<commit_message>
This is to add another revision of the PPT to Dennis's branch in the group's repo for the final project.
</commit_message>
<xml_diff>
--- a/Cancer_Champions_PPT.pptx
+++ b/Cancer_Champions_PPT.pptx
@@ -5,10 +5,10 @@
     <p:sldMasterId id="2147483669" r:id="rId4"/>
   </p:sldMasterIdLst>
   <p:notesMasterIdLst>
-    <p:notesMasterId r:id="rId22"/>
+    <p:notesMasterId r:id="rId23"/>
   </p:notesMasterIdLst>
   <p:handoutMasterIdLst>
-    <p:handoutMasterId r:id="rId23"/>
+    <p:handoutMasterId r:id="rId24"/>
   </p:handoutMasterIdLst>
   <p:sldIdLst>
     <p:sldId id="256" r:id="rId5"/>
@@ -24,10 +24,11 @@
     <p:sldId id="269" r:id="rId15"/>
     <p:sldId id="270" r:id="rId16"/>
     <p:sldId id="271" r:id="rId17"/>
-    <p:sldId id="261" r:id="rId18"/>
-    <p:sldId id="272" r:id="rId19"/>
-    <p:sldId id="263" r:id="rId20"/>
-    <p:sldId id="262" r:id="rId21"/>
+    <p:sldId id="273" r:id="rId18"/>
+    <p:sldId id="261" r:id="rId19"/>
+    <p:sldId id="272" r:id="rId20"/>
+    <p:sldId id="263" r:id="rId21"/>
+    <p:sldId id="262" r:id="rId22"/>
   </p:sldIdLst>
   <p:sldSz cx="12192000" cy="6858000"/>
   <p:notesSz cx="6858000" cy="9144000"/>
@@ -3463,7 +3464,7 @@
       <dgm:spPr/>
     </dgm:pt>
     <dgm:pt modelId="{17CA1487-CDD9-4364-92F6-A11DBDAFE16C}" type="pres">
-      <dgm:prSet presAssocID="{6857B86A-DEC1-407C-A1BB-5BF9ACCBCA6A}" presName="desTx" presStyleLbl="alignAccFollowNode1" presStyleIdx="0" presStyleCnt="3" custScaleX="95991" custScaleY="100000" custLinFactNeighborX="1302" custLinFactNeighborY="-6530">
+      <dgm:prSet presAssocID="{6857B86A-DEC1-407C-A1BB-5BF9ACCBCA6A}" presName="desTx" presStyleLbl="alignAccFollowNode1" presStyleIdx="0" presStyleCnt="3" custScaleX="95991" custScaleY="90365" custLinFactNeighborX="1302" custLinFactNeighborY="-6530">
         <dgm:presLayoutVars>
           <dgm:bulletEnabled val="1"/>
         </dgm:presLayoutVars>
@@ -3489,7 +3490,7 @@
       <dgm:spPr/>
     </dgm:pt>
     <dgm:pt modelId="{E4FD5043-5612-43C5-B6AE-CCD431549399}" type="pres">
-      <dgm:prSet presAssocID="{ABA77F75-8642-4931-8D7E-BE6C6DB9940D}" presName="desTx" presStyleLbl="alignAccFollowNode1" presStyleIdx="1" presStyleCnt="3" custScaleX="95961" custScaleY="99865" custLinFactNeighborX="-729" custLinFactNeighborY="-5592">
+      <dgm:prSet presAssocID="{ABA77F75-8642-4931-8D7E-BE6C6DB9940D}" presName="desTx" presStyleLbl="alignAccFollowNode1" presStyleIdx="1" presStyleCnt="3" custScaleX="95961" custScaleY="91425" custLinFactNeighborX="-729" custLinFactNeighborY="-5592">
         <dgm:presLayoutVars>
           <dgm:bulletEnabled val="1"/>
         </dgm:presLayoutVars>
@@ -3515,7 +3516,7 @@
       <dgm:spPr/>
     </dgm:pt>
     <dgm:pt modelId="{EA81ED6A-A7EA-4137-A3DC-D16E79F1B938}" type="pres">
-      <dgm:prSet presAssocID="{DA5DFAD8-E443-4F53-9341-A0903BBBD378}" presName="desTx" presStyleLbl="alignAccFollowNode1" presStyleIdx="2" presStyleCnt="3" custScaleY="99586" custLinFactNeighborX="160" custLinFactNeighborY="-5450">
+      <dgm:prSet presAssocID="{DA5DFAD8-E443-4F53-9341-A0903BBBD378}" presName="desTx" presStyleLbl="alignAccFollowNode1" presStyleIdx="2" presStyleCnt="3" custScaleY="90918" custLinFactNeighborX="160" custLinFactNeighborY="-5956">
         <dgm:presLayoutVars>
           <dgm:bulletEnabled val="1"/>
         </dgm:presLayoutVars>
@@ -4313,8 +4314,8 @@
       </dsp:nvSpPr>
       <dsp:spPr>
         <a:xfrm>
-          <a:off x="67114" y="0"/>
-          <a:ext cx="3549098" cy="571800"/>
+          <a:off x="67114" y="255275"/>
+          <a:ext cx="3549098" cy="543210"/>
         </a:xfrm>
         <a:prstGeom prst="rect">
           <a:avLst/>
@@ -4386,8 +4387,8 @@
         </a:p>
       </dsp:txBody>
       <dsp:txXfrm>
-        <a:off x="67114" y="0"/>
-        <a:ext cx="3549098" cy="571800"/>
+        <a:off x="67114" y="255275"/>
+        <a:ext cx="3549098" cy="543210"/>
       </dsp:txXfrm>
     </dsp:sp>
     <dsp:sp modelId="{17CA1487-CDD9-4364-92F6-A11DBDAFE16C}">
@@ -4397,8 +4398,8 @@
       </dsp:nvSpPr>
       <dsp:spPr>
         <a:xfrm>
-          <a:off x="67132" y="578266"/>
-          <a:ext cx="3526066" cy="3813624"/>
+          <a:off x="67132" y="992370"/>
+          <a:ext cx="3526066" cy="3166191"/>
         </a:xfrm>
         <a:prstGeom prst="rect">
           <a:avLst/>
@@ -4469,7 +4470,7 @@
           </a:r>
         </a:p>
         <a:p>
-          <a:pPr marL="171450" lvl="1" indent="-171450" algn="l" defTabSz="844550">
+          <a:pPr marL="171450" lvl="1" indent="-171450" algn="l" defTabSz="755650">
             <a:lnSpc>
               <a:spcPct val="90000"/>
             </a:lnSpc>
@@ -4483,7 +4484,7 @@
             <a:buChar char=""/>
           </a:pPr>
           <a:r>
-            <a:rPr lang="en-US" sz="1900" kern="1200" dirty="0">
+            <a:rPr lang="en-US" sz="1700" kern="1200" dirty="0">
               <a:latin typeface="Tahoma" panose="020B0604030504040204" pitchFamily="34" charset="0"/>
               <a:ea typeface="Tahoma" panose="020B0604030504040204" pitchFamily="34" charset="0"/>
               <a:cs typeface="Tahoma" panose="020B0604030504040204" pitchFamily="34" charset="0"/>
@@ -4492,7 +4493,7 @@
           </a:r>
         </a:p>
         <a:p>
-          <a:pPr marL="342900" lvl="2" indent="-171450" algn="l" defTabSz="844550">
+          <a:pPr marL="342900" lvl="2" indent="-171450" algn="l" defTabSz="755650">
             <a:lnSpc>
               <a:spcPct val="90000"/>
             </a:lnSpc>
@@ -4506,7 +4507,7 @@
             <a:buChar char=""/>
           </a:pPr>
           <a:r>
-            <a:rPr lang="en-US" sz="1900" kern="1200" dirty="0">
+            <a:rPr lang="en-US" sz="1700" kern="1200" dirty="0">
               <a:latin typeface="Tahoma" panose="020B0604030504040204" pitchFamily="34" charset="0"/>
               <a:ea typeface="Tahoma" panose="020B0604030504040204" pitchFamily="34" charset="0"/>
               <a:cs typeface="Tahoma" panose="020B0604030504040204" pitchFamily="34" charset="0"/>
@@ -4515,7 +4516,7 @@
           </a:r>
         </a:p>
         <a:p>
-          <a:pPr marL="342900" lvl="2" indent="-171450" algn="l" defTabSz="844550">
+          <a:pPr marL="342900" lvl="2" indent="-171450" algn="l" defTabSz="755650">
             <a:lnSpc>
               <a:spcPct val="90000"/>
             </a:lnSpc>
@@ -4529,7 +4530,7 @@
             <a:buChar char=""/>
           </a:pPr>
           <a:r>
-            <a:rPr lang="en-US" sz="1900" kern="1200" dirty="0">
+            <a:rPr lang="en-US" sz="1700" kern="1200" dirty="0">
               <a:latin typeface="Tahoma" panose="020B0604030504040204" pitchFamily="34" charset="0"/>
               <a:ea typeface="Tahoma" panose="020B0604030504040204" pitchFamily="34" charset="0"/>
               <a:cs typeface="Tahoma" panose="020B0604030504040204" pitchFamily="34" charset="0"/>
@@ -4537,7 +4538,7 @@
             <a:t>datasets/</a:t>
           </a:r>
           <a:r>
-            <a:rPr lang="en-US" sz="1900" kern="1200" dirty="0" err="1">
+            <a:rPr lang="en-US" sz="1700" kern="1200" dirty="0" err="1">
               <a:latin typeface="Tahoma" panose="020B0604030504040204" pitchFamily="34" charset="0"/>
               <a:ea typeface="Tahoma" panose="020B0604030504040204" pitchFamily="34" charset="0"/>
               <a:cs typeface="Tahoma" panose="020B0604030504040204" pitchFamily="34" charset="0"/>
@@ -4545,7 +4546,7 @@
             <a:t>andrewmvd</a:t>
           </a:r>
           <a:r>
-            <a:rPr lang="en-US" sz="1900" kern="1200" dirty="0">
+            <a:rPr lang="en-US" sz="1700" kern="1200" dirty="0">
               <a:latin typeface="Tahoma" panose="020B0604030504040204" pitchFamily="34" charset="0"/>
               <a:ea typeface="Tahoma" panose="020B0604030504040204" pitchFamily="34" charset="0"/>
               <a:cs typeface="Tahoma" panose="020B0604030504040204" pitchFamily="34" charset="0"/>
@@ -4554,7 +4555,7 @@
           </a:r>
         </a:p>
         <a:p>
-          <a:pPr marL="342900" lvl="2" indent="-171450" algn="l" defTabSz="844550">
+          <a:pPr marL="342900" lvl="2" indent="-171450" algn="l" defTabSz="755650">
             <a:lnSpc>
               <a:spcPct val="90000"/>
             </a:lnSpc>
@@ -4568,7 +4569,7 @@
             <a:buChar char=""/>
           </a:pPr>
           <a:r>
-            <a:rPr lang="en-US" sz="1900" kern="1200" dirty="0">
+            <a:rPr lang="en-US" sz="1700" kern="1200" dirty="0">
               <a:latin typeface="Tahoma" panose="020B0604030504040204" pitchFamily="34" charset="0"/>
               <a:ea typeface="Tahoma" panose="020B0604030504040204" pitchFamily="34" charset="0"/>
               <a:cs typeface="Tahoma" panose="020B0604030504040204" pitchFamily="34" charset="0"/>
@@ -4577,7 +4578,7 @@
           </a:r>
         </a:p>
         <a:p>
-          <a:pPr marL="514350" lvl="3" indent="-171450" algn="l" defTabSz="844550">
+          <a:pPr marL="514350" lvl="3" indent="-171450" algn="l" defTabSz="755650">
             <a:lnSpc>
               <a:spcPct val="90000"/>
             </a:lnSpc>
@@ -4591,21 +4592,21 @@
             <a:buChar char=""/>
           </a:pPr>
           <a:r>
-            <a:rPr lang="en-US" sz="1900" b="1" i="1" kern="1200" dirty="0">
+            <a:rPr lang="en-US" sz="1700" b="1" i="1" kern="1200" dirty="0">
               <a:latin typeface="Tahoma" panose="020B0604030504040204" pitchFamily="34" charset="0"/>
               <a:ea typeface="Tahoma" panose="020B0604030504040204" pitchFamily="34" charset="0"/>
               <a:cs typeface="Tahoma" panose="020B0604030504040204" pitchFamily="34" charset="0"/>
             </a:rPr>
             <a:t>Reduced Input Size</a:t>
           </a:r>
-          <a:endParaRPr lang="en-US" sz="1900" kern="1200" dirty="0">
+          <a:endParaRPr lang="en-US" sz="1700" kern="1200" dirty="0">
             <a:latin typeface="Tahoma" panose="020B0604030504040204" pitchFamily="34" charset="0"/>
             <a:ea typeface="Tahoma" panose="020B0604030504040204" pitchFamily="34" charset="0"/>
             <a:cs typeface="Tahoma" panose="020B0604030504040204" pitchFamily="34" charset="0"/>
           </a:endParaRPr>
         </a:p>
         <a:p>
-          <a:pPr marL="171450" lvl="1" indent="-171450" algn="l" defTabSz="844550">
+          <a:pPr marL="171450" lvl="1" indent="-171450" algn="l" defTabSz="755650">
             <a:lnSpc>
               <a:spcPct val="90000"/>
             </a:lnSpc>
@@ -4619,7 +4620,7 @@
             <a:buChar char=""/>
           </a:pPr>
           <a:r>
-            <a:rPr lang="en-US" sz="1900" kern="1200" dirty="0">
+            <a:rPr lang="en-US" sz="1700" kern="1200" dirty="0">
               <a:latin typeface="Tahoma" panose="020B0604030504040204" pitchFamily="34" charset="0"/>
               <a:ea typeface="Tahoma" panose="020B0604030504040204" pitchFamily="34" charset="0"/>
               <a:cs typeface="Tahoma" panose="020B0604030504040204" pitchFamily="34" charset="0"/>
@@ -4627,21 +4628,21 @@
             <a:t>Build from </a:t>
           </a:r>
           <a:r>
-            <a:rPr lang="en-US" sz="1900" kern="1200" dirty="0" err="1">
+            <a:rPr lang="en-US" sz="1700" kern="1200" dirty="0" err="1">
               <a:latin typeface="Tahoma" panose="020B0604030504040204" pitchFamily="34" charset="0"/>
               <a:ea typeface="Tahoma" panose="020B0604030504040204" pitchFamily="34" charset="0"/>
               <a:cs typeface="Tahoma" panose="020B0604030504040204" pitchFamily="34" charset="0"/>
             </a:rPr>
             <a:t>Scrach</a:t>
           </a:r>
-          <a:endParaRPr lang="en-US" sz="1900" kern="1200" dirty="0">
+          <a:endParaRPr lang="en-US" sz="1700" kern="1200" dirty="0">
             <a:latin typeface="Tahoma" panose="020B0604030504040204" pitchFamily="34" charset="0"/>
             <a:ea typeface="Tahoma" panose="020B0604030504040204" pitchFamily="34" charset="0"/>
             <a:cs typeface="Tahoma" panose="020B0604030504040204" pitchFamily="34" charset="0"/>
           </a:endParaRPr>
         </a:p>
         <a:p>
-          <a:pPr marL="171450" lvl="1" indent="-171450" algn="l" defTabSz="844550">
+          <a:pPr marL="171450" lvl="1" indent="-171450" algn="l" defTabSz="755650">
             <a:lnSpc>
               <a:spcPct val="90000"/>
             </a:lnSpc>
@@ -4655,19 +4656,19 @@
             <a:buChar char=""/>
           </a:pPr>
           <a:r>
-            <a:rPr lang="en-US" sz="1900" b="1" i="1" kern="1200" dirty="0">
+            <a:rPr lang="en-US" sz="1700" b="1" i="1" kern="1200" dirty="0">
               <a:latin typeface="Tahoma" panose="020B0604030504040204" pitchFamily="34" charset="0"/>
               <a:ea typeface="Tahoma" panose="020B0604030504040204" pitchFamily="34" charset="0"/>
               <a:cs typeface="Tahoma" panose="020B0604030504040204" pitchFamily="34" charset="0"/>
             </a:rPr>
             <a:t>Add on Interface</a:t>
           </a:r>
-          <a:endParaRPr lang="en-US" sz="1900" kern="1200" dirty="0"/>
+          <a:endParaRPr lang="en-US" sz="1700" kern="1200" dirty="0"/>
         </a:p>
       </dsp:txBody>
       <dsp:txXfrm>
-        <a:off x="67132" y="578266"/>
-        <a:ext cx="3526066" cy="3813624"/>
+        <a:off x="67132" y="992370"/>
+        <a:ext cx="3526066" cy="3166191"/>
       </dsp:txXfrm>
     </dsp:sp>
     <dsp:sp modelId="{055A5EAB-EAE0-4501-8649-31F112FF9AD5}">
@@ -4677,8 +4678,8 @@
       </dsp:nvSpPr>
       <dsp:spPr>
         <a:xfrm>
-          <a:off x="4054294" y="9435"/>
-          <a:ext cx="3522320" cy="576000"/>
+          <a:off x="4054294" y="264897"/>
+          <a:ext cx="3522320" cy="547200"/>
         </a:xfrm>
         <a:prstGeom prst="rect">
           <a:avLst/>
@@ -4750,8 +4751,8 @@
         </a:p>
       </dsp:txBody>
       <dsp:txXfrm>
-        <a:off x="4054294" y="9435"/>
-        <a:ext cx="3522320" cy="576000"/>
+        <a:off x="4054294" y="264897"/>
+        <a:ext cx="3522320" cy="547200"/>
       </dsp:txXfrm>
     </dsp:sp>
     <dsp:sp modelId="{E4FD5043-5612-43C5-B6AE-CCD431549399}">
@@ -4761,8 +4762,8 @@
       </dsp:nvSpPr>
       <dsp:spPr>
         <a:xfrm>
-          <a:off x="4044376" y="621049"/>
-          <a:ext cx="3524964" cy="3808475"/>
+          <a:off x="4044376" y="1000373"/>
+          <a:ext cx="3524964" cy="3203331"/>
         </a:xfrm>
         <a:prstGeom prst="rect">
           <a:avLst/>
@@ -4805,12 +4806,12 @@
         <a:fontRef idx="minor"/>
       </dsp:style>
       <dsp:txBody>
-        <a:bodyPr spcFirstLastPara="0" vert="horz" wrap="square" lIns="101346" tIns="101346" rIns="135128" bIns="152019" numCol="1" spcCol="1270" anchor="t" anchorCtr="0">
+        <a:bodyPr spcFirstLastPara="0" vert="horz" wrap="square" lIns="90678" tIns="90678" rIns="120904" bIns="136017" numCol="1" spcCol="1270" anchor="t" anchorCtr="0">
           <a:noAutofit/>
         </a:bodyPr>
         <a:lstStyle/>
         <a:p>
-          <a:pPr marL="171450" lvl="1" indent="-171450" algn="l" defTabSz="844550">
+          <a:pPr marL="171450" lvl="1" indent="-171450" algn="l" defTabSz="755650">
             <a:lnSpc>
               <a:spcPct val="90000"/>
             </a:lnSpc>
@@ -4824,7 +4825,7 @@
             <a:buChar char="§"/>
           </a:pPr>
           <a:r>
-            <a:rPr lang="en-US" sz="1900" kern="1200" dirty="0">
+            <a:rPr lang="en-US" sz="1700" kern="1200" dirty="0">
               <a:latin typeface="Tahoma" panose="020B0604030504040204" pitchFamily="34" charset="0"/>
               <a:ea typeface="Tahoma" panose="020B0604030504040204" pitchFamily="34" charset="0"/>
               <a:cs typeface="Tahoma" panose="020B0604030504040204" pitchFamily="34" charset="0"/>
@@ -4832,7 +4833,7 @@
             <a:t>Pre-trained U-Net Model/</a:t>
           </a:r>
           <a:r>
-            <a:rPr lang="en-US" sz="1900" kern="1200" dirty="0">
+            <a:rPr lang="en-US" sz="1700" kern="1200" dirty="0">
               <a:solidFill>
                 <a:srgbClr val="FF0000"/>
               </a:solidFill>
@@ -4842,14 +4843,14 @@
             </a:rPr>
             <a:t>FAILURE</a:t>
           </a:r>
-          <a:endParaRPr lang="en-US" sz="1900" kern="1200" dirty="0">
+          <a:endParaRPr lang="en-US" sz="1700" kern="1200" dirty="0">
             <a:latin typeface="Tahoma" panose="020B0604030504040204" pitchFamily="34" charset="0"/>
             <a:ea typeface="Tahoma" panose="020B0604030504040204" pitchFamily="34" charset="0"/>
             <a:cs typeface="Tahoma" panose="020B0604030504040204" pitchFamily="34" charset="0"/>
           </a:endParaRPr>
         </a:p>
         <a:p>
-          <a:pPr marL="171450" lvl="1" indent="-171450" algn="l" defTabSz="844550">
+          <a:pPr marL="171450" lvl="1" indent="-171450" algn="l" defTabSz="755650">
             <a:lnSpc>
               <a:spcPct val="90000"/>
             </a:lnSpc>
@@ -4862,14 +4863,14 @@
             <a:buFont typeface="Wingdings" panose="05000000000000000000" pitchFamily="2" charset="2"/>
             <a:buNone/>
           </a:pPr>
-          <a:endParaRPr lang="en-US" sz="1900" kern="1200" dirty="0">
+          <a:endParaRPr lang="en-US" sz="1700" kern="1200" dirty="0">
             <a:latin typeface="Tahoma" panose="020B0604030504040204" pitchFamily="34" charset="0"/>
             <a:ea typeface="Tahoma" panose="020B0604030504040204" pitchFamily="34" charset="0"/>
             <a:cs typeface="Tahoma" panose="020B0604030504040204" pitchFamily="34" charset="0"/>
           </a:endParaRPr>
         </a:p>
         <a:p>
-          <a:pPr marL="171450" lvl="1" indent="-171450" algn="l" defTabSz="844550">
+          <a:pPr marL="171450" lvl="1" indent="-171450" algn="l" defTabSz="755650">
             <a:lnSpc>
               <a:spcPct val="90000"/>
             </a:lnSpc>
@@ -4883,7 +4884,7 @@
             <a:buChar char=""/>
           </a:pPr>
           <a:r>
-            <a:rPr lang="en-US" sz="1900" kern="1200" dirty="0">
+            <a:rPr lang="en-US" sz="1700" kern="1200" dirty="0">
               <a:latin typeface="Tahoma" panose="020B0604030504040204" pitchFamily="34" charset="0"/>
               <a:ea typeface="Tahoma" panose="020B0604030504040204" pitchFamily="34" charset="0"/>
               <a:cs typeface="Tahoma" panose="020B0604030504040204" pitchFamily="34" charset="0"/>
@@ -4891,7 +4892,7 @@
             <a:t>U-Net Model from Scratch/</a:t>
           </a:r>
           <a:r>
-            <a:rPr lang="en-US" sz="1900" kern="1200" dirty="0">
+            <a:rPr lang="en-US" sz="1700" kern="1200" dirty="0">
               <a:solidFill>
                 <a:srgbClr val="FF0000"/>
               </a:solidFill>
@@ -4903,7 +4904,7 @@
           </a:r>
         </a:p>
         <a:p>
-          <a:pPr marL="171450" lvl="1" indent="-171450" algn="l" defTabSz="844550">
+          <a:pPr marL="171450" lvl="1" indent="-171450" algn="l" defTabSz="755650">
             <a:lnSpc>
               <a:spcPct val="90000"/>
             </a:lnSpc>
@@ -4917,7 +4918,7 @@
             <a:buChar char=""/>
           </a:pPr>
           <a:r>
-            <a:rPr lang="en-US" sz="1900" kern="1200" dirty="0">
+            <a:rPr lang="en-US" sz="1700" kern="1200" dirty="0">
               <a:latin typeface="Tahoma" panose="020B0604030504040204" pitchFamily="34" charset="0"/>
               <a:ea typeface="Tahoma" panose="020B0604030504040204" pitchFamily="34" charset="0"/>
               <a:cs typeface="Tahoma" panose="020B0604030504040204" pitchFamily="34" charset="0"/>
@@ -4926,7 +4927,7 @@
           </a:r>
         </a:p>
         <a:p>
-          <a:pPr marL="342900" lvl="2" indent="-171450" algn="l" defTabSz="844550">
+          <a:pPr marL="342900" lvl="2" indent="-171450" algn="l" defTabSz="755650">
             <a:lnSpc>
               <a:spcPct val="90000"/>
             </a:lnSpc>
@@ -4940,7 +4941,7 @@
             <a:buChar char=""/>
           </a:pPr>
           <a:r>
-            <a:rPr lang="en-US" sz="1900" kern="1200" dirty="0">
+            <a:rPr lang="en-US" sz="1700" kern="1200" dirty="0">
               <a:latin typeface="Tahoma" panose="020B0604030504040204" pitchFamily="34" charset="0"/>
               <a:ea typeface="Tahoma" panose="020B0604030504040204" pitchFamily="34" charset="0"/>
               <a:cs typeface="Tahoma" panose="020B0604030504040204" pitchFamily="34" charset="0"/>
@@ -4949,7 +4950,7 @@
           </a:r>
         </a:p>
         <a:p>
-          <a:pPr marL="342900" lvl="2" indent="-171450" algn="l" defTabSz="844550">
+          <a:pPr marL="342900" lvl="2" indent="-171450" algn="l" defTabSz="755650">
             <a:lnSpc>
               <a:spcPct val="90000"/>
             </a:lnSpc>
@@ -4963,7 +4964,7 @@
             <a:buChar char=""/>
           </a:pPr>
           <a:r>
-            <a:rPr lang="en-US" sz="1900" kern="1200" dirty="0">
+            <a:rPr lang="en-US" sz="1700" kern="1200" dirty="0">
               <a:latin typeface="Tahoma" panose="020B0604030504040204" pitchFamily="34" charset="0"/>
               <a:ea typeface="Tahoma" panose="020B0604030504040204" pitchFamily="34" charset="0"/>
               <a:cs typeface="Tahoma" panose="020B0604030504040204" pitchFamily="34" charset="0"/>
@@ -4972,7 +4973,7 @@
           </a:r>
         </a:p>
         <a:p>
-          <a:pPr marL="342900" lvl="2" indent="-171450" algn="l" defTabSz="844550">
+          <a:pPr marL="342900" lvl="2" indent="-171450" algn="l" defTabSz="755650">
             <a:lnSpc>
               <a:spcPct val="90000"/>
             </a:lnSpc>
@@ -4986,7 +4987,7 @@
             <a:buChar char=""/>
           </a:pPr>
           <a:r>
-            <a:rPr lang="en-US" sz="1900" kern="1200" dirty="0">
+            <a:rPr lang="en-US" sz="1700" kern="1200" dirty="0">
               <a:latin typeface="Tahoma" panose="020B0604030504040204" pitchFamily="34" charset="0"/>
               <a:ea typeface="Tahoma" panose="020B0604030504040204" pitchFamily="34" charset="0"/>
               <a:cs typeface="Tahoma" panose="020B0604030504040204" pitchFamily="34" charset="0"/>
@@ -4995,7 +4996,7 @@
           </a:r>
         </a:p>
         <a:p>
-          <a:pPr marL="342900" lvl="2" indent="-171450" algn="l" defTabSz="844550">
+          <a:pPr marL="342900" lvl="2" indent="-171450" algn="l" defTabSz="755650">
             <a:lnSpc>
               <a:spcPct val="90000"/>
             </a:lnSpc>
@@ -5009,7 +5010,7 @@
             <a:buChar char=""/>
           </a:pPr>
           <a:r>
-            <a:rPr lang="en-US" sz="1900" kern="1200" dirty="0">
+            <a:rPr lang="en-US" sz="1700" kern="1200" dirty="0">
               <a:latin typeface="Tahoma" panose="020B0604030504040204" pitchFamily="34" charset="0"/>
               <a:ea typeface="Tahoma" panose="020B0604030504040204" pitchFamily="34" charset="0"/>
               <a:cs typeface="Tahoma" panose="020B0604030504040204" pitchFamily="34" charset="0"/>
@@ -5018,7 +5019,7 @@
           </a:r>
         </a:p>
         <a:p>
-          <a:pPr marL="171450" lvl="1" indent="-171450" algn="l" defTabSz="844550">
+          <a:pPr marL="171450" lvl="1" indent="-171450" algn="l" defTabSz="755650">
             <a:lnSpc>
               <a:spcPct val="90000"/>
             </a:lnSpc>
@@ -5031,7 +5032,7 @@
             <a:buFont typeface="Wingdings" panose="05000000000000000000" pitchFamily="2" charset="2"/>
             <a:buChar char=""/>
           </a:pPr>
-          <a:endParaRPr lang="en-US" sz="1900" kern="1200" dirty="0">
+          <a:endParaRPr lang="en-US" sz="1700" kern="1200" dirty="0">
             <a:latin typeface="Tahoma" panose="020B0604030504040204" pitchFamily="34" charset="0"/>
             <a:ea typeface="Tahoma" panose="020B0604030504040204" pitchFamily="34" charset="0"/>
             <a:cs typeface="Tahoma" panose="020B0604030504040204" pitchFamily="34" charset="0"/>
@@ -5039,8 +5040,8 @@
         </a:p>
       </dsp:txBody>
       <dsp:txXfrm>
-        <a:off x="4044376" y="621049"/>
-        <a:ext cx="3524964" cy="3808475"/>
+        <a:off x="4044376" y="1000373"/>
+        <a:ext cx="3524964" cy="3203331"/>
       </dsp:txXfrm>
     </dsp:sp>
     <dsp:sp modelId="{23D06E36-F688-4B37-8BB8-73015E665B0E}">
@@ -5050,8 +5051,8 @@
       </dsp:nvSpPr>
       <dsp:spPr>
         <a:xfrm>
-          <a:off x="8116263" y="42064"/>
-          <a:ext cx="3673330" cy="576000"/>
+          <a:off x="8116263" y="297809"/>
+          <a:ext cx="3673330" cy="547200"/>
         </a:xfrm>
         <a:prstGeom prst="rect">
           <a:avLst/>
@@ -5123,8 +5124,8 @@
         </a:p>
       </dsp:txBody>
       <dsp:txXfrm>
-        <a:off x="8116263" y="42064"/>
-        <a:ext cx="3673330" cy="576000"/>
+        <a:off x="8116263" y="297809"/>
+        <a:ext cx="3673330" cy="547200"/>
       </dsp:txXfrm>
     </dsp:sp>
     <dsp:sp modelId="{EA81ED6A-A7EA-4137-A3DC-D16E79F1B938}">
@@ -5134,8 +5135,8 @@
       </dsp:nvSpPr>
       <dsp:spPr>
         <a:xfrm>
-          <a:off x="8116263" y="634444"/>
-          <a:ext cx="3673330" cy="3797835"/>
+          <a:off x="8116263" y="1000942"/>
+          <a:ext cx="3673330" cy="3185567"/>
         </a:xfrm>
         <a:prstGeom prst="rect">
           <a:avLst/>
@@ -5178,12 +5179,12 @@
         <a:fontRef idx="minor"/>
       </dsp:style>
       <dsp:txBody>
-        <a:bodyPr spcFirstLastPara="0" vert="horz" wrap="square" lIns="101346" tIns="101346" rIns="135128" bIns="152019" numCol="1" spcCol="1270" anchor="t" anchorCtr="0">
+        <a:bodyPr spcFirstLastPara="0" vert="horz" wrap="square" lIns="90678" tIns="90678" rIns="120904" bIns="136017" numCol="1" spcCol="1270" anchor="t" anchorCtr="0">
           <a:noAutofit/>
         </a:bodyPr>
         <a:lstStyle/>
         <a:p>
-          <a:pPr marL="171450" lvl="1" indent="-171450" algn="l" defTabSz="844550">
+          <a:pPr marL="171450" lvl="1" indent="-171450" algn="l" defTabSz="755650">
             <a:lnSpc>
               <a:spcPct val="90000"/>
             </a:lnSpc>
@@ -5197,7 +5198,7 @@
             <a:buChar char=""/>
           </a:pPr>
           <a:r>
-            <a:rPr lang="en-US" sz="1900" kern="1200" dirty="0" err="1">
+            <a:rPr lang="en-US" sz="1700" kern="1200" dirty="0" err="1">
               <a:latin typeface="Tahoma" panose="020B0604030504040204" pitchFamily="34" charset="0"/>
               <a:ea typeface="Tahoma" panose="020B0604030504040204" pitchFamily="34" charset="0"/>
               <a:cs typeface="Tahoma" panose="020B0604030504040204" pitchFamily="34" charset="0"/>
@@ -5205,7 +5206,7 @@
             <a:t>Pretrainded</a:t>
           </a:r>
           <a:r>
-            <a:rPr lang="en-US" sz="1900" kern="1200" dirty="0">
+            <a:rPr lang="en-US" sz="1700" kern="1200" dirty="0">
               <a:latin typeface="Tahoma" panose="020B0604030504040204" pitchFamily="34" charset="0"/>
               <a:ea typeface="Tahoma" panose="020B0604030504040204" pitchFamily="34" charset="0"/>
               <a:cs typeface="Tahoma" panose="020B0604030504040204" pitchFamily="34" charset="0"/>
@@ -5213,17 +5214,17 @@
             <a:t> </a:t>
           </a:r>
           <a:r>
-            <a:rPr lang="en-US" sz="1900" b="0" i="0" kern="1200" dirty="0"/>
+            <a:rPr lang="en-US" sz="1700" b="0" i="0" kern="1200" dirty="0"/>
             <a:t>Lung ResNet50 KD</a:t>
           </a:r>
-          <a:endParaRPr lang="en-US" sz="1900" kern="1200" dirty="0">
+          <a:endParaRPr lang="en-US" sz="1700" kern="1200" dirty="0">
             <a:latin typeface="Tahoma" panose="020B0604030504040204" pitchFamily="34" charset="0"/>
             <a:ea typeface="Tahoma" panose="020B0604030504040204" pitchFamily="34" charset="0"/>
             <a:cs typeface="Tahoma" panose="020B0604030504040204" pitchFamily="34" charset="0"/>
           </a:endParaRPr>
         </a:p>
         <a:p>
-          <a:pPr marL="171450" lvl="1" indent="-171450" algn="l" defTabSz="844550">
+          <a:pPr marL="171450" lvl="1" indent="-171450" algn="l" defTabSz="755650">
             <a:lnSpc>
               <a:spcPct val="90000"/>
             </a:lnSpc>
@@ -5237,7 +5238,7 @@
             <a:buChar char=""/>
           </a:pPr>
           <a:r>
-            <a:rPr lang="en-US" sz="1900" kern="1200" dirty="0">
+            <a:rPr lang="en-US" sz="1700" kern="1200" dirty="0">
               <a:latin typeface="Tahoma" panose="020B0604030504040204" pitchFamily="34" charset="0"/>
               <a:ea typeface="Tahoma" panose="020B0604030504040204" pitchFamily="34" charset="0"/>
               <a:cs typeface="Tahoma" panose="020B0604030504040204" pitchFamily="34" charset="0"/>
@@ -5246,7 +5247,7 @@
           </a:r>
         </a:p>
         <a:p>
-          <a:pPr marL="342900" lvl="2" indent="-171450" algn="l" defTabSz="844550">
+          <a:pPr marL="342900" lvl="2" indent="-171450" algn="l" defTabSz="755650">
             <a:lnSpc>
               <a:spcPct val="90000"/>
             </a:lnSpc>
@@ -5260,7 +5261,7 @@
             <a:buNone/>
           </a:pPr>
           <a:r>
-            <a:rPr lang="en-US" sz="1900" kern="1200" dirty="0">
+            <a:rPr lang="en-US" sz="1700" kern="1200" dirty="0">
               <a:latin typeface="Tahoma" panose="020B0604030504040204" pitchFamily="34" charset="0"/>
               <a:ea typeface="Tahoma" panose="020B0604030504040204" pitchFamily="34" charset="0"/>
               <a:cs typeface="Tahoma" panose="020B0604030504040204" pitchFamily="34" charset="0"/>
@@ -5269,7 +5270,7 @@
           </a:r>
         </a:p>
         <a:p>
-          <a:pPr marL="342900" lvl="2" indent="-171450" algn="l" defTabSz="844550">
+          <a:pPr marL="342900" lvl="2" indent="-171450" algn="l" defTabSz="755650">
             <a:lnSpc>
               <a:spcPct val="90000"/>
             </a:lnSpc>
@@ -5283,7 +5284,7 @@
             <a:buNone/>
           </a:pPr>
           <a:r>
-            <a:rPr lang="en-US" sz="1900" kern="1200" dirty="0">
+            <a:rPr lang="en-US" sz="1700" kern="1200" dirty="0">
               <a:latin typeface="Tahoma" panose="020B0604030504040204" pitchFamily="34" charset="0"/>
               <a:ea typeface="Tahoma" panose="020B0604030504040204" pitchFamily="34" charset="0"/>
               <a:cs typeface="Tahoma" panose="020B0604030504040204" pitchFamily="34" charset="0"/>
@@ -5291,7 +5292,7 @@
             <a:t>datasets/</a:t>
           </a:r>
           <a:r>
-            <a:rPr lang="en-US" sz="1900" kern="1200" dirty="0" err="1">
+            <a:rPr lang="en-US" sz="1700" kern="1200" dirty="0" err="1">
               <a:latin typeface="Tahoma" panose="020B0604030504040204" pitchFamily="34" charset="0"/>
               <a:ea typeface="Tahoma" panose="020B0604030504040204" pitchFamily="34" charset="0"/>
               <a:cs typeface="Tahoma" panose="020B0604030504040204" pitchFamily="34" charset="0"/>
@@ -5299,7 +5300,7 @@
             <a:t>andrewmvd</a:t>
           </a:r>
           <a:r>
-            <a:rPr lang="en-US" sz="1900" kern="1200" dirty="0">
+            <a:rPr lang="en-US" sz="1700" kern="1200" dirty="0">
               <a:latin typeface="Tahoma" panose="020B0604030504040204" pitchFamily="34" charset="0"/>
               <a:ea typeface="Tahoma" panose="020B0604030504040204" pitchFamily="34" charset="0"/>
               <a:cs typeface="Tahoma" panose="020B0604030504040204" pitchFamily="34" charset="0"/>
@@ -5308,7 +5309,7 @@
           </a:r>
         </a:p>
         <a:p>
-          <a:pPr marL="342900" lvl="2" indent="-171450" algn="l" defTabSz="844550">
+          <a:pPr marL="342900" lvl="2" indent="-171450" algn="l" defTabSz="755650">
             <a:lnSpc>
               <a:spcPct val="90000"/>
             </a:lnSpc>
@@ -5322,7 +5323,7 @@
             <a:buNone/>
           </a:pPr>
           <a:r>
-            <a:rPr lang="en-US" sz="1900" kern="1200" dirty="0">
+            <a:rPr lang="en-US" sz="1700" kern="1200" dirty="0">
               <a:latin typeface="Tahoma" panose="020B0604030504040204" pitchFamily="34" charset="0"/>
               <a:ea typeface="Tahoma" panose="020B0604030504040204" pitchFamily="34" charset="0"/>
               <a:cs typeface="Tahoma" panose="020B0604030504040204" pitchFamily="34" charset="0"/>
@@ -5331,7 +5332,7 @@
           </a:r>
         </a:p>
         <a:p>
-          <a:pPr marL="514350" lvl="3" indent="-171450" algn="l" defTabSz="844550">
+          <a:pPr marL="514350" lvl="3" indent="-171450" algn="l" defTabSz="755650">
             <a:lnSpc>
               <a:spcPct val="90000"/>
             </a:lnSpc>
@@ -5345,21 +5346,21 @@
             <a:buNone/>
           </a:pPr>
           <a:r>
-            <a:rPr lang="en-US" sz="1900" b="1" i="1" kern="1200" dirty="0">
+            <a:rPr lang="en-US" sz="1700" b="1" i="1" kern="1200" dirty="0">
               <a:latin typeface="Tahoma" panose="020B0604030504040204" pitchFamily="34" charset="0"/>
               <a:ea typeface="Tahoma" panose="020B0604030504040204" pitchFamily="34" charset="0"/>
               <a:cs typeface="Tahoma" panose="020B0604030504040204" pitchFamily="34" charset="0"/>
             </a:rPr>
             <a:t>Reduced Input Size</a:t>
           </a:r>
-          <a:endParaRPr lang="en-US" sz="1900" kern="1200" dirty="0">
+          <a:endParaRPr lang="en-US" sz="1700" kern="1200" dirty="0">
             <a:latin typeface="Tahoma" panose="020B0604030504040204" pitchFamily="34" charset="0"/>
             <a:ea typeface="Tahoma" panose="020B0604030504040204" pitchFamily="34" charset="0"/>
             <a:cs typeface="Tahoma" panose="020B0604030504040204" pitchFamily="34" charset="0"/>
           </a:endParaRPr>
         </a:p>
         <a:p>
-          <a:pPr marL="171450" lvl="1" indent="-171450" algn="l" defTabSz="844550">
+          <a:pPr marL="171450" lvl="1" indent="-171450" algn="l" defTabSz="755650">
             <a:lnSpc>
               <a:spcPct val="90000"/>
             </a:lnSpc>
@@ -5373,7 +5374,7 @@
             <a:buChar char=""/>
           </a:pPr>
           <a:r>
-            <a:rPr lang="en-US" sz="1900" kern="1200" dirty="0">
+            <a:rPr lang="en-US" sz="1700" kern="1200" dirty="0">
               <a:latin typeface="Tahoma" panose="020B0604030504040204" pitchFamily="34" charset="0"/>
               <a:ea typeface="Tahoma" panose="020B0604030504040204" pitchFamily="34" charset="0"/>
               <a:cs typeface="Tahoma" panose="020B0604030504040204" pitchFamily="34" charset="0"/>
@@ -5383,8 +5384,8 @@
         </a:p>
       </dsp:txBody>
       <dsp:txXfrm>
-        <a:off x="8116263" y="634444"/>
-        <a:ext cx="3673330" cy="3797835"/>
+        <a:off x="8116263" y="1000942"/>
+        <a:ext cx="3673330" cy="3185567"/>
       </dsp:txXfrm>
     </dsp:sp>
   </dsp:spTree>
@@ -8504,7 +8505,7 @@
           <a:noFill/>
           <a:extLst>
             <a:ext uri="{909E8E84-426E-40dd-AFC4-6F175D3DCCD1}">
-              <a14:hiddenFill xmlns:a14="http://schemas.microsoft.com/office/drawing/2010/main" xmlns="">
+              <a14:hiddenFill xmlns="" xmlns:a14="http://schemas.microsoft.com/office/drawing/2010/main">
                 <a:solidFill>
                   <a:srgbClr val="FFFFFF"/>
                 </a:solidFill>
@@ -8563,7 +8564,7 @@
             </a:ln>
             <a:extLst>
               <a:ext uri="{91240B29-F687-4f45-9708-019B960494DF}">
-                <a14:hiddenLine xmlns:a14="http://schemas.microsoft.com/office/drawing/2010/main" xmlns="" w="9525">
+                <a14:hiddenLine xmlns="" xmlns:a14="http://schemas.microsoft.com/office/drawing/2010/main" w="9525">
                   <a:solidFill>
                     <a:srgbClr val="000000"/>
                   </a:solidFill>
@@ -8653,7 +8654,7 @@
             </a:ln>
             <a:extLst>
               <a:ext uri="{91240B29-F687-4f45-9708-019B960494DF}">
-                <a14:hiddenLine xmlns:a14="http://schemas.microsoft.com/office/drawing/2010/main" xmlns="" w="9525">
+                <a14:hiddenLine xmlns="" xmlns:a14="http://schemas.microsoft.com/office/drawing/2010/main" w="9525">
                   <a:solidFill>
                     <a:srgbClr val="000000"/>
                   </a:solidFill>
@@ -8743,7 +8744,7 @@
             </a:ln>
             <a:extLst>
               <a:ext uri="{91240B29-F687-4f45-9708-019B960494DF}">
-                <a14:hiddenLine xmlns:a14="http://schemas.microsoft.com/office/drawing/2010/main" xmlns="" w="9525">
+                <a14:hiddenLine xmlns="" xmlns:a14="http://schemas.microsoft.com/office/drawing/2010/main" w="9525">
                   <a:solidFill>
                     <a:srgbClr val="000000"/>
                   </a:solidFill>
@@ -8777,7 +8778,7 @@
             </a:ln>
             <a:extLst>
               <a:ext uri="{91240B29-F687-4f45-9708-019B960494DF}">
-                <a14:hiddenLine xmlns:a14="http://schemas.microsoft.com/office/drawing/2010/main" xmlns="" w="9525">
+                <a14:hiddenLine xmlns="" xmlns:a14="http://schemas.microsoft.com/office/drawing/2010/main" w="9525">
                   <a:solidFill>
                     <a:srgbClr val="000000"/>
                   </a:solidFill>
@@ -8867,7 +8868,7 @@
             </a:ln>
             <a:extLst>
               <a:ext uri="{91240B29-F687-4f45-9708-019B960494DF}">
-                <a14:hiddenLine xmlns:a14="http://schemas.microsoft.com/office/drawing/2010/main" xmlns="" w="9525">
+                <a14:hiddenLine xmlns="" xmlns:a14="http://schemas.microsoft.com/office/drawing/2010/main" w="9525">
                   <a:solidFill>
                     <a:srgbClr val="000000"/>
                   </a:solidFill>
@@ -8929,7 +8930,7 @@
             </a:ln>
             <a:extLst>
               <a:ext uri="{91240B29-F687-4f45-9708-019B960494DF}">
-                <a14:hiddenLine xmlns:a14="http://schemas.microsoft.com/office/drawing/2010/main" xmlns="" w="9525">
+                <a14:hiddenLine xmlns="" xmlns:a14="http://schemas.microsoft.com/office/drawing/2010/main" w="9525">
                   <a:solidFill>
                     <a:srgbClr val="000000"/>
                   </a:solidFill>
@@ -8991,7 +8992,7 @@
             </a:ln>
             <a:extLst>
               <a:ext uri="{91240B29-F687-4f45-9708-019B960494DF}">
-                <a14:hiddenLine xmlns:a14="http://schemas.microsoft.com/office/drawing/2010/main" xmlns="" w="9525">
+                <a14:hiddenLine xmlns="" xmlns:a14="http://schemas.microsoft.com/office/drawing/2010/main" w="9525">
                   <a:solidFill>
                     <a:srgbClr val="000000"/>
                   </a:solidFill>
@@ -9081,7 +9082,7 @@
             </a:ln>
             <a:extLst>
               <a:ext uri="{91240B29-F687-4f45-9708-019B960494DF}">
-                <a14:hiddenLine xmlns:a14="http://schemas.microsoft.com/office/drawing/2010/main" xmlns="" w="9525">
+                <a14:hiddenLine xmlns="" xmlns:a14="http://schemas.microsoft.com/office/drawing/2010/main" w="9525">
                   <a:solidFill>
                     <a:srgbClr val="000000"/>
                   </a:solidFill>
@@ -9143,7 +9144,7 @@
             </a:ln>
             <a:extLst>
               <a:ext uri="{91240B29-F687-4f45-9708-019B960494DF}">
-                <a14:hiddenLine xmlns:a14="http://schemas.microsoft.com/office/drawing/2010/main" xmlns="" w="9525">
+                <a14:hiddenLine xmlns="" xmlns:a14="http://schemas.microsoft.com/office/drawing/2010/main" w="9525">
                   <a:solidFill>
                     <a:srgbClr val="000000"/>
                   </a:solidFill>
@@ -9205,7 +9206,7 @@
             </a:ln>
             <a:extLst>
               <a:ext uri="{91240B29-F687-4f45-9708-019B960494DF}">
-                <a14:hiddenLine xmlns:a14="http://schemas.microsoft.com/office/drawing/2010/main" xmlns="" w="9525">
+                <a14:hiddenLine xmlns="" xmlns:a14="http://schemas.microsoft.com/office/drawing/2010/main" w="9525">
                   <a:solidFill>
                     <a:srgbClr val="000000"/>
                   </a:solidFill>
@@ -9295,7 +9296,7 @@
             </a:ln>
             <a:extLst>
               <a:ext uri="{91240B29-F687-4f45-9708-019B960494DF}">
-                <a14:hiddenLine xmlns:a14="http://schemas.microsoft.com/office/drawing/2010/main" xmlns="" w="9525">
+                <a14:hiddenLine xmlns="" xmlns:a14="http://schemas.microsoft.com/office/drawing/2010/main" w="9525">
                   <a:solidFill>
                     <a:srgbClr val="000000"/>
                   </a:solidFill>
@@ -9385,7 +9386,7 @@
             </a:ln>
             <a:extLst>
               <a:ext uri="{91240B29-F687-4f45-9708-019B960494DF}">
-                <a14:hiddenLine xmlns:a14="http://schemas.microsoft.com/office/drawing/2010/main" xmlns="" w="9525">
+                <a14:hiddenLine xmlns="" xmlns:a14="http://schemas.microsoft.com/office/drawing/2010/main" w="9525">
                   <a:solidFill>
                     <a:srgbClr val="000000"/>
                   </a:solidFill>
@@ -9447,7 +9448,7 @@
             </a:ln>
             <a:extLst>
               <a:ext uri="{91240B29-F687-4f45-9708-019B960494DF}">
-                <a14:hiddenLine xmlns:a14="http://schemas.microsoft.com/office/drawing/2010/main" xmlns="" w="9525">
+                <a14:hiddenLine xmlns="" xmlns:a14="http://schemas.microsoft.com/office/drawing/2010/main" w="9525">
                   <a:solidFill>
                     <a:srgbClr val="000000"/>
                   </a:solidFill>
@@ -9557,7 +9558,7 @@
             </a:ln>
             <a:extLst>
               <a:ext uri="{91240B29-F687-4f45-9708-019B960494DF}">
-                <a14:hiddenLine xmlns:a14="http://schemas.microsoft.com/office/drawing/2010/main" xmlns="" w="9525">
+                <a14:hiddenLine xmlns="" xmlns:a14="http://schemas.microsoft.com/office/drawing/2010/main" w="9525">
                   <a:solidFill>
                     <a:srgbClr val="000000"/>
                   </a:solidFill>
@@ -9619,7 +9620,7 @@
             </a:ln>
             <a:extLst>
               <a:ext uri="{91240B29-F687-4f45-9708-019B960494DF}">
-                <a14:hiddenLine xmlns:a14="http://schemas.microsoft.com/office/drawing/2010/main" xmlns="" w="9525">
+                <a14:hiddenLine xmlns="" xmlns:a14="http://schemas.microsoft.com/office/drawing/2010/main" w="9525">
                   <a:solidFill>
                     <a:srgbClr val="000000"/>
                   </a:solidFill>
@@ -9709,7 +9710,7 @@
             </a:ln>
             <a:extLst>
               <a:ext uri="{91240B29-F687-4f45-9708-019B960494DF}">
-                <a14:hiddenLine xmlns:a14="http://schemas.microsoft.com/office/drawing/2010/main" xmlns="" w="9525">
+                <a14:hiddenLine xmlns="" xmlns:a14="http://schemas.microsoft.com/office/drawing/2010/main" w="9525">
                   <a:solidFill>
                     <a:srgbClr val="000000"/>
                   </a:solidFill>
@@ -9799,7 +9800,7 @@
             </a:ln>
             <a:extLst>
               <a:ext uri="{91240B29-F687-4f45-9708-019B960494DF}">
-                <a14:hiddenLine xmlns:a14="http://schemas.microsoft.com/office/drawing/2010/main" xmlns="" w="9525">
+                <a14:hiddenLine xmlns="" xmlns:a14="http://schemas.microsoft.com/office/drawing/2010/main" w="9525">
                   <a:solidFill>
                     <a:srgbClr val="000000"/>
                   </a:solidFill>
@@ -9861,7 +9862,7 @@
             </a:ln>
             <a:extLst>
               <a:ext uri="{91240B29-F687-4f45-9708-019B960494DF}">
-                <a14:hiddenLine xmlns:a14="http://schemas.microsoft.com/office/drawing/2010/main" xmlns="" w="9525">
+                <a14:hiddenLine xmlns="" xmlns:a14="http://schemas.microsoft.com/office/drawing/2010/main" w="9525">
                   <a:solidFill>
                     <a:srgbClr val="000000"/>
                   </a:solidFill>
@@ -9951,7 +9952,7 @@
             </a:ln>
             <a:extLst>
               <a:ext uri="{91240B29-F687-4f45-9708-019B960494DF}">
-                <a14:hiddenLine xmlns:a14="http://schemas.microsoft.com/office/drawing/2010/main" xmlns="" w="9525">
+                <a14:hiddenLine xmlns="" xmlns:a14="http://schemas.microsoft.com/office/drawing/2010/main" w="9525">
                   <a:solidFill>
                     <a:srgbClr val="000000"/>
                   </a:solidFill>
@@ -10041,7 +10042,7 @@
             </a:ln>
             <a:extLst>
               <a:ext uri="{91240B29-F687-4f45-9708-019B960494DF}">
-                <a14:hiddenLine xmlns:a14="http://schemas.microsoft.com/office/drawing/2010/main" xmlns="" w="9525">
+                <a14:hiddenLine xmlns="" xmlns:a14="http://schemas.microsoft.com/office/drawing/2010/main" w="9525">
                   <a:solidFill>
                     <a:srgbClr val="000000"/>
                   </a:solidFill>
@@ -10097,7 +10098,7 @@
             </a:ln>
             <a:extLst>
               <a:ext uri="{91240B29-F687-4f45-9708-019B960494DF}">
-                <a14:hiddenLine xmlns:a14="http://schemas.microsoft.com/office/drawing/2010/main" xmlns="" w="9525">
+                <a14:hiddenLine xmlns="" xmlns:a14="http://schemas.microsoft.com/office/drawing/2010/main" w="9525">
                   <a:solidFill>
                     <a:srgbClr val="000000"/>
                   </a:solidFill>
@@ -10187,7 +10188,7 @@
             </a:ln>
             <a:extLst>
               <a:ext uri="{91240B29-F687-4f45-9708-019B960494DF}">
-                <a14:hiddenLine xmlns:a14="http://schemas.microsoft.com/office/drawing/2010/main" xmlns="" w="9525">
+                <a14:hiddenLine xmlns="" xmlns:a14="http://schemas.microsoft.com/office/drawing/2010/main" w="9525">
                   <a:solidFill>
                     <a:srgbClr val="000000"/>
                   </a:solidFill>
@@ -10243,7 +10244,7 @@
             </a:ln>
             <a:extLst>
               <a:ext uri="{91240B29-F687-4f45-9708-019B960494DF}">
-                <a14:hiddenLine xmlns:a14="http://schemas.microsoft.com/office/drawing/2010/main" xmlns="" w="9525">
+                <a14:hiddenLine xmlns="" xmlns:a14="http://schemas.microsoft.com/office/drawing/2010/main" w="9525">
                   <a:solidFill>
                     <a:srgbClr val="000000"/>
                   </a:solidFill>
@@ -10333,7 +10334,7 @@
             </a:ln>
             <a:extLst>
               <a:ext uri="{91240B29-F687-4f45-9708-019B960494DF}">
-                <a14:hiddenLine xmlns:a14="http://schemas.microsoft.com/office/drawing/2010/main" xmlns="" w="9525">
+                <a14:hiddenLine xmlns="" xmlns:a14="http://schemas.microsoft.com/office/drawing/2010/main" w="9525">
                   <a:solidFill>
                     <a:srgbClr val="000000"/>
                   </a:solidFill>
@@ -10401,7 +10402,7 @@
             </a:ln>
             <a:extLst>
               <a:ext uri="{91240B29-F687-4f45-9708-019B960494DF}">
-                <a14:hiddenLine xmlns:a14="http://schemas.microsoft.com/office/drawing/2010/main" xmlns="" w="9525">
+                <a14:hiddenLine xmlns="" xmlns:a14="http://schemas.microsoft.com/office/drawing/2010/main" w="9525">
                   <a:solidFill>
                     <a:srgbClr val="000000"/>
                   </a:solidFill>
@@ -10491,7 +10492,7 @@
             </a:ln>
             <a:extLst>
               <a:ext uri="{91240B29-F687-4f45-9708-019B960494DF}">
-                <a14:hiddenLine xmlns:a14="http://schemas.microsoft.com/office/drawing/2010/main" xmlns="" w="9525">
+                <a14:hiddenLine xmlns="" xmlns:a14="http://schemas.microsoft.com/office/drawing/2010/main" w="9525">
                   <a:solidFill>
                     <a:srgbClr val="000000"/>
                   </a:solidFill>
@@ -10559,7 +10560,7 @@
             </a:ln>
             <a:extLst>
               <a:ext uri="{91240B29-F687-4f45-9708-019B960494DF}">
-                <a14:hiddenLine xmlns:a14="http://schemas.microsoft.com/office/drawing/2010/main" xmlns="" w="9525">
+                <a14:hiddenLine xmlns="" xmlns:a14="http://schemas.microsoft.com/office/drawing/2010/main" w="9525">
                   <a:solidFill>
                     <a:srgbClr val="000000"/>
                   </a:solidFill>
@@ -10649,7 +10650,7 @@
             </a:ln>
             <a:extLst>
               <a:ext uri="{91240B29-F687-4f45-9708-019B960494DF}">
-                <a14:hiddenLine xmlns:a14="http://schemas.microsoft.com/office/drawing/2010/main" xmlns="" w="9525">
+                <a14:hiddenLine xmlns="" xmlns:a14="http://schemas.microsoft.com/office/drawing/2010/main" w="9525">
                   <a:solidFill>
                     <a:srgbClr val="000000"/>
                   </a:solidFill>
@@ -10683,7 +10684,7 @@
             </a:ln>
             <a:extLst>
               <a:ext uri="{91240B29-F687-4f45-9708-019B960494DF}">
-                <a14:hiddenLine xmlns:a14="http://schemas.microsoft.com/office/drawing/2010/main" xmlns="" w="9525">
+                <a14:hiddenLine xmlns="" xmlns:a14="http://schemas.microsoft.com/office/drawing/2010/main" w="9525">
                   <a:solidFill>
                     <a:srgbClr val="000000"/>
                   </a:solidFill>
@@ -10773,7 +10774,7 @@
             </a:ln>
             <a:extLst>
               <a:ext uri="{91240B29-F687-4f45-9708-019B960494DF}">
-                <a14:hiddenLine xmlns:a14="http://schemas.microsoft.com/office/drawing/2010/main" xmlns="" w="9525">
+                <a14:hiddenLine xmlns="" xmlns:a14="http://schemas.microsoft.com/office/drawing/2010/main" w="9525">
                   <a:solidFill>
                     <a:srgbClr val="000000"/>
                   </a:solidFill>
@@ -10835,7 +10836,7 @@
             </a:ln>
             <a:extLst>
               <a:ext uri="{91240B29-F687-4f45-9708-019B960494DF}">
-                <a14:hiddenLine xmlns:a14="http://schemas.microsoft.com/office/drawing/2010/main" xmlns="" w="9525">
+                <a14:hiddenLine xmlns="" xmlns:a14="http://schemas.microsoft.com/office/drawing/2010/main" w="9525">
                   <a:solidFill>
                     <a:srgbClr val="000000"/>
                   </a:solidFill>
@@ -10897,7 +10898,7 @@
             </a:ln>
             <a:extLst>
               <a:ext uri="{91240B29-F687-4f45-9708-019B960494DF}">
-                <a14:hiddenLine xmlns:a14="http://schemas.microsoft.com/office/drawing/2010/main" xmlns="" w="9525">
+                <a14:hiddenLine xmlns="" xmlns:a14="http://schemas.microsoft.com/office/drawing/2010/main" w="9525">
                   <a:solidFill>
                     <a:srgbClr val="000000"/>
                   </a:solidFill>
@@ -10987,7 +10988,7 @@
             </a:ln>
             <a:extLst>
               <a:ext uri="{91240B29-F687-4f45-9708-019B960494DF}">
-                <a14:hiddenLine xmlns:a14="http://schemas.microsoft.com/office/drawing/2010/main" xmlns="" w="9525">
+                <a14:hiddenLine xmlns="" xmlns:a14="http://schemas.microsoft.com/office/drawing/2010/main" w="9525">
                   <a:solidFill>
                     <a:srgbClr val="000000"/>
                   </a:solidFill>
@@ -11055,7 +11056,7 @@
             </a:ln>
             <a:extLst>
               <a:ext uri="{91240B29-F687-4f45-9708-019B960494DF}">
-                <a14:hiddenLine xmlns:a14="http://schemas.microsoft.com/office/drawing/2010/main" xmlns="" w="9525">
+                <a14:hiddenLine xmlns="" xmlns:a14="http://schemas.microsoft.com/office/drawing/2010/main" w="9525">
                   <a:solidFill>
                     <a:srgbClr val="000000"/>
                   </a:solidFill>
@@ -11117,7 +11118,7 @@
             </a:ln>
             <a:extLst>
               <a:ext uri="{91240B29-F687-4f45-9708-019B960494DF}">
-                <a14:hiddenLine xmlns:a14="http://schemas.microsoft.com/office/drawing/2010/main" xmlns="" w="9525">
+                <a14:hiddenLine xmlns="" xmlns:a14="http://schemas.microsoft.com/office/drawing/2010/main" w="9525">
                   <a:solidFill>
                     <a:srgbClr val="000000"/>
                   </a:solidFill>
@@ -11207,7 +11208,7 @@
             </a:ln>
             <a:extLst>
               <a:ext uri="{91240B29-F687-4f45-9708-019B960494DF}">
-                <a14:hiddenLine xmlns:a14="http://schemas.microsoft.com/office/drawing/2010/main" xmlns="" w="9525">
+                <a14:hiddenLine xmlns="" xmlns:a14="http://schemas.microsoft.com/office/drawing/2010/main" w="9525">
                   <a:solidFill>
                     <a:srgbClr val="000000"/>
                   </a:solidFill>
@@ -11269,7 +11270,7 @@
             </a:ln>
             <a:extLst>
               <a:ext uri="{91240B29-F687-4f45-9708-019B960494DF}">
-                <a14:hiddenLine xmlns:a14="http://schemas.microsoft.com/office/drawing/2010/main" xmlns="" w="9525">
+                <a14:hiddenLine xmlns="" xmlns:a14="http://schemas.microsoft.com/office/drawing/2010/main" w="9525">
                   <a:solidFill>
                     <a:srgbClr val="000000"/>
                   </a:solidFill>
@@ -11359,7 +11360,7 @@
             </a:ln>
             <a:extLst>
               <a:ext uri="{91240B29-F687-4f45-9708-019B960494DF}">
-                <a14:hiddenLine xmlns:a14="http://schemas.microsoft.com/office/drawing/2010/main" xmlns="" w="9525">
+                <a14:hiddenLine xmlns="" xmlns:a14="http://schemas.microsoft.com/office/drawing/2010/main" w="9525">
                   <a:solidFill>
                     <a:srgbClr val="000000"/>
                   </a:solidFill>
@@ -11421,7 +11422,7 @@
             </a:ln>
             <a:extLst>
               <a:ext uri="{91240B29-F687-4f45-9708-019B960494DF}">
-                <a14:hiddenLine xmlns:a14="http://schemas.microsoft.com/office/drawing/2010/main" xmlns="" w="9525">
+                <a14:hiddenLine xmlns="" xmlns:a14="http://schemas.microsoft.com/office/drawing/2010/main" w="9525">
                   <a:solidFill>
                     <a:srgbClr val="000000"/>
                   </a:solidFill>
@@ -11511,7 +11512,7 @@
             </a:ln>
             <a:extLst>
               <a:ext uri="{91240B29-F687-4f45-9708-019B960494DF}">
-                <a14:hiddenLine xmlns:a14="http://schemas.microsoft.com/office/drawing/2010/main" xmlns="" w="9525">
+                <a14:hiddenLine xmlns="" xmlns:a14="http://schemas.microsoft.com/office/drawing/2010/main" w="9525">
                   <a:solidFill>
                     <a:srgbClr val="000000"/>
                   </a:solidFill>
@@ -11545,7 +11546,7 @@
             </a:ln>
             <a:extLst>
               <a:ext uri="{91240B29-F687-4f45-9708-019B960494DF}">
-                <a14:hiddenLine xmlns:a14="http://schemas.microsoft.com/office/drawing/2010/main" xmlns="" w="9525">
+                <a14:hiddenLine xmlns="" xmlns:a14="http://schemas.microsoft.com/office/drawing/2010/main" w="9525">
                   <a:solidFill>
                     <a:srgbClr val="000000"/>
                   </a:solidFill>
@@ -11610,7 +11611,7 @@
             </a:ln>
             <a:extLst>
               <a:ext uri="{91240B29-F687-4f45-9708-019B960494DF}">
-                <a14:hiddenLine xmlns:a14="http://schemas.microsoft.com/office/drawing/2010/main" xmlns="" w="9525">
+                <a14:hiddenLine xmlns="" xmlns:a14="http://schemas.microsoft.com/office/drawing/2010/main" w="9525">
                   <a:solidFill>
                     <a:srgbClr val="000000"/>
                   </a:solidFill>
@@ -11700,7 +11701,7 @@
             </a:ln>
             <a:extLst>
               <a:ext uri="{91240B29-F687-4f45-9708-019B960494DF}">
-                <a14:hiddenLine xmlns:a14="http://schemas.microsoft.com/office/drawing/2010/main" xmlns="" w="9525">
+                <a14:hiddenLine xmlns="" xmlns:a14="http://schemas.microsoft.com/office/drawing/2010/main" w="9525">
                   <a:solidFill>
                     <a:srgbClr val="000000"/>
                   </a:solidFill>
@@ -11762,7 +11763,7 @@
             </a:ln>
             <a:extLst>
               <a:ext uri="{91240B29-F687-4f45-9708-019B960494DF}">
-                <a14:hiddenLine xmlns:a14="http://schemas.microsoft.com/office/drawing/2010/main" xmlns="" w="9525">
+                <a14:hiddenLine xmlns="" xmlns:a14="http://schemas.microsoft.com/office/drawing/2010/main" w="9525">
                   <a:solidFill>
                     <a:srgbClr val="000000"/>
                   </a:solidFill>
@@ -11852,7 +11853,7 @@
             </a:ln>
             <a:extLst>
               <a:ext uri="{91240B29-F687-4f45-9708-019B960494DF}">
-                <a14:hiddenLine xmlns:a14="http://schemas.microsoft.com/office/drawing/2010/main" xmlns="" w="9525">
+                <a14:hiddenLine xmlns="" xmlns:a14="http://schemas.microsoft.com/office/drawing/2010/main" w="9525">
                   <a:solidFill>
                     <a:srgbClr val="000000"/>
                   </a:solidFill>
@@ -11942,7 +11943,7 @@
             </a:ln>
             <a:extLst>
               <a:ext uri="{91240B29-F687-4f45-9708-019B960494DF}">
-                <a14:hiddenLine xmlns:a14="http://schemas.microsoft.com/office/drawing/2010/main" xmlns="" w="9525">
+                <a14:hiddenLine xmlns="" xmlns:a14="http://schemas.microsoft.com/office/drawing/2010/main" w="9525">
                   <a:solidFill>
                     <a:srgbClr val="000000"/>
                   </a:solidFill>
@@ -12007,7 +12008,7 @@
             </a:ln>
             <a:extLst>
               <a:ext uri="{91240B29-F687-4f45-9708-019B960494DF}">
-                <a14:hiddenLine xmlns:a14="http://schemas.microsoft.com/office/drawing/2010/main" xmlns="" w="9525">
+                <a14:hiddenLine xmlns="" xmlns:a14="http://schemas.microsoft.com/office/drawing/2010/main" w="9525">
                   <a:solidFill>
                     <a:srgbClr val="000000"/>
                   </a:solidFill>
@@ -12069,7 +12070,7 @@
             </a:ln>
             <a:extLst>
               <a:ext uri="{91240B29-F687-4f45-9708-019B960494DF}">
-                <a14:hiddenLine xmlns:a14="http://schemas.microsoft.com/office/drawing/2010/main" xmlns="" w="9525">
+                <a14:hiddenLine xmlns="" xmlns:a14="http://schemas.microsoft.com/office/drawing/2010/main" w="9525">
                   <a:solidFill>
                     <a:srgbClr val="000000"/>
                   </a:solidFill>
@@ -12159,7 +12160,7 @@
             </a:ln>
             <a:extLst>
               <a:ext uri="{91240B29-F687-4f45-9708-019B960494DF}">
-                <a14:hiddenLine xmlns:a14="http://schemas.microsoft.com/office/drawing/2010/main" xmlns="" w="9525">
+                <a14:hiddenLine xmlns="" xmlns:a14="http://schemas.microsoft.com/office/drawing/2010/main" w="9525">
                   <a:solidFill>
                     <a:srgbClr val="000000"/>
                   </a:solidFill>
@@ -12249,7 +12250,7 @@
             </a:ln>
             <a:extLst>
               <a:ext uri="{91240B29-F687-4f45-9708-019B960494DF}">
-                <a14:hiddenLine xmlns:a14="http://schemas.microsoft.com/office/drawing/2010/main" xmlns="" w="9525">
+                <a14:hiddenLine xmlns="" xmlns:a14="http://schemas.microsoft.com/office/drawing/2010/main" w="9525">
                   <a:solidFill>
                     <a:srgbClr val="000000"/>
                   </a:solidFill>
@@ -12311,7 +12312,7 @@
             </a:ln>
             <a:extLst>
               <a:ext uri="{91240B29-F687-4f45-9708-019B960494DF}">
-                <a14:hiddenLine xmlns:a14="http://schemas.microsoft.com/office/drawing/2010/main" xmlns="" w="9525">
+                <a14:hiddenLine xmlns="" xmlns:a14="http://schemas.microsoft.com/office/drawing/2010/main" w="9525">
                   <a:solidFill>
                     <a:srgbClr val="000000"/>
                   </a:solidFill>
@@ -12431,7 +12432,7 @@
             </a:ln>
             <a:extLst>
               <a:ext uri="{91240B29-F687-4f45-9708-019B960494DF}">
-                <a14:hiddenLine xmlns:a14="http://schemas.microsoft.com/office/drawing/2010/main" xmlns="" w="9525">
+                <a14:hiddenLine xmlns="" xmlns:a14="http://schemas.microsoft.com/office/drawing/2010/main" w="9525">
                   <a:solidFill>
                     <a:srgbClr val="000000"/>
                   </a:solidFill>
@@ -12499,7 +12500,7 @@
             </a:ln>
             <a:extLst>
               <a:ext uri="{91240B29-F687-4f45-9708-019B960494DF}">
-                <a14:hiddenLine xmlns:a14="http://schemas.microsoft.com/office/drawing/2010/main" xmlns="" w="9525">
+                <a14:hiddenLine xmlns="" xmlns:a14="http://schemas.microsoft.com/office/drawing/2010/main" w="9525">
                   <a:solidFill>
                     <a:srgbClr val="000000"/>
                   </a:solidFill>
@@ -12589,7 +12590,7 @@
             </a:ln>
             <a:extLst>
               <a:ext uri="{91240B29-F687-4f45-9708-019B960494DF}">
-                <a14:hiddenLine xmlns:a14="http://schemas.microsoft.com/office/drawing/2010/main" xmlns="" w="9525">
+                <a14:hiddenLine xmlns="" xmlns:a14="http://schemas.microsoft.com/office/drawing/2010/main" w="9525">
                   <a:solidFill>
                     <a:srgbClr val="000000"/>
                   </a:solidFill>
@@ -17403,7 +17404,7 @@
           <a:noFill/>
           <a:extLst>
             <a:ext uri="{909E8E84-426E-40dd-AFC4-6F175D3DCCD1}">
-              <a14:hiddenFill xmlns:a14="http://schemas.microsoft.com/office/drawing/2010/main" xmlns="">
+              <a14:hiddenFill xmlns="" xmlns:a14="http://schemas.microsoft.com/office/drawing/2010/main">
                 <a:solidFill>
                   <a:srgbClr val="FFFFFF"/>
                 </a:solidFill>
@@ -17477,7 +17478,7 @@
               </a:ln>
               <a:extLst>
                 <a:ext uri="{91240B29-F687-4f45-9708-019B960494DF}">
-                  <a14:hiddenLine xmlns:a14="http://schemas.microsoft.com/office/drawing/2010/main" xmlns="" w="9525">
+                  <a14:hiddenLine xmlns="" xmlns:a14="http://schemas.microsoft.com/office/drawing/2010/main" w="9525">
                     <a:solidFill>
                       <a:srgbClr val="000000"/>
                     </a:solidFill>
@@ -17567,7 +17568,7 @@
               </a:ln>
               <a:extLst>
                 <a:ext uri="{91240B29-F687-4f45-9708-019B960494DF}">
-                  <a14:hiddenLine xmlns:a14="http://schemas.microsoft.com/office/drawing/2010/main" xmlns="" w="9525">
+                  <a14:hiddenLine xmlns="" xmlns:a14="http://schemas.microsoft.com/office/drawing/2010/main" w="9525">
                     <a:solidFill>
                       <a:srgbClr val="000000"/>
                     </a:solidFill>
@@ -17657,7 +17658,7 @@
               </a:ln>
               <a:extLst>
                 <a:ext uri="{91240B29-F687-4f45-9708-019B960494DF}">
-                  <a14:hiddenLine xmlns:a14="http://schemas.microsoft.com/office/drawing/2010/main" xmlns="" w="9525">
+                  <a14:hiddenLine xmlns="" xmlns:a14="http://schemas.microsoft.com/office/drawing/2010/main" w="9525">
                     <a:solidFill>
                       <a:srgbClr val="000000"/>
                     </a:solidFill>
@@ -17719,7 +17720,7 @@
               </a:ln>
               <a:extLst>
                 <a:ext uri="{91240B29-F687-4f45-9708-019B960494DF}">
-                  <a14:hiddenLine xmlns:a14="http://schemas.microsoft.com/office/drawing/2010/main" xmlns="" w="9525">
+                  <a14:hiddenLine xmlns="" xmlns:a14="http://schemas.microsoft.com/office/drawing/2010/main" w="9525">
                     <a:solidFill>
                       <a:srgbClr val="000000"/>
                     </a:solidFill>
@@ -17809,7 +17810,7 @@
               </a:ln>
               <a:extLst>
                 <a:ext uri="{91240B29-F687-4f45-9708-019B960494DF}">
-                  <a14:hiddenLine xmlns:a14="http://schemas.microsoft.com/office/drawing/2010/main" xmlns="" w="9525">
+                  <a14:hiddenLine xmlns="" xmlns:a14="http://schemas.microsoft.com/office/drawing/2010/main" w="9525">
                     <a:solidFill>
                       <a:srgbClr val="000000"/>
                     </a:solidFill>
@@ -17871,7 +17872,7 @@
               </a:ln>
               <a:extLst>
                 <a:ext uri="{91240B29-F687-4f45-9708-019B960494DF}">
-                  <a14:hiddenLine xmlns:a14="http://schemas.microsoft.com/office/drawing/2010/main" xmlns="" w="9525">
+                  <a14:hiddenLine xmlns="" xmlns:a14="http://schemas.microsoft.com/office/drawing/2010/main" w="9525">
                     <a:solidFill>
                       <a:srgbClr val="000000"/>
                     </a:solidFill>
@@ -17933,7 +17934,7 @@
               </a:ln>
               <a:extLst>
                 <a:ext uri="{91240B29-F687-4f45-9708-019B960494DF}">
-                  <a14:hiddenLine xmlns:a14="http://schemas.microsoft.com/office/drawing/2010/main" xmlns="" w="9525">
+                  <a14:hiddenLine xmlns="" xmlns:a14="http://schemas.microsoft.com/office/drawing/2010/main" w="9525">
                     <a:solidFill>
                       <a:srgbClr val="000000"/>
                     </a:solidFill>
@@ -18023,7 +18024,7 @@
               </a:ln>
               <a:extLst>
                 <a:ext uri="{91240B29-F687-4f45-9708-019B960494DF}">
-                  <a14:hiddenLine xmlns:a14="http://schemas.microsoft.com/office/drawing/2010/main" xmlns="" w="9525">
+                  <a14:hiddenLine xmlns="" xmlns:a14="http://schemas.microsoft.com/office/drawing/2010/main" w="9525">
                     <a:solidFill>
                       <a:srgbClr val="000000"/>
                     </a:solidFill>
@@ -18113,7 +18114,7 @@
               </a:ln>
               <a:extLst>
                 <a:ext uri="{91240B29-F687-4f45-9708-019B960494DF}">
-                  <a14:hiddenLine xmlns:a14="http://schemas.microsoft.com/office/drawing/2010/main" xmlns="" w="9525">
+                  <a14:hiddenLine xmlns="" xmlns:a14="http://schemas.microsoft.com/office/drawing/2010/main" w="9525">
                     <a:solidFill>
                       <a:srgbClr val="000000"/>
                     </a:solidFill>
@@ -18175,7 +18176,7 @@
               </a:ln>
               <a:extLst>
                 <a:ext uri="{91240B29-F687-4f45-9708-019B960494DF}">
-                  <a14:hiddenLine xmlns:a14="http://schemas.microsoft.com/office/drawing/2010/main" xmlns="" w="9525">
+                  <a14:hiddenLine xmlns="" xmlns:a14="http://schemas.microsoft.com/office/drawing/2010/main" w="9525">
                     <a:solidFill>
                       <a:srgbClr val="000000"/>
                     </a:solidFill>
@@ -18285,7 +18286,7 @@
               </a:ln>
               <a:extLst>
                 <a:ext uri="{91240B29-F687-4f45-9708-019B960494DF}">
-                  <a14:hiddenLine xmlns:a14="http://schemas.microsoft.com/office/drawing/2010/main" xmlns="" w="9525">
+                  <a14:hiddenLine xmlns="" xmlns:a14="http://schemas.microsoft.com/office/drawing/2010/main" w="9525">
                     <a:solidFill>
                       <a:srgbClr val="000000"/>
                     </a:solidFill>
@@ -18369,7 +18370,7 @@
               </a:ln>
               <a:extLst>
                 <a:ext uri="{91240B29-F687-4f45-9708-019B960494DF}">
-                  <a14:hiddenLine xmlns:a14="http://schemas.microsoft.com/office/drawing/2010/main" xmlns="" w="9525">
+                  <a14:hiddenLine xmlns="" xmlns:a14="http://schemas.microsoft.com/office/drawing/2010/main" w="9525">
                     <a:solidFill>
                       <a:srgbClr val="000000"/>
                     </a:solidFill>
@@ -18431,7 +18432,7 @@
               </a:ln>
               <a:extLst>
                 <a:ext uri="{91240B29-F687-4f45-9708-019B960494DF}">
-                  <a14:hiddenLine xmlns:a14="http://schemas.microsoft.com/office/drawing/2010/main" xmlns="" w="9525">
+                  <a14:hiddenLine xmlns="" xmlns:a14="http://schemas.microsoft.com/office/drawing/2010/main" w="9525">
                     <a:solidFill>
                       <a:srgbClr val="000000"/>
                     </a:solidFill>
@@ -18493,7 +18494,7 @@
               </a:ln>
               <a:extLst>
                 <a:ext uri="{91240B29-F687-4f45-9708-019B960494DF}">
-                  <a14:hiddenLine xmlns:a14="http://schemas.microsoft.com/office/drawing/2010/main" xmlns="" w="9525">
+                  <a14:hiddenLine xmlns="" xmlns:a14="http://schemas.microsoft.com/office/drawing/2010/main" w="9525">
                     <a:solidFill>
                       <a:srgbClr val="000000"/>
                     </a:solidFill>
@@ -18583,7 +18584,7 @@
               </a:ln>
               <a:extLst>
                 <a:ext uri="{91240B29-F687-4f45-9708-019B960494DF}">
-                  <a14:hiddenLine xmlns:a14="http://schemas.microsoft.com/office/drawing/2010/main" xmlns="" w="9525">
+                  <a14:hiddenLine xmlns="" xmlns:a14="http://schemas.microsoft.com/office/drawing/2010/main" w="9525">
                     <a:solidFill>
                       <a:srgbClr val="000000"/>
                     </a:solidFill>
@@ -18617,7 +18618,7 @@
               </a:ln>
               <a:extLst>
                 <a:ext uri="{91240B29-F687-4f45-9708-019B960494DF}">
-                  <a14:hiddenLine xmlns:a14="http://schemas.microsoft.com/office/drawing/2010/main" xmlns="" w="9525">
+                  <a14:hiddenLine xmlns="" xmlns:a14="http://schemas.microsoft.com/office/drawing/2010/main" w="9525">
                     <a:solidFill>
                       <a:srgbClr val="000000"/>
                     </a:solidFill>
@@ -18682,7 +18683,7 @@
               </a:ln>
               <a:extLst>
                 <a:ext uri="{91240B29-F687-4f45-9708-019B960494DF}">
-                  <a14:hiddenLine xmlns:a14="http://schemas.microsoft.com/office/drawing/2010/main" xmlns="" w="9525">
+                  <a14:hiddenLine xmlns="" xmlns:a14="http://schemas.microsoft.com/office/drawing/2010/main" w="9525">
                     <a:solidFill>
                       <a:srgbClr val="000000"/>
                     </a:solidFill>
@@ -18772,7 +18773,7 @@
               </a:ln>
               <a:extLst>
                 <a:ext uri="{91240B29-F687-4f45-9708-019B960494DF}">
-                  <a14:hiddenLine xmlns:a14="http://schemas.microsoft.com/office/drawing/2010/main" xmlns="" w="9525">
+                  <a14:hiddenLine xmlns="" xmlns:a14="http://schemas.microsoft.com/office/drawing/2010/main" w="9525">
                     <a:solidFill>
                       <a:srgbClr val="000000"/>
                     </a:solidFill>
@@ -18834,7 +18835,7 @@
               </a:ln>
               <a:extLst>
                 <a:ext uri="{91240B29-F687-4f45-9708-019B960494DF}">
-                  <a14:hiddenLine xmlns:a14="http://schemas.microsoft.com/office/drawing/2010/main" xmlns="" w="9525">
+                  <a14:hiddenLine xmlns="" xmlns:a14="http://schemas.microsoft.com/office/drawing/2010/main" w="9525">
                     <a:solidFill>
                       <a:srgbClr val="000000"/>
                     </a:solidFill>
@@ -18924,7 +18925,7 @@
               </a:ln>
               <a:extLst>
                 <a:ext uri="{91240B29-F687-4f45-9708-019B960494DF}">
-                  <a14:hiddenLine xmlns:a14="http://schemas.microsoft.com/office/drawing/2010/main" xmlns="" w="9525">
+                  <a14:hiddenLine xmlns="" xmlns:a14="http://schemas.microsoft.com/office/drawing/2010/main" w="9525">
                     <a:solidFill>
                       <a:srgbClr val="000000"/>
                     </a:solidFill>
@@ -18989,7 +18990,7 @@
               </a:ln>
               <a:extLst>
                 <a:ext uri="{91240B29-F687-4f45-9708-019B960494DF}">
-                  <a14:hiddenLine xmlns:a14="http://schemas.microsoft.com/office/drawing/2010/main" xmlns="" w="9525">
+                  <a14:hiddenLine xmlns="" xmlns:a14="http://schemas.microsoft.com/office/drawing/2010/main" w="9525">
                     <a:solidFill>
                       <a:srgbClr val="000000"/>
                     </a:solidFill>
@@ -19051,7 +19052,7 @@
               </a:ln>
               <a:extLst>
                 <a:ext uri="{91240B29-F687-4f45-9708-019B960494DF}">
-                  <a14:hiddenLine xmlns:a14="http://schemas.microsoft.com/office/drawing/2010/main" xmlns="" w="9525">
+                  <a14:hiddenLine xmlns="" xmlns:a14="http://schemas.microsoft.com/office/drawing/2010/main" w="9525">
                     <a:solidFill>
                       <a:srgbClr val="000000"/>
                     </a:solidFill>
@@ -19141,7 +19142,7 @@
               </a:ln>
               <a:extLst>
                 <a:ext uri="{91240B29-F687-4f45-9708-019B960494DF}">
-                  <a14:hiddenLine xmlns:a14="http://schemas.microsoft.com/office/drawing/2010/main" xmlns="" w="9525">
+                  <a14:hiddenLine xmlns="" xmlns:a14="http://schemas.microsoft.com/office/drawing/2010/main" w="9525">
                     <a:solidFill>
                       <a:srgbClr val="000000"/>
                     </a:solidFill>
@@ -19231,7 +19232,7 @@
               </a:ln>
               <a:extLst>
                 <a:ext uri="{91240B29-F687-4f45-9708-019B960494DF}">
-                  <a14:hiddenLine xmlns:a14="http://schemas.microsoft.com/office/drawing/2010/main" xmlns="" w="9525">
+                  <a14:hiddenLine xmlns="" xmlns:a14="http://schemas.microsoft.com/office/drawing/2010/main" w="9525">
                     <a:solidFill>
                       <a:srgbClr val="000000"/>
                     </a:solidFill>
@@ -19296,7 +19297,7 @@
               </a:ln>
               <a:extLst>
                 <a:ext uri="{91240B29-F687-4f45-9708-019B960494DF}">
-                  <a14:hiddenLine xmlns:a14="http://schemas.microsoft.com/office/drawing/2010/main" xmlns="" w="9525">
+                  <a14:hiddenLine xmlns="" xmlns:a14="http://schemas.microsoft.com/office/drawing/2010/main" w="9525">
                     <a:solidFill>
                       <a:srgbClr val="000000"/>
                     </a:solidFill>
@@ -19416,7 +19417,7 @@
               </a:ln>
               <a:extLst>
                 <a:ext uri="{91240B29-F687-4f45-9708-019B960494DF}">
-                  <a14:hiddenLine xmlns:a14="http://schemas.microsoft.com/office/drawing/2010/main" xmlns="" w="9525">
+                  <a14:hiddenLine xmlns="" xmlns:a14="http://schemas.microsoft.com/office/drawing/2010/main" w="9525">
                     <a:solidFill>
                       <a:srgbClr val="000000"/>
                     </a:solidFill>
@@ -19497,7 +19498,7 @@
               </a:ln>
               <a:extLst>
                 <a:ext uri="{91240B29-F687-4f45-9708-019B960494DF}">
-                  <a14:hiddenLine xmlns:a14="http://schemas.microsoft.com/office/drawing/2010/main" xmlns="" w="9525">
+                  <a14:hiddenLine xmlns="" xmlns:a14="http://schemas.microsoft.com/office/drawing/2010/main" w="9525">
                     <a:solidFill>
                       <a:srgbClr val="000000"/>
                     </a:solidFill>
@@ -19612,7 +19613,7 @@
               </a:ln>
               <a:extLst>
                 <a:ext uri="{91240B29-F687-4f45-9708-019B960494DF}">
-                  <a14:hiddenLine xmlns:a14="http://schemas.microsoft.com/office/drawing/2010/main" xmlns="" w="9525">
+                  <a14:hiddenLine xmlns="" xmlns:a14="http://schemas.microsoft.com/office/drawing/2010/main" w="9525">
                     <a:solidFill>
                       <a:srgbClr val="000000"/>
                     </a:solidFill>
@@ -19702,7 +19703,7 @@
               </a:ln>
               <a:extLst>
                 <a:ext uri="{91240B29-F687-4f45-9708-019B960494DF}">
-                  <a14:hiddenLine xmlns:a14="http://schemas.microsoft.com/office/drawing/2010/main" xmlns="" w="9525">
+                  <a14:hiddenLine xmlns="" xmlns:a14="http://schemas.microsoft.com/office/drawing/2010/main" w="9525">
                     <a:solidFill>
                       <a:srgbClr val="000000"/>
                     </a:solidFill>
@@ -19767,7 +19768,7 @@
               </a:ln>
               <a:extLst>
                 <a:ext uri="{91240B29-F687-4f45-9708-019B960494DF}">
-                  <a14:hiddenLine xmlns:a14="http://schemas.microsoft.com/office/drawing/2010/main" xmlns="" w="9525">
+                  <a14:hiddenLine xmlns="" xmlns:a14="http://schemas.microsoft.com/office/drawing/2010/main" w="9525">
                     <a:solidFill>
                       <a:srgbClr val="000000"/>
                     </a:solidFill>
@@ -19857,7 +19858,7 @@
               </a:ln>
               <a:extLst>
                 <a:ext uri="{91240B29-F687-4f45-9708-019B960494DF}">
-                  <a14:hiddenLine xmlns:a14="http://schemas.microsoft.com/office/drawing/2010/main" xmlns="" w="9525">
+                  <a14:hiddenLine xmlns="" xmlns:a14="http://schemas.microsoft.com/office/drawing/2010/main" w="9525">
                     <a:solidFill>
                       <a:srgbClr val="000000"/>
                     </a:solidFill>
@@ -19925,7 +19926,7 @@
               </a:ln>
               <a:extLst>
                 <a:ext uri="{91240B29-F687-4f45-9708-019B960494DF}">
-                  <a14:hiddenLine xmlns:a14="http://schemas.microsoft.com/office/drawing/2010/main" xmlns="" w="9525">
+                  <a14:hiddenLine xmlns="" xmlns:a14="http://schemas.microsoft.com/office/drawing/2010/main" w="9525">
                     <a:solidFill>
                       <a:srgbClr val="000000"/>
                     </a:solidFill>
@@ -20015,7 +20016,7 @@
               </a:ln>
               <a:extLst>
                 <a:ext uri="{91240B29-F687-4f45-9708-019B960494DF}">
-                  <a14:hiddenLine xmlns:a14="http://schemas.microsoft.com/office/drawing/2010/main" xmlns="" w="9525">
+                  <a14:hiddenLine xmlns="" xmlns:a14="http://schemas.microsoft.com/office/drawing/2010/main" w="9525">
                     <a:solidFill>
                       <a:srgbClr val="000000"/>
                     </a:solidFill>
@@ -20083,7 +20084,7 @@
               </a:ln>
               <a:extLst>
                 <a:ext uri="{91240B29-F687-4f45-9708-019B960494DF}">
-                  <a14:hiddenLine xmlns:a14="http://schemas.microsoft.com/office/drawing/2010/main" xmlns="" w="9525">
+                  <a14:hiddenLine xmlns="" xmlns:a14="http://schemas.microsoft.com/office/drawing/2010/main" w="9525">
                     <a:solidFill>
                       <a:srgbClr val="000000"/>
                     </a:solidFill>
@@ -20173,7 +20174,7 @@
               </a:ln>
               <a:extLst>
                 <a:ext uri="{91240B29-F687-4f45-9708-019B960494DF}">
-                  <a14:hiddenLine xmlns:a14="http://schemas.microsoft.com/office/drawing/2010/main" xmlns="" w="9525">
+                  <a14:hiddenLine xmlns="" xmlns:a14="http://schemas.microsoft.com/office/drawing/2010/main" w="9525">
                     <a:solidFill>
                       <a:srgbClr val="000000"/>
                     </a:solidFill>
@@ -20207,7 +20208,7 @@
               </a:ln>
               <a:extLst>
                 <a:ext uri="{91240B29-F687-4f45-9708-019B960494DF}">
-                  <a14:hiddenLine xmlns:a14="http://schemas.microsoft.com/office/drawing/2010/main" xmlns="" w="9525">
+                  <a14:hiddenLine xmlns="" xmlns:a14="http://schemas.microsoft.com/office/drawing/2010/main" w="9525">
                     <a:solidFill>
                       <a:srgbClr val="000000"/>
                     </a:solidFill>
@@ -22023,6 +22024,132 @@
         </p:nvSpPr>
         <p:spPr>
           <a:xfrm>
+            <a:off x="3485118" y="256022"/>
+            <a:ext cx="6164909" cy="756560"/>
+          </a:xfrm>
+        </p:spPr>
+        <p:txBody>
+          <a:bodyPr>
+            <a:normAutofit/>
+          </a:bodyPr>
+          <a:lstStyle/>
+          <a:p>
+            <a:r>
+              <a:rPr lang="en-US" sz="4400" dirty="0">
+                <a:latin typeface="Rockwell" panose="02060603020205020403" pitchFamily="18" charset="0"/>
+              </a:rPr>
+              <a:t>U-Net Model Result</a:t>
+            </a:r>
+          </a:p>
+        </p:txBody>
+      </p:sp>
+      <p:pic>
+        <p:nvPicPr>
+          <p:cNvPr id="4" name="Content Placeholder 3" descr="A picture containing text, device, meter&#10;&#10;Description automatically generated">
+            <a:extLst>
+              <a:ext uri="{FF2B5EF4-FFF2-40B4-BE49-F238E27FC236}">
+                <a16:creationId xmlns:a16="http://schemas.microsoft.com/office/drawing/2014/main" id="{7993AC62-F6CE-B176-D78E-FFBFB4BF9243}"/>
+              </a:ext>
+            </a:extLst>
+          </p:cNvPr>
+          <p:cNvPicPr>
+            <a:picLocks noGrp="1" noChangeAspect="1"/>
+          </p:cNvPicPr>
+          <p:nvPr>
+            <p:ph sz="half" idx="1"/>
+          </p:nvPr>
+        </p:nvPicPr>
+        <p:blipFill>
+          <a:blip r:embed="rId2"/>
+          <a:stretch>
+            <a:fillRect/>
+          </a:stretch>
+        </p:blipFill>
+        <p:spPr>
+          <a:xfrm>
+            <a:off x="1731146" y="1429305"/>
+            <a:ext cx="9339308" cy="4382224"/>
+          </a:xfrm>
+        </p:spPr>
+      </p:pic>
+      <p:pic>
+        <p:nvPicPr>
+          <p:cNvPr id="8" name="Picture 7">
+            <a:extLst>
+              <a:ext uri="{FF2B5EF4-FFF2-40B4-BE49-F238E27FC236}">
+                <a16:creationId xmlns:a16="http://schemas.microsoft.com/office/drawing/2014/main" id="{02DC82F4-9AFF-4838-8AEB-E4E0FE7361F3}"/>
+              </a:ext>
+            </a:extLst>
+          </p:cNvPr>
+          <p:cNvPicPr>
+            <a:picLocks noChangeAspect="1"/>
+          </p:cNvPicPr>
+          <p:nvPr/>
+        </p:nvPicPr>
+        <p:blipFill>
+          <a:blip r:embed="rId3"/>
+          <a:stretch>
+            <a:fillRect/>
+          </a:stretch>
+        </p:blipFill>
+        <p:spPr>
+          <a:xfrm>
+            <a:off x="10667999" y="256022"/>
+            <a:ext cx="1260713" cy="872978"/>
+          </a:xfrm>
+          <a:prstGeom prst="rect">
+            <a:avLst/>
+          </a:prstGeom>
+        </p:spPr>
+      </p:pic>
+    </p:spTree>
+    <p:extLst>
+      <p:ext uri="{BB962C8B-B14F-4D97-AF65-F5344CB8AC3E}">
+        <p14:creationId xmlns:p14="http://schemas.microsoft.com/office/powerpoint/2010/main" val="522109485"/>
+      </p:ext>
+    </p:extLst>
+  </p:cSld>
+  <p:clrMapOvr>
+    <a:masterClrMapping/>
+  </p:clrMapOvr>
+</p:sld>
+</file>
+
+<file path=ppt/slides/slide15.xml><?xml version="1.0" encoding="utf-8"?>
+<p:sld xmlns:a="http://schemas.openxmlformats.org/drawingml/2006/main" xmlns:r="http://schemas.openxmlformats.org/officeDocument/2006/relationships" xmlns:p="http://schemas.openxmlformats.org/presentationml/2006/main">
+  <p:cSld>
+    <p:spTree>
+      <p:nvGrpSpPr>
+        <p:cNvPr id="1" name=""/>
+        <p:cNvGrpSpPr/>
+        <p:nvPr/>
+      </p:nvGrpSpPr>
+      <p:grpSpPr>
+        <a:xfrm>
+          <a:off x="0" y="0"/>
+          <a:ext cx="0" cy="0"/>
+          <a:chOff x="0" y="0"/>
+          <a:chExt cx="0" cy="0"/>
+        </a:xfrm>
+      </p:grpSpPr>
+      <p:sp>
+        <p:nvSpPr>
+          <p:cNvPr id="2" name="Title 1">
+            <a:extLst>
+              <a:ext uri="{FF2B5EF4-FFF2-40B4-BE49-F238E27FC236}">
+                <a16:creationId xmlns:a16="http://schemas.microsoft.com/office/drawing/2014/main" id="{34DB6CE4-2B13-4715-B5B2-615A55922CA1}"/>
+              </a:ext>
+            </a:extLst>
+          </p:cNvPr>
+          <p:cNvSpPr>
+            <a:spLocks noGrp="1"/>
+          </p:cNvSpPr>
+          <p:nvPr>
+            <p:ph type="title"/>
+          </p:nvPr>
+        </p:nvSpPr>
+        <p:spPr>
+          <a:xfrm>
             <a:off x="4506050" y="403963"/>
             <a:ext cx="3510486" cy="725037"/>
           </a:xfrm>
@@ -22163,7 +22290,7 @@
 </p:sld>
 </file>
 
-<file path=ppt/slides/slide15.xml><?xml version="1.0" encoding="utf-8"?>
+<file path=ppt/slides/slide16.xml><?xml version="1.0" encoding="utf-8"?>
 <p:sld xmlns:a="http://schemas.openxmlformats.org/drawingml/2006/main" xmlns:r="http://schemas.openxmlformats.org/officeDocument/2006/relationships" xmlns:p="http://schemas.openxmlformats.org/presentationml/2006/main">
   <p:cSld>
     <p:spTree>
@@ -22302,7 +22429,7 @@
 </p:sld>
 </file>
 
-<file path=ppt/slides/slide16.xml><?xml version="1.0" encoding="utf-8"?>
+<file path=ppt/slides/slide17.xml><?xml version="1.0" encoding="utf-8"?>
 <p:sld xmlns:a="http://schemas.openxmlformats.org/drawingml/2006/main" xmlns:r="http://schemas.openxmlformats.org/officeDocument/2006/relationships" xmlns:p="http://schemas.openxmlformats.org/presentationml/2006/main">
   <p:cSld>
     <p:spTree>
@@ -22474,7 +22601,7 @@
 </p:sld>
 </file>
 
-<file path=ppt/slides/slide17.xml><?xml version="1.0" encoding="utf-8"?>
+<file path=ppt/slides/slide18.xml><?xml version="1.0" encoding="utf-8"?>
 <p:sld xmlns:a="http://schemas.openxmlformats.org/drawingml/2006/main" xmlns:r="http://schemas.openxmlformats.org/officeDocument/2006/relationships" xmlns:p="http://schemas.openxmlformats.org/presentationml/2006/main">
   <p:cSld>
     <p:spTree>
@@ -22699,7 +22826,7 @@
         </p:nvSpPr>
         <p:spPr>
           <a:xfrm>
-            <a:off x="2130641" y="1500327"/>
+            <a:off x="2130641" y="1509205"/>
             <a:ext cx="6338545" cy="4495061"/>
           </a:xfrm>
         </p:spPr>
@@ -23008,7 +23135,7 @@
             <p:ph idx="1"/>
             <p:extLst>
               <p:ext uri="{D42A27DB-BD31-4B8C-83A1-F6EECF244321}">
-                <p14:modId xmlns:p14="http://schemas.microsoft.com/office/powerpoint/2010/main" val="209556155"/>
+                <p14:modId xmlns:p14="http://schemas.microsoft.com/office/powerpoint/2010/main" val="1235439741"/>
               </p:ext>
             </p:extLst>
           </p:nvPr>
@@ -24795,6 +24922,23 @@
 </file>
 
 <file path=customXml/item1.xml><?xml version="1.0" encoding="utf-8"?>
+<p:properties xmlns:p="http://schemas.microsoft.com/office/2006/metadata/properties" xmlns:xsi="http://www.w3.org/2001/XMLSchema-instance" xmlns:pc="http://schemas.microsoft.com/office/infopath/2007/PartnerControls">
+  <documentManagement>
+    <MediaServiceKeyPoints xmlns="71af3243-3dd4-4a8d-8c0d-dd76da1f02a5" xsi:nil="true"/>
+  </documentManagement>
+</p:properties>
+</file>
+
+<file path=customXml/item2.xml><?xml version="1.0" encoding="utf-8"?>
+<?mso-contentType ?>
+<FormTemplates xmlns="http://schemas.microsoft.com/sharepoint/v3/contenttype/forms">
+  <Display>DocumentLibraryForm</Display>
+  <Edit>DocumentLibraryForm</Edit>
+  <New>DocumentLibraryForm</New>
+</FormTemplates>
+</file>
+
+<file path=customXml/item3.xml><?xml version="1.0" encoding="utf-8"?>
 <ct:contentTypeSchema xmlns:ct="http://schemas.microsoft.com/office/2006/metadata/contentType" xmlns:ma="http://schemas.microsoft.com/office/2006/metadata/properties/metaAttributes" ct:_="" ma:_="" ma:contentTypeName="Document" ma:contentTypeID="0x01010079F111ED35F8CC479449609E8A0923A6" ma:contentTypeVersion="11" ma:contentTypeDescription="Create a new document." ma:contentTypeScope="" ma:versionID="96291512c1ee715ab617f4c07df79fc1">
   <xsd:schema xmlns:xsd="http://www.w3.org/2001/XMLSchema" xmlns:xs="http://www.w3.org/2001/XMLSchema" xmlns:p="http://schemas.microsoft.com/office/2006/metadata/properties" xmlns:ns2="71af3243-3dd4-4a8d-8c0d-dd76da1f02a5" xmlns:ns3="16c05727-aa75-4e4a-9b5f-8a80a1165891" targetNamespace="http://schemas.microsoft.com/office/2006/metadata/properties" ma:root="true" ma:fieldsID="8256c27c40ca5c40ce1cf6c44f0205df" ns2:_="" ns3:_="">
     <xsd:import namespace="71af3243-3dd4-4a8d-8c0d-dd76da1f02a5"/>
@@ -25005,24 +25149,32 @@
 </ct:contentTypeSchema>
 </file>
 
-<file path=customXml/item2.xml><?xml version="1.0" encoding="utf-8"?>
-<?mso-contentType ?>
-<FormTemplates xmlns="http://schemas.microsoft.com/sharepoint/v3/contenttype/forms">
-  <Display>DocumentLibraryForm</Display>
-  <Edit>DocumentLibraryForm</Edit>
-  <New>DocumentLibraryForm</New>
-</FormTemplates>
+<file path=customXml/itemProps1.xml><?xml version="1.0" encoding="utf-8"?>
+<ds:datastoreItem xmlns:ds="http://schemas.openxmlformats.org/officeDocument/2006/customXml" ds:itemID="{E7866CFD-F94E-4AE5-ACEA-86FEC0F48A10}">
+  <ds:schemaRefs>
+    <ds:schemaRef ds:uri="http://purl.org/dc/elements/1.1/"/>
+    <ds:schemaRef ds:uri="http://schemas.microsoft.com/office/2006/documentManagement/types"/>
+    <ds:schemaRef ds:uri="16c05727-aa75-4e4a-9b5f-8a80a1165891"/>
+    <ds:schemaRef ds:uri="http://purl.org/dc/terms/"/>
+    <ds:schemaRef ds:uri="71af3243-3dd4-4a8d-8c0d-dd76da1f02a5"/>
+    <ds:schemaRef ds:uri="http://schemas.microsoft.com/office/infopath/2007/PartnerControls"/>
+    <ds:schemaRef ds:uri="http://www.w3.org/XML/1998/namespace"/>
+    <ds:schemaRef ds:uri="http://schemas.openxmlformats.org/package/2006/metadata/core-properties"/>
+    <ds:schemaRef ds:uri="http://schemas.microsoft.com/office/2006/metadata/properties"/>
+    <ds:schemaRef ds:uri="http://purl.org/dc/dcmitype/"/>
+  </ds:schemaRefs>
+</ds:datastoreItem>
 </file>
 
-<file path=customXml/item3.xml><?xml version="1.0" encoding="utf-8"?>
-<p:properties xmlns:p="http://schemas.microsoft.com/office/2006/metadata/properties" xmlns:xsi="http://www.w3.org/2001/XMLSchema-instance" xmlns:pc="http://schemas.microsoft.com/office/infopath/2007/PartnerControls">
-  <documentManagement>
-    <MediaServiceKeyPoints xmlns="71af3243-3dd4-4a8d-8c0d-dd76da1f02a5" xsi:nil="true"/>
-  </documentManagement>
-</p:properties>
+<file path=customXml/itemProps2.xml><?xml version="1.0" encoding="utf-8"?>
+<ds:datastoreItem xmlns:ds="http://schemas.openxmlformats.org/officeDocument/2006/customXml" ds:itemID="{B579702B-25C7-40D7-9E29-7686B11A9660}">
+  <ds:schemaRefs>
+    <ds:schemaRef ds:uri="http://schemas.microsoft.com/sharepoint/v3/contenttype/forms"/>
+  </ds:schemaRefs>
+</ds:datastoreItem>
 </file>
 
-<file path=customXml/itemProps1.xml><?xml version="1.0" encoding="utf-8"?>
+<file path=customXml/itemProps3.xml><?xml version="1.0" encoding="utf-8"?>
 <ds:datastoreItem xmlns:ds="http://schemas.openxmlformats.org/officeDocument/2006/customXml" ds:itemID="{A7C0B241-13E5-418D-8920-D23491E2D2C0}">
   <ds:schemaRefs>
     <ds:schemaRef ds:uri="http://schemas.microsoft.com/office/2006/metadata/contentType"/>
@@ -25039,29 +25191,4 @@
     <ds:schemaRef ds:uri="http://schemas.microsoft.com/internal/obd"/>
   </ds:schemaRefs>
 </ds:datastoreItem>
-</file>
-
-<file path=customXml/itemProps2.xml><?xml version="1.0" encoding="utf-8"?>
-<ds:datastoreItem xmlns:ds="http://schemas.openxmlformats.org/officeDocument/2006/customXml" ds:itemID="{B579702B-25C7-40D7-9E29-7686B11A9660}">
-  <ds:schemaRefs>
-    <ds:schemaRef ds:uri="http://schemas.microsoft.com/sharepoint/v3/contenttype/forms"/>
-  </ds:schemaRefs>
-</ds:datastoreItem>
-</file>
-
-<file path=customXml/itemProps3.xml><?xml version="1.0" encoding="utf-8"?>
-<ds:datastoreItem xmlns:ds="http://schemas.openxmlformats.org/officeDocument/2006/customXml" ds:itemID="{E7866CFD-F94E-4AE5-ACEA-86FEC0F48A10}">
-  <ds:schemaRefs>
-    <ds:schemaRef ds:uri="http://purl.org/dc/elements/1.1/"/>
-    <ds:schemaRef ds:uri="http://schemas.microsoft.com/office/2006/documentManagement/types"/>
-    <ds:schemaRef ds:uri="16c05727-aa75-4e4a-9b5f-8a80a1165891"/>
-    <ds:schemaRef ds:uri="http://purl.org/dc/terms/"/>
-    <ds:schemaRef ds:uri="71af3243-3dd4-4a8d-8c0d-dd76da1f02a5"/>
-    <ds:schemaRef ds:uri="http://schemas.microsoft.com/office/infopath/2007/PartnerControls"/>
-    <ds:schemaRef ds:uri="http://www.w3.org/XML/1998/namespace"/>
-    <ds:schemaRef ds:uri="http://schemas.openxmlformats.org/package/2006/metadata/core-properties"/>
-    <ds:schemaRef ds:uri="http://schemas.microsoft.com/office/2006/metadata/properties"/>
-    <ds:schemaRef ds:uri="http://purl.org/dc/dcmitype/"/>
-  </ds:schemaRefs>
-</ds:datastoreItem>
 </file>
</xml_diff>

<commit_message>
This is another revision of the PPT pushed added to Dennis's branch in the group's repo for the final project.
</commit_message>
<xml_diff>
--- a/Cancer_Champions_PPT.pptx
+++ b/Cancer_Champions_PPT.pptx
@@ -22502,7 +22502,7 @@
         <p:spPr>
           <a:xfrm>
             <a:off x="1141412" y="1761214"/>
-            <a:ext cx="9905999" cy="4257846"/>
+            <a:ext cx="9905999" cy="2642110"/>
           </a:xfrm>
         </p:spPr>
         <p:txBody>
@@ -22537,23 +22537,6 @@
                 <a:cs typeface="Tahoma" panose="020B0604030504040204" pitchFamily="34" charset="0"/>
               </a:rPr>
               <a:t>Team Challenges</a:t>
-            </a:r>
-          </a:p>
-          <a:p>
-            <a:endParaRPr lang="en-US" dirty="0">
-              <a:latin typeface="Tahoma" panose="020B0604030504040204" pitchFamily="34" charset="0"/>
-              <a:ea typeface="Tahoma" panose="020B0604030504040204" pitchFamily="34" charset="0"/>
-              <a:cs typeface="Tahoma" panose="020B0604030504040204" pitchFamily="34" charset="0"/>
-            </a:endParaRPr>
-          </a:p>
-          <a:p>
-            <a:r>
-              <a:rPr lang="en-US" sz="3500" dirty="0">
-                <a:latin typeface="Tahoma" panose="020B0604030504040204" pitchFamily="34" charset="0"/>
-                <a:ea typeface="Tahoma" panose="020B0604030504040204" pitchFamily="34" charset="0"/>
-                <a:cs typeface="Tahoma" panose="020B0604030504040204" pitchFamily="34" charset="0"/>
-              </a:rPr>
-              <a:t>The project will be used in future work</a:t>
             </a:r>
           </a:p>
         </p:txBody>

</xml_diff>

<commit_message>
Caught another mistake in the visualizations on the PPT and fixed it.
</commit_message>
<xml_diff>
--- a/Cancer_Champions_PPT.pptx
+++ b/Cancer_Champions_PPT.pptx
@@ -8505,7 +8505,7 @@
           <a:noFill/>
           <a:extLst>
             <a:ext uri="{909E8E84-426E-40dd-AFC4-6F175D3DCCD1}">
-              <a14:hiddenFill xmlns="" xmlns:a14="http://schemas.microsoft.com/office/drawing/2010/main">
+              <a14:hiddenFill xmlns:a14="http://schemas.microsoft.com/office/drawing/2010/main" xmlns="">
                 <a:solidFill>
                   <a:srgbClr val="FFFFFF"/>
                 </a:solidFill>
@@ -8564,7 +8564,7 @@
             </a:ln>
             <a:extLst>
               <a:ext uri="{91240B29-F687-4f45-9708-019B960494DF}">
-                <a14:hiddenLine xmlns="" xmlns:a14="http://schemas.microsoft.com/office/drawing/2010/main" w="9525">
+                <a14:hiddenLine xmlns:a14="http://schemas.microsoft.com/office/drawing/2010/main" xmlns="" w="9525">
                   <a:solidFill>
                     <a:srgbClr val="000000"/>
                   </a:solidFill>
@@ -8654,7 +8654,7 @@
             </a:ln>
             <a:extLst>
               <a:ext uri="{91240B29-F687-4f45-9708-019B960494DF}">
-                <a14:hiddenLine xmlns="" xmlns:a14="http://schemas.microsoft.com/office/drawing/2010/main" w="9525">
+                <a14:hiddenLine xmlns:a14="http://schemas.microsoft.com/office/drawing/2010/main" xmlns="" w="9525">
                   <a:solidFill>
                     <a:srgbClr val="000000"/>
                   </a:solidFill>
@@ -8744,7 +8744,7 @@
             </a:ln>
             <a:extLst>
               <a:ext uri="{91240B29-F687-4f45-9708-019B960494DF}">
-                <a14:hiddenLine xmlns="" xmlns:a14="http://schemas.microsoft.com/office/drawing/2010/main" w="9525">
+                <a14:hiddenLine xmlns:a14="http://schemas.microsoft.com/office/drawing/2010/main" xmlns="" w="9525">
                   <a:solidFill>
                     <a:srgbClr val="000000"/>
                   </a:solidFill>
@@ -8778,7 +8778,7 @@
             </a:ln>
             <a:extLst>
               <a:ext uri="{91240B29-F687-4f45-9708-019B960494DF}">
-                <a14:hiddenLine xmlns="" xmlns:a14="http://schemas.microsoft.com/office/drawing/2010/main" w="9525">
+                <a14:hiddenLine xmlns:a14="http://schemas.microsoft.com/office/drawing/2010/main" xmlns="" w="9525">
                   <a:solidFill>
                     <a:srgbClr val="000000"/>
                   </a:solidFill>
@@ -8868,7 +8868,7 @@
             </a:ln>
             <a:extLst>
               <a:ext uri="{91240B29-F687-4f45-9708-019B960494DF}">
-                <a14:hiddenLine xmlns="" xmlns:a14="http://schemas.microsoft.com/office/drawing/2010/main" w="9525">
+                <a14:hiddenLine xmlns:a14="http://schemas.microsoft.com/office/drawing/2010/main" xmlns="" w="9525">
                   <a:solidFill>
                     <a:srgbClr val="000000"/>
                   </a:solidFill>
@@ -8930,7 +8930,7 @@
             </a:ln>
             <a:extLst>
               <a:ext uri="{91240B29-F687-4f45-9708-019B960494DF}">
-                <a14:hiddenLine xmlns="" xmlns:a14="http://schemas.microsoft.com/office/drawing/2010/main" w="9525">
+                <a14:hiddenLine xmlns:a14="http://schemas.microsoft.com/office/drawing/2010/main" xmlns="" w="9525">
                   <a:solidFill>
                     <a:srgbClr val="000000"/>
                   </a:solidFill>
@@ -8992,7 +8992,7 @@
             </a:ln>
             <a:extLst>
               <a:ext uri="{91240B29-F687-4f45-9708-019B960494DF}">
-                <a14:hiddenLine xmlns="" xmlns:a14="http://schemas.microsoft.com/office/drawing/2010/main" w="9525">
+                <a14:hiddenLine xmlns:a14="http://schemas.microsoft.com/office/drawing/2010/main" xmlns="" w="9525">
                   <a:solidFill>
                     <a:srgbClr val="000000"/>
                   </a:solidFill>
@@ -9082,7 +9082,7 @@
             </a:ln>
             <a:extLst>
               <a:ext uri="{91240B29-F687-4f45-9708-019B960494DF}">
-                <a14:hiddenLine xmlns="" xmlns:a14="http://schemas.microsoft.com/office/drawing/2010/main" w="9525">
+                <a14:hiddenLine xmlns:a14="http://schemas.microsoft.com/office/drawing/2010/main" xmlns="" w="9525">
                   <a:solidFill>
                     <a:srgbClr val="000000"/>
                   </a:solidFill>
@@ -9144,7 +9144,7 @@
             </a:ln>
             <a:extLst>
               <a:ext uri="{91240B29-F687-4f45-9708-019B960494DF}">
-                <a14:hiddenLine xmlns="" xmlns:a14="http://schemas.microsoft.com/office/drawing/2010/main" w="9525">
+                <a14:hiddenLine xmlns:a14="http://schemas.microsoft.com/office/drawing/2010/main" xmlns="" w="9525">
                   <a:solidFill>
                     <a:srgbClr val="000000"/>
                   </a:solidFill>
@@ -9206,7 +9206,7 @@
             </a:ln>
             <a:extLst>
               <a:ext uri="{91240B29-F687-4f45-9708-019B960494DF}">
-                <a14:hiddenLine xmlns="" xmlns:a14="http://schemas.microsoft.com/office/drawing/2010/main" w="9525">
+                <a14:hiddenLine xmlns:a14="http://schemas.microsoft.com/office/drawing/2010/main" xmlns="" w="9525">
                   <a:solidFill>
                     <a:srgbClr val="000000"/>
                   </a:solidFill>
@@ -9296,7 +9296,7 @@
             </a:ln>
             <a:extLst>
               <a:ext uri="{91240B29-F687-4f45-9708-019B960494DF}">
-                <a14:hiddenLine xmlns="" xmlns:a14="http://schemas.microsoft.com/office/drawing/2010/main" w="9525">
+                <a14:hiddenLine xmlns:a14="http://schemas.microsoft.com/office/drawing/2010/main" xmlns="" w="9525">
                   <a:solidFill>
                     <a:srgbClr val="000000"/>
                   </a:solidFill>
@@ -9386,7 +9386,7 @@
             </a:ln>
             <a:extLst>
               <a:ext uri="{91240B29-F687-4f45-9708-019B960494DF}">
-                <a14:hiddenLine xmlns="" xmlns:a14="http://schemas.microsoft.com/office/drawing/2010/main" w="9525">
+                <a14:hiddenLine xmlns:a14="http://schemas.microsoft.com/office/drawing/2010/main" xmlns="" w="9525">
                   <a:solidFill>
                     <a:srgbClr val="000000"/>
                   </a:solidFill>
@@ -9448,7 +9448,7 @@
             </a:ln>
             <a:extLst>
               <a:ext uri="{91240B29-F687-4f45-9708-019B960494DF}">
-                <a14:hiddenLine xmlns="" xmlns:a14="http://schemas.microsoft.com/office/drawing/2010/main" w="9525">
+                <a14:hiddenLine xmlns:a14="http://schemas.microsoft.com/office/drawing/2010/main" xmlns="" w="9525">
                   <a:solidFill>
                     <a:srgbClr val="000000"/>
                   </a:solidFill>
@@ -9558,7 +9558,7 @@
             </a:ln>
             <a:extLst>
               <a:ext uri="{91240B29-F687-4f45-9708-019B960494DF}">
-                <a14:hiddenLine xmlns="" xmlns:a14="http://schemas.microsoft.com/office/drawing/2010/main" w="9525">
+                <a14:hiddenLine xmlns:a14="http://schemas.microsoft.com/office/drawing/2010/main" xmlns="" w="9525">
                   <a:solidFill>
                     <a:srgbClr val="000000"/>
                   </a:solidFill>
@@ -9620,7 +9620,7 @@
             </a:ln>
             <a:extLst>
               <a:ext uri="{91240B29-F687-4f45-9708-019B960494DF}">
-                <a14:hiddenLine xmlns="" xmlns:a14="http://schemas.microsoft.com/office/drawing/2010/main" w="9525">
+                <a14:hiddenLine xmlns:a14="http://schemas.microsoft.com/office/drawing/2010/main" xmlns="" w="9525">
                   <a:solidFill>
                     <a:srgbClr val="000000"/>
                   </a:solidFill>
@@ -9710,7 +9710,7 @@
             </a:ln>
             <a:extLst>
               <a:ext uri="{91240B29-F687-4f45-9708-019B960494DF}">
-                <a14:hiddenLine xmlns="" xmlns:a14="http://schemas.microsoft.com/office/drawing/2010/main" w="9525">
+                <a14:hiddenLine xmlns:a14="http://schemas.microsoft.com/office/drawing/2010/main" xmlns="" w="9525">
                   <a:solidFill>
                     <a:srgbClr val="000000"/>
                   </a:solidFill>
@@ -9800,7 +9800,7 @@
             </a:ln>
             <a:extLst>
               <a:ext uri="{91240B29-F687-4f45-9708-019B960494DF}">
-                <a14:hiddenLine xmlns="" xmlns:a14="http://schemas.microsoft.com/office/drawing/2010/main" w="9525">
+                <a14:hiddenLine xmlns:a14="http://schemas.microsoft.com/office/drawing/2010/main" xmlns="" w="9525">
                   <a:solidFill>
                     <a:srgbClr val="000000"/>
                   </a:solidFill>
@@ -9862,7 +9862,7 @@
             </a:ln>
             <a:extLst>
               <a:ext uri="{91240B29-F687-4f45-9708-019B960494DF}">
-                <a14:hiddenLine xmlns="" xmlns:a14="http://schemas.microsoft.com/office/drawing/2010/main" w="9525">
+                <a14:hiddenLine xmlns:a14="http://schemas.microsoft.com/office/drawing/2010/main" xmlns="" w="9525">
                   <a:solidFill>
                     <a:srgbClr val="000000"/>
                   </a:solidFill>
@@ -9952,7 +9952,7 @@
             </a:ln>
             <a:extLst>
               <a:ext uri="{91240B29-F687-4f45-9708-019B960494DF}">
-                <a14:hiddenLine xmlns="" xmlns:a14="http://schemas.microsoft.com/office/drawing/2010/main" w="9525">
+                <a14:hiddenLine xmlns:a14="http://schemas.microsoft.com/office/drawing/2010/main" xmlns="" w="9525">
                   <a:solidFill>
                     <a:srgbClr val="000000"/>
                   </a:solidFill>
@@ -10042,7 +10042,7 @@
             </a:ln>
             <a:extLst>
               <a:ext uri="{91240B29-F687-4f45-9708-019B960494DF}">
-                <a14:hiddenLine xmlns="" xmlns:a14="http://schemas.microsoft.com/office/drawing/2010/main" w="9525">
+                <a14:hiddenLine xmlns:a14="http://schemas.microsoft.com/office/drawing/2010/main" xmlns="" w="9525">
                   <a:solidFill>
                     <a:srgbClr val="000000"/>
                   </a:solidFill>
@@ -10098,7 +10098,7 @@
             </a:ln>
             <a:extLst>
               <a:ext uri="{91240B29-F687-4f45-9708-019B960494DF}">
-                <a14:hiddenLine xmlns="" xmlns:a14="http://schemas.microsoft.com/office/drawing/2010/main" w="9525">
+                <a14:hiddenLine xmlns:a14="http://schemas.microsoft.com/office/drawing/2010/main" xmlns="" w="9525">
                   <a:solidFill>
                     <a:srgbClr val="000000"/>
                   </a:solidFill>
@@ -10188,7 +10188,7 @@
             </a:ln>
             <a:extLst>
               <a:ext uri="{91240B29-F687-4f45-9708-019B960494DF}">
-                <a14:hiddenLine xmlns="" xmlns:a14="http://schemas.microsoft.com/office/drawing/2010/main" w="9525">
+                <a14:hiddenLine xmlns:a14="http://schemas.microsoft.com/office/drawing/2010/main" xmlns="" w="9525">
                   <a:solidFill>
                     <a:srgbClr val="000000"/>
                   </a:solidFill>
@@ -10244,7 +10244,7 @@
             </a:ln>
             <a:extLst>
               <a:ext uri="{91240B29-F687-4f45-9708-019B960494DF}">
-                <a14:hiddenLine xmlns="" xmlns:a14="http://schemas.microsoft.com/office/drawing/2010/main" w="9525">
+                <a14:hiddenLine xmlns:a14="http://schemas.microsoft.com/office/drawing/2010/main" xmlns="" w="9525">
                   <a:solidFill>
                     <a:srgbClr val="000000"/>
                   </a:solidFill>
@@ -10334,7 +10334,7 @@
             </a:ln>
             <a:extLst>
               <a:ext uri="{91240B29-F687-4f45-9708-019B960494DF}">
-                <a14:hiddenLine xmlns="" xmlns:a14="http://schemas.microsoft.com/office/drawing/2010/main" w="9525">
+                <a14:hiddenLine xmlns:a14="http://schemas.microsoft.com/office/drawing/2010/main" xmlns="" w="9525">
                   <a:solidFill>
                     <a:srgbClr val="000000"/>
                   </a:solidFill>
@@ -10402,7 +10402,7 @@
             </a:ln>
             <a:extLst>
               <a:ext uri="{91240B29-F687-4f45-9708-019B960494DF}">
-                <a14:hiddenLine xmlns="" xmlns:a14="http://schemas.microsoft.com/office/drawing/2010/main" w="9525">
+                <a14:hiddenLine xmlns:a14="http://schemas.microsoft.com/office/drawing/2010/main" xmlns="" w="9525">
                   <a:solidFill>
                     <a:srgbClr val="000000"/>
                   </a:solidFill>
@@ -10492,7 +10492,7 @@
             </a:ln>
             <a:extLst>
               <a:ext uri="{91240B29-F687-4f45-9708-019B960494DF}">
-                <a14:hiddenLine xmlns="" xmlns:a14="http://schemas.microsoft.com/office/drawing/2010/main" w="9525">
+                <a14:hiddenLine xmlns:a14="http://schemas.microsoft.com/office/drawing/2010/main" xmlns="" w="9525">
                   <a:solidFill>
                     <a:srgbClr val="000000"/>
                   </a:solidFill>
@@ -10560,7 +10560,7 @@
             </a:ln>
             <a:extLst>
               <a:ext uri="{91240B29-F687-4f45-9708-019B960494DF}">
-                <a14:hiddenLine xmlns="" xmlns:a14="http://schemas.microsoft.com/office/drawing/2010/main" w="9525">
+                <a14:hiddenLine xmlns:a14="http://schemas.microsoft.com/office/drawing/2010/main" xmlns="" w="9525">
                   <a:solidFill>
                     <a:srgbClr val="000000"/>
                   </a:solidFill>
@@ -10650,7 +10650,7 @@
             </a:ln>
             <a:extLst>
               <a:ext uri="{91240B29-F687-4f45-9708-019B960494DF}">
-                <a14:hiddenLine xmlns="" xmlns:a14="http://schemas.microsoft.com/office/drawing/2010/main" w="9525">
+                <a14:hiddenLine xmlns:a14="http://schemas.microsoft.com/office/drawing/2010/main" xmlns="" w="9525">
                   <a:solidFill>
                     <a:srgbClr val="000000"/>
                   </a:solidFill>
@@ -10684,7 +10684,7 @@
             </a:ln>
             <a:extLst>
               <a:ext uri="{91240B29-F687-4f45-9708-019B960494DF}">
-                <a14:hiddenLine xmlns="" xmlns:a14="http://schemas.microsoft.com/office/drawing/2010/main" w="9525">
+                <a14:hiddenLine xmlns:a14="http://schemas.microsoft.com/office/drawing/2010/main" xmlns="" w="9525">
                   <a:solidFill>
                     <a:srgbClr val="000000"/>
                   </a:solidFill>
@@ -10774,7 +10774,7 @@
             </a:ln>
             <a:extLst>
               <a:ext uri="{91240B29-F687-4f45-9708-019B960494DF}">
-                <a14:hiddenLine xmlns="" xmlns:a14="http://schemas.microsoft.com/office/drawing/2010/main" w="9525">
+                <a14:hiddenLine xmlns:a14="http://schemas.microsoft.com/office/drawing/2010/main" xmlns="" w="9525">
                   <a:solidFill>
                     <a:srgbClr val="000000"/>
                   </a:solidFill>
@@ -10836,7 +10836,7 @@
             </a:ln>
             <a:extLst>
               <a:ext uri="{91240B29-F687-4f45-9708-019B960494DF}">
-                <a14:hiddenLine xmlns="" xmlns:a14="http://schemas.microsoft.com/office/drawing/2010/main" w="9525">
+                <a14:hiddenLine xmlns:a14="http://schemas.microsoft.com/office/drawing/2010/main" xmlns="" w="9525">
                   <a:solidFill>
                     <a:srgbClr val="000000"/>
                   </a:solidFill>
@@ -10898,7 +10898,7 @@
             </a:ln>
             <a:extLst>
               <a:ext uri="{91240B29-F687-4f45-9708-019B960494DF}">
-                <a14:hiddenLine xmlns="" xmlns:a14="http://schemas.microsoft.com/office/drawing/2010/main" w="9525">
+                <a14:hiddenLine xmlns:a14="http://schemas.microsoft.com/office/drawing/2010/main" xmlns="" w="9525">
                   <a:solidFill>
                     <a:srgbClr val="000000"/>
                   </a:solidFill>
@@ -10988,7 +10988,7 @@
             </a:ln>
             <a:extLst>
               <a:ext uri="{91240B29-F687-4f45-9708-019B960494DF}">
-                <a14:hiddenLine xmlns="" xmlns:a14="http://schemas.microsoft.com/office/drawing/2010/main" w="9525">
+                <a14:hiddenLine xmlns:a14="http://schemas.microsoft.com/office/drawing/2010/main" xmlns="" w="9525">
                   <a:solidFill>
                     <a:srgbClr val="000000"/>
                   </a:solidFill>
@@ -11056,7 +11056,7 @@
             </a:ln>
             <a:extLst>
               <a:ext uri="{91240B29-F687-4f45-9708-019B960494DF}">
-                <a14:hiddenLine xmlns="" xmlns:a14="http://schemas.microsoft.com/office/drawing/2010/main" w="9525">
+                <a14:hiddenLine xmlns:a14="http://schemas.microsoft.com/office/drawing/2010/main" xmlns="" w="9525">
                   <a:solidFill>
                     <a:srgbClr val="000000"/>
                   </a:solidFill>
@@ -11118,7 +11118,7 @@
             </a:ln>
             <a:extLst>
               <a:ext uri="{91240B29-F687-4f45-9708-019B960494DF}">
-                <a14:hiddenLine xmlns="" xmlns:a14="http://schemas.microsoft.com/office/drawing/2010/main" w="9525">
+                <a14:hiddenLine xmlns:a14="http://schemas.microsoft.com/office/drawing/2010/main" xmlns="" w="9525">
                   <a:solidFill>
                     <a:srgbClr val="000000"/>
                   </a:solidFill>
@@ -11208,7 +11208,7 @@
             </a:ln>
             <a:extLst>
               <a:ext uri="{91240B29-F687-4f45-9708-019B960494DF}">
-                <a14:hiddenLine xmlns="" xmlns:a14="http://schemas.microsoft.com/office/drawing/2010/main" w="9525">
+                <a14:hiddenLine xmlns:a14="http://schemas.microsoft.com/office/drawing/2010/main" xmlns="" w="9525">
                   <a:solidFill>
                     <a:srgbClr val="000000"/>
                   </a:solidFill>
@@ -11270,7 +11270,7 @@
             </a:ln>
             <a:extLst>
               <a:ext uri="{91240B29-F687-4f45-9708-019B960494DF}">
-                <a14:hiddenLine xmlns="" xmlns:a14="http://schemas.microsoft.com/office/drawing/2010/main" w="9525">
+                <a14:hiddenLine xmlns:a14="http://schemas.microsoft.com/office/drawing/2010/main" xmlns="" w="9525">
                   <a:solidFill>
                     <a:srgbClr val="000000"/>
                   </a:solidFill>
@@ -11360,7 +11360,7 @@
             </a:ln>
             <a:extLst>
               <a:ext uri="{91240B29-F687-4f45-9708-019B960494DF}">
-                <a14:hiddenLine xmlns="" xmlns:a14="http://schemas.microsoft.com/office/drawing/2010/main" w="9525">
+                <a14:hiddenLine xmlns:a14="http://schemas.microsoft.com/office/drawing/2010/main" xmlns="" w="9525">
                   <a:solidFill>
                     <a:srgbClr val="000000"/>
                   </a:solidFill>
@@ -11422,7 +11422,7 @@
             </a:ln>
             <a:extLst>
               <a:ext uri="{91240B29-F687-4f45-9708-019B960494DF}">
-                <a14:hiddenLine xmlns="" xmlns:a14="http://schemas.microsoft.com/office/drawing/2010/main" w="9525">
+                <a14:hiddenLine xmlns:a14="http://schemas.microsoft.com/office/drawing/2010/main" xmlns="" w="9525">
                   <a:solidFill>
                     <a:srgbClr val="000000"/>
                   </a:solidFill>
@@ -11512,7 +11512,7 @@
             </a:ln>
             <a:extLst>
               <a:ext uri="{91240B29-F687-4f45-9708-019B960494DF}">
-                <a14:hiddenLine xmlns="" xmlns:a14="http://schemas.microsoft.com/office/drawing/2010/main" w="9525">
+                <a14:hiddenLine xmlns:a14="http://schemas.microsoft.com/office/drawing/2010/main" xmlns="" w="9525">
                   <a:solidFill>
                     <a:srgbClr val="000000"/>
                   </a:solidFill>
@@ -11546,7 +11546,7 @@
             </a:ln>
             <a:extLst>
               <a:ext uri="{91240B29-F687-4f45-9708-019B960494DF}">
-                <a14:hiddenLine xmlns="" xmlns:a14="http://schemas.microsoft.com/office/drawing/2010/main" w="9525">
+                <a14:hiddenLine xmlns:a14="http://schemas.microsoft.com/office/drawing/2010/main" xmlns="" w="9525">
                   <a:solidFill>
                     <a:srgbClr val="000000"/>
                   </a:solidFill>
@@ -11611,7 +11611,7 @@
             </a:ln>
             <a:extLst>
               <a:ext uri="{91240B29-F687-4f45-9708-019B960494DF}">
-                <a14:hiddenLine xmlns="" xmlns:a14="http://schemas.microsoft.com/office/drawing/2010/main" w="9525">
+                <a14:hiddenLine xmlns:a14="http://schemas.microsoft.com/office/drawing/2010/main" xmlns="" w="9525">
                   <a:solidFill>
                     <a:srgbClr val="000000"/>
                   </a:solidFill>
@@ -11701,7 +11701,7 @@
             </a:ln>
             <a:extLst>
               <a:ext uri="{91240B29-F687-4f45-9708-019B960494DF}">
-                <a14:hiddenLine xmlns="" xmlns:a14="http://schemas.microsoft.com/office/drawing/2010/main" w="9525">
+                <a14:hiddenLine xmlns:a14="http://schemas.microsoft.com/office/drawing/2010/main" xmlns="" w="9525">
                   <a:solidFill>
                     <a:srgbClr val="000000"/>
                   </a:solidFill>
@@ -11763,7 +11763,7 @@
             </a:ln>
             <a:extLst>
               <a:ext uri="{91240B29-F687-4f45-9708-019B960494DF}">
-                <a14:hiddenLine xmlns="" xmlns:a14="http://schemas.microsoft.com/office/drawing/2010/main" w="9525">
+                <a14:hiddenLine xmlns:a14="http://schemas.microsoft.com/office/drawing/2010/main" xmlns="" w="9525">
                   <a:solidFill>
                     <a:srgbClr val="000000"/>
                   </a:solidFill>
@@ -11853,7 +11853,7 @@
             </a:ln>
             <a:extLst>
               <a:ext uri="{91240B29-F687-4f45-9708-019B960494DF}">
-                <a14:hiddenLine xmlns="" xmlns:a14="http://schemas.microsoft.com/office/drawing/2010/main" w="9525">
+                <a14:hiddenLine xmlns:a14="http://schemas.microsoft.com/office/drawing/2010/main" xmlns="" w="9525">
                   <a:solidFill>
                     <a:srgbClr val="000000"/>
                   </a:solidFill>
@@ -11943,7 +11943,7 @@
             </a:ln>
             <a:extLst>
               <a:ext uri="{91240B29-F687-4f45-9708-019B960494DF}">
-                <a14:hiddenLine xmlns="" xmlns:a14="http://schemas.microsoft.com/office/drawing/2010/main" w="9525">
+                <a14:hiddenLine xmlns:a14="http://schemas.microsoft.com/office/drawing/2010/main" xmlns="" w="9525">
                   <a:solidFill>
                     <a:srgbClr val="000000"/>
                   </a:solidFill>
@@ -12008,7 +12008,7 @@
             </a:ln>
             <a:extLst>
               <a:ext uri="{91240B29-F687-4f45-9708-019B960494DF}">
-                <a14:hiddenLine xmlns="" xmlns:a14="http://schemas.microsoft.com/office/drawing/2010/main" w="9525">
+                <a14:hiddenLine xmlns:a14="http://schemas.microsoft.com/office/drawing/2010/main" xmlns="" w="9525">
                   <a:solidFill>
                     <a:srgbClr val="000000"/>
                   </a:solidFill>
@@ -12070,7 +12070,7 @@
             </a:ln>
             <a:extLst>
               <a:ext uri="{91240B29-F687-4f45-9708-019B960494DF}">
-                <a14:hiddenLine xmlns="" xmlns:a14="http://schemas.microsoft.com/office/drawing/2010/main" w="9525">
+                <a14:hiddenLine xmlns:a14="http://schemas.microsoft.com/office/drawing/2010/main" xmlns="" w="9525">
                   <a:solidFill>
                     <a:srgbClr val="000000"/>
                   </a:solidFill>
@@ -12160,7 +12160,7 @@
             </a:ln>
             <a:extLst>
               <a:ext uri="{91240B29-F687-4f45-9708-019B960494DF}">
-                <a14:hiddenLine xmlns="" xmlns:a14="http://schemas.microsoft.com/office/drawing/2010/main" w="9525">
+                <a14:hiddenLine xmlns:a14="http://schemas.microsoft.com/office/drawing/2010/main" xmlns="" w="9525">
                   <a:solidFill>
                     <a:srgbClr val="000000"/>
                   </a:solidFill>
@@ -12250,7 +12250,7 @@
             </a:ln>
             <a:extLst>
               <a:ext uri="{91240B29-F687-4f45-9708-019B960494DF}">
-                <a14:hiddenLine xmlns="" xmlns:a14="http://schemas.microsoft.com/office/drawing/2010/main" w="9525">
+                <a14:hiddenLine xmlns:a14="http://schemas.microsoft.com/office/drawing/2010/main" xmlns="" w="9525">
                   <a:solidFill>
                     <a:srgbClr val="000000"/>
                   </a:solidFill>
@@ -12312,7 +12312,7 @@
             </a:ln>
             <a:extLst>
               <a:ext uri="{91240B29-F687-4f45-9708-019B960494DF}">
-                <a14:hiddenLine xmlns="" xmlns:a14="http://schemas.microsoft.com/office/drawing/2010/main" w="9525">
+                <a14:hiddenLine xmlns:a14="http://schemas.microsoft.com/office/drawing/2010/main" xmlns="" w="9525">
                   <a:solidFill>
                     <a:srgbClr val="000000"/>
                   </a:solidFill>
@@ -12432,7 +12432,7 @@
             </a:ln>
             <a:extLst>
               <a:ext uri="{91240B29-F687-4f45-9708-019B960494DF}">
-                <a14:hiddenLine xmlns="" xmlns:a14="http://schemas.microsoft.com/office/drawing/2010/main" w="9525">
+                <a14:hiddenLine xmlns:a14="http://schemas.microsoft.com/office/drawing/2010/main" xmlns="" w="9525">
                   <a:solidFill>
                     <a:srgbClr val="000000"/>
                   </a:solidFill>
@@ -12500,7 +12500,7 @@
             </a:ln>
             <a:extLst>
               <a:ext uri="{91240B29-F687-4f45-9708-019B960494DF}">
-                <a14:hiddenLine xmlns="" xmlns:a14="http://schemas.microsoft.com/office/drawing/2010/main" w="9525">
+                <a14:hiddenLine xmlns:a14="http://schemas.microsoft.com/office/drawing/2010/main" xmlns="" w="9525">
                   <a:solidFill>
                     <a:srgbClr val="000000"/>
                   </a:solidFill>
@@ -12590,7 +12590,7 @@
             </a:ln>
             <a:extLst>
               <a:ext uri="{91240B29-F687-4f45-9708-019B960494DF}">
-                <a14:hiddenLine xmlns="" xmlns:a14="http://schemas.microsoft.com/office/drawing/2010/main" w="9525">
+                <a14:hiddenLine xmlns:a14="http://schemas.microsoft.com/office/drawing/2010/main" xmlns="" w="9525">
                   <a:solidFill>
                     <a:srgbClr val="000000"/>
                   </a:solidFill>
@@ -17404,7 +17404,7 @@
           <a:noFill/>
           <a:extLst>
             <a:ext uri="{909E8E84-426E-40dd-AFC4-6F175D3DCCD1}">
-              <a14:hiddenFill xmlns="" xmlns:a14="http://schemas.microsoft.com/office/drawing/2010/main">
+              <a14:hiddenFill xmlns:a14="http://schemas.microsoft.com/office/drawing/2010/main" xmlns="">
                 <a:solidFill>
                   <a:srgbClr val="FFFFFF"/>
                 </a:solidFill>
@@ -17478,7 +17478,7 @@
               </a:ln>
               <a:extLst>
                 <a:ext uri="{91240B29-F687-4f45-9708-019B960494DF}">
-                  <a14:hiddenLine xmlns="" xmlns:a14="http://schemas.microsoft.com/office/drawing/2010/main" w="9525">
+                  <a14:hiddenLine xmlns:a14="http://schemas.microsoft.com/office/drawing/2010/main" xmlns="" w="9525">
                     <a:solidFill>
                       <a:srgbClr val="000000"/>
                     </a:solidFill>
@@ -17568,7 +17568,7 @@
               </a:ln>
               <a:extLst>
                 <a:ext uri="{91240B29-F687-4f45-9708-019B960494DF}">
-                  <a14:hiddenLine xmlns="" xmlns:a14="http://schemas.microsoft.com/office/drawing/2010/main" w="9525">
+                  <a14:hiddenLine xmlns:a14="http://schemas.microsoft.com/office/drawing/2010/main" xmlns="" w="9525">
                     <a:solidFill>
                       <a:srgbClr val="000000"/>
                     </a:solidFill>
@@ -17658,7 +17658,7 @@
               </a:ln>
               <a:extLst>
                 <a:ext uri="{91240B29-F687-4f45-9708-019B960494DF}">
-                  <a14:hiddenLine xmlns="" xmlns:a14="http://schemas.microsoft.com/office/drawing/2010/main" w="9525">
+                  <a14:hiddenLine xmlns:a14="http://schemas.microsoft.com/office/drawing/2010/main" xmlns="" w="9525">
                     <a:solidFill>
                       <a:srgbClr val="000000"/>
                     </a:solidFill>
@@ -17720,7 +17720,7 @@
               </a:ln>
               <a:extLst>
                 <a:ext uri="{91240B29-F687-4f45-9708-019B960494DF}">
-                  <a14:hiddenLine xmlns="" xmlns:a14="http://schemas.microsoft.com/office/drawing/2010/main" w="9525">
+                  <a14:hiddenLine xmlns:a14="http://schemas.microsoft.com/office/drawing/2010/main" xmlns="" w="9525">
                     <a:solidFill>
                       <a:srgbClr val="000000"/>
                     </a:solidFill>
@@ -17810,7 +17810,7 @@
               </a:ln>
               <a:extLst>
                 <a:ext uri="{91240B29-F687-4f45-9708-019B960494DF}">
-                  <a14:hiddenLine xmlns="" xmlns:a14="http://schemas.microsoft.com/office/drawing/2010/main" w="9525">
+                  <a14:hiddenLine xmlns:a14="http://schemas.microsoft.com/office/drawing/2010/main" xmlns="" w="9525">
                     <a:solidFill>
                       <a:srgbClr val="000000"/>
                     </a:solidFill>
@@ -17872,7 +17872,7 @@
               </a:ln>
               <a:extLst>
                 <a:ext uri="{91240B29-F687-4f45-9708-019B960494DF}">
-                  <a14:hiddenLine xmlns="" xmlns:a14="http://schemas.microsoft.com/office/drawing/2010/main" w="9525">
+                  <a14:hiddenLine xmlns:a14="http://schemas.microsoft.com/office/drawing/2010/main" xmlns="" w="9525">
                     <a:solidFill>
                       <a:srgbClr val="000000"/>
                     </a:solidFill>
@@ -17934,7 +17934,7 @@
               </a:ln>
               <a:extLst>
                 <a:ext uri="{91240B29-F687-4f45-9708-019B960494DF}">
-                  <a14:hiddenLine xmlns="" xmlns:a14="http://schemas.microsoft.com/office/drawing/2010/main" w="9525">
+                  <a14:hiddenLine xmlns:a14="http://schemas.microsoft.com/office/drawing/2010/main" xmlns="" w="9525">
                     <a:solidFill>
                       <a:srgbClr val="000000"/>
                     </a:solidFill>
@@ -18024,7 +18024,7 @@
               </a:ln>
               <a:extLst>
                 <a:ext uri="{91240B29-F687-4f45-9708-019B960494DF}">
-                  <a14:hiddenLine xmlns="" xmlns:a14="http://schemas.microsoft.com/office/drawing/2010/main" w="9525">
+                  <a14:hiddenLine xmlns:a14="http://schemas.microsoft.com/office/drawing/2010/main" xmlns="" w="9525">
                     <a:solidFill>
                       <a:srgbClr val="000000"/>
                     </a:solidFill>
@@ -18114,7 +18114,7 @@
               </a:ln>
               <a:extLst>
                 <a:ext uri="{91240B29-F687-4f45-9708-019B960494DF}">
-                  <a14:hiddenLine xmlns="" xmlns:a14="http://schemas.microsoft.com/office/drawing/2010/main" w="9525">
+                  <a14:hiddenLine xmlns:a14="http://schemas.microsoft.com/office/drawing/2010/main" xmlns="" w="9525">
                     <a:solidFill>
                       <a:srgbClr val="000000"/>
                     </a:solidFill>
@@ -18176,7 +18176,7 @@
               </a:ln>
               <a:extLst>
                 <a:ext uri="{91240B29-F687-4f45-9708-019B960494DF}">
-                  <a14:hiddenLine xmlns="" xmlns:a14="http://schemas.microsoft.com/office/drawing/2010/main" w="9525">
+                  <a14:hiddenLine xmlns:a14="http://schemas.microsoft.com/office/drawing/2010/main" xmlns="" w="9525">
                     <a:solidFill>
                       <a:srgbClr val="000000"/>
                     </a:solidFill>
@@ -18286,7 +18286,7 @@
               </a:ln>
               <a:extLst>
                 <a:ext uri="{91240B29-F687-4f45-9708-019B960494DF}">
-                  <a14:hiddenLine xmlns="" xmlns:a14="http://schemas.microsoft.com/office/drawing/2010/main" w="9525">
+                  <a14:hiddenLine xmlns:a14="http://schemas.microsoft.com/office/drawing/2010/main" xmlns="" w="9525">
                     <a:solidFill>
                       <a:srgbClr val="000000"/>
                     </a:solidFill>
@@ -18370,7 +18370,7 @@
               </a:ln>
               <a:extLst>
                 <a:ext uri="{91240B29-F687-4f45-9708-019B960494DF}">
-                  <a14:hiddenLine xmlns="" xmlns:a14="http://schemas.microsoft.com/office/drawing/2010/main" w="9525">
+                  <a14:hiddenLine xmlns:a14="http://schemas.microsoft.com/office/drawing/2010/main" xmlns="" w="9525">
                     <a:solidFill>
                       <a:srgbClr val="000000"/>
                     </a:solidFill>
@@ -18432,7 +18432,7 @@
               </a:ln>
               <a:extLst>
                 <a:ext uri="{91240B29-F687-4f45-9708-019B960494DF}">
-                  <a14:hiddenLine xmlns="" xmlns:a14="http://schemas.microsoft.com/office/drawing/2010/main" w="9525">
+                  <a14:hiddenLine xmlns:a14="http://schemas.microsoft.com/office/drawing/2010/main" xmlns="" w="9525">
                     <a:solidFill>
                       <a:srgbClr val="000000"/>
                     </a:solidFill>
@@ -18494,7 +18494,7 @@
               </a:ln>
               <a:extLst>
                 <a:ext uri="{91240B29-F687-4f45-9708-019B960494DF}">
-                  <a14:hiddenLine xmlns="" xmlns:a14="http://schemas.microsoft.com/office/drawing/2010/main" w="9525">
+                  <a14:hiddenLine xmlns:a14="http://schemas.microsoft.com/office/drawing/2010/main" xmlns="" w="9525">
                     <a:solidFill>
                       <a:srgbClr val="000000"/>
                     </a:solidFill>
@@ -18584,7 +18584,7 @@
               </a:ln>
               <a:extLst>
                 <a:ext uri="{91240B29-F687-4f45-9708-019B960494DF}">
-                  <a14:hiddenLine xmlns="" xmlns:a14="http://schemas.microsoft.com/office/drawing/2010/main" w="9525">
+                  <a14:hiddenLine xmlns:a14="http://schemas.microsoft.com/office/drawing/2010/main" xmlns="" w="9525">
                     <a:solidFill>
                       <a:srgbClr val="000000"/>
                     </a:solidFill>
@@ -18618,7 +18618,7 @@
               </a:ln>
               <a:extLst>
                 <a:ext uri="{91240B29-F687-4f45-9708-019B960494DF}">
-                  <a14:hiddenLine xmlns="" xmlns:a14="http://schemas.microsoft.com/office/drawing/2010/main" w="9525">
+                  <a14:hiddenLine xmlns:a14="http://schemas.microsoft.com/office/drawing/2010/main" xmlns="" w="9525">
                     <a:solidFill>
                       <a:srgbClr val="000000"/>
                     </a:solidFill>
@@ -18683,7 +18683,7 @@
               </a:ln>
               <a:extLst>
                 <a:ext uri="{91240B29-F687-4f45-9708-019B960494DF}">
-                  <a14:hiddenLine xmlns="" xmlns:a14="http://schemas.microsoft.com/office/drawing/2010/main" w="9525">
+                  <a14:hiddenLine xmlns:a14="http://schemas.microsoft.com/office/drawing/2010/main" xmlns="" w="9525">
                     <a:solidFill>
                       <a:srgbClr val="000000"/>
                     </a:solidFill>
@@ -18773,7 +18773,7 @@
               </a:ln>
               <a:extLst>
                 <a:ext uri="{91240B29-F687-4f45-9708-019B960494DF}">
-                  <a14:hiddenLine xmlns="" xmlns:a14="http://schemas.microsoft.com/office/drawing/2010/main" w="9525">
+                  <a14:hiddenLine xmlns:a14="http://schemas.microsoft.com/office/drawing/2010/main" xmlns="" w="9525">
                     <a:solidFill>
                       <a:srgbClr val="000000"/>
                     </a:solidFill>
@@ -18835,7 +18835,7 @@
               </a:ln>
               <a:extLst>
                 <a:ext uri="{91240B29-F687-4f45-9708-019B960494DF}">
-                  <a14:hiddenLine xmlns="" xmlns:a14="http://schemas.microsoft.com/office/drawing/2010/main" w="9525">
+                  <a14:hiddenLine xmlns:a14="http://schemas.microsoft.com/office/drawing/2010/main" xmlns="" w="9525">
                     <a:solidFill>
                       <a:srgbClr val="000000"/>
                     </a:solidFill>
@@ -18925,7 +18925,7 @@
               </a:ln>
               <a:extLst>
                 <a:ext uri="{91240B29-F687-4f45-9708-019B960494DF}">
-                  <a14:hiddenLine xmlns="" xmlns:a14="http://schemas.microsoft.com/office/drawing/2010/main" w="9525">
+                  <a14:hiddenLine xmlns:a14="http://schemas.microsoft.com/office/drawing/2010/main" xmlns="" w="9525">
                     <a:solidFill>
                       <a:srgbClr val="000000"/>
                     </a:solidFill>
@@ -18990,7 +18990,7 @@
               </a:ln>
               <a:extLst>
                 <a:ext uri="{91240B29-F687-4f45-9708-019B960494DF}">
-                  <a14:hiddenLine xmlns="" xmlns:a14="http://schemas.microsoft.com/office/drawing/2010/main" w="9525">
+                  <a14:hiddenLine xmlns:a14="http://schemas.microsoft.com/office/drawing/2010/main" xmlns="" w="9525">
                     <a:solidFill>
                       <a:srgbClr val="000000"/>
                     </a:solidFill>
@@ -19052,7 +19052,7 @@
               </a:ln>
               <a:extLst>
                 <a:ext uri="{91240B29-F687-4f45-9708-019B960494DF}">
-                  <a14:hiddenLine xmlns="" xmlns:a14="http://schemas.microsoft.com/office/drawing/2010/main" w="9525">
+                  <a14:hiddenLine xmlns:a14="http://schemas.microsoft.com/office/drawing/2010/main" xmlns="" w="9525">
                     <a:solidFill>
                       <a:srgbClr val="000000"/>
                     </a:solidFill>
@@ -19142,7 +19142,7 @@
               </a:ln>
               <a:extLst>
                 <a:ext uri="{91240B29-F687-4f45-9708-019B960494DF}">
-                  <a14:hiddenLine xmlns="" xmlns:a14="http://schemas.microsoft.com/office/drawing/2010/main" w="9525">
+                  <a14:hiddenLine xmlns:a14="http://schemas.microsoft.com/office/drawing/2010/main" xmlns="" w="9525">
                     <a:solidFill>
                       <a:srgbClr val="000000"/>
                     </a:solidFill>
@@ -19232,7 +19232,7 @@
               </a:ln>
               <a:extLst>
                 <a:ext uri="{91240B29-F687-4f45-9708-019B960494DF}">
-                  <a14:hiddenLine xmlns="" xmlns:a14="http://schemas.microsoft.com/office/drawing/2010/main" w="9525">
+                  <a14:hiddenLine xmlns:a14="http://schemas.microsoft.com/office/drawing/2010/main" xmlns="" w="9525">
                     <a:solidFill>
                       <a:srgbClr val="000000"/>
                     </a:solidFill>
@@ -19297,7 +19297,7 @@
               </a:ln>
               <a:extLst>
                 <a:ext uri="{91240B29-F687-4f45-9708-019B960494DF}">
-                  <a14:hiddenLine xmlns="" xmlns:a14="http://schemas.microsoft.com/office/drawing/2010/main" w="9525">
+                  <a14:hiddenLine xmlns:a14="http://schemas.microsoft.com/office/drawing/2010/main" xmlns="" w="9525">
                     <a:solidFill>
                       <a:srgbClr val="000000"/>
                     </a:solidFill>
@@ -19417,7 +19417,7 @@
               </a:ln>
               <a:extLst>
                 <a:ext uri="{91240B29-F687-4f45-9708-019B960494DF}">
-                  <a14:hiddenLine xmlns="" xmlns:a14="http://schemas.microsoft.com/office/drawing/2010/main" w="9525">
+                  <a14:hiddenLine xmlns:a14="http://schemas.microsoft.com/office/drawing/2010/main" xmlns="" w="9525">
                     <a:solidFill>
                       <a:srgbClr val="000000"/>
                     </a:solidFill>
@@ -19498,7 +19498,7 @@
               </a:ln>
               <a:extLst>
                 <a:ext uri="{91240B29-F687-4f45-9708-019B960494DF}">
-                  <a14:hiddenLine xmlns="" xmlns:a14="http://schemas.microsoft.com/office/drawing/2010/main" w="9525">
+                  <a14:hiddenLine xmlns:a14="http://schemas.microsoft.com/office/drawing/2010/main" xmlns="" w="9525">
                     <a:solidFill>
                       <a:srgbClr val="000000"/>
                     </a:solidFill>
@@ -19613,7 +19613,7 @@
               </a:ln>
               <a:extLst>
                 <a:ext uri="{91240B29-F687-4f45-9708-019B960494DF}">
-                  <a14:hiddenLine xmlns="" xmlns:a14="http://schemas.microsoft.com/office/drawing/2010/main" w="9525">
+                  <a14:hiddenLine xmlns:a14="http://schemas.microsoft.com/office/drawing/2010/main" xmlns="" w="9525">
                     <a:solidFill>
                       <a:srgbClr val="000000"/>
                     </a:solidFill>
@@ -19703,7 +19703,7 @@
               </a:ln>
               <a:extLst>
                 <a:ext uri="{91240B29-F687-4f45-9708-019B960494DF}">
-                  <a14:hiddenLine xmlns="" xmlns:a14="http://schemas.microsoft.com/office/drawing/2010/main" w="9525">
+                  <a14:hiddenLine xmlns:a14="http://schemas.microsoft.com/office/drawing/2010/main" xmlns="" w="9525">
                     <a:solidFill>
                       <a:srgbClr val="000000"/>
                     </a:solidFill>
@@ -19768,7 +19768,7 @@
               </a:ln>
               <a:extLst>
                 <a:ext uri="{91240B29-F687-4f45-9708-019B960494DF}">
-                  <a14:hiddenLine xmlns="" xmlns:a14="http://schemas.microsoft.com/office/drawing/2010/main" w="9525">
+                  <a14:hiddenLine xmlns:a14="http://schemas.microsoft.com/office/drawing/2010/main" xmlns="" w="9525">
                     <a:solidFill>
                       <a:srgbClr val="000000"/>
                     </a:solidFill>
@@ -19858,7 +19858,7 @@
               </a:ln>
               <a:extLst>
                 <a:ext uri="{91240B29-F687-4f45-9708-019B960494DF}">
-                  <a14:hiddenLine xmlns="" xmlns:a14="http://schemas.microsoft.com/office/drawing/2010/main" w="9525">
+                  <a14:hiddenLine xmlns:a14="http://schemas.microsoft.com/office/drawing/2010/main" xmlns="" w="9525">
                     <a:solidFill>
                       <a:srgbClr val="000000"/>
                     </a:solidFill>
@@ -19926,7 +19926,7 @@
               </a:ln>
               <a:extLst>
                 <a:ext uri="{91240B29-F687-4f45-9708-019B960494DF}">
-                  <a14:hiddenLine xmlns="" xmlns:a14="http://schemas.microsoft.com/office/drawing/2010/main" w="9525">
+                  <a14:hiddenLine xmlns:a14="http://schemas.microsoft.com/office/drawing/2010/main" xmlns="" w="9525">
                     <a:solidFill>
                       <a:srgbClr val="000000"/>
                     </a:solidFill>
@@ -20016,7 +20016,7 @@
               </a:ln>
               <a:extLst>
                 <a:ext uri="{91240B29-F687-4f45-9708-019B960494DF}">
-                  <a14:hiddenLine xmlns="" xmlns:a14="http://schemas.microsoft.com/office/drawing/2010/main" w="9525">
+                  <a14:hiddenLine xmlns:a14="http://schemas.microsoft.com/office/drawing/2010/main" xmlns="" w="9525">
                     <a:solidFill>
                       <a:srgbClr val="000000"/>
                     </a:solidFill>
@@ -20084,7 +20084,7 @@
               </a:ln>
               <a:extLst>
                 <a:ext uri="{91240B29-F687-4f45-9708-019B960494DF}">
-                  <a14:hiddenLine xmlns="" xmlns:a14="http://schemas.microsoft.com/office/drawing/2010/main" w="9525">
+                  <a14:hiddenLine xmlns:a14="http://schemas.microsoft.com/office/drawing/2010/main" xmlns="" w="9525">
                     <a:solidFill>
                       <a:srgbClr val="000000"/>
                     </a:solidFill>
@@ -20174,7 +20174,7 @@
               </a:ln>
               <a:extLst>
                 <a:ext uri="{91240B29-F687-4f45-9708-019B960494DF}">
-                  <a14:hiddenLine xmlns="" xmlns:a14="http://schemas.microsoft.com/office/drawing/2010/main" w="9525">
+                  <a14:hiddenLine xmlns:a14="http://schemas.microsoft.com/office/drawing/2010/main" xmlns="" w="9525">
                     <a:solidFill>
                       <a:srgbClr val="000000"/>
                     </a:solidFill>
@@ -20208,7 +20208,7 @@
               </a:ln>
               <a:extLst>
                 <a:ext uri="{91240B29-F687-4f45-9708-019B960494DF}">
-                  <a14:hiddenLine xmlns="" xmlns:a14="http://schemas.microsoft.com/office/drawing/2010/main" w="9525">
+                  <a14:hiddenLine xmlns:a14="http://schemas.microsoft.com/office/drawing/2010/main" xmlns="" w="9525">
                     <a:solidFill>
                       <a:srgbClr val="000000"/>
                     </a:solidFill>
@@ -23231,62 +23231,12 @@
           </a:p>
         </p:txBody>
       </p:sp>
-      <p:sp>
-        <p:nvSpPr>
-          <p:cNvPr id="5" name="Content Placeholder 4">
+      <p:pic>
+        <p:nvPicPr>
+          <p:cNvPr id="10" name="Picture 9">
             <a:extLst>
               <a:ext uri="{FF2B5EF4-FFF2-40B4-BE49-F238E27FC236}">
-                <a16:creationId xmlns:a16="http://schemas.microsoft.com/office/drawing/2014/main" id="{09198237-3D97-4C8C-A848-18F7BEE3B21B}"/>
-              </a:ext>
-            </a:extLst>
-          </p:cNvPr>
-          <p:cNvSpPr>
-            <a:spLocks noGrp="1"/>
-          </p:cNvSpPr>
-          <p:nvPr>
-            <p:ph sz="half" idx="1"/>
-          </p:nvPr>
-        </p:nvSpPr>
-        <p:spPr/>
-        <p:txBody>
-          <a:bodyPr/>
-          <a:lstStyle/>
-          <a:p>
-            <a:endParaRPr lang="en-US"/>
-          </a:p>
-        </p:txBody>
-      </p:sp>
-      <p:sp>
-        <p:nvSpPr>
-          <p:cNvPr id="7" name="Content Placeholder 6">
-            <a:extLst>
-              <a:ext uri="{FF2B5EF4-FFF2-40B4-BE49-F238E27FC236}">
-                <a16:creationId xmlns:a16="http://schemas.microsoft.com/office/drawing/2014/main" id="{A33720BD-0F2B-43E2-A442-868FFF19794D}"/>
-              </a:ext>
-            </a:extLst>
-          </p:cNvPr>
-          <p:cNvSpPr>
-            <a:spLocks noGrp="1"/>
-          </p:cNvSpPr>
-          <p:nvPr>
-            <p:ph sz="half" idx="2"/>
-          </p:nvPr>
-        </p:nvSpPr>
-        <p:spPr/>
-        <p:txBody>
-          <a:bodyPr/>
-          <a:lstStyle/>
-          <a:p>
-            <a:endParaRPr lang="en-US" dirty="0"/>
-          </a:p>
-        </p:txBody>
-      </p:sp>
-      <p:pic>
-        <p:nvPicPr>
-          <p:cNvPr id="9" name="Content Placeholder 6">
-            <a:extLst>
-              <a:ext uri="{FF2B5EF4-FFF2-40B4-BE49-F238E27FC236}">
-                <a16:creationId xmlns:a16="http://schemas.microsoft.com/office/drawing/2014/main" id="{C3E8A4F9-EC3F-4DCF-B202-33A8BF792D23}"/>
+                <a16:creationId xmlns:a16="http://schemas.microsoft.com/office/drawing/2014/main" id="{A5A0CBB1-6450-41EC-A78A-A2FC5EC4222D}"/>
               </a:ext>
             </a:extLst>
           </p:cNvPr>
@@ -23303,36 +23253,6 @@
         </p:blipFill>
         <p:spPr>
           <a:xfrm>
-            <a:off x="1141410" y="1266518"/>
-            <a:ext cx="9982778" cy="5335460"/>
-          </a:xfrm>
-          <a:prstGeom prst="rect">
-            <a:avLst/>
-          </a:prstGeom>
-        </p:spPr>
-      </p:pic>
-      <p:pic>
-        <p:nvPicPr>
-          <p:cNvPr id="10" name="Picture 9">
-            <a:extLst>
-              <a:ext uri="{FF2B5EF4-FFF2-40B4-BE49-F238E27FC236}">
-                <a16:creationId xmlns:a16="http://schemas.microsoft.com/office/drawing/2014/main" id="{A5A0CBB1-6450-41EC-A78A-A2FC5EC4222D}"/>
-              </a:ext>
-            </a:extLst>
-          </p:cNvPr>
-          <p:cNvPicPr>
-            <a:picLocks noChangeAspect="1"/>
-          </p:cNvPicPr>
-          <p:nvPr/>
-        </p:nvPicPr>
-        <p:blipFill>
-          <a:blip r:embed="rId3"/>
-          <a:stretch>
-            <a:fillRect/>
-          </a:stretch>
-        </p:blipFill>
-        <p:spPr>
-          <a:xfrm>
             <a:off x="10667999" y="256022"/>
             <a:ext cx="1260713" cy="872978"/>
           </a:xfrm>
@@ -23341,6 +23261,330 @@
           </a:prstGeom>
         </p:spPr>
       </p:pic>
+      <p:sp>
+        <p:nvSpPr>
+          <p:cNvPr id="21" name="Rectangle 2">
+            <a:extLst>
+              <a:ext uri="{FF2B5EF4-FFF2-40B4-BE49-F238E27FC236}">
+                <a16:creationId xmlns:a16="http://schemas.microsoft.com/office/drawing/2014/main" id="{89E28970-2357-ED38-9833-2D5FBF8674F6}"/>
+              </a:ext>
+            </a:extLst>
+          </p:cNvPr>
+          <p:cNvSpPr>
+            <a:spLocks noChangeArrowheads="1"/>
+          </p:cNvSpPr>
+          <p:nvPr/>
+        </p:nvSpPr>
+        <p:spPr bwMode="auto">
+          <a:xfrm>
+            <a:off x="1908699" y="609600"/>
+            <a:ext cx="12192000" cy="457200"/>
+          </a:xfrm>
+          <a:prstGeom prst="rect">
+            <a:avLst/>
+          </a:prstGeom>
+          <a:noFill/>
+          <a:ln>
+            <a:noFill/>
+          </a:ln>
+          <a:effectLst/>
+          <a:extLst>
+            <a:ext uri="{909E8E84-426E-40DD-AFC4-6F175D3DCCD1}">
+              <a14:hiddenFill xmlns:a14="http://schemas.microsoft.com/office/drawing/2010/main">
+                <a:solidFill>
+                  <a:schemeClr val="accent1"/>
+                </a:solidFill>
+              </a14:hiddenFill>
+            </a:ext>
+            <a:ext uri="{91240B29-F687-4F45-9708-019B960494DF}">
+              <a14:hiddenLine xmlns:a14="http://schemas.microsoft.com/office/drawing/2010/main" w="9525">
+                <a:solidFill>
+                  <a:schemeClr val="tx1"/>
+                </a:solidFill>
+                <a:miter lim="800000"/>
+                <a:headEnd/>
+                <a:tailEnd/>
+              </a14:hiddenLine>
+            </a:ext>
+            <a:ext uri="{AF507438-7753-43E0-B8FC-AC1667EBCBE1}">
+              <a14:hiddenEffects xmlns:a14="http://schemas.microsoft.com/office/drawing/2010/main">
+                <a:effectLst>
+                  <a:outerShdw dist="35921" dir="2700000" algn="ctr" rotWithShape="0">
+                    <a:schemeClr val="bg2"/>
+                  </a:outerShdw>
+                </a:effectLst>
+              </a14:hiddenEffects>
+            </a:ext>
+          </a:extLst>
+        </p:spPr>
+        <p:txBody>
+          <a:bodyPr vert="horz" wrap="none" lIns="91440" tIns="45720" rIns="91440" bIns="45720" numCol="1" anchor="ctr" anchorCtr="0" compatLnSpc="1">
+            <a:prstTxWarp prst="textNoShape">
+              <a:avLst/>
+            </a:prstTxWarp>
+            <a:spAutoFit/>
+          </a:bodyPr>
+          <a:lstStyle/>
+          <a:p>
+            <a:endParaRPr lang="en-US"/>
+          </a:p>
+        </p:txBody>
+      </p:sp>
+      <p:sp>
+        <p:nvSpPr>
+          <p:cNvPr id="23" name="Rectangle 5">
+            <a:extLst>
+              <a:ext uri="{FF2B5EF4-FFF2-40B4-BE49-F238E27FC236}">
+                <a16:creationId xmlns:a16="http://schemas.microsoft.com/office/drawing/2014/main" id="{DF42A5DD-2BEF-79B6-8ACA-8009FCA8D314}"/>
+              </a:ext>
+            </a:extLst>
+          </p:cNvPr>
+          <p:cNvSpPr>
+            <a:spLocks noChangeArrowheads="1"/>
+          </p:cNvSpPr>
+          <p:nvPr/>
+        </p:nvSpPr>
+        <p:spPr bwMode="auto">
+          <a:xfrm>
+            <a:off x="0" y="0"/>
+            <a:ext cx="12192000" cy="457200"/>
+          </a:xfrm>
+          <a:prstGeom prst="rect">
+            <a:avLst/>
+          </a:prstGeom>
+          <a:noFill/>
+          <a:ln>
+            <a:noFill/>
+          </a:ln>
+          <a:effectLst/>
+          <a:extLst>
+            <a:ext uri="{909E8E84-426E-40DD-AFC4-6F175D3DCCD1}">
+              <a14:hiddenFill xmlns:a14="http://schemas.microsoft.com/office/drawing/2010/main">
+                <a:solidFill>
+                  <a:schemeClr val="accent1"/>
+                </a:solidFill>
+              </a14:hiddenFill>
+            </a:ext>
+            <a:ext uri="{91240B29-F687-4F45-9708-019B960494DF}">
+              <a14:hiddenLine xmlns:a14="http://schemas.microsoft.com/office/drawing/2010/main" w="9525">
+                <a:solidFill>
+                  <a:schemeClr val="tx1"/>
+                </a:solidFill>
+                <a:miter lim="800000"/>
+                <a:headEnd/>
+                <a:tailEnd/>
+              </a14:hiddenLine>
+            </a:ext>
+            <a:ext uri="{AF507438-7753-43E0-B8FC-AC1667EBCBE1}">
+              <a14:hiddenEffects xmlns:a14="http://schemas.microsoft.com/office/drawing/2010/main">
+                <a:effectLst>
+                  <a:outerShdw dist="35921" dir="2700000" algn="ctr" rotWithShape="0">
+                    <a:schemeClr val="bg2"/>
+                  </a:outerShdw>
+                </a:effectLst>
+              </a14:hiddenEffects>
+            </a:ext>
+          </a:extLst>
+        </p:spPr>
+        <p:txBody>
+          <a:bodyPr vert="horz" wrap="none" lIns="91440" tIns="45720" rIns="91440" bIns="45720" numCol="1" anchor="ctr" anchorCtr="0" compatLnSpc="1">
+            <a:prstTxWarp prst="textNoShape">
+              <a:avLst/>
+            </a:prstTxWarp>
+            <a:spAutoFit/>
+          </a:bodyPr>
+          <a:lstStyle/>
+          <a:p>
+            <a:endParaRPr lang="en-US"/>
+          </a:p>
+        </p:txBody>
+      </p:sp>
+      <p:pic>
+        <p:nvPicPr>
+          <p:cNvPr id="1028" name="Picture 4" descr="Graphical user interface&#10;&#10;Description automatically generated">
+            <a:extLst>
+              <a:ext uri="{FF2B5EF4-FFF2-40B4-BE49-F238E27FC236}">
+                <a16:creationId xmlns:a16="http://schemas.microsoft.com/office/drawing/2014/main" id="{356F25F2-FE7A-AE1F-51EB-A96783B168A9}"/>
+              </a:ext>
+            </a:extLst>
+          </p:cNvPr>
+          <p:cNvPicPr>
+            <a:picLocks noChangeAspect="1" noChangeArrowheads="1"/>
+          </p:cNvPicPr>
+          <p:nvPr/>
+        </p:nvPicPr>
+        <p:blipFill>
+          <a:blip r:embed="rId3">
+            <a:extLst>
+              <a:ext uri="{28A0092B-C50C-407E-A947-70E740481C1C}">
+                <a14:useLocalDpi xmlns:a14="http://schemas.microsoft.com/office/drawing/2010/main" val="0"/>
+              </a:ext>
+            </a:extLst>
+          </a:blip>
+          <a:srcRect/>
+          <a:stretch>
+            <a:fillRect/>
+          </a:stretch>
+        </p:blipFill>
+        <p:spPr bwMode="auto">
+          <a:xfrm>
+            <a:off x="484909" y="1224422"/>
+            <a:ext cx="11222182" cy="5157594"/>
+          </a:xfrm>
+          <a:prstGeom prst="rect">
+            <a:avLst/>
+          </a:prstGeom>
+          <a:noFill/>
+          <a:extLst>
+            <a:ext uri="{909E8E84-426E-40DD-AFC4-6F175D3DCCD1}">
+              <a14:hiddenFill xmlns:a14="http://schemas.microsoft.com/office/drawing/2010/main">
+                <a:solidFill>
+                  <a:srgbClr val="FFFFFF"/>
+                </a:solidFill>
+              </a14:hiddenFill>
+            </a:ext>
+          </a:extLst>
+        </p:spPr>
+      </p:pic>
+      <p:sp>
+        <p:nvSpPr>
+          <p:cNvPr id="24" name="Rectangle 6">
+            <a:extLst>
+              <a:ext uri="{FF2B5EF4-FFF2-40B4-BE49-F238E27FC236}">
+                <a16:creationId xmlns:a16="http://schemas.microsoft.com/office/drawing/2014/main" id="{2CC08ED7-5E89-1213-3008-077833F5A405}"/>
+              </a:ext>
+            </a:extLst>
+          </p:cNvPr>
+          <p:cNvSpPr>
+            <a:spLocks noChangeArrowheads="1"/>
+          </p:cNvSpPr>
+          <p:nvPr/>
+        </p:nvSpPr>
+        <p:spPr bwMode="auto">
+          <a:xfrm>
+            <a:off x="2796310" y="6354972"/>
+            <a:ext cx="5611088" cy="369332"/>
+          </a:xfrm>
+          <a:prstGeom prst="rect">
+            <a:avLst/>
+          </a:prstGeom>
+          <a:noFill/>
+          <a:ln>
+            <a:noFill/>
+          </a:ln>
+          <a:effectLst/>
+          <a:extLst>
+            <a:ext uri="{909E8E84-426E-40DD-AFC4-6F175D3DCCD1}">
+              <a14:hiddenFill xmlns:a14="http://schemas.microsoft.com/office/drawing/2010/main">
+                <a:solidFill>
+                  <a:schemeClr val="accent1"/>
+                </a:solidFill>
+              </a14:hiddenFill>
+            </a:ext>
+            <a:ext uri="{91240B29-F687-4F45-9708-019B960494DF}">
+              <a14:hiddenLine xmlns:a14="http://schemas.microsoft.com/office/drawing/2010/main" w="9525">
+                <a:solidFill>
+                  <a:schemeClr val="tx1"/>
+                </a:solidFill>
+                <a:miter lim="800000"/>
+                <a:headEnd/>
+                <a:tailEnd/>
+              </a14:hiddenLine>
+            </a:ext>
+            <a:ext uri="{AF507438-7753-43E0-B8FC-AC1667EBCBE1}">
+              <a14:hiddenEffects xmlns:a14="http://schemas.microsoft.com/office/drawing/2010/main">
+                <a:effectLst>
+                  <a:outerShdw dist="35921" dir="2700000" algn="ctr" rotWithShape="0">
+                    <a:schemeClr val="bg2"/>
+                  </a:outerShdw>
+                </a:effectLst>
+              </a14:hiddenEffects>
+            </a:ext>
+          </a:extLst>
+        </p:spPr>
+        <p:txBody>
+          <a:bodyPr vert="horz" wrap="none" lIns="91440" tIns="45720" rIns="91440" bIns="45720" numCol="1" anchor="ctr" anchorCtr="0" compatLnSpc="1">
+            <a:prstTxWarp prst="textNoShape">
+              <a:avLst/>
+            </a:prstTxWarp>
+            <a:spAutoFit/>
+          </a:bodyPr>
+          <a:lstStyle/>
+          <a:p>
+            <a:pPr marL="0" marR="0" lvl="0" indent="0" algn="ctr" defTabSz="914400" rtl="0" eaLnBrk="0" fontAlgn="base" latinLnBrk="0" hangingPunct="0">
+              <a:lnSpc>
+                <a:spcPct val="100000"/>
+              </a:lnSpc>
+              <a:spcBef>
+                <a:spcPct val="0"/>
+              </a:spcBef>
+              <a:spcAft>
+                <a:spcPct val="0"/>
+              </a:spcAft>
+              <a:buClrTx/>
+              <a:buSzTx/>
+              <a:buFontTx/>
+              <a:buNone/>
+              <a:tabLst/>
+            </a:pPr>
+            <a:r>
+              <a:rPr kumimoji="0" lang="en-US" altLang="en-US" b="0" i="1" u="none" strike="noStrike" cap="none" normalizeH="0" baseline="0" dirty="0">
+                <a:ln>
+                  <a:noFill/>
+                </a:ln>
+                <a:solidFill>
+                  <a:schemeClr val="tx2"/>
+                </a:solidFill>
+                <a:effectLst/>
+                <a:latin typeface="Aptos" panose="020B0004020202020204" pitchFamily="34" charset="0"/>
+                <a:ea typeface="Aptos" panose="020B0004020202020204" pitchFamily="34" charset="0"/>
+                <a:cs typeface="Times New Roman" panose="02020603050405020304" pitchFamily="18" charset="0"/>
+              </a:rPr>
+              <a:t>Figure 3: </a:t>
+            </a:r>
+            <a:r>
+              <a:rPr kumimoji="0" lang="en-US" altLang="en-US" b="0" i="1" u="none" strike="noStrike" cap="none" normalizeH="0" baseline="0" dirty="0" err="1">
+                <a:ln>
+                  <a:noFill/>
+                </a:ln>
+                <a:solidFill>
+                  <a:schemeClr val="tx2"/>
+                </a:solidFill>
+                <a:effectLst/>
+                <a:latin typeface="Aptos" panose="020B0004020202020204" pitchFamily="34" charset="0"/>
+                <a:ea typeface="Aptos" panose="020B0004020202020204" pitchFamily="34" charset="0"/>
+                <a:cs typeface="Times New Roman" panose="02020603050405020304" pitchFamily="18" charset="0"/>
+              </a:rPr>
+              <a:t>Softmax</a:t>
+            </a:r>
+            <a:r>
+              <a:rPr kumimoji="0" lang="en-US" altLang="en-US" b="0" i="1" u="none" strike="noStrike" cap="none" normalizeH="0" baseline="0" dirty="0">
+                <a:ln>
+                  <a:noFill/>
+                </a:ln>
+                <a:solidFill>
+                  <a:schemeClr val="tx2"/>
+                </a:solidFill>
+                <a:effectLst/>
+                <a:latin typeface="Aptos" panose="020B0004020202020204" pitchFamily="34" charset="0"/>
+                <a:ea typeface="Aptos" panose="020B0004020202020204" pitchFamily="34" charset="0"/>
+                <a:cs typeface="Times New Roman" panose="02020603050405020304" pitchFamily="18" charset="0"/>
+              </a:rPr>
+              <a:t> Metrics Plot for 10 Images and Masks</a:t>
+            </a:r>
+            <a:endParaRPr kumimoji="0" lang="en-US" altLang="en-US" b="0" i="0" u="none" strike="noStrike" cap="none" normalizeH="0" baseline="0" dirty="0">
+              <a:ln>
+                <a:noFill/>
+              </a:ln>
+              <a:solidFill>
+                <a:schemeClr val="tx2"/>
+              </a:solidFill>
+              <a:effectLst/>
+              <a:latin typeface="Arial" panose="020B0604020202020204" pitchFamily="34" charset="0"/>
+            </a:endParaRPr>
+          </a:p>
+        </p:txBody>
+      </p:sp>
     </p:spTree>
     <p:extLst>
       <p:ext uri="{BB962C8B-B14F-4D97-AF65-F5344CB8AC3E}">
@@ -24905,23 +25149,6 @@
 </file>
 
 <file path=customXml/item1.xml><?xml version="1.0" encoding="utf-8"?>
-<p:properties xmlns:p="http://schemas.microsoft.com/office/2006/metadata/properties" xmlns:xsi="http://www.w3.org/2001/XMLSchema-instance" xmlns:pc="http://schemas.microsoft.com/office/infopath/2007/PartnerControls">
-  <documentManagement>
-    <MediaServiceKeyPoints xmlns="71af3243-3dd4-4a8d-8c0d-dd76da1f02a5" xsi:nil="true"/>
-  </documentManagement>
-</p:properties>
-</file>
-
-<file path=customXml/item2.xml><?xml version="1.0" encoding="utf-8"?>
-<?mso-contentType ?>
-<FormTemplates xmlns="http://schemas.microsoft.com/sharepoint/v3/contenttype/forms">
-  <Display>DocumentLibraryForm</Display>
-  <Edit>DocumentLibraryForm</Edit>
-  <New>DocumentLibraryForm</New>
-</FormTemplates>
-</file>
-
-<file path=customXml/item3.xml><?xml version="1.0" encoding="utf-8"?>
 <ct:contentTypeSchema xmlns:ct="http://schemas.microsoft.com/office/2006/metadata/contentType" xmlns:ma="http://schemas.microsoft.com/office/2006/metadata/properties/metaAttributes" ct:_="" ma:_="" ma:contentTypeName="Document" ma:contentTypeID="0x01010079F111ED35F8CC479449609E8A0923A6" ma:contentTypeVersion="11" ma:contentTypeDescription="Create a new document." ma:contentTypeScope="" ma:versionID="96291512c1ee715ab617f4c07df79fc1">
   <xsd:schema xmlns:xsd="http://www.w3.org/2001/XMLSchema" xmlns:xs="http://www.w3.org/2001/XMLSchema" xmlns:p="http://schemas.microsoft.com/office/2006/metadata/properties" xmlns:ns2="71af3243-3dd4-4a8d-8c0d-dd76da1f02a5" xmlns:ns3="16c05727-aa75-4e4a-9b5f-8a80a1165891" targetNamespace="http://schemas.microsoft.com/office/2006/metadata/properties" ma:root="true" ma:fieldsID="8256c27c40ca5c40ce1cf6c44f0205df" ns2:_="" ns3:_="">
     <xsd:import namespace="71af3243-3dd4-4a8d-8c0d-dd76da1f02a5"/>
@@ -25132,32 +25359,24 @@
 </ct:contentTypeSchema>
 </file>
 
-<file path=customXml/itemProps1.xml><?xml version="1.0" encoding="utf-8"?>
-<ds:datastoreItem xmlns:ds="http://schemas.openxmlformats.org/officeDocument/2006/customXml" ds:itemID="{E7866CFD-F94E-4AE5-ACEA-86FEC0F48A10}">
-  <ds:schemaRefs>
-    <ds:schemaRef ds:uri="http://purl.org/dc/elements/1.1/"/>
-    <ds:schemaRef ds:uri="http://schemas.microsoft.com/office/2006/documentManagement/types"/>
-    <ds:schemaRef ds:uri="16c05727-aa75-4e4a-9b5f-8a80a1165891"/>
-    <ds:schemaRef ds:uri="http://purl.org/dc/terms/"/>
-    <ds:schemaRef ds:uri="71af3243-3dd4-4a8d-8c0d-dd76da1f02a5"/>
-    <ds:schemaRef ds:uri="http://schemas.microsoft.com/office/infopath/2007/PartnerControls"/>
-    <ds:schemaRef ds:uri="http://www.w3.org/XML/1998/namespace"/>
-    <ds:schemaRef ds:uri="http://schemas.openxmlformats.org/package/2006/metadata/core-properties"/>
-    <ds:schemaRef ds:uri="http://schemas.microsoft.com/office/2006/metadata/properties"/>
-    <ds:schemaRef ds:uri="http://purl.org/dc/dcmitype/"/>
-  </ds:schemaRefs>
-</ds:datastoreItem>
+<file path=customXml/item2.xml><?xml version="1.0" encoding="utf-8"?>
+<?mso-contentType ?>
+<FormTemplates xmlns="http://schemas.microsoft.com/sharepoint/v3/contenttype/forms">
+  <Display>DocumentLibraryForm</Display>
+  <Edit>DocumentLibraryForm</Edit>
+  <New>DocumentLibraryForm</New>
+</FormTemplates>
 </file>
 
-<file path=customXml/itemProps2.xml><?xml version="1.0" encoding="utf-8"?>
-<ds:datastoreItem xmlns:ds="http://schemas.openxmlformats.org/officeDocument/2006/customXml" ds:itemID="{B579702B-25C7-40D7-9E29-7686B11A9660}">
-  <ds:schemaRefs>
-    <ds:schemaRef ds:uri="http://schemas.microsoft.com/sharepoint/v3/contenttype/forms"/>
-  </ds:schemaRefs>
-</ds:datastoreItem>
+<file path=customXml/item3.xml><?xml version="1.0" encoding="utf-8"?>
+<p:properties xmlns:p="http://schemas.microsoft.com/office/2006/metadata/properties" xmlns:xsi="http://www.w3.org/2001/XMLSchema-instance" xmlns:pc="http://schemas.microsoft.com/office/infopath/2007/PartnerControls">
+  <documentManagement>
+    <MediaServiceKeyPoints xmlns="71af3243-3dd4-4a8d-8c0d-dd76da1f02a5" xsi:nil="true"/>
+  </documentManagement>
+</p:properties>
 </file>
 
-<file path=customXml/itemProps3.xml><?xml version="1.0" encoding="utf-8"?>
+<file path=customXml/itemProps1.xml><?xml version="1.0" encoding="utf-8"?>
 <ds:datastoreItem xmlns:ds="http://schemas.openxmlformats.org/officeDocument/2006/customXml" ds:itemID="{A7C0B241-13E5-418D-8920-D23491E2D2C0}">
   <ds:schemaRefs>
     <ds:schemaRef ds:uri="http://schemas.microsoft.com/office/2006/metadata/contentType"/>
@@ -25174,4 +25393,29 @@
     <ds:schemaRef ds:uri="http://schemas.microsoft.com/internal/obd"/>
   </ds:schemaRefs>
 </ds:datastoreItem>
+</file>
+
+<file path=customXml/itemProps2.xml><?xml version="1.0" encoding="utf-8"?>
+<ds:datastoreItem xmlns:ds="http://schemas.openxmlformats.org/officeDocument/2006/customXml" ds:itemID="{B579702B-25C7-40D7-9E29-7686B11A9660}">
+  <ds:schemaRefs>
+    <ds:schemaRef ds:uri="http://schemas.microsoft.com/sharepoint/v3/contenttype/forms"/>
+  </ds:schemaRefs>
+</ds:datastoreItem>
+</file>
+
+<file path=customXml/itemProps3.xml><?xml version="1.0" encoding="utf-8"?>
+<ds:datastoreItem xmlns:ds="http://schemas.openxmlformats.org/officeDocument/2006/customXml" ds:itemID="{E7866CFD-F94E-4AE5-ACEA-86FEC0F48A10}">
+  <ds:schemaRefs>
+    <ds:schemaRef ds:uri="http://purl.org/dc/elements/1.1/"/>
+    <ds:schemaRef ds:uri="http://schemas.microsoft.com/office/2006/documentManagement/types"/>
+    <ds:schemaRef ds:uri="16c05727-aa75-4e4a-9b5f-8a80a1165891"/>
+    <ds:schemaRef ds:uri="http://purl.org/dc/terms/"/>
+    <ds:schemaRef ds:uri="71af3243-3dd4-4a8d-8c0d-dd76da1f02a5"/>
+    <ds:schemaRef ds:uri="http://schemas.microsoft.com/office/infopath/2007/PartnerControls"/>
+    <ds:schemaRef ds:uri="http://www.w3.org/XML/1998/namespace"/>
+    <ds:schemaRef ds:uri="http://schemas.openxmlformats.org/package/2006/metadata/core-properties"/>
+    <ds:schemaRef ds:uri="http://schemas.microsoft.com/office/2006/metadata/properties"/>
+    <ds:schemaRef ds:uri="http://purl.org/dc/dcmitype/"/>
+  </ds:schemaRefs>
+</ds:datastoreItem>
 </file>
</xml_diff>

<commit_message>
Found a typo in the PPT and fixed it.
</commit_message>
<xml_diff>
--- a/Cancer_Champions_PPT.pptx
+++ b/Cancer_Champions_PPT.pptx
@@ -2690,20 +2690,12 @@
             <a:buChar char=""/>
           </a:pPr>
           <a:r>
-            <a:rPr lang="en-US" dirty="0" err="1">
+            <a:rPr lang="en-US">
               <a:latin typeface="Tahoma" panose="020B0604030504040204" pitchFamily="34" charset="0"/>
               <a:ea typeface="Tahoma" panose="020B0604030504040204" pitchFamily="34" charset="0"/>
               <a:cs typeface="Tahoma" panose="020B0604030504040204" pitchFamily="34" charset="0"/>
             </a:rPr>
-            <a:t>Pretrainded</a:t>
-          </a:r>
-          <a:r>
-            <a:rPr lang="en-US" dirty="0">
-              <a:latin typeface="Tahoma" panose="020B0604030504040204" pitchFamily="34" charset="0"/>
-              <a:ea typeface="Tahoma" panose="020B0604030504040204" pitchFamily="34" charset="0"/>
-              <a:cs typeface="Tahoma" panose="020B0604030504040204" pitchFamily="34" charset="0"/>
-            </a:rPr>
-            <a:t> </a:t>
+            <a:t>Pre-trained </a:t>
           </a:r>
           <a:r>
             <a:rPr lang="en-US" b="0" i="0" dirty="0"/>
@@ -5198,20 +5190,12 @@
             <a:buChar char=""/>
           </a:pPr>
           <a:r>
-            <a:rPr lang="en-US" sz="1700" kern="1200" dirty="0" err="1">
+            <a:rPr lang="en-US" sz="1700" kern="1200">
               <a:latin typeface="Tahoma" panose="020B0604030504040204" pitchFamily="34" charset="0"/>
               <a:ea typeface="Tahoma" panose="020B0604030504040204" pitchFamily="34" charset="0"/>
               <a:cs typeface="Tahoma" panose="020B0604030504040204" pitchFamily="34" charset="0"/>
             </a:rPr>
-            <a:t>Pretrainded</a:t>
-          </a:r>
-          <a:r>
-            <a:rPr lang="en-US" sz="1700" kern="1200" dirty="0">
-              <a:latin typeface="Tahoma" panose="020B0604030504040204" pitchFamily="34" charset="0"/>
-              <a:ea typeface="Tahoma" panose="020B0604030504040204" pitchFamily="34" charset="0"/>
-              <a:cs typeface="Tahoma" panose="020B0604030504040204" pitchFamily="34" charset="0"/>
-            </a:rPr>
-            <a:t> </a:t>
+            <a:t>Pre-trained </a:t>
           </a:r>
           <a:r>
             <a:rPr lang="en-US" sz="1700" b="0" i="0" kern="1200" dirty="0"/>
@@ -8505,7 +8489,7 @@
           <a:noFill/>
           <a:extLst>
             <a:ext uri="{909E8E84-426E-40dd-AFC4-6F175D3DCCD1}">
-              <a14:hiddenFill xmlns:a14="http://schemas.microsoft.com/office/drawing/2010/main" xmlns="">
+              <a14:hiddenFill xmlns="" xmlns:a14="http://schemas.microsoft.com/office/drawing/2010/main">
                 <a:solidFill>
                   <a:srgbClr val="FFFFFF"/>
                 </a:solidFill>
@@ -8564,7 +8548,7 @@
             </a:ln>
             <a:extLst>
               <a:ext uri="{91240B29-F687-4f45-9708-019B960494DF}">
-                <a14:hiddenLine xmlns:a14="http://schemas.microsoft.com/office/drawing/2010/main" xmlns="" w="9525">
+                <a14:hiddenLine xmlns="" xmlns:a14="http://schemas.microsoft.com/office/drawing/2010/main" w="9525">
                   <a:solidFill>
                     <a:srgbClr val="000000"/>
                   </a:solidFill>
@@ -8654,7 +8638,7 @@
             </a:ln>
             <a:extLst>
               <a:ext uri="{91240B29-F687-4f45-9708-019B960494DF}">
-                <a14:hiddenLine xmlns:a14="http://schemas.microsoft.com/office/drawing/2010/main" xmlns="" w="9525">
+                <a14:hiddenLine xmlns="" xmlns:a14="http://schemas.microsoft.com/office/drawing/2010/main" w="9525">
                   <a:solidFill>
                     <a:srgbClr val="000000"/>
                   </a:solidFill>
@@ -8744,7 +8728,7 @@
             </a:ln>
             <a:extLst>
               <a:ext uri="{91240B29-F687-4f45-9708-019B960494DF}">
-                <a14:hiddenLine xmlns:a14="http://schemas.microsoft.com/office/drawing/2010/main" xmlns="" w="9525">
+                <a14:hiddenLine xmlns="" xmlns:a14="http://schemas.microsoft.com/office/drawing/2010/main" w="9525">
                   <a:solidFill>
                     <a:srgbClr val="000000"/>
                   </a:solidFill>
@@ -8778,7 +8762,7 @@
             </a:ln>
             <a:extLst>
               <a:ext uri="{91240B29-F687-4f45-9708-019B960494DF}">
-                <a14:hiddenLine xmlns:a14="http://schemas.microsoft.com/office/drawing/2010/main" xmlns="" w="9525">
+                <a14:hiddenLine xmlns="" xmlns:a14="http://schemas.microsoft.com/office/drawing/2010/main" w="9525">
                   <a:solidFill>
                     <a:srgbClr val="000000"/>
                   </a:solidFill>
@@ -8868,7 +8852,7 @@
             </a:ln>
             <a:extLst>
               <a:ext uri="{91240B29-F687-4f45-9708-019B960494DF}">
-                <a14:hiddenLine xmlns:a14="http://schemas.microsoft.com/office/drawing/2010/main" xmlns="" w="9525">
+                <a14:hiddenLine xmlns="" xmlns:a14="http://schemas.microsoft.com/office/drawing/2010/main" w="9525">
                   <a:solidFill>
                     <a:srgbClr val="000000"/>
                   </a:solidFill>
@@ -8930,7 +8914,7 @@
             </a:ln>
             <a:extLst>
               <a:ext uri="{91240B29-F687-4f45-9708-019B960494DF}">
-                <a14:hiddenLine xmlns:a14="http://schemas.microsoft.com/office/drawing/2010/main" xmlns="" w="9525">
+                <a14:hiddenLine xmlns="" xmlns:a14="http://schemas.microsoft.com/office/drawing/2010/main" w="9525">
                   <a:solidFill>
                     <a:srgbClr val="000000"/>
                   </a:solidFill>
@@ -8992,7 +8976,7 @@
             </a:ln>
             <a:extLst>
               <a:ext uri="{91240B29-F687-4f45-9708-019B960494DF}">
-                <a14:hiddenLine xmlns:a14="http://schemas.microsoft.com/office/drawing/2010/main" xmlns="" w="9525">
+                <a14:hiddenLine xmlns="" xmlns:a14="http://schemas.microsoft.com/office/drawing/2010/main" w="9525">
                   <a:solidFill>
                     <a:srgbClr val="000000"/>
                   </a:solidFill>
@@ -9082,7 +9066,7 @@
             </a:ln>
             <a:extLst>
               <a:ext uri="{91240B29-F687-4f45-9708-019B960494DF}">
-                <a14:hiddenLine xmlns:a14="http://schemas.microsoft.com/office/drawing/2010/main" xmlns="" w="9525">
+                <a14:hiddenLine xmlns="" xmlns:a14="http://schemas.microsoft.com/office/drawing/2010/main" w="9525">
                   <a:solidFill>
                     <a:srgbClr val="000000"/>
                   </a:solidFill>
@@ -9144,7 +9128,7 @@
             </a:ln>
             <a:extLst>
               <a:ext uri="{91240B29-F687-4f45-9708-019B960494DF}">
-                <a14:hiddenLine xmlns:a14="http://schemas.microsoft.com/office/drawing/2010/main" xmlns="" w="9525">
+                <a14:hiddenLine xmlns="" xmlns:a14="http://schemas.microsoft.com/office/drawing/2010/main" w="9525">
                   <a:solidFill>
                     <a:srgbClr val="000000"/>
                   </a:solidFill>
@@ -9206,7 +9190,7 @@
             </a:ln>
             <a:extLst>
               <a:ext uri="{91240B29-F687-4f45-9708-019B960494DF}">
-                <a14:hiddenLine xmlns:a14="http://schemas.microsoft.com/office/drawing/2010/main" xmlns="" w="9525">
+                <a14:hiddenLine xmlns="" xmlns:a14="http://schemas.microsoft.com/office/drawing/2010/main" w="9525">
                   <a:solidFill>
                     <a:srgbClr val="000000"/>
                   </a:solidFill>
@@ -9296,7 +9280,7 @@
             </a:ln>
             <a:extLst>
               <a:ext uri="{91240B29-F687-4f45-9708-019B960494DF}">
-                <a14:hiddenLine xmlns:a14="http://schemas.microsoft.com/office/drawing/2010/main" xmlns="" w="9525">
+                <a14:hiddenLine xmlns="" xmlns:a14="http://schemas.microsoft.com/office/drawing/2010/main" w="9525">
                   <a:solidFill>
                     <a:srgbClr val="000000"/>
                   </a:solidFill>
@@ -9386,7 +9370,7 @@
             </a:ln>
             <a:extLst>
               <a:ext uri="{91240B29-F687-4f45-9708-019B960494DF}">
-                <a14:hiddenLine xmlns:a14="http://schemas.microsoft.com/office/drawing/2010/main" xmlns="" w="9525">
+                <a14:hiddenLine xmlns="" xmlns:a14="http://schemas.microsoft.com/office/drawing/2010/main" w="9525">
                   <a:solidFill>
                     <a:srgbClr val="000000"/>
                   </a:solidFill>
@@ -9448,7 +9432,7 @@
             </a:ln>
             <a:extLst>
               <a:ext uri="{91240B29-F687-4f45-9708-019B960494DF}">
-                <a14:hiddenLine xmlns:a14="http://schemas.microsoft.com/office/drawing/2010/main" xmlns="" w="9525">
+                <a14:hiddenLine xmlns="" xmlns:a14="http://schemas.microsoft.com/office/drawing/2010/main" w="9525">
                   <a:solidFill>
                     <a:srgbClr val="000000"/>
                   </a:solidFill>
@@ -9558,7 +9542,7 @@
             </a:ln>
             <a:extLst>
               <a:ext uri="{91240B29-F687-4f45-9708-019B960494DF}">
-                <a14:hiddenLine xmlns:a14="http://schemas.microsoft.com/office/drawing/2010/main" xmlns="" w="9525">
+                <a14:hiddenLine xmlns="" xmlns:a14="http://schemas.microsoft.com/office/drawing/2010/main" w="9525">
                   <a:solidFill>
                     <a:srgbClr val="000000"/>
                   </a:solidFill>
@@ -9620,7 +9604,7 @@
             </a:ln>
             <a:extLst>
               <a:ext uri="{91240B29-F687-4f45-9708-019B960494DF}">
-                <a14:hiddenLine xmlns:a14="http://schemas.microsoft.com/office/drawing/2010/main" xmlns="" w="9525">
+                <a14:hiddenLine xmlns="" xmlns:a14="http://schemas.microsoft.com/office/drawing/2010/main" w="9525">
                   <a:solidFill>
                     <a:srgbClr val="000000"/>
                   </a:solidFill>
@@ -9710,7 +9694,7 @@
             </a:ln>
             <a:extLst>
               <a:ext uri="{91240B29-F687-4f45-9708-019B960494DF}">
-                <a14:hiddenLine xmlns:a14="http://schemas.microsoft.com/office/drawing/2010/main" xmlns="" w="9525">
+                <a14:hiddenLine xmlns="" xmlns:a14="http://schemas.microsoft.com/office/drawing/2010/main" w="9525">
                   <a:solidFill>
                     <a:srgbClr val="000000"/>
                   </a:solidFill>
@@ -9800,7 +9784,7 @@
             </a:ln>
             <a:extLst>
               <a:ext uri="{91240B29-F687-4f45-9708-019B960494DF}">
-                <a14:hiddenLine xmlns:a14="http://schemas.microsoft.com/office/drawing/2010/main" xmlns="" w="9525">
+                <a14:hiddenLine xmlns="" xmlns:a14="http://schemas.microsoft.com/office/drawing/2010/main" w="9525">
                   <a:solidFill>
                     <a:srgbClr val="000000"/>
                   </a:solidFill>
@@ -9862,7 +9846,7 @@
             </a:ln>
             <a:extLst>
               <a:ext uri="{91240B29-F687-4f45-9708-019B960494DF}">
-                <a14:hiddenLine xmlns:a14="http://schemas.microsoft.com/office/drawing/2010/main" xmlns="" w="9525">
+                <a14:hiddenLine xmlns="" xmlns:a14="http://schemas.microsoft.com/office/drawing/2010/main" w="9525">
                   <a:solidFill>
                     <a:srgbClr val="000000"/>
                   </a:solidFill>
@@ -9952,7 +9936,7 @@
             </a:ln>
             <a:extLst>
               <a:ext uri="{91240B29-F687-4f45-9708-019B960494DF}">
-                <a14:hiddenLine xmlns:a14="http://schemas.microsoft.com/office/drawing/2010/main" xmlns="" w="9525">
+                <a14:hiddenLine xmlns="" xmlns:a14="http://schemas.microsoft.com/office/drawing/2010/main" w="9525">
                   <a:solidFill>
                     <a:srgbClr val="000000"/>
                   </a:solidFill>
@@ -10042,7 +10026,7 @@
             </a:ln>
             <a:extLst>
               <a:ext uri="{91240B29-F687-4f45-9708-019B960494DF}">
-                <a14:hiddenLine xmlns:a14="http://schemas.microsoft.com/office/drawing/2010/main" xmlns="" w="9525">
+                <a14:hiddenLine xmlns="" xmlns:a14="http://schemas.microsoft.com/office/drawing/2010/main" w="9525">
                   <a:solidFill>
                     <a:srgbClr val="000000"/>
                   </a:solidFill>
@@ -10098,7 +10082,7 @@
             </a:ln>
             <a:extLst>
               <a:ext uri="{91240B29-F687-4f45-9708-019B960494DF}">
-                <a14:hiddenLine xmlns:a14="http://schemas.microsoft.com/office/drawing/2010/main" xmlns="" w="9525">
+                <a14:hiddenLine xmlns="" xmlns:a14="http://schemas.microsoft.com/office/drawing/2010/main" w="9525">
                   <a:solidFill>
                     <a:srgbClr val="000000"/>
                   </a:solidFill>
@@ -10188,7 +10172,7 @@
             </a:ln>
             <a:extLst>
               <a:ext uri="{91240B29-F687-4f45-9708-019B960494DF}">
-                <a14:hiddenLine xmlns:a14="http://schemas.microsoft.com/office/drawing/2010/main" xmlns="" w="9525">
+                <a14:hiddenLine xmlns="" xmlns:a14="http://schemas.microsoft.com/office/drawing/2010/main" w="9525">
                   <a:solidFill>
                     <a:srgbClr val="000000"/>
                   </a:solidFill>
@@ -10244,7 +10228,7 @@
             </a:ln>
             <a:extLst>
               <a:ext uri="{91240B29-F687-4f45-9708-019B960494DF}">
-                <a14:hiddenLine xmlns:a14="http://schemas.microsoft.com/office/drawing/2010/main" xmlns="" w="9525">
+                <a14:hiddenLine xmlns="" xmlns:a14="http://schemas.microsoft.com/office/drawing/2010/main" w="9525">
                   <a:solidFill>
                     <a:srgbClr val="000000"/>
                   </a:solidFill>
@@ -10334,7 +10318,7 @@
             </a:ln>
             <a:extLst>
               <a:ext uri="{91240B29-F687-4f45-9708-019B960494DF}">
-                <a14:hiddenLine xmlns:a14="http://schemas.microsoft.com/office/drawing/2010/main" xmlns="" w="9525">
+                <a14:hiddenLine xmlns="" xmlns:a14="http://schemas.microsoft.com/office/drawing/2010/main" w="9525">
                   <a:solidFill>
                     <a:srgbClr val="000000"/>
                   </a:solidFill>
@@ -10402,7 +10386,7 @@
             </a:ln>
             <a:extLst>
               <a:ext uri="{91240B29-F687-4f45-9708-019B960494DF}">
-                <a14:hiddenLine xmlns:a14="http://schemas.microsoft.com/office/drawing/2010/main" xmlns="" w="9525">
+                <a14:hiddenLine xmlns="" xmlns:a14="http://schemas.microsoft.com/office/drawing/2010/main" w="9525">
                   <a:solidFill>
                     <a:srgbClr val="000000"/>
                   </a:solidFill>
@@ -10492,7 +10476,7 @@
             </a:ln>
             <a:extLst>
               <a:ext uri="{91240B29-F687-4f45-9708-019B960494DF}">
-                <a14:hiddenLine xmlns:a14="http://schemas.microsoft.com/office/drawing/2010/main" xmlns="" w="9525">
+                <a14:hiddenLine xmlns="" xmlns:a14="http://schemas.microsoft.com/office/drawing/2010/main" w="9525">
                   <a:solidFill>
                     <a:srgbClr val="000000"/>
                   </a:solidFill>
@@ -10560,7 +10544,7 @@
             </a:ln>
             <a:extLst>
               <a:ext uri="{91240B29-F687-4f45-9708-019B960494DF}">
-                <a14:hiddenLine xmlns:a14="http://schemas.microsoft.com/office/drawing/2010/main" xmlns="" w="9525">
+                <a14:hiddenLine xmlns="" xmlns:a14="http://schemas.microsoft.com/office/drawing/2010/main" w="9525">
                   <a:solidFill>
                     <a:srgbClr val="000000"/>
                   </a:solidFill>
@@ -10650,7 +10634,7 @@
             </a:ln>
             <a:extLst>
               <a:ext uri="{91240B29-F687-4f45-9708-019B960494DF}">
-                <a14:hiddenLine xmlns:a14="http://schemas.microsoft.com/office/drawing/2010/main" xmlns="" w="9525">
+                <a14:hiddenLine xmlns="" xmlns:a14="http://schemas.microsoft.com/office/drawing/2010/main" w="9525">
                   <a:solidFill>
                     <a:srgbClr val="000000"/>
                   </a:solidFill>
@@ -10684,7 +10668,7 @@
             </a:ln>
             <a:extLst>
               <a:ext uri="{91240B29-F687-4f45-9708-019B960494DF}">
-                <a14:hiddenLine xmlns:a14="http://schemas.microsoft.com/office/drawing/2010/main" xmlns="" w="9525">
+                <a14:hiddenLine xmlns="" xmlns:a14="http://schemas.microsoft.com/office/drawing/2010/main" w="9525">
                   <a:solidFill>
                     <a:srgbClr val="000000"/>
                   </a:solidFill>
@@ -10774,7 +10758,7 @@
             </a:ln>
             <a:extLst>
               <a:ext uri="{91240B29-F687-4f45-9708-019B960494DF}">
-                <a14:hiddenLine xmlns:a14="http://schemas.microsoft.com/office/drawing/2010/main" xmlns="" w="9525">
+                <a14:hiddenLine xmlns="" xmlns:a14="http://schemas.microsoft.com/office/drawing/2010/main" w="9525">
                   <a:solidFill>
                     <a:srgbClr val="000000"/>
                   </a:solidFill>
@@ -10836,7 +10820,7 @@
             </a:ln>
             <a:extLst>
               <a:ext uri="{91240B29-F687-4f45-9708-019B960494DF}">
-                <a14:hiddenLine xmlns:a14="http://schemas.microsoft.com/office/drawing/2010/main" xmlns="" w="9525">
+                <a14:hiddenLine xmlns="" xmlns:a14="http://schemas.microsoft.com/office/drawing/2010/main" w="9525">
                   <a:solidFill>
                     <a:srgbClr val="000000"/>
                   </a:solidFill>
@@ -10898,7 +10882,7 @@
             </a:ln>
             <a:extLst>
               <a:ext uri="{91240B29-F687-4f45-9708-019B960494DF}">
-                <a14:hiddenLine xmlns:a14="http://schemas.microsoft.com/office/drawing/2010/main" xmlns="" w="9525">
+                <a14:hiddenLine xmlns="" xmlns:a14="http://schemas.microsoft.com/office/drawing/2010/main" w="9525">
                   <a:solidFill>
                     <a:srgbClr val="000000"/>
                   </a:solidFill>
@@ -10988,7 +10972,7 @@
             </a:ln>
             <a:extLst>
               <a:ext uri="{91240B29-F687-4f45-9708-019B960494DF}">
-                <a14:hiddenLine xmlns:a14="http://schemas.microsoft.com/office/drawing/2010/main" xmlns="" w="9525">
+                <a14:hiddenLine xmlns="" xmlns:a14="http://schemas.microsoft.com/office/drawing/2010/main" w="9525">
                   <a:solidFill>
                     <a:srgbClr val="000000"/>
                   </a:solidFill>
@@ -11056,7 +11040,7 @@
             </a:ln>
             <a:extLst>
               <a:ext uri="{91240B29-F687-4f45-9708-019B960494DF}">
-                <a14:hiddenLine xmlns:a14="http://schemas.microsoft.com/office/drawing/2010/main" xmlns="" w="9525">
+                <a14:hiddenLine xmlns="" xmlns:a14="http://schemas.microsoft.com/office/drawing/2010/main" w="9525">
                   <a:solidFill>
                     <a:srgbClr val="000000"/>
                   </a:solidFill>
@@ -11118,7 +11102,7 @@
             </a:ln>
             <a:extLst>
               <a:ext uri="{91240B29-F687-4f45-9708-019B960494DF}">
-                <a14:hiddenLine xmlns:a14="http://schemas.microsoft.com/office/drawing/2010/main" xmlns="" w="9525">
+                <a14:hiddenLine xmlns="" xmlns:a14="http://schemas.microsoft.com/office/drawing/2010/main" w="9525">
                   <a:solidFill>
                     <a:srgbClr val="000000"/>
                   </a:solidFill>
@@ -11208,7 +11192,7 @@
             </a:ln>
             <a:extLst>
               <a:ext uri="{91240B29-F687-4f45-9708-019B960494DF}">
-                <a14:hiddenLine xmlns:a14="http://schemas.microsoft.com/office/drawing/2010/main" xmlns="" w="9525">
+                <a14:hiddenLine xmlns="" xmlns:a14="http://schemas.microsoft.com/office/drawing/2010/main" w="9525">
                   <a:solidFill>
                     <a:srgbClr val="000000"/>
                   </a:solidFill>
@@ -11270,7 +11254,7 @@
             </a:ln>
             <a:extLst>
               <a:ext uri="{91240B29-F687-4f45-9708-019B960494DF}">
-                <a14:hiddenLine xmlns:a14="http://schemas.microsoft.com/office/drawing/2010/main" xmlns="" w="9525">
+                <a14:hiddenLine xmlns="" xmlns:a14="http://schemas.microsoft.com/office/drawing/2010/main" w="9525">
                   <a:solidFill>
                     <a:srgbClr val="000000"/>
                   </a:solidFill>
@@ -11360,7 +11344,7 @@
             </a:ln>
             <a:extLst>
               <a:ext uri="{91240B29-F687-4f45-9708-019B960494DF}">
-                <a14:hiddenLine xmlns:a14="http://schemas.microsoft.com/office/drawing/2010/main" xmlns="" w="9525">
+                <a14:hiddenLine xmlns="" xmlns:a14="http://schemas.microsoft.com/office/drawing/2010/main" w="9525">
                   <a:solidFill>
                     <a:srgbClr val="000000"/>
                   </a:solidFill>
@@ -11422,7 +11406,7 @@
             </a:ln>
             <a:extLst>
               <a:ext uri="{91240B29-F687-4f45-9708-019B960494DF}">
-                <a14:hiddenLine xmlns:a14="http://schemas.microsoft.com/office/drawing/2010/main" xmlns="" w="9525">
+                <a14:hiddenLine xmlns="" xmlns:a14="http://schemas.microsoft.com/office/drawing/2010/main" w="9525">
                   <a:solidFill>
                     <a:srgbClr val="000000"/>
                   </a:solidFill>
@@ -11512,7 +11496,7 @@
             </a:ln>
             <a:extLst>
               <a:ext uri="{91240B29-F687-4f45-9708-019B960494DF}">
-                <a14:hiddenLine xmlns:a14="http://schemas.microsoft.com/office/drawing/2010/main" xmlns="" w="9525">
+                <a14:hiddenLine xmlns="" xmlns:a14="http://schemas.microsoft.com/office/drawing/2010/main" w="9525">
                   <a:solidFill>
                     <a:srgbClr val="000000"/>
                   </a:solidFill>
@@ -11546,7 +11530,7 @@
             </a:ln>
             <a:extLst>
               <a:ext uri="{91240B29-F687-4f45-9708-019B960494DF}">
-                <a14:hiddenLine xmlns:a14="http://schemas.microsoft.com/office/drawing/2010/main" xmlns="" w="9525">
+                <a14:hiddenLine xmlns="" xmlns:a14="http://schemas.microsoft.com/office/drawing/2010/main" w="9525">
                   <a:solidFill>
                     <a:srgbClr val="000000"/>
                   </a:solidFill>
@@ -11611,7 +11595,7 @@
             </a:ln>
             <a:extLst>
               <a:ext uri="{91240B29-F687-4f45-9708-019B960494DF}">
-                <a14:hiddenLine xmlns:a14="http://schemas.microsoft.com/office/drawing/2010/main" xmlns="" w="9525">
+                <a14:hiddenLine xmlns="" xmlns:a14="http://schemas.microsoft.com/office/drawing/2010/main" w="9525">
                   <a:solidFill>
                     <a:srgbClr val="000000"/>
                   </a:solidFill>
@@ -11701,7 +11685,7 @@
             </a:ln>
             <a:extLst>
               <a:ext uri="{91240B29-F687-4f45-9708-019B960494DF}">
-                <a14:hiddenLine xmlns:a14="http://schemas.microsoft.com/office/drawing/2010/main" xmlns="" w="9525">
+                <a14:hiddenLine xmlns="" xmlns:a14="http://schemas.microsoft.com/office/drawing/2010/main" w="9525">
                   <a:solidFill>
                     <a:srgbClr val="000000"/>
                   </a:solidFill>
@@ -11763,7 +11747,7 @@
             </a:ln>
             <a:extLst>
               <a:ext uri="{91240B29-F687-4f45-9708-019B960494DF}">
-                <a14:hiddenLine xmlns:a14="http://schemas.microsoft.com/office/drawing/2010/main" xmlns="" w="9525">
+                <a14:hiddenLine xmlns="" xmlns:a14="http://schemas.microsoft.com/office/drawing/2010/main" w="9525">
                   <a:solidFill>
                     <a:srgbClr val="000000"/>
                   </a:solidFill>
@@ -11853,7 +11837,7 @@
             </a:ln>
             <a:extLst>
               <a:ext uri="{91240B29-F687-4f45-9708-019B960494DF}">
-                <a14:hiddenLine xmlns:a14="http://schemas.microsoft.com/office/drawing/2010/main" xmlns="" w="9525">
+                <a14:hiddenLine xmlns="" xmlns:a14="http://schemas.microsoft.com/office/drawing/2010/main" w="9525">
                   <a:solidFill>
                     <a:srgbClr val="000000"/>
                   </a:solidFill>
@@ -11943,7 +11927,7 @@
             </a:ln>
             <a:extLst>
               <a:ext uri="{91240B29-F687-4f45-9708-019B960494DF}">
-                <a14:hiddenLine xmlns:a14="http://schemas.microsoft.com/office/drawing/2010/main" xmlns="" w="9525">
+                <a14:hiddenLine xmlns="" xmlns:a14="http://schemas.microsoft.com/office/drawing/2010/main" w="9525">
                   <a:solidFill>
                     <a:srgbClr val="000000"/>
                   </a:solidFill>
@@ -12008,7 +11992,7 @@
             </a:ln>
             <a:extLst>
               <a:ext uri="{91240B29-F687-4f45-9708-019B960494DF}">
-                <a14:hiddenLine xmlns:a14="http://schemas.microsoft.com/office/drawing/2010/main" xmlns="" w="9525">
+                <a14:hiddenLine xmlns="" xmlns:a14="http://schemas.microsoft.com/office/drawing/2010/main" w="9525">
                   <a:solidFill>
                     <a:srgbClr val="000000"/>
                   </a:solidFill>
@@ -12070,7 +12054,7 @@
             </a:ln>
             <a:extLst>
               <a:ext uri="{91240B29-F687-4f45-9708-019B960494DF}">
-                <a14:hiddenLine xmlns:a14="http://schemas.microsoft.com/office/drawing/2010/main" xmlns="" w="9525">
+                <a14:hiddenLine xmlns="" xmlns:a14="http://schemas.microsoft.com/office/drawing/2010/main" w="9525">
                   <a:solidFill>
                     <a:srgbClr val="000000"/>
                   </a:solidFill>
@@ -12160,7 +12144,7 @@
             </a:ln>
             <a:extLst>
               <a:ext uri="{91240B29-F687-4f45-9708-019B960494DF}">
-                <a14:hiddenLine xmlns:a14="http://schemas.microsoft.com/office/drawing/2010/main" xmlns="" w="9525">
+                <a14:hiddenLine xmlns="" xmlns:a14="http://schemas.microsoft.com/office/drawing/2010/main" w="9525">
                   <a:solidFill>
                     <a:srgbClr val="000000"/>
                   </a:solidFill>
@@ -12250,7 +12234,7 @@
             </a:ln>
             <a:extLst>
               <a:ext uri="{91240B29-F687-4f45-9708-019B960494DF}">
-                <a14:hiddenLine xmlns:a14="http://schemas.microsoft.com/office/drawing/2010/main" xmlns="" w="9525">
+                <a14:hiddenLine xmlns="" xmlns:a14="http://schemas.microsoft.com/office/drawing/2010/main" w="9525">
                   <a:solidFill>
                     <a:srgbClr val="000000"/>
                   </a:solidFill>
@@ -12312,7 +12296,7 @@
             </a:ln>
             <a:extLst>
               <a:ext uri="{91240B29-F687-4f45-9708-019B960494DF}">
-                <a14:hiddenLine xmlns:a14="http://schemas.microsoft.com/office/drawing/2010/main" xmlns="" w="9525">
+                <a14:hiddenLine xmlns="" xmlns:a14="http://schemas.microsoft.com/office/drawing/2010/main" w="9525">
                   <a:solidFill>
                     <a:srgbClr val="000000"/>
                   </a:solidFill>
@@ -12432,7 +12416,7 @@
             </a:ln>
             <a:extLst>
               <a:ext uri="{91240B29-F687-4f45-9708-019B960494DF}">
-                <a14:hiddenLine xmlns:a14="http://schemas.microsoft.com/office/drawing/2010/main" xmlns="" w="9525">
+                <a14:hiddenLine xmlns="" xmlns:a14="http://schemas.microsoft.com/office/drawing/2010/main" w="9525">
                   <a:solidFill>
                     <a:srgbClr val="000000"/>
                   </a:solidFill>
@@ -12500,7 +12484,7 @@
             </a:ln>
             <a:extLst>
               <a:ext uri="{91240B29-F687-4f45-9708-019B960494DF}">
-                <a14:hiddenLine xmlns:a14="http://schemas.microsoft.com/office/drawing/2010/main" xmlns="" w="9525">
+                <a14:hiddenLine xmlns="" xmlns:a14="http://schemas.microsoft.com/office/drawing/2010/main" w="9525">
                   <a:solidFill>
                     <a:srgbClr val="000000"/>
                   </a:solidFill>
@@ -12590,7 +12574,7 @@
             </a:ln>
             <a:extLst>
               <a:ext uri="{91240B29-F687-4f45-9708-019B960494DF}">
-                <a14:hiddenLine xmlns:a14="http://schemas.microsoft.com/office/drawing/2010/main" xmlns="" w="9525">
+                <a14:hiddenLine xmlns="" xmlns:a14="http://schemas.microsoft.com/office/drawing/2010/main" w="9525">
                   <a:solidFill>
                     <a:srgbClr val="000000"/>
                   </a:solidFill>
@@ -17404,7 +17388,7 @@
           <a:noFill/>
           <a:extLst>
             <a:ext uri="{909E8E84-426E-40dd-AFC4-6F175D3DCCD1}">
-              <a14:hiddenFill xmlns:a14="http://schemas.microsoft.com/office/drawing/2010/main" xmlns="">
+              <a14:hiddenFill xmlns="" xmlns:a14="http://schemas.microsoft.com/office/drawing/2010/main">
                 <a:solidFill>
                   <a:srgbClr val="FFFFFF"/>
                 </a:solidFill>
@@ -17478,7 +17462,7 @@
               </a:ln>
               <a:extLst>
                 <a:ext uri="{91240B29-F687-4f45-9708-019B960494DF}">
-                  <a14:hiddenLine xmlns:a14="http://schemas.microsoft.com/office/drawing/2010/main" xmlns="" w="9525">
+                  <a14:hiddenLine xmlns="" xmlns:a14="http://schemas.microsoft.com/office/drawing/2010/main" w="9525">
                     <a:solidFill>
                       <a:srgbClr val="000000"/>
                     </a:solidFill>
@@ -17568,7 +17552,7 @@
               </a:ln>
               <a:extLst>
                 <a:ext uri="{91240B29-F687-4f45-9708-019B960494DF}">
-                  <a14:hiddenLine xmlns:a14="http://schemas.microsoft.com/office/drawing/2010/main" xmlns="" w="9525">
+                  <a14:hiddenLine xmlns="" xmlns:a14="http://schemas.microsoft.com/office/drawing/2010/main" w="9525">
                     <a:solidFill>
                       <a:srgbClr val="000000"/>
                     </a:solidFill>
@@ -17658,7 +17642,7 @@
               </a:ln>
               <a:extLst>
                 <a:ext uri="{91240B29-F687-4f45-9708-019B960494DF}">
-                  <a14:hiddenLine xmlns:a14="http://schemas.microsoft.com/office/drawing/2010/main" xmlns="" w="9525">
+                  <a14:hiddenLine xmlns="" xmlns:a14="http://schemas.microsoft.com/office/drawing/2010/main" w="9525">
                     <a:solidFill>
                       <a:srgbClr val="000000"/>
                     </a:solidFill>
@@ -17720,7 +17704,7 @@
               </a:ln>
               <a:extLst>
                 <a:ext uri="{91240B29-F687-4f45-9708-019B960494DF}">
-                  <a14:hiddenLine xmlns:a14="http://schemas.microsoft.com/office/drawing/2010/main" xmlns="" w="9525">
+                  <a14:hiddenLine xmlns="" xmlns:a14="http://schemas.microsoft.com/office/drawing/2010/main" w="9525">
                     <a:solidFill>
                       <a:srgbClr val="000000"/>
                     </a:solidFill>
@@ -17810,7 +17794,7 @@
               </a:ln>
               <a:extLst>
                 <a:ext uri="{91240B29-F687-4f45-9708-019B960494DF}">
-                  <a14:hiddenLine xmlns:a14="http://schemas.microsoft.com/office/drawing/2010/main" xmlns="" w="9525">
+                  <a14:hiddenLine xmlns="" xmlns:a14="http://schemas.microsoft.com/office/drawing/2010/main" w="9525">
                     <a:solidFill>
                       <a:srgbClr val="000000"/>
                     </a:solidFill>
@@ -17872,7 +17856,7 @@
               </a:ln>
               <a:extLst>
                 <a:ext uri="{91240B29-F687-4f45-9708-019B960494DF}">
-                  <a14:hiddenLine xmlns:a14="http://schemas.microsoft.com/office/drawing/2010/main" xmlns="" w="9525">
+                  <a14:hiddenLine xmlns="" xmlns:a14="http://schemas.microsoft.com/office/drawing/2010/main" w="9525">
                     <a:solidFill>
                       <a:srgbClr val="000000"/>
                     </a:solidFill>
@@ -17934,7 +17918,7 @@
               </a:ln>
               <a:extLst>
                 <a:ext uri="{91240B29-F687-4f45-9708-019B960494DF}">
-                  <a14:hiddenLine xmlns:a14="http://schemas.microsoft.com/office/drawing/2010/main" xmlns="" w="9525">
+                  <a14:hiddenLine xmlns="" xmlns:a14="http://schemas.microsoft.com/office/drawing/2010/main" w="9525">
                     <a:solidFill>
                       <a:srgbClr val="000000"/>
                     </a:solidFill>
@@ -18024,7 +18008,7 @@
               </a:ln>
               <a:extLst>
                 <a:ext uri="{91240B29-F687-4f45-9708-019B960494DF}">
-                  <a14:hiddenLine xmlns:a14="http://schemas.microsoft.com/office/drawing/2010/main" xmlns="" w="9525">
+                  <a14:hiddenLine xmlns="" xmlns:a14="http://schemas.microsoft.com/office/drawing/2010/main" w="9525">
                     <a:solidFill>
                       <a:srgbClr val="000000"/>
                     </a:solidFill>
@@ -18114,7 +18098,7 @@
               </a:ln>
               <a:extLst>
                 <a:ext uri="{91240B29-F687-4f45-9708-019B960494DF}">
-                  <a14:hiddenLine xmlns:a14="http://schemas.microsoft.com/office/drawing/2010/main" xmlns="" w="9525">
+                  <a14:hiddenLine xmlns="" xmlns:a14="http://schemas.microsoft.com/office/drawing/2010/main" w="9525">
                     <a:solidFill>
                       <a:srgbClr val="000000"/>
                     </a:solidFill>
@@ -18176,7 +18160,7 @@
               </a:ln>
               <a:extLst>
                 <a:ext uri="{91240B29-F687-4f45-9708-019B960494DF}">
-                  <a14:hiddenLine xmlns:a14="http://schemas.microsoft.com/office/drawing/2010/main" xmlns="" w="9525">
+                  <a14:hiddenLine xmlns="" xmlns:a14="http://schemas.microsoft.com/office/drawing/2010/main" w="9525">
                     <a:solidFill>
                       <a:srgbClr val="000000"/>
                     </a:solidFill>
@@ -18286,7 +18270,7 @@
               </a:ln>
               <a:extLst>
                 <a:ext uri="{91240B29-F687-4f45-9708-019B960494DF}">
-                  <a14:hiddenLine xmlns:a14="http://schemas.microsoft.com/office/drawing/2010/main" xmlns="" w="9525">
+                  <a14:hiddenLine xmlns="" xmlns:a14="http://schemas.microsoft.com/office/drawing/2010/main" w="9525">
                     <a:solidFill>
                       <a:srgbClr val="000000"/>
                     </a:solidFill>
@@ -18370,7 +18354,7 @@
               </a:ln>
               <a:extLst>
                 <a:ext uri="{91240B29-F687-4f45-9708-019B960494DF}">
-                  <a14:hiddenLine xmlns:a14="http://schemas.microsoft.com/office/drawing/2010/main" xmlns="" w="9525">
+                  <a14:hiddenLine xmlns="" xmlns:a14="http://schemas.microsoft.com/office/drawing/2010/main" w="9525">
                     <a:solidFill>
                       <a:srgbClr val="000000"/>
                     </a:solidFill>
@@ -18432,7 +18416,7 @@
               </a:ln>
               <a:extLst>
                 <a:ext uri="{91240B29-F687-4f45-9708-019B960494DF}">
-                  <a14:hiddenLine xmlns:a14="http://schemas.microsoft.com/office/drawing/2010/main" xmlns="" w="9525">
+                  <a14:hiddenLine xmlns="" xmlns:a14="http://schemas.microsoft.com/office/drawing/2010/main" w="9525">
                     <a:solidFill>
                       <a:srgbClr val="000000"/>
                     </a:solidFill>
@@ -18494,7 +18478,7 @@
               </a:ln>
               <a:extLst>
                 <a:ext uri="{91240B29-F687-4f45-9708-019B960494DF}">
-                  <a14:hiddenLine xmlns:a14="http://schemas.microsoft.com/office/drawing/2010/main" xmlns="" w="9525">
+                  <a14:hiddenLine xmlns="" xmlns:a14="http://schemas.microsoft.com/office/drawing/2010/main" w="9525">
                     <a:solidFill>
                       <a:srgbClr val="000000"/>
                     </a:solidFill>
@@ -18584,7 +18568,7 @@
               </a:ln>
               <a:extLst>
                 <a:ext uri="{91240B29-F687-4f45-9708-019B960494DF}">
-                  <a14:hiddenLine xmlns:a14="http://schemas.microsoft.com/office/drawing/2010/main" xmlns="" w="9525">
+                  <a14:hiddenLine xmlns="" xmlns:a14="http://schemas.microsoft.com/office/drawing/2010/main" w="9525">
                     <a:solidFill>
                       <a:srgbClr val="000000"/>
                     </a:solidFill>
@@ -18618,7 +18602,7 @@
               </a:ln>
               <a:extLst>
                 <a:ext uri="{91240B29-F687-4f45-9708-019B960494DF}">
-                  <a14:hiddenLine xmlns:a14="http://schemas.microsoft.com/office/drawing/2010/main" xmlns="" w="9525">
+                  <a14:hiddenLine xmlns="" xmlns:a14="http://schemas.microsoft.com/office/drawing/2010/main" w="9525">
                     <a:solidFill>
                       <a:srgbClr val="000000"/>
                     </a:solidFill>
@@ -18683,7 +18667,7 @@
               </a:ln>
               <a:extLst>
                 <a:ext uri="{91240B29-F687-4f45-9708-019B960494DF}">
-                  <a14:hiddenLine xmlns:a14="http://schemas.microsoft.com/office/drawing/2010/main" xmlns="" w="9525">
+                  <a14:hiddenLine xmlns="" xmlns:a14="http://schemas.microsoft.com/office/drawing/2010/main" w="9525">
                     <a:solidFill>
                       <a:srgbClr val="000000"/>
                     </a:solidFill>
@@ -18773,7 +18757,7 @@
               </a:ln>
               <a:extLst>
                 <a:ext uri="{91240B29-F687-4f45-9708-019B960494DF}">
-                  <a14:hiddenLine xmlns:a14="http://schemas.microsoft.com/office/drawing/2010/main" xmlns="" w="9525">
+                  <a14:hiddenLine xmlns="" xmlns:a14="http://schemas.microsoft.com/office/drawing/2010/main" w="9525">
                     <a:solidFill>
                       <a:srgbClr val="000000"/>
                     </a:solidFill>
@@ -18835,7 +18819,7 @@
               </a:ln>
               <a:extLst>
                 <a:ext uri="{91240B29-F687-4f45-9708-019B960494DF}">
-                  <a14:hiddenLine xmlns:a14="http://schemas.microsoft.com/office/drawing/2010/main" xmlns="" w="9525">
+                  <a14:hiddenLine xmlns="" xmlns:a14="http://schemas.microsoft.com/office/drawing/2010/main" w="9525">
                     <a:solidFill>
                       <a:srgbClr val="000000"/>
                     </a:solidFill>
@@ -18925,7 +18909,7 @@
               </a:ln>
               <a:extLst>
                 <a:ext uri="{91240B29-F687-4f45-9708-019B960494DF}">
-                  <a14:hiddenLine xmlns:a14="http://schemas.microsoft.com/office/drawing/2010/main" xmlns="" w="9525">
+                  <a14:hiddenLine xmlns="" xmlns:a14="http://schemas.microsoft.com/office/drawing/2010/main" w="9525">
                     <a:solidFill>
                       <a:srgbClr val="000000"/>
                     </a:solidFill>
@@ -18990,7 +18974,7 @@
               </a:ln>
               <a:extLst>
                 <a:ext uri="{91240B29-F687-4f45-9708-019B960494DF}">
-                  <a14:hiddenLine xmlns:a14="http://schemas.microsoft.com/office/drawing/2010/main" xmlns="" w="9525">
+                  <a14:hiddenLine xmlns="" xmlns:a14="http://schemas.microsoft.com/office/drawing/2010/main" w="9525">
                     <a:solidFill>
                       <a:srgbClr val="000000"/>
                     </a:solidFill>
@@ -19052,7 +19036,7 @@
               </a:ln>
               <a:extLst>
                 <a:ext uri="{91240B29-F687-4f45-9708-019B960494DF}">
-                  <a14:hiddenLine xmlns:a14="http://schemas.microsoft.com/office/drawing/2010/main" xmlns="" w="9525">
+                  <a14:hiddenLine xmlns="" xmlns:a14="http://schemas.microsoft.com/office/drawing/2010/main" w="9525">
                     <a:solidFill>
                       <a:srgbClr val="000000"/>
                     </a:solidFill>
@@ -19142,7 +19126,7 @@
               </a:ln>
               <a:extLst>
                 <a:ext uri="{91240B29-F687-4f45-9708-019B960494DF}">
-                  <a14:hiddenLine xmlns:a14="http://schemas.microsoft.com/office/drawing/2010/main" xmlns="" w="9525">
+                  <a14:hiddenLine xmlns="" xmlns:a14="http://schemas.microsoft.com/office/drawing/2010/main" w="9525">
                     <a:solidFill>
                       <a:srgbClr val="000000"/>
                     </a:solidFill>
@@ -19232,7 +19216,7 @@
               </a:ln>
               <a:extLst>
                 <a:ext uri="{91240B29-F687-4f45-9708-019B960494DF}">
-                  <a14:hiddenLine xmlns:a14="http://schemas.microsoft.com/office/drawing/2010/main" xmlns="" w="9525">
+                  <a14:hiddenLine xmlns="" xmlns:a14="http://schemas.microsoft.com/office/drawing/2010/main" w="9525">
                     <a:solidFill>
                       <a:srgbClr val="000000"/>
                     </a:solidFill>
@@ -19297,7 +19281,7 @@
               </a:ln>
               <a:extLst>
                 <a:ext uri="{91240B29-F687-4f45-9708-019B960494DF}">
-                  <a14:hiddenLine xmlns:a14="http://schemas.microsoft.com/office/drawing/2010/main" xmlns="" w="9525">
+                  <a14:hiddenLine xmlns="" xmlns:a14="http://schemas.microsoft.com/office/drawing/2010/main" w="9525">
                     <a:solidFill>
                       <a:srgbClr val="000000"/>
                     </a:solidFill>
@@ -19417,7 +19401,7 @@
               </a:ln>
               <a:extLst>
                 <a:ext uri="{91240B29-F687-4f45-9708-019B960494DF}">
-                  <a14:hiddenLine xmlns:a14="http://schemas.microsoft.com/office/drawing/2010/main" xmlns="" w="9525">
+                  <a14:hiddenLine xmlns="" xmlns:a14="http://schemas.microsoft.com/office/drawing/2010/main" w="9525">
                     <a:solidFill>
                       <a:srgbClr val="000000"/>
                     </a:solidFill>
@@ -19498,7 +19482,7 @@
               </a:ln>
               <a:extLst>
                 <a:ext uri="{91240B29-F687-4f45-9708-019B960494DF}">
-                  <a14:hiddenLine xmlns:a14="http://schemas.microsoft.com/office/drawing/2010/main" xmlns="" w="9525">
+                  <a14:hiddenLine xmlns="" xmlns:a14="http://schemas.microsoft.com/office/drawing/2010/main" w="9525">
                     <a:solidFill>
                       <a:srgbClr val="000000"/>
                     </a:solidFill>
@@ -19613,7 +19597,7 @@
               </a:ln>
               <a:extLst>
                 <a:ext uri="{91240B29-F687-4f45-9708-019B960494DF}">
-                  <a14:hiddenLine xmlns:a14="http://schemas.microsoft.com/office/drawing/2010/main" xmlns="" w="9525">
+                  <a14:hiddenLine xmlns="" xmlns:a14="http://schemas.microsoft.com/office/drawing/2010/main" w="9525">
                     <a:solidFill>
                       <a:srgbClr val="000000"/>
                     </a:solidFill>
@@ -19703,7 +19687,7 @@
               </a:ln>
               <a:extLst>
                 <a:ext uri="{91240B29-F687-4f45-9708-019B960494DF}">
-                  <a14:hiddenLine xmlns:a14="http://schemas.microsoft.com/office/drawing/2010/main" xmlns="" w="9525">
+                  <a14:hiddenLine xmlns="" xmlns:a14="http://schemas.microsoft.com/office/drawing/2010/main" w="9525">
                     <a:solidFill>
                       <a:srgbClr val="000000"/>
                     </a:solidFill>
@@ -19768,7 +19752,7 @@
               </a:ln>
               <a:extLst>
                 <a:ext uri="{91240B29-F687-4f45-9708-019B960494DF}">
-                  <a14:hiddenLine xmlns:a14="http://schemas.microsoft.com/office/drawing/2010/main" xmlns="" w="9525">
+                  <a14:hiddenLine xmlns="" xmlns:a14="http://schemas.microsoft.com/office/drawing/2010/main" w="9525">
                     <a:solidFill>
                       <a:srgbClr val="000000"/>
                     </a:solidFill>
@@ -19858,7 +19842,7 @@
               </a:ln>
               <a:extLst>
                 <a:ext uri="{91240B29-F687-4f45-9708-019B960494DF}">
-                  <a14:hiddenLine xmlns:a14="http://schemas.microsoft.com/office/drawing/2010/main" xmlns="" w="9525">
+                  <a14:hiddenLine xmlns="" xmlns:a14="http://schemas.microsoft.com/office/drawing/2010/main" w="9525">
                     <a:solidFill>
                       <a:srgbClr val="000000"/>
                     </a:solidFill>
@@ -19926,7 +19910,7 @@
               </a:ln>
               <a:extLst>
                 <a:ext uri="{91240B29-F687-4f45-9708-019B960494DF}">
-                  <a14:hiddenLine xmlns:a14="http://schemas.microsoft.com/office/drawing/2010/main" xmlns="" w="9525">
+                  <a14:hiddenLine xmlns="" xmlns:a14="http://schemas.microsoft.com/office/drawing/2010/main" w="9525">
                     <a:solidFill>
                       <a:srgbClr val="000000"/>
                     </a:solidFill>
@@ -20016,7 +20000,7 @@
               </a:ln>
               <a:extLst>
                 <a:ext uri="{91240B29-F687-4f45-9708-019B960494DF}">
-                  <a14:hiddenLine xmlns:a14="http://schemas.microsoft.com/office/drawing/2010/main" xmlns="" w="9525">
+                  <a14:hiddenLine xmlns="" xmlns:a14="http://schemas.microsoft.com/office/drawing/2010/main" w="9525">
                     <a:solidFill>
                       <a:srgbClr val="000000"/>
                     </a:solidFill>
@@ -20084,7 +20068,7 @@
               </a:ln>
               <a:extLst>
                 <a:ext uri="{91240B29-F687-4f45-9708-019B960494DF}">
-                  <a14:hiddenLine xmlns:a14="http://schemas.microsoft.com/office/drawing/2010/main" xmlns="" w="9525">
+                  <a14:hiddenLine xmlns="" xmlns:a14="http://schemas.microsoft.com/office/drawing/2010/main" w="9525">
                     <a:solidFill>
                       <a:srgbClr val="000000"/>
                     </a:solidFill>
@@ -20174,7 +20158,7 @@
               </a:ln>
               <a:extLst>
                 <a:ext uri="{91240B29-F687-4f45-9708-019B960494DF}">
-                  <a14:hiddenLine xmlns:a14="http://schemas.microsoft.com/office/drawing/2010/main" xmlns="" w="9525">
+                  <a14:hiddenLine xmlns="" xmlns:a14="http://schemas.microsoft.com/office/drawing/2010/main" w="9525">
                     <a:solidFill>
                       <a:srgbClr val="000000"/>
                     </a:solidFill>
@@ -20208,7 +20192,7 @@
               </a:ln>
               <a:extLst>
                 <a:ext uri="{91240B29-F687-4f45-9708-019B960494DF}">
-                  <a14:hiddenLine xmlns:a14="http://schemas.microsoft.com/office/drawing/2010/main" xmlns="" w="9525">
+                  <a14:hiddenLine xmlns="" xmlns:a14="http://schemas.microsoft.com/office/drawing/2010/main" w="9525">
                     <a:solidFill>
                       <a:srgbClr val="000000"/>
                     </a:solidFill>
@@ -23118,7 +23102,7 @@
             <p:ph idx="1"/>
             <p:extLst>
               <p:ext uri="{D42A27DB-BD31-4B8C-83A1-F6EECF244321}">
-                <p14:modId xmlns:p14="http://schemas.microsoft.com/office/powerpoint/2010/main" val="1235439741"/>
+                <p14:modId xmlns:p14="http://schemas.microsoft.com/office/powerpoint/2010/main" val="1950837075"/>
               </p:ext>
             </p:extLst>
           </p:nvPr>
@@ -25149,6 +25133,23 @@
 </file>
 
 <file path=customXml/item1.xml><?xml version="1.0" encoding="utf-8"?>
+<p:properties xmlns:p="http://schemas.microsoft.com/office/2006/metadata/properties" xmlns:xsi="http://www.w3.org/2001/XMLSchema-instance" xmlns:pc="http://schemas.microsoft.com/office/infopath/2007/PartnerControls">
+  <documentManagement>
+    <MediaServiceKeyPoints xmlns="71af3243-3dd4-4a8d-8c0d-dd76da1f02a5" xsi:nil="true"/>
+  </documentManagement>
+</p:properties>
+</file>
+
+<file path=customXml/item2.xml><?xml version="1.0" encoding="utf-8"?>
+<?mso-contentType ?>
+<FormTemplates xmlns="http://schemas.microsoft.com/sharepoint/v3/contenttype/forms">
+  <Display>DocumentLibraryForm</Display>
+  <Edit>DocumentLibraryForm</Edit>
+  <New>DocumentLibraryForm</New>
+</FormTemplates>
+</file>
+
+<file path=customXml/item3.xml><?xml version="1.0" encoding="utf-8"?>
 <ct:contentTypeSchema xmlns:ct="http://schemas.microsoft.com/office/2006/metadata/contentType" xmlns:ma="http://schemas.microsoft.com/office/2006/metadata/properties/metaAttributes" ct:_="" ma:_="" ma:contentTypeName="Document" ma:contentTypeID="0x01010079F111ED35F8CC479449609E8A0923A6" ma:contentTypeVersion="11" ma:contentTypeDescription="Create a new document." ma:contentTypeScope="" ma:versionID="96291512c1ee715ab617f4c07df79fc1">
   <xsd:schema xmlns:xsd="http://www.w3.org/2001/XMLSchema" xmlns:xs="http://www.w3.org/2001/XMLSchema" xmlns:p="http://schemas.microsoft.com/office/2006/metadata/properties" xmlns:ns2="71af3243-3dd4-4a8d-8c0d-dd76da1f02a5" xmlns:ns3="16c05727-aa75-4e4a-9b5f-8a80a1165891" targetNamespace="http://schemas.microsoft.com/office/2006/metadata/properties" ma:root="true" ma:fieldsID="8256c27c40ca5c40ce1cf6c44f0205df" ns2:_="" ns3:_="">
     <xsd:import namespace="71af3243-3dd4-4a8d-8c0d-dd76da1f02a5"/>
@@ -25359,24 +25360,32 @@
 </ct:contentTypeSchema>
 </file>
 
-<file path=customXml/item2.xml><?xml version="1.0" encoding="utf-8"?>
-<?mso-contentType ?>
-<FormTemplates xmlns="http://schemas.microsoft.com/sharepoint/v3/contenttype/forms">
-  <Display>DocumentLibraryForm</Display>
-  <Edit>DocumentLibraryForm</Edit>
-  <New>DocumentLibraryForm</New>
-</FormTemplates>
+<file path=customXml/itemProps1.xml><?xml version="1.0" encoding="utf-8"?>
+<ds:datastoreItem xmlns:ds="http://schemas.openxmlformats.org/officeDocument/2006/customXml" ds:itemID="{E7866CFD-F94E-4AE5-ACEA-86FEC0F48A10}">
+  <ds:schemaRefs>
+    <ds:schemaRef ds:uri="http://purl.org/dc/elements/1.1/"/>
+    <ds:schemaRef ds:uri="http://schemas.microsoft.com/office/2006/documentManagement/types"/>
+    <ds:schemaRef ds:uri="16c05727-aa75-4e4a-9b5f-8a80a1165891"/>
+    <ds:schemaRef ds:uri="http://purl.org/dc/terms/"/>
+    <ds:schemaRef ds:uri="71af3243-3dd4-4a8d-8c0d-dd76da1f02a5"/>
+    <ds:schemaRef ds:uri="http://schemas.microsoft.com/office/infopath/2007/PartnerControls"/>
+    <ds:schemaRef ds:uri="http://www.w3.org/XML/1998/namespace"/>
+    <ds:schemaRef ds:uri="http://schemas.openxmlformats.org/package/2006/metadata/core-properties"/>
+    <ds:schemaRef ds:uri="http://schemas.microsoft.com/office/2006/metadata/properties"/>
+    <ds:schemaRef ds:uri="http://purl.org/dc/dcmitype/"/>
+  </ds:schemaRefs>
+</ds:datastoreItem>
 </file>
 
-<file path=customXml/item3.xml><?xml version="1.0" encoding="utf-8"?>
-<p:properties xmlns:p="http://schemas.microsoft.com/office/2006/metadata/properties" xmlns:xsi="http://www.w3.org/2001/XMLSchema-instance" xmlns:pc="http://schemas.microsoft.com/office/infopath/2007/PartnerControls">
-  <documentManagement>
-    <MediaServiceKeyPoints xmlns="71af3243-3dd4-4a8d-8c0d-dd76da1f02a5" xsi:nil="true"/>
-  </documentManagement>
-</p:properties>
+<file path=customXml/itemProps2.xml><?xml version="1.0" encoding="utf-8"?>
+<ds:datastoreItem xmlns:ds="http://schemas.openxmlformats.org/officeDocument/2006/customXml" ds:itemID="{B579702B-25C7-40D7-9E29-7686B11A9660}">
+  <ds:schemaRefs>
+    <ds:schemaRef ds:uri="http://schemas.microsoft.com/sharepoint/v3/contenttype/forms"/>
+  </ds:schemaRefs>
+</ds:datastoreItem>
 </file>
 
-<file path=customXml/itemProps1.xml><?xml version="1.0" encoding="utf-8"?>
+<file path=customXml/itemProps3.xml><?xml version="1.0" encoding="utf-8"?>
 <ds:datastoreItem xmlns:ds="http://schemas.openxmlformats.org/officeDocument/2006/customXml" ds:itemID="{A7C0B241-13E5-418D-8920-D23491E2D2C0}">
   <ds:schemaRefs>
     <ds:schemaRef ds:uri="http://schemas.microsoft.com/office/2006/metadata/contentType"/>
@@ -25393,29 +25402,4 @@
     <ds:schemaRef ds:uri="http://schemas.microsoft.com/internal/obd"/>
   </ds:schemaRefs>
 </ds:datastoreItem>
-</file>
-
-<file path=customXml/itemProps2.xml><?xml version="1.0" encoding="utf-8"?>
-<ds:datastoreItem xmlns:ds="http://schemas.openxmlformats.org/officeDocument/2006/customXml" ds:itemID="{B579702B-25C7-40D7-9E29-7686B11A9660}">
-  <ds:schemaRefs>
-    <ds:schemaRef ds:uri="http://schemas.microsoft.com/sharepoint/v3/contenttype/forms"/>
-  </ds:schemaRefs>
-</ds:datastoreItem>
-</file>
-
-<file path=customXml/itemProps3.xml><?xml version="1.0" encoding="utf-8"?>
-<ds:datastoreItem xmlns:ds="http://schemas.openxmlformats.org/officeDocument/2006/customXml" ds:itemID="{E7866CFD-F94E-4AE5-ACEA-86FEC0F48A10}">
-  <ds:schemaRefs>
-    <ds:schemaRef ds:uri="http://purl.org/dc/elements/1.1/"/>
-    <ds:schemaRef ds:uri="http://schemas.microsoft.com/office/2006/documentManagement/types"/>
-    <ds:schemaRef ds:uri="16c05727-aa75-4e4a-9b5f-8a80a1165891"/>
-    <ds:schemaRef ds:uri="http://purl.org/dc/terms/"/>
-    <ds:schemaRef ds:uri="71af3243-3dd4-4a8d-8c0d-dd76da1f02a5"/>
-    <ds:schemaRef ds:uri="http://schemas.microsoft.com/office/infopath/2007/PartnerControls"/>
-    <ds:schemaRef ds:uri="http://www.w3.org/XML/1998/namespace"/>
-    <ds:schemaRef ds:uri="http://schemas.openxmlformats.org/package/2006/metadata/core-properties"/>
-    <ds:schemaRef ds:uri="http://schemas.microsoft.com/office/2006/metadata/properties"/>
-    <ds:schemaRef ds:uri="http://purl.org/dc/dcmitype/"/>
-  </ds:schemaRefs>
-</ds:datastoreItem>
 </file>
</xml_diff>

<commit_message>
This is to push the final touches to the PPT to Dennis's branch in the group repo, hoping he or no one else will be editing it before the presentation is over.
</commit_message>
<xml_diff>
--- a/Cancer_Champions_PPT.pptx
+++ b/Cancer_Champions_PPT.pptx
@@ -5,10 +5,10 @@
     <p:sldMasterId id="2147483669" r:id="rId4"/>
   </p:sldMasterIdLst>
   <p:notesMasterIdLst>
-    <p:notesMasterId r:id="rId23"/>
+    <p:notesMasterId r:id="rId22"/>
   </p:notesMasterIdLst>
   <p:handoutMasterIdLst>
-    <p:handoutMasterId r:id="rId24"/>
+    <p:handoutMasterId r:id="rId23"/>
   </p:handoutMasterIdLst>
   <p:sldIdLst>
     <p:sldId id="256" r:id="rId5"/>
@@ -23,12 +23,11 @@
     <p:sldId id="268" r:id="rId14"/>
     <p:sldId id="269" r:id="rId15"/>
     <p:sldId id="270" r:id="rId16"/>
-    <p:sldId id="271" r:id="rId17"/>
-    <p:sldId id="273" r:id="rId18"/>
-    <p:sldId id="261" r:id="rId19"/>
-    <p:sldId id="272" r:id="rId20"/>
-    <p:sldId id="263" r:id="rId21"/>
-    <p:sldId id="262" r:id="rId22"/>
+    <p:sldId id="273" r:id="rId17"/>
+    <p:sldId id="261" r:id="rId18"/>
+    <p:sldId id="272" r:id="rId19"/>
+    <p:sldId id="263" r:id="rId20"/>
+    <p:sldId id="262" r:id="rId21"/>
   </p:sldIdLst>
   <p:sldSz cx="12192000" cy="6858000"/>
   <p:notesSz cx="6858000" cy="9144000"/>
@@ -1802,7 +1801,7 @@
               <a:ea typeface="Tahoma" panose="020B0604030504040204" pitchFamily="34" charset="0"/>
               <a:cs typeface="Tahoma" panose="020B0604030504040204" pitchFamily="34" charset="0"/>
             </a:rPr>
-            <a:t>Biomedical Imagery</a:t>
+            <a:t>Biomedical Imagery Professionals + Cancer Patients</a:t>
           </a:r>
         </a:p>
       </dgm:t>
@@ -1885,7 +1884,7 @@
               <a:ea typeface="Tahoma" panose="020B0604030504040204" pitchFamily="34" charset="0"/>
               <a:cs typeface="Tahoma" panose="020B0604030504040204" pitchFamily="34" charset="0"/>
             </a:rPr>
-            <a:t>Efficiency &amp; Cost</a:t>
+            <a:t>Efficiency, Cost, Resolution</a:t>
           </a:r>
         </a:p>
       </dgm:t>
@@ -1968,8 +1967,21 @@
               <a:ea typeface="Tahoma" panose="020B0604030504040204" pitchFamily="34" charset="0"/>
               <a:cs typeface="Tahoma" panose="020B0604030504040204" pitchFamily="34" charset="0"/>
             </a:rPr>
-            <a:t>Accuracy Analysis</a:t>
+            <a:t>Accuracy, Loss, Dice Coefficient, </a:t>
           </a:r>
+          <a:r>
+            <a:rPr lang="en-US" sz="2400" dirty="0" err="1">
+              <a:latin typeface="Tahoma" panose="020B0604030504040204" pitchFamily="34" charset="0"/>
+              <a:ea typeface="Tahoma" panose="020B0604030504040204" pitchFamily="34" charset="0"/>
+              <a:cs typeface="Tahoma" panose="020B0604030504040204" pitchFamily="34" charset="0"/>
+            </a:rPr>
+            <a:t>IoU</a:t>
+          </a:r>
+          <a:endParaRPr lang="en-US" sz="2400" dirty="0">
+            <a:latin typeface="Tahoma" panose="020B0604030504040204" pitchFamily="34" charset="0"/>
+            <a:ea typeface="Tahoma" panose="020B0604030504040204" pitchFamily="34" charset="0"/>
+            <a:cs typeface="Tahoma" panose="020B0604030504040204" pitchFamily="34" charset="0"/>
+          </a:endParaRPr>
         </a:p>
       </dgm:t>
     </dgm:pt>
@@ -3860,7 +3872,7 @@
               <a:ea typeface="Tahoma" panose="020B0604030504040204" pitchFamily="34" charset="0"/>
               <a:cs typeface="Tahoma" panose="020B0604030504040204" pitchFamily="34" charset="0"/>
             </a:rPr>
-            <a:t>Biomedical Imagery</a:t>
+            <a:t>Biomedical Imagery Professionals + Cancer Patients</a:t>
           </a:r>
         </a:p>
       </dsp:txBody>
@@ -4027,7 +4039,7 @@
               <a:ea typeface="Tahoma" panose="020B0604030504040204" pitchFamily="34" charset="0"/>
               <a:cs typeface="Tahoma" panose="020B0604030504040204" pitchFamily="34" charset="0"/>
             </a:rPr>
-            <a:t>Efficiency &amp; Cost</a:t>
+            <a:t>Efficiency, Cost, Resolution</a:t>
           </a:r>
         </a:p>
       </dsp:txBody>
@@ -4194,8 +4206,21 @@
               <a:ea typeface="Tahoma" panose="020B0604030504040204" pitchFamily="34" charset="0"/>
               <a:cs typeface="Tahoma" panose="020B0604030504040204" pitchFamily="34" charset="0"/>
             </a:rPr>
-            <a:t>Accuracy Analysis</a:t>
+            <a:t>Accuracy, Loss, Dice Coefficient, </a:t>
           </a:r>
+          <a:r>
+            <a:rPr lang="en-US" sz="2400" kern="1200" dirty="0" err="1">
+              <a:latin typeface="Tahoma" panose="020B0604030504040204" pitchFamily="34" charset="0"/>
+              <a:ea typeface="Tahoma" panose="020B0604030504040204" pitchFamily="34" charset="0"/>
+              <a:cs typeface="Tahoma" panose="020B0604030504040204" pitchFamily="34" charset="0"/>
+            </a:rPr>
+            <a:t>IoU</a:t>
+          </a:r>
+          <a:endParaRPr lang="en-US" sz="2400" kern="1200" dirty="0">
+            <a:latin typeface="Tahoma" panose="020B0604030504040204" pitchFamily="34" charset="0"/>
+            <a:ea typeface="Tahoma" panose="020B0604030504040204" pitchFamily="34" charset="0"/>
+            <a:cs typeface="Tahoma" panose="020B0604030504040204" pitchFamily="34" charset="0"/>
+          </a:endParaRPr>
         </a:p>
       </dsp:txBody>
       <dsp:txXfrm rot="-5400000">
@@ -7988,7 +8013,7 @@
           <a:p>
             <a:fld id="{2B85766F-5EC0-4797-B4D1-777FCB005B11}" type="datetimeFigureOut">
               <a:rPr lang="en-US" smtClean="0"/>
-              <a:t>8/26/2024</a:t>
+              <a:t>8/27/2024</a:t>
             </a:fld>
             <a:endParaRPr lang="en-US" dirty="0"/>
           </a:p>
@@ -8165,7 +8190,7 @@
           <a:p>
             <a:fld id="{B2B4B5EC-152C-4627-80C0-63B10D5574EF}" type="datetimeFigureOut">
               <a:rPr lang="en-US" smtClean="0"/>
-              <a:t>8/26/2024</a:t>
+              <a:t>8/27/2024</a:t>
             </a:fld>
             <a:endParaRPr lang="en-US" dirty="0"/>
           </a:p>
@@ -8489,7 +8514,7 @@
           <a:noFill/>
           <a:extLst>
             <a:ext uri="{909E8E84-426E-40dd-AFC4-6F175D3DCCD1}">
-              <a14:hiddenFill xmlns="" xmlns:a14="http://schemas.microsoft.com/office/drawing/2010/main">
+              <a14:hiddenFill xmlns:a14="http://schemas.microsoft.com/office/drawing/2010/main" xmlns="">
                 <a:solidFill>
                   <a:srgbClr val="FFFFFF"/>
                 </a:solidFill>
@@ -8548,7 +8573,7 @@
             </a:ln>
             <a:extLst>
               <a:ext uri="{91240B29-F687-4f45-9708-019B960494DF}">
-                <a14:hiddenLine xmlns="" xmlns:a14="http://schemas.microsoft.com/office/drawing/2010/main" w="9525">
+                <a14:hiddenLine xmlns:a14="http://schemas.microsoft.com/office/drawing/2010/main" xmlns="" w="9525">
                   <a:solidFill>
                     <a:srgbClr val="000000"/>
                   </a:solidFill>
@@ -8638,7 +8663,7 @@
             </a:ln>
             <a:extLst>
               <a:ext uri="{91240B29-F687-4f45-9708-019B960494DF}">
-                <a14:hiddenLine xmlns="" xmlns:a14="http://schemas.microsoft.com/office/drawing/2010/main" w="9525">
+                <a14:hiddenLine xmlns:a14="http://schemas.microsoft.com/office/drawing/2010/main" xmlns="" w="9525">
                   <a:solidFill>
                     <a:srgbClr val="000000"/>
                   </a:solidFill>
@@ -8728,7 +8753,7 @@
             </a:ln>
             <a:extLst>
               <a:ext uri="{91240B29-F687-4f45-9708-019B960494DF}">
-                <a14:hiddenLine xmlns="" xmlns:a14="http://schemas.microsoft.com/office/drawing/2010/main" w="9525">
+                <a14:hiddenLine xmlns:a14="http://schemas.microsoft.com/office/drawing/2010/main" xmlns="" w="9525">
                   <a:solidFill>
                     <a:srgbClr val="000000"/>
                   </a:solidFill>
@@ -8762,7 +8787,7 @@
             </a:ln>
             <a:extLst>
               <a:ext uri="{91240B29-F687-4f45-9708-019B960494DF}">
-                <a14:hiddenLine xmlns="" xmlns:a14="http://schemas.microsoft.com/office/drawing/2010/main" w="9525">
+                <a14:hiddenLine xmlns:a14="http://schemas.microsoft.com/office/drawing/2010/main" xmlns="" w="9525">
                   <a:solidFill>
                     <a:srgbClr val="000000"/>
                   </a:solidFill>
@@ -8852,7 +8877,7 @@
             </a:ln>
             <a:extLst>
               <a:ext uri="{91240B29-F687-4f45-9708-019B960494DF}">
-                <a14:hiddenLine xmlns="" xmlns:a14="http://schemas.microsoft.com/office/drawing/2010/main" w="9525">
+                <a14:hiddenLine xmlns:a14="http://schemas.microsoft.com/office/drawing/2010/main" xmlns="" w="9525">
                   <a:solidFill>
                     <a:srgbClr val="000000"/>
                   </a:solidFill>
@@ -8914,7 +8939,7 @@
             </a:ln>
             <a:extLst>
               <a:ext uri="{91240B29-F687-4f45-9708-019B960494DF}">
-                <a14:hiddenLine xmlns="" xmlns:a14="http://schemas.microsoft.com/office/drawing/2010/main" w="9525">
+                <a14:hiddenLine xmlns:a14="http://schemas.microsoft.com/office/drawing/2010/main" xmlns="" w="9525">
                   <a:solidFill>
                     <a:srgbClr val="000000"/>
                   </a:solidFill>
@@ -8976,7 +9001,7 @@
             </a:ln>
             <a:extLst>
               <a:ext uri="{91240B29-F687-4f45-9708-019B960494DF}">
-                <a14:hiddenLine xmlns="" xmlns:a14="http://schemas.microsoft.com/office/drawing/2010/main" w="9525">
+                <a14:hiddenLine xmlns:a14="http://schemas.microsoft.com/office/drawing/2010/main" xmlns="" w="9525">
                   <a:solidFill>
                     <a:srgbClr val="000000"/>
                   </a:solidFill>
@@ -9066,7 +9091,7 @@
             </a:ln>
             <a:extLst>
               <a:ext uri="{91240B29-F687-4f45-9708-019B960494DF}">
-                <a14:hiddenLine xmlns="" xmlns:a14="http://schemas.microsoft.com/office/drawing/2010/main" w="9525">
+                <a14:hiddenLine xmlns:a14="http://schemas.microsoft.com/office/drawing/2010/main" xmlns="" w="9525">
                   <a:solidFill>
                     <a:srgbClr val="000000"/>
                   </a:solidFill>
@@ -9128,7 +9153,7 @@
             </a:ln>
             <a:extLst>
               <a:ext uri="{91240B29-F687-4f45-9708-019B960494DF}">
-                <a14:hiddenLine xmlns="" xmlns:a14="http://schemas.microsoft.com/office/drawing/2010/main" w="9525">
+                <a14:hiddenLine xmlns:a14="http://schemas.microsoft.com/office/drawing/2010/main" xmlns="" w="9525">
                   <a:solidFill>
                     <a:srgbClr val="000000"/>
                   </a:solidFill>
@@ -9190,7 +9215,7 @@
             </a:ln>
             <a:extLst>
               <a:ext uri="{91240B29-F687-4f45-9708-019B960494DF}">
-                <a14:hiddenLine xmlns="" xmlns:a14="http://schemas.microsoft.com/office/drawing/2010/main" w="9525">
+                <a14:hiddenLine xmlns:a14="http://schemas.microsoft.com/office/drawing/2010/main" xmlns="" w="9525">
                   <a:solidFill>
                     <a:srgbClr val="000000"/>
                   </a:solidFill>
@@ -9280,7 +9305,7 @@
             </a:ln>
             <a:extLst>
               <a:ext uri="{91240B29-F687-4f45-9708-019B960494DF}">
-                <a14:hiddenLine xmlns="" xmlns:a14="http://schemas.microsoft.com/office/drawing/2010/main" w="9525">
+                <a14:hiddenLine xmlns:a14="http://schemas.microsoft.com/office/drawing/2010/main" xmlns="" w="9525">
                   <a:solidFill>
                     <a:srgbClr val="000000"/>
                   </a:solidFill>
@@ -9370,7 +9395,7 @@
             </a:ln>
             <a:extLst>
               <a:ext uri="{91240B29-F687-4f45-9708-019B960494DF}">
-                <a14:hiddenLine xmlns="" xmlns:a14="http://schemas.microsoft.com/office/drawing/2010/main" w="9525">
+                <a14:hiddenLine xmlns:a14="http://schemas.microsoft.com/office/drawing/2010/main" xmlns="" w="9525">
                   <a:solidFill>
                     <a:srgbClr val="000000"/>
                   </a:solidFill>
@@ -9432,7 +9457,7 @@
             </a:ln>
             <a:extLst>
               <a:ext uri="{91240B29-F687-4f45-9708-019B960494DF}">
-                <a14:hiddenLine xmlns="" xmlns:a14="http://schemas.microsoft.com/office/drawing/2010/main" w="9525">
+                <a14:hiddenLine xmlns:a14="http://schemas.microsoft.com/office/drawing/2010/main" xmlns="" w="9525">
                   <a:solidFill>
                     <a:srgbClr val="000000"/>
                   </a:solidFill>
@@ -9542,7 +9567,7 @@
             </a:ln>
             <a:extLst>
               <a:ext uri="{91240B29-F687-4f45-9708-019B960494DF}">
-                <a14:hiddenLine xmlns="" xmlns:a14="http://schemas.microsoft.com/office/drawing/2010/main" w="9525">
+                <a14:hiddenLine xmlns:a14="http://schemas.microsoft.com/office/drawing/2010/main" xmlns="" w="9525">
                   <a:solidFill>
                     <a:srgbClr val="000000"/>
                   </a:solidFill>
@@ -9604,7 +9629,7 @@
             </a:ln>
             <a:extLst>
               <a:ext uri="{91240B29-F687-4f45-9708-019B960494DF}">
-                <a14:hiddenLine xmlns="" xmlns:a14="http://schemas.microsoft.com/office/drawing/2010/main" w="9525">
+                <a14:hiddenLine xmlns:a14="http://schemas.microsoft.com/office/drawing/2010/main" xmlns="" w="9525">
                   <a:solidFill>
                     <a:srgbClr val="000000"/>
                   </a:solidFill>
@@ -9694,7 +9719,7 @@
             </a:ln>
             <a:extLst>
               <a:ext uri="{91240B29-F687-4f45-9708-019B960494DF}">
-                <a14:hiddenLine xmlns="" xmlns:a14="http://schemas.microsoft.com/office/drawing/2010/main" w="9525">
+                <a14:hiddenLine xmlns:a14="http://schemas.microsoft.com/office/drawing/2010/main" xmlns="" w="9525">
                   <a:solidFill>
                     <a:srgbClr val="000000"/>
                   </a:solidFill>
@@ -9784,7 +9809,7 @@
             </a:ln>
             <a:extLst>
               <a:ext uri="{91240B29-F687-4f45-9708-019B960494DF}">
-                <a14:hiddenLine xmlns="" xmlns:a14="http://schemas.microsoft.com/office/drawing/2010/main" w="9525">
+                <a14:hiddenLine xmlns:a14="http://schemas.microsoft.com/office/drawing/2010/main" xmlns="" w="9525">
                   <a:solidFill>
                     <a:srgbClr val="000000"/>
                   </a:solidFill>
@@ -9846,7 +9871,7 @@
             </a:ln>
             <a:extLst>
               <a:ext uri="{91240B29-F687-4f45-9708-019B960494DF}">
-                <a14:hiddenLine xmlns="" xmlns:a14="http://schemas.microsoft.com/office/drawing/2010/main" w="9525">
+                <a14:hiddenLine xmlns:a14="http://schemas.microsoft.com/office/drawing/2010/main" xmlns="" w="9525">
                   <a:solidFill>
                     <a:srgbClr val="000000"/>
                   </a:solidFill>
@@ -9936,7 +9961,7 @@
             </a:ln>
             <a:extLst>
               <a:ext uri="{91240B29-F687-4f45-9708-019B960494DF}">
-                <a14:hiddenLine xmlns="" xmlns:a14="http://schemas.microsoft.com/office/drawing/2010/main" w="9525">
+                <a14:hiddenLine xmlns:a14="http://schemas.microsoft.com/office/drawing/2010/main" xmlns="" w="9525">
                   <a:solidFill>
                     <a:srgbClr val="000000"/>
                   </a:solidFill>
@@ -10026,7 +10051,7 @@
             </a:ln>
             <a:extLst>
               <a:ext uri="{91240B29-F687-4f45-9708-019B960494DF}">
-                <a14:hiddenLine xmlns="" xmlns:a14="http://schemas.microsoft.com/office/drawing/2010/main" w="9525">
+                <a14:hiddenLine xmlns:a14="http://schemas.microsoft.com/office/drawing/2010/main" xmlns="" w="9525">
                   <a:solidFill>
                     <a:srgbClr val="000000"/>
                   </a:solidFill>
@@ -10082,7 +10107,7 @@
             </a:ln>
             <a:extLst>
               <a:ext uri="{91240B29-F687-4f45-9708-019B960494DF}">
-                <a14:hiddenLine xmlns="" xmlns:a14="http://schemas.microsoft.com/office/drawing/2010/main" w="9525">
+                <a14:hiddenLine xmlns:a14="http://schemas.microsoft.com/office/drawing/2010/main" xmlns="" w="9525">
                   <a:solidFill>
                     <a:srgbClr val="000000"/>
                   </a:solidFill>
@@ -10172,7 +10197,7 @@
             </a:ln>
             <a:extLst>
               <a:ext uri="{91240B29-F687-4f45-9708-019B960494DF}">
-                <a14:hiddenLine xmlns="" xmlns:a14="http://schemas.microsoft.com/office/drawing/2010/main" w="9525">
+                <a14:hiddenLine xmlns:a14="http://schemas.microsoft.com/office/drawing/2010/main" xmlns="" w="9525">
                   <a:solidFill>
                     <a:srgbClr val="000000"/>
                   </a:solidFill>
@@ -10228,7 +10253,7 @@
             </a:ln>
             <a:extLst>
               <a:ext uri="{91240B29-F687-4f45-9708-019B960494DF}">
-                <a14:hiddenLine xmlns="" xmlns:a14="http://schemas.microsoft.com/office/drawing/2010/main" w="9525">
+                <a14:hiddenLine xmlns:a14="http://schemas.microsoft.com/office/drawing/2010/main" xmlns="" w="9525">
                   <a:solidFill>
                     <a:srgbClr val="000000"/>
                   </a:solidFill>
@@ -10318,7 +10343,7 @@
             </a:ln>
             <a:extLst>
               <a:ext uri="{91240B29-F687-4f45-9708-019B960494DF}">
-                <a14:hiddenLine xmlns="" xmlns:a14="http://schemas.microsoft.com/office/drawing/2010/main" w="9525">
+                <a14:hiddenLine xmlns:a14="http://schemas.microsoft.com/office/drawing/2010/main" xmlns="" w="9525">
                   <a:solidFill>
                     <a:srgbClr val="000000"/>
                   </a:solidFill>
@@ -10386,7 +10411,7 @@
             </a:ln>
             <a:extLst>
               <a:ext uri="{91240B29-F687-4f45-9708-019B960494DF}">
-                <a14:hiddenLine xmlns="" xmlns:a14="http://schemas.microsoft.com/office/drawing/2010/main" w="9525">
+                <a14:hiddenLine xmlns:a14="http://schemas.microsoft.com/office/drawing/2010/main" xmlns="" w="9525">
                   <a:solidFill>
                     <a:srgbClr val="000000"/>
                   </a:solidFill>
@@ -10476,7 +10501,7 @@
             </a:ln>
             <a:extLst>
               <a:ext uri="{91240B29-F687-4f45-9708-019B960494DF}">
-                <a14:hiddenLine xmlns="" xmlns:a14="http://schemas.microsoft.com/office/drawing/2010/main" w="9525">
+                <a14:hiddenLine xmlns:a14="http://schemas.microsoft.com/office/drawing/2010/main" xmlns="" w="9525">
                   <a:solidFill>
                     <a:srgbClr val="000000"/>
                   </a:solidFill>
@@ -10544,7 +10569,7 @@
             </a:ln>
             <a:extLst>
               <a:ext uri="{91240B29-F687-4f45-9708-019B960494DF}">
-                <a14:hiddenLine xmlns="" xmlns:a14="http://schemas.microsoft.com/office/drawing/2010/main" w="9525">
+                <a14:hiddenLine xmlns:a14="http://schemas.microsoft.com/office/drawing/2010/main" xmlns="" w="9525">
                   <a:solidFill>
                     <a:srgbClr val="000000"/>
                   </a:solidFill>
@@ -10634,7 +10659,7 @@
             </a:ln>
             <a:extLst>
               <a:ext uri="{91240B29-F687-4f45-9708-019B960494DF}">
-                <a14:hiddenLine xmlns="" xmlns:a14="http://schemas.microsoft.com/office/drawing/2010/main" w="9525">
+                <a14:hiddenLine xmlns:a14="http://schemas.microsoft.com/office/drawing/2010/main" xmlns="" w="9525">
                   <a:solidFill>
                     <a:srgbClr val="000000"/>
                   </a:solidFill>
@@ -10668,7 +10693,7 @@
             </a:ln>
             <a:extLst>
               <a:ext uri="{91240B29-F687-4f45-9708-019B960494DF}">
-                <a14:hiddenLine xmlns="" xmlns:a14="http://schemas.microsoft.com/office/drawing/2010/main" w="9525">
+                <a14:hiddenLine xmlns:a14="http://schemas.microsoft.com/office/drawing/2010/main" xmlns="" w="9525">
                   <a:solidFill>
                     <a:srgbClr val="000000"/>
                   </a:solidFill>
@@ -10758,7 +10783,7 @@
             </a:ln>
             <a:extLst>
               <a:ext uri="{91240B29-F687-4f45-9708-019B960494DF}">
-                <a14:hiddenLine xmlns="" xmlns:a14="http://schemas.microsoft.com/office/drawing/2010/main" w="9525">
+                <a14:hiddenLine xmlns:a14="http://schemas.microsoft.com/office/drawing/2010/main" xmlns="" w="9525">
                   <a:solidFill>
                     <a:srgbClr val="000000"/>
                   </a:solidFill>
@@ -10820,7 +10845,7 @@
             </a:ln>
             <a:extLst>
               <a:ext uri="{91240B29-F687-4f45-9708-019B960494DF}">
-                <a14:hiddenLine xmlns="" xmlns:a14="http://schemas.microsoft.com/office/drawing/2010/main" w="9525">
+                <a14:hiddenLine xmlns:a14="http://schemas.microsoft.com/office/drawing/2010/main" xmlns="" w="9525">
                   <a:solidFill>
                     <a:srgbClr val="000000"/>
                   </a:solidFill>
@@ -10882,7 +10907,7 @@
             </a:ln>
             <a:extLst>
               <a:ext uri="{91240B29-F687-4f45-9708-019B960494DF}">
-                <a14:hiddenLine xmlns="" xmlns:a14="http://schemas.microsoft.com/office/drawing/2010/main" w="9525">
+                <a14:hiddenLine xmlns:a14="http://schemas.microsoft.com/office/drawing/2010/main" xmlns="" w="9525">
                   <a:solidFill>
                     <a:srgbClr val="000000"/>
                   </a:solidFill>
@@ -10972,7 +10997,7 @@
             </a:ln>
             <a:extLst>
               <a:ext uri="{91240B29-F687-4f45-9708-019B960494DF}">
-                <a14:hiddenLine xmlns="" xmlns:a14="http://schemas.microsoft.com/office/drawing/2010/main" w="9525">
+                <a14:hiddenLine xmlns:a14="http://schemas.microsoft.com/office/drawing/2010/main" xmlns="" w="9525">
                   <a:solidFill>
                     <a:srgbClr val="000000"/>
                   </a:solidFill>
@@ -11040,7 +11065,7 @@
             </a:ln>
             <a:extLst>
               <a:ext uri="{91240B29-F687-4f45-9708-019B960494DF}">
-                <a14:hiddenLine xmlns="" xmlns:a14="http://schemas.microsoft.com/office/drawing/2010/main" w="9525">
+                <a14:hiddenLine xmlns:a14="http://schemas.microsoft.com/office/drawing/2010/main" xmlns="" w="9525">
                   <a:solidFill>
                     <a:srgbClr val="000000"/>
                   </a:solidFill>
@@ -11102,7 +11127,7 @@
             </a:ln>
             <a:extLst>
               <a:ext uri="{91240B29-F687-4f45-9708-019B960494DF}">
-                <a14:hiddenLine xmlns="" xmlns:a14="http://schemas.microsoft.com/office/drawing/2010/main" w="9525">
+                <a14:hiddenLine xmlns:a14="http://schemas.microsoft.com/office/drawing/2010/main" xmlns="" w="9525">
                   <a:solidFill>
                     <a:srgbClr val="000000"/>
                   </a:solidFill>
@@ -11192,7 +11217,7 @@
             </a:ln>
             <a:extLst>
               <a:ext uri="{91240B29-F687-4f45-9708-019B960494DF}">
-                <a14:hiddenLine xmlns="" xmlns:a14="http://schemas.microsoft.com/office/drawing/2010/main" w="9525">
+                <a14:hiddenLine xmlns:a14="http://schemas.microsoft.com/office/drawing/2010/main" xmlns="" w="9525">
                   <a:solidFill>
                     <a:srgbClr val="000000"/>
                   </a:solidFill>
@@ -11254,7 +11279,7 @@
             </a:ln>
             <a:extLst>
               <a:ext uri="{91240B29-F687-4f45-9708-019B960494DF}">
-                <a14:hiddenLine xmlns="" xmlns:a14="http://schemas.microsoft.com/office/drawing/2010/main" w="9525">
+                <a14:hiddenLine xmlns:a14="http://schemas.microsoft.com/office/drawing/2010/main" xmlns="" w="9525">
                   <a:solidFill>
                     <a:srgbClr val="000000"/>
                   </a:solidFill>
@@ -11344,7 +11369,7 @@
             </a:ln>
             <a:extLst>
               <a:ext uri="{91240B29-F687-4f45-9708-019B960494DF}">
-                <a14:hiddenLine xmlns="" xmlns:a14="http://schemas.microsoft.com/office/drawing/2010/main" w="9525">
+                <a14:hiddenLine xmlns:a14="http://schemas.microsoft.com/office/drawing/2010/main" xmlns="" w="9525">
                   <a:solidFill>
                     <a:srgbClr val="000000"/>
                   </a:solidFill>
@@ -11406,7 +11431,7 @@
             </a:ln>
             <a:extLst>
               <a:ext uri="{91240B29-F687-4f45-9708-019B960494DF}">
-                <a14:hiddenLine xmlns="" xmlns:a14="http://schemas.microsoft.com/office/drawing/2010/main" w="9525">
+                <a14:hiddenLine xmlns:a14="http://schemas.microsoft.com/office/drawing/2010/main" xmlns="" w="9525">
                   <a:solidFill>
                     <a:srgbClr val="000000"/>
                   </a:solidFill>
@@ -11496,7 +11521,7 @@
             </a:ln>
             <a:extLst>
               <a:ext uri="{91240B29-F687-4f45-9708-019B960494DF}">
-                <a14:hiddenLine xmlns="" xmlns:a14="http://schemas.microsoft.com/office/drawing/2010/main" w="9525">
+                <a14:hiddenLine xmlns:a14="http://schemas.microsoft.com/office/drawing/2010/main" xmlns="" w="9525">
                   <a:solidFill>
                     <a:srgbClr val="000000"/>
                   </a:solidFill>
@@ -11530,7 +11555,7 @@
             </a:ln>
             <a:extLst>
               <a:ext uri="{91240B29-F687-4f45-9708-019B960494DF}">
-                <a14:hiddenLine xmlns="" xmlns:a14="http://schemas.microsoft.com/office/drawing/2010/main" w="9525">
+                <a14:hiddenLine xmlns:a14="http://schemas.microsoft.com/office/drawing/2010/main" xmlns="" w="9525">
                   <a:solidFill>
                     <a:srgbClr val="000000"/>
                   </a:solidFill>
@@ -11595,7 +11620,7 @@
             </a:ln>
             <a:extLst>
               <a:ext uri="{91240B29-F687-4f45-9708-019B960494DF}">
-                <a14:hiddenLine xmlns="" xmlns:a14="http://schemas.microsoft.com/office/drawing/2010/main" w="9525">
+                <a14:hiddenLine xmlns:a14="http://schemas.microsoft.com/office/drawing/2010/main" xmlns="" w="9525">
                   <a:solidFill>
                     <a:srgbClr val="000000"/>
                   </a:solidFill>
@@ -11685,7 +11710,7 @@
             </a:ln>
             <a:extLst>
               <a:ext uri="{91240B29-F687-4f45-9708-019B960494DF}">
-                <a14:hiddenLine xmlns="" xmlns:a14="http://schemas.microsoft.com/office/drawing/2010/main" w="9525">
+                <a14:hiddenLine xmlns:a14="http://schemas.microsoft.com/office/drawing/2010/main" xmlns="" w="9525">
                   <a:solidFill>
                     <a:srgbClr val="000000"/>
                   </a:solidFill>
@@ -11747,7 +11772,7 @@
             </a:ln>
             <a:extLst>
               <a:ext uri="{91240B29-F687-4f45-9708-019B960494DF}">
-                <a14:hiddenLine xmlns="" xmlns:a14="http://schemas.microsoft.com/office/drawing/2010/main" w="9525">
+                <a14:hiddenLine xmlns:a14="http://schemas.microsoft.com/office/drawing/2010/main" xmlns="" w="9525">
                   <a:solidFill>
                     <a:srgbClr val="000000"/>
                   </a:solidFill>
@@ -11837,7 +11862,7 @@
             </a:ln>
             <a:extLst>
               <a:ext uri="{91240B29-F687-4f45-9708-019B960494DF}">
-                <a14:hiddenLine xmlns="" xmlns:a14="http://schemas.microsoft.com/office/drawing/2010/main" w="9525">
+                <a14:hiddenLine xmlns:a14="http://schemas.microsoft.com/office/drawing/2010/main" xmlns="" w="9525">
                   <a:solidFill>
                     <a:srgbClr val="000000"/>
                   </a:solidFill>
@@ -11927,7 +11952,7 @@
             </a:ln>
             <a:extLst>
               <a:ext uri="{91240B29-F687-4f45-9708-019B960494DF}">
-                <a14:hiddenLine xmlns="" xmlns:a14="http://schemas.microsoft.com/office/drawing/2010/main" w="9525">
+                <a14:hiddenLine xmlns:a14="http://schemas.microsoft.com/office/drawing/2010/main" xmlns="" w="9525">
                   <a:solidFill>
                     <a:srgbClr val="000000"/>
                   </a:solidFill>
@@ -11992,7 +12017,7 @@
             </a:ln>
             <a:extLst>
               <a:ext uri="{91240B29-F687-4f45-9708-019B960494DF}">
-                <a14:hiddenLine xmlns="" xmlns:a14="http://schemas.microsoft.com/office/drawing/2010/main" w="9525">
+                <a14:hiddenLine xmlns:a14="http://schemas.microsoft.com/office/drawing/2010/main" xmlns="" w="9525">
                   <a:solidFill>
                     <a:srgbClr val="000000"/>
                   </a:solidFill>
@@ -12054,7 +12079,7 @@
             </a:ln>
             <a:extLst>
               <a:ext uri="{91240B29-F687-4f45-9708-019B960494DF}">
-                <a14:hiddenLine xmlns="" xmlns:a14="http://schemas.microsoft.com/office/drawing/2010/main" w="9525">
+                <a14:hiddenLine xmlns:a14="http://schemas.microsoft.com/office/drawing/2010/main" xmlns="" w="9525">
                   <a:solidFill>
                     <a:srgbClr val="000000"/>
                   </a:solidFill>
@@ -12144,7 +12169,7 @@
             </a:ln>
             <a:extLst>
               <a:ext uri="{91240B29-F687-4f45-9708-019B960494DF}">
-                <a14:hiddenLine xmlns="" xmlns:a14="http://schemas.microsoft.com/office/drawing/2010/main" w="9525">
+                <a14:hiddenLine xmlns:a14="http://schemas.microsoft.com/office/drawing/2010/main" xmlns="" w="9525">
                   <a:solidFill>
                     <a:srgbClr val="000000"/>
                   </a:solidFill>
@@ -12234,7 +12259,7 @@
             </a:ln>
             <a:extLst>
               <a:ext uri="{91240B29-F687-4f45-9708-019B960494DF}">
-                <a14:hiddenLine xmlns="" xmlns:a14="http://schemas.microsoft.com/office/drawing/2010/main" w="9525">
+                <a14:hiddenLine xmlns:a14="http://schemas.microsoft.com/office/drawing/2010/main" xmlns="" w="9525">
                   <a:solidFill>
                     <a:srgbClr val="000000"/>
                   </a:solidFill>
@@ -12296,7 +12321,7 @@
             </a:ln>
             <a:extLst>
               <a:ext uri="{91240B29-F687-4f45-9708-019B960494DF}">
-                <a14:hiddenLine xmlns="" xmlns:a14="http://schemas.microsoft.com/office/drawing/2010/main" w="9525">
+                <a14:hiddenLine xmlns:a14="http://schemas.microsoft.com/office/drawing/2010/main" xmlns="" w="9525">
                   <a:solidFill>
                     <a:srgbClr val="000000"/>
                   </a:solidFill>
@@ -12416,7 +12441,7 @@
             </a:ln>
             <a:extLst>
               <a:ext uri="{91240B29-F687-4f45-9708-019B960494DF}">
-                <a14:hiddenLine xmlns="" xmlns:a14="http://schemas.microsoft.com/office/drawing/2010/main" w="9525">
+                <a14:hiddenLine xmlns:a14="http://schemas.microsoft.com/office/drawing/2010/main" xmlns="" w="9525">
                   <a:solidFill>
                     <a:srgbClr val="000000"/>
                   </a:solidFill>
@@ -12484,7 +12509,7 @@
             </a:ln>
             <a:extLst>
               <a:ext uri="{91240B29-F687-4f45-9708-019B960494DF}">
-                <a14:hiddenLine xmlns="" xmlns:a14="http://schemas.microsoft.com/office/drawing/2010/main" w="9525">
+                <a14:hiddenLine xmlns:a14="http://schemas.microsoft.com/office/drawing/2010/main" xmlns="" w="9525">
                   <a:solidFill>
                     <a:srgbClr val="000000"/>
                   </a:solidFill>
@@ -12574,7 +12599,7 @@
             </a:ln>
             <a:extLst>
               <a:ext uri="{91240B29-F687-4f45-9708-019B960494DF}">
-                <a14:hiddenLine xmlns="" xmlns:a14="http://schemas.microsoft.com/office/drawing/2010/main" w="9525">
+                <a14:hiddenLine xmlns:a14="http://schemas.microsoft.com/office/drawing/2010/main" xmlns="" w="9525">
                   <a:solidFill>
                     <a:srgbClr val="000000"/>
                   </a:solidFill>
@@ -12714,7 +12739,7 @@
           <a:p>
             <a:fld id="{48A87A34-81AB-432B-8DAE-1953F412C126}" type="datetimeFigureOut">
               <a:rPr lang="en-US" smtClean="0"/>
-              <a:t>8/26/2024</a:t>
+              <a:t>8/27/2024</a:t>
             </a:fld>
             <a:endParaRPr lang="en-US" dirty="0"/>
           </a:p>
@@ -12981,7 +13006,7 @@
           <a:p>
             <a:fld id="{48A87A34-81AB-432B-8DAE-1953F412C126}" type="datetimeFigureOut">
               <a:rPr lang="en-US" smtClean="0"/>
-              <a:t>8/26/2024</a:t>
+              <a:t>8/27/2024</a:t>
             </a:fld>
             <a:endParaRPr lang="en-US" dirty="0"/>
           </a:p>
@@ -13177,7 +13202,7 @@
           <a:p>
             <a:fld id="{48A87A34-81AB-432B-8DAE-1953F412C126}" type="datetimeFigureOut">
               <a:rPr lang="en-US" smtClean="0"/>
-              <a:t>8/26/2024</a:t>
+              <a:t>8/27/2024</a:t>
             </a:fld>
             <a:endParaRPr lang="en-US" dirty="0"/>
           </a:p>
@@ -13440,7 +13465,7 @@
           <a:p>
             <a:fld id="{48A87A34-81AB-432B-8DAE-1953F412C126}" type="datetimeFigureOut">
               <a:rPr lang="en-US" smtClean="0"/>
-              <a:t>8/26/2024</a:t>
+              <a:t>8/27/2024</a:t>
             </a:fld>
             <a:endParaRPr lang="en-US" dirty="0"/>
           </a:p>
@@ -13874,7 +13899,7 @@
           <a:p>
             <a:fld id="{48A87A34-81AB-432B-8DAE-1953F412C126}" type="datetimeFigureOut">
               <a:rPr lang="en-US" smtClean="0"/>
-              <a:t>8/26/2024</a:t>
+              <a:t>8/27/2024</a:t>
             </a:fld>
             <a:endParaRPr lang="en-US" dirty="0"/>
           </a:p>
@@ -14420,7 +14445,7 @@
           <a:p>
             <a:fld id="{48A87A34-81AB-432B-8DAE-1953F412C126}" type="datetimeFigureOut">
               <a:rPr lang="en-US" smtClean="0"/>
-              <a:t>8/26/2024</a:t>
+              <a:t>8/27/2024</a:t>
             </a:fld>
             <a:endParaRPr lang="en-US" dirty="0"/>
           </a:p>
@@ -15140,7 +15165,7 @@
           <a:p>
             <a:fld id="{48A87A34-81AB-432B-8DAE-1953F412C126}" type="datetimeFigureOut">
               <a:rPr lang="en-US" smtClean="0"/>
-              <a:t>8/26/2024</a:t>
+              <a:t>8/27/2024</a:t>
             </a:fld>
             <a:endParaRPr lang="en-US" dirty="0"/>
           </a:p>
@@ -15310,7 +15335,7 @@
           <a:p>
             <a:fld id="{48A87A34-81AB-432B-8DAE-1953F412C126}" type="datetimeFigureOut">
               <a:rPr lang="en-US" smtClean="0"/>
-              <a:t>8/26/2024</a:t>
+              <a:t>8/27/2024</a:t>
             </a:fld>
             <a:endParaRPr lang="en-US" dirty="0"/>
           </a:p>
@@ -15490,7 +15515,7 @@
           <a:p>
             <a:fld id="{48A87A34-81AB-432B-8DAE-1953F412C126}" type="datetimeFigureOut">
               <a:rPr lang="en-US" smtClean="0"/>
-              <a:t>8/26/2024</a:t>
+              <a:t>8/27/2024</a:t>
             </a:fld>
             <a:endParaRPr lang="en-US" dirty="0"/>
           </a:p>
@@ -15660,7 +15685,7 @@
           <a:p>
             <a:fld id="{48A87A34-81AB-432B-8DAE-1953F412C126}" type="datetimeFigureOut">
               <a:rPr lang="en-US" smtClean="0"/>
-              <a:t>8/26/2024</a:t>
+              <a:t>8/27/2024</a:t>
             </a:fld>
             <a:endParaRPr lang="en-US" dirty="0"/>
           </a:p>
@@ -15910,7 +15935,7 @@
           <a:p>
             <a:fld id="{48A87A34-81AB-432B-8DAE-1953F412C126}" type="datetimeFigureOut">
               <a:rPr lang="en-US" smtClean="0"/>
-              <a:t>8/26/2024</a:t>
+              <a:t>8/27/2024</a:t>
             </a:fld>
             <a:endParaRPr lang="en-US" dirty="0"/>
           </a:p>
@@ -16142,7 +16167,7 @@
           <a:p>
             <a:fld id="{48A87A34-81AB-432B-8DAE-1953F412C126}" type="datetimeFigureOut">
               <a:rPr lang="en-US" smtClean="0"/>
-              <a:t>8/26/2024</a:t>
+              <a:t>8/27/2024</a:t>
             </a:fld>
             <a:endParaRPr lang="en-US" dirty="0"/>
           </a:p>
@@ -16523,7 +16548,7 @@
           <a:p>
             <a:fld id="{48A87A34-81AB-432B-8DAE-1953F412C126}" type="datetimeFigureOut">
               <a:rPr lang="en-US" smtClean="0"/>
-              <a:t>8/26/2024</a:t>
+              <a:t>8/27/2024</a:t>
             </a:fld>
             <a:endParaRPr lang="en-US" dirty="0"/>
           </a:p>
@@ -16641,7 +16666,7 @@
           <a:p>
             <a:fld id="{48A87A34-81AB-432B-8DAE-1953F412C126}" type="datetimeFigureOut">
               <a:rPr lang="en-US" smtClean="0"/>
-              <a:t>8/26/2024</a:t>
+              <a:t>8/27/2024</a:t>
             </a:fld>
             <a:endParaRPr lang="en-US" dirty="0"/>
           </a:p>
@@ -16736,7 +16761,7 @@
           <a:p>
             <a:fld id="{48A87A34-81AB-432B-8DAE-1953F412C126}" type="datetimeFigureOut">
               <a:rPr lang="en-US" smtClean="0"/>
-              <a:t>8/26/2024</a:t>
+              <a:t>8/27/2024</a:t>
             </a:fld>
             <a:endParaRPr lang="en-US" dirty="0"/>
           </a:p>
@@ -16985,7 +17010,7 @@
           <a:p>
             <a:fld id="{48A87A34-81AB-432B-8DAE-1953F412C126}" type="datetimeFigureOut">
               <a:rPr lang="en-US" smtClean="0"/>
-              <a:t>8/26/2024</a:t>
+              <a:t>8/27/2024</a:t>
             </a:fld>
             <a:endParaRPr lang="en-US" dirty="0"/>
           </a:p>
@@ -17265,7 +17290,7 @@
           <a:p>
             <a:fld id="{48A87A34-81AB-432B-8DAE-1953F412C126}" type="datetimeFigureOut">
               <a:rPr lang="en-US" smtClean="0"/>
-              <a:t>8/26/2024</a:t>
+              <a:t>8/27/2024</a:t>
             </a:fld>
             <a:endParaRPr lang="en-US" dirty="0"/>
           </a:p>
@@ -17388,7 +17413,7 @@
           <a:noFill/>
           <a:extLst>
             <a:ext uri="{909E8E84-426E-40dd-AFC4-6F175D3DCCD1}">
-              <a14:hiddenFill xmlns="" xmlns:a14="http://schemas.microsoft.com/office/drawing/2010/main">
+              <a14:hiddenFill xmlns:a14="http://schemas.microsoft.com/office/drawing/2010/main" xmlns="">
                 <a:solidFill>
                   <a:srgbClr val="FFFFFF"/>
                 </a:solidFill>
@@ -17462,7 +17487,7 @@
               </a:ln>
               <a:extLst>
                 <a:ext uri="{91240B29-F687-4f45-9708-019B960494DF}">
-                  <a14:hiddenLine xmlns="" xmlns:a14="http://schemas.microsoft.com/office/drawing/2010/main" w="9525">
+                  <a14:hiddenLine xmlns:a14="http://schemas.microsoft.com/office/drawing/2010/main" xmlns="" w="9525">
                     <a:solidFill>
                       <a:srgbClr val="000000"/>
                     </a:solidFill>
@@ -17552,7 +17577,7 @@
               </a:ln>
               <a:extLst>
                 <a:ext uri="{91240B29-F687-4f45-9708-019B960494DF}">
-                  <a14:hiddenLine xmlns="" xmlns:a14="http://schemas.microsoft.com/office/drawing/2010/main" w="9525">
+                  <a14:hiddenLine xmlns:a14="http://schemas.microsoft.com/office/drawing/2010/main" xmlns="" w="9525">
                     <a:solidFill>
                       <a:srgbClr val="000000"/>
                     </a:solidFill>
@@ -17642,7 +17667,7 @@
               </a:ln>
               <a:extLst>
                 <a:ext uri="{91240B29-F687-4f45-9708-019B960494DF}">
-                  <a14:hiddenLine xmlns="" xmlns:a14="http://schemas.microsoft.com/office/drawing/2010/main" w="9525">
+                  <a14:hiddenLine xmlns:a14="http://schemas.microsoft.com/office/drawing/2010/main" xmlns="" w="9525">
                     <a:solidFill>
                       <a:srgbClr val="000000"/>
                     </a:solidFill>
@@ -17704,7 +17729,7 @@
               </a:ln>
               <a:extLst>
                 <a:ext uri="{91240B29-F687-4f45-9708-019B960494DF}">
-                  <a14:hiddenLine xmlns="" xmlns:a14="http://schemas.microsoft.com/office/drawing/2010/main" w="9525">
+                  <a14:hiddenLine xmlns:a14="http://schemas.microsoft.com/office/drawing/2010/main" xmlns="" w="9525">
                     <a:solidFill>
                       <a:srgbClr val="000000"/>
                     </a:solidFill>
@@ -17794,7 +17819,7 @@
               </a:ln>
               <a:extLst>
                 <a:ext uri="{91240B29-F687-4f45-9708-019B960494DF}">
-                  <a14:hiddenLine xmlns="" xmlns:a14="http://schemas.microsoft.com/office/drawing/2010/main" w="9525">
+                  <a14:hiddenLine xmlns:a14="http://schemas.microsoft.com/office/drawing/2010/main" xmlns="" w="9525">
                     <a:solidFill>
                       <a:srgbClr val="000000"/>
                     </a:solidFill>
@@ -17856,7 +17881,7 @@
               </a:ln>
               <a:extLst>
                 <a:ext uri="{91240B29-F687-4f45-9708-019B960494DF}">
-                  <a14:hiddenLine xmlns="" xmlns:a14="http://schemas.microsoft.com/office/drawing/2010/main" w="9525">
+                  <a14:hiddenLine xmlns:a14="http://schemas.microsoft.com/office/drawing/2010/main" xmlns="" w="9525">
                     <a:solidFill>
                       <a:srgbClr val="000000"/>
                     </a:solidFill>
@@ -17918,7 +17943,7 @@
               </a:ln>
               <a:extLst>
                 <a:ext uri="{91240B29-F687-4f45-9708-019B960494DF}">
-                  <a14:hiddenLine xmlns="" xmlns:a14="http://schemas.microsoft.com/office/drawing/2010/main" w="9525">
+                  <a14:hiddenLine xmlns:a14="http://schemas.microsoft.com/office/drawing/2010/main" xmlns="" w="9525">
                     <a:solidFill>
                       <a:srgbClr val="000000"/>
                     </a:solidFill>
@@ -18008,7 +18033,7 @@
               </a:ln>
               <a:extLst>
                 <a:ext uri="{91240B29-F687-4f45-9708-019B960494DF}">
-                  <a14:hiddenLine xmlns="" xmlns:a14="http://schemas.microsoft.com/office/drawing/2010/main" w="9525">
+                  <a14:hiddenLine xmlns:a14="http://schemas.microsoft.com/office/drawing/2010/main" xmlns="" w="9525">
                     <a:solidFill>
                       <a:srgbClr val="000000"/>
                     </a:solidFill>
@@ -18098,7 +18123,7 @@
               </a:ln>
               <a:extLst>
                 <a:ext uri="{91240B29-F687-4f45-9708-019B960494DF}">
-                  <a14:hiddenLine xmlns="" xmlns:a14="http://schemas.microsoft.com/office/drawing/2010/main" w="9525">
+                  <a14:hiddenLine xmlns:a14="http://schemas.microsoft.com/office/drawing/2010/main" xmlns="" w="9525">
                     <a:solidFill>
                       <a:srgbClr val="000000"/>
                     </a:solidFill>
@@ -18160,7 +18185,7 @@
               </a:ln>
               <a:extLst>
                 <a:ext uri="{91240B29-F687-4f45-9708-019B960494DF}">
-                  <a14:hiddenLine xmlns="" xmlns:a14="http://schemas.microsoft.com/office/drawing/2010/main" w="9525">
+                  <a14:hiddenLine xmlns:a14="http://schemas.microsoft.com/office/drawing/2010/main" xmlns="" w="9525">
                     <a:solidFill>
                       <a:srgbClr val="000000"/>
                     </a:solidFill>
@@ -18270,7 +18295,7 @@
               </a:ln>
               <a:extLst>
                 <a:ext uri="{91240B29-F687-4f45-9708-019B960494DF}">
-                  <a14:hiddenLine xmlns="" xmlns:a14="http://schemas.microsoft.com/office/drawing/2010/main" w="9525">
+                  <a14:hiddenLine xmlns:a14="http://schemas.microsoft.com/office/drawing/2010/main" xmlns="" w="9525">
                     <a:solidFill>
                       <a:srgbClr val="000000"/>
                     </a:solidFill>
@@ -18354,7 +18379,7 @@
               </a:ln>
               <a:extLst>
                 <a:ext uri="{91240B29-F687-4f45-9708-019B960494DF}">
-                  <a14:hiddenLine xmlns="" xmlns:a14="http://schemas.microsoft.com/office/drawing/2010/main" w="9525">
+                  <a14:hiddenLine xmlns:a14="http://schemas.microsoft.com/office/drawing/2010/main" xmlns="" w="9525">
                     <a:solidFill>
                       <a:srgbClr val="000000"/>
                     </a:solidFill>
@@ -18416,7 +18441,7 @@
               </a:ln>
               <a:extLst>
                 <a:ext uri="{91240B29-F687-4f45-9708-019B960494DF}">
-                  <a14:hiddenLine xmlns="" xmlns:a14="http://schemas.microsoft.com/office/drawing/2010/main" w="9525">
+                  <a14:hiddenLine xmlns:a14="http://schemas.microsoft.com/office/drawing/2010/main" xmlns="" w="9525">
                     <a:solidFill>
                       <a:srgbClr val="000000"/>
                     </a:solidFill>
@@ -18478,7 +18503,7 @@
               </a:ln>
               <a:extLst>
                 <a:ext uri="{91240B29-F687-4f45-9708-019B960494DF}">
-                  <a14:hiddenLine xmlns="" xmlns:a14="http://schemas.microsoft.com/office/drawing/2010/main" w="9525">
+                  <a14:hiddenLine xmlns:a14="http://schemas.microsoft.com/office/drawing/2010/main" xmlns="" w="9525">
                     <a:solidFill>
                       <a:srgbClr val="000000"/>
                     </a:solidFill>
@@ -18568,7 +18593,7 @@
               </a:ln>
               <a:extLst>
                 <a:ext uri="{91240B29-F687-4f45-9708-019B960494DF}">
-                  <a14:hiddenLine xmlns="" xmlns:a14="http://schemas.microsoft.com/office/drawing/2010/main" w="9525">
+                  <a14:hiddenLine xmlns:a14="http://schemas.microsoft.com/office/drawing/2010/main" xmlns="" w="9525">
                     <a:solidFill>
                       <a:srgbClr val="000000"/>
                     </a:solidFill>
@@ -18602,7 +18627,7 @@
               </a:ln>
               <a:extLst>
                 <a:ext uri="{91240B29-F687-4f45-9708-019B960494DF}">
-                  <a14:hiddenLine xmlns="" xmlns:a14="http://schemas.microsoft.com/office/drawing/2010/main" w="9525">
+                  <a14:hiddenLine xmlns:a14="http://schemas.microsoft.com/office/drawing/2010/main" xmlns="" w="9525">
                     <a:solidFill>
                       <a:srgbClr val="000000"/>
                     </a:solidFill>
@@ -18667,7 +18692,7 @@
               </a:ln>
               <a:extLst>
                 <a:ext uri="{91240B29-F687-4f45-9708-019B960494DF}">
-                  <a14:hiddenLine xmlns="" xmlns:a14="http://schemas.microsoft.com/office/drawing/2010/main" w="9525">
+                  <a14:hiddenLine xmlns:a14="http://schemas.microsoft.com/office/drawing/2010/main" xmlns="" w="9525">
                     <a:solidFill>
                       <a:srgbClr val="000000"/>
                     </a:solidFill>
@@ -18757,7 +18782,7 @@
               </a:ln>
               <a:extLst>
                 <a:ext uri="{91240B29-F687-4f45-9708-019B960494DF}">
-                  <a14:hiddenLine xmlns="" xmlns:a14="http://schemas.microsoft.com/office/drawing/2010/main" w="9525">
+                  <a14:hiddenLine xmlns:a14="http://schemas.microsoft.com/office/drawing/2010/main" xmlns="" w="9525">
                     <a:solidFill>
                       <a:srgbClr val="000000"/>
                     </a:solidFill>
@@ -18819,7 +18844,7 @@
               </a:ln>
               <a:extLst>
                 <a:ext uri="{91240B29-F687-4f45-9708-019B960494DF}">
-                  <a14:hiddenLine xmlns="" xmlns:a14="http://schemas.microsoft.com/office/drawing/2010/main" w="9525">
+                  <a14:hiddenLine xmlns:a14="http://schemas.microsoft.com/office/drawing/2010/main" xmlns="" w="9525">
                     <a:solidFill>
                       <a:srgbClr val="000000"/>
                     </a:solidFill>
@@ -18909,7 +18934,7 @@
               </a:ln>
               <a:extLst>
                 <a:ext uri="{91240B29-F687-4f45-9708-019B960494DF}">
-                  <a14:hiddenLine xmlns="" xmlns:a14="http://schemas.microsoft.com/office/drawing/2010/main" w="9525">
+                  <a14:hiddenLine xmlns:a14="http://schemas.microsoft.com/office/drawing/2010/main" xmlns="" w="9525">
                     <a:solidFill>
                       <a:srgbClr val="000000"/>
                     </a:solidFill>
@@ -18974,7 +18999,7 @@
               </a:ln>
               <a:extLst>
                 <a:ext uri="{91240B29-F687-4f45-9708-019B960494DF}">
-                  <a14:hiddenLine xmlns="" xmlns:a14="http://schemas.microsoft.com/office/drawing/2010/main" w="9525">
+                  <a14:hiddenLine xmlns:a14="http://schemas.microsoft.com/office/drawing/2010/main" xmlns="" w="9525">
                     <a:solidFill>
                       <a:srgbClr val="000000"/>
                     </a:solidFill>
@@ -19036,7 +19061,7 @@
               </a:ln>
               <a:extLst>
                 <a:ext uri="{91240B29-F687-4f45-9708-019B960494DF}">
-                  <a14:hiddenLine xmlns="" xmlns:a14="http://schemas.microsoft.com/office/drawing/2010/main" w="9525">
+                  <a14:hiddenLine xmlns:a14="http://schemas.microsoft.com/office/drawing/2010/main" xmlns="" w="9525">
                     <a:solidFill>
                       <a:srgbClr val="000000"/>
                     </a:solidFill>
@@ -19126,7 +19151,7 @@
               </a:ln>
               <a:extLst>
                 <a:ext uri="{91240B29-F687-4f45-9708-019B960494DF}">
-                  <a14:hiddenLine xmlns="" xmlns:a14="http://schemas.microsoft.com/office/drawing/2010/main" w="9525">
+                  <a14:hiddenLine xmlns:a14="http://schemas.microsoft.com/office/drawing/2010/main" xmlns="" w="9525">
                     <a:solidFill>
                       <a:srgbClr val="000000"/>
                     </a:solidFill>
@@ -19216,7 +19241,7 @@
               </a:ln>
               <a:extLst>
                 <a:ext uri="{91240B29-F687-4f45-9708-019B960494DF}">
-                  <a14:hiddenLine xmlns="" xmlns:a14="http://schemas.microsoft.com/office/drawing/2010/main" w="9525">
+                  <a14:hiddenLine xmlns:a14="http://schemas.microsoft.com/office/drawing/2010/main" xmlns="" w="9525">
                     <a:solidFill>
                       <a:srgbClr val="000000"/>
                     </a:solidFill>
@@ -19281,7 +19306,7 @@
               </a:ln>
               <a:extLst>
                 <a:ext uri="{91240B29-F687-4f45-9708-019B960494DF}">
-                  <a14:hiddenLine xmlns="" xmlns:a14="http://schemas.microsoft.com/office/drawing/2010/main" w="9525">
+                  <a14:hiddenLine xmlns:a14="http://schemas.microsoft.com/office/drawing/2010/main" xmlns="" w="9525">
                     <a:solidFill>
                       <a:srgbClr val="000000"/>
                     </a:solidFill>
@@ -19401,7 +19426,7 @@
               </a:ln>
               <a:extLst>
                 <a:ext uri="{91240B29-F687-4f45-9708-019B960494DF}">
-                  <a14:hiddenLine xmlns="" xmlns:a14="http://schemas.microsoft.com/office/drawing/2010/main" w="9525">
+                  <a14:hiddenLine xmlns:a14="http://schemas.microsoft.com/office/drawing/2010/main" xmlns="" w="9525">
                     <a:solidFill>
                       <a:srgbClr val="000000"/>
                     </a:solidFill>
@@ -19482,7 +19507,7 @@
               </a:ln>
               <a:extLst>
                 <a:ext uri="{91240B29-F687-4f45-9708-019B960494DF}">
-                  <a14:hiddenLine xmlns="" xmlns:a14="http://schemas.microsoft.com/office/drawing/2010/main" w="9525">
+                  <a14:hiddenLine xmlns:a14="http://schemas.microsoft.com/office/drawing/2010/main" xmlns="" w="9525">
                     <a:solidFill>
                       <a:srgbClr val="000000"/>
                     </a:solidFill>
@@ -19597,7 +19622,7 @@
               </a:ln>
               <a:extLst>
                 <a:ext uri="{91240B29-F687-4f45-9708-019B960494DF}">
-                  <a14:hiddenLine xmlns="" xmlns:a14="http://schemas.microsoft.com/office/drawing/2010/main" w="9525">
+                  <a14:hiddenLine xmlns:a14="http://schemas.microsoft.com/office/drawing/2010/main" xmlns="" w="9525">
                     <a:solidFill>
                       <a:srgbClr val="000000"/>
                     </a:solidFill>
@@ -19687,7 +19712,7 @@
               </a:ln>
               <a:extLst>
                 <a:ext uri="{91240B29-F687-4f45-9708-019B960494DF}">
-                  <a14:hiddenLine xmlns="" xmlns:a14="http://schemas.microsoft.com/office/drawing/2010/main" w="9525">
+                  <a14:hiddenLine xmlns:a14="http://schemas.microsoft.com/office/drawing/2010/main" xmlns="" w="9525">
                     <a:solidFill>
                       <a:srgbClr val="000000"/>
                     </a:solidFill>
@@ -19752,7 +19777,7 @@
               </a:ln>
               <a:extLst>
                 <a:ext uri="{91240B29-F687-4f45-9708-019B960494DF}">
-                  <a14:hiddenLine xmlns="" xmlns:a14="http://schemas.microsoft.com/office/drawing/2010/main" w="9525">
+                  <a14:hiddenLine xmlns:a14="http://schemas.microsoft.com/office/drawing/2010/main" xmlns="" w="9525">
                     <a:solidFill>
                       <a:srgbClr val="000000"/>
                     </a:solidFill>
@@ -19842,7 +19867,7 @@
               </a:ln>
               <a:extLst>
                 <a:ext uri="{91240B29-F687-4f45-9708-019B960494DF}">
-                  <a14:hiddenLine xmlns="" xmlns:a14="http://schemas.microsoft.com/office/drawing/2010/main" w="9525">
+                  <a14:hiddenLine xmlns:a14="http://schemas.microsoft.com/office/drawing/2010/main" xmlns="" w="9525">
                     <a:solidFill>
                       <a:srgbClr val="000000"/>
                     </a:solidFill>
@@ -19910,7 +19935,7 @@
               </a:ln>
               <a:extLst>
                 <a:ext uri="{91240B29-F687-4f45-9708-019B960494DF}">
-                  <a14:hiddenLine xmlns="" xmlns:a14="http://schemas.microsoft.com/office/drawing/2010/main" w="9525">
+                  <a14:hiddenLine xmlns:a14="http://schemas.microsoft.com/office/drawing/2010/main" xmlns="" w="9525">
                     <a:solidFill>
                       <a:srgbClr val="000000"/>
                     </a:solidFill>
@@ -20000,7 +20025,7 @@
               </a:ln>
               <a:extLst>
                 <a:ext uri="{91240B29-F687-4f45-9708-019B960494DF}">
-                  <a14:hiddenLine xmlns="" xmlns:a14="http://schemas.microsoft.com/office/drawing/2010/main" w="9525">
+                  <a14:hiddenLine xmlns:a14="http://schemas.microsoft.com/office/drawing/2010/main" xmlns="" w="9525">
                     <a:solidFill>
                       <a:srgbClr val="000000"/>
                     </a:solidFill>
@@ -20068,7 +20093,7 @@
               </a:ln>
               <a:extLst>
                 <a:ext uri="{91240B29-F687-4f45-9708-019B960494DF}">
-                  <a14:hiddenLine xmlns="" xmlns:a14="http://schemas.microsoft.com/office/drawing/2010/main" w="9525">
+                  <a14:hiddenLine xmlns:a14="http://schemas.microsoft.com/office/drawing/2010/main" xmlns="" w="9525">
                     <a:solidFill>
                       <a:srgbClr val="000000"/>
                     </a:solidFill>
@@ -20158,7 +20183,7 @@
               </a:ln>
               <a:extLst>
                 <a:ext uri="{91240B29-F687-4f45-9708-019B960494DF}">
-                  <a14:hiddenLine xmlns="" xmlns:a14="http://schemas.microsoft.com/office/drawing/2010/main" w="9525">
+                  <a14:hiddenLine xmlns:a14="http://schemas.microsoft.com/office/drawing/2010/main" xmlns="" w="9525">
                     <a:solidFill>
                       <a:srgbClr val="000000"/>
                     </a:solidFill>
@@ -20192,7 +20217,7 @@
               </a:ln>
               <a:extLst>
                 <a:ext uri="{91240B29-F687-4f45-9708-019B960494DF}">
-                  <a14:hiddenLine xmlns="" xmlns:a14="http://schemas.microsoft.com/office/drawing/2010/main" w="9525">
+                  <a14:hiddenLine xmlns:a14="http://schemas.microsoft.com/office/drawing/2010/main" xmlns="" w="9525">
                     <a:solidFill>
                       <a:srgbClr val="000000"/>
                     </a:solidFill>
@@ -20333,7 +20358,7 @@
             <a:fld id="{48A87A34-81AB-432B-8DAE-1953F412C126}" type="datetimeFigureOut">
               <a:rPr lang="en-US" smtClean="0"/>
               <a:pPr/>
-              <a:t>8/26/2024</a:t>
+              <a:t>8/27/2024</a:t>
             </a:fld>
             <a:endParaRPr lang="en-US" dirty="0"/>
           </a:p>
@@ -21319,62 +21344,12 @@
           </a:p>
         </p:txBody>
       </p:sp>
-      <p:sp>
-        <p:nvSpPr>
-          <p:cNvPr id="5" name="Content Placeholder 4">
+      <p:pic>
+        <p:nvPicPr>
+          <p:cNvPr id="8" name="Picture 7">
             <a:extLst>
               <a:ext uri="{FF2B5EF4-FFF2-40B4-BE49-F238E27FC236}">
-                <a16:creationId xmlns:a16="http://schemas.microsoft.com/office/drawing/2014/main" id="{09198237-3D97-4C8C-A848-18F7BEE3B21B}"/>
-              </a:ext>
-            </a:extLst>
-          </p:cNvPr>
-          <p:cNvSpPr>
-            <a:spLocks noGrp="1"/>
-          </p:cNvSpPr>
-          <p:nvPr>
-            <p:ph sz="half" idx="1"/>
-          </p:nvPr>
-        </p:nvSpPr>
-        <p:spPr/>
-        <p:txBody>
-          <a:bodyPr/>
-          <a:lstStyle/>
-          <a:p>
-            <a:endParaRPr lang="en-US"/>
-          </a:p>
-        </p:txBody>
-      </p:sp>
-      <p:sp>
-        <p:nvSpPr>
-          <p:cNvPr id="7" name="Content Placeholder 6">
-            <a:extLst>
-              <a:ext uri="{FF2B5EF4-FFF2-40B4-BE49-F238E27FC236}">
-                <a16:creationId xmlns:a16="http://schemas.microsoft.com/office/drawing/2014/main" id="{A33720BD-0F2B-43E2-A442-868FFF19794D}"/>
-              </a:ext>
-            </a:extLst>
-          </p:cNvPr>
-          <p:cNvSpPr>
-            <a:spLocks noGrp="1"/>
-          </p:cNvSpPr>
-          <p:nvPr>
-            <p:ph sz="half" idx="2"/>
-          </p:nvPr>
-        </p:nvSpPr>
-        <p:spPr/>
-        <p:txBody>
-          <a:bodyPr/>
-          <a:lstStyle/>
-          <a:p>
-            <a:endParaRPr lang="en-US" dirty="0"/>
-          </a:p>
-        </p:txBody>
-      </p:sp>
-      <p:pic>
-        <p:nvPicPr>
-          <p:cNvPr id="6" name="Content Placeholder 9">
-            <a:extLst>
-              <a:ext uri="{FF2B5EF4-FFF2-40B4-BE49-F238E27FC236}">
-                <a16:creationId xmlns:a16="http://schemas.microsoft.com/office/drawing/2014/main" id="{96C8661F-21F7-41E2-A3F1-61A1AF32FC38}"/>
+                <a16:creationId xmlns:a16="http://schemas.microsoft.com/office/drawing/2014/main" id="{048B69D4-17DC-4C16-B9DE-555F1CD39352}"/>
               </a:ext>
             </a:extLst>
           </p:cNvPr>
@@ -21391,36 +21366,6 @@
         </p:blipFill>
         <p:spPr>
           <a:xfrm>
-            <a:off x="1141410" y="1174868"/>
-            <a:ext cx="9906001" cy="5209657"/>
-          </a:xfrm>
-          <a:prstGeom prst="rect">
-            <a:avLst/>
-          </a:prstGeom>
-        </p:spPr>
-      </p:pic>
-      <p:pic>
-        <p:nvPicPr>
-          <p:cNvPr id="8" name="Picture 7">
-            <a:extLst>
-              <a:ext uri="{FF2B5EF4-FFF2-40B4-BE49-F238E27FC236}">
-                <a16:creationId xmlns:a16="http://schemas.microsoft.com/office/drawing/2014/main" id="{048B69D4-17DC-4C16-B9DE-555F1CD39352}"/>
-              </a:ext>
-            </a:extLst>
-          </p:cNvPr>
-          <p:cNvPicPr>
-            <a:picLocks noChangeAspect="1"/>
-          </p:cNvPicPr>
-          <p:nvPr/>
-        </p:nvPicPr>
-        <p:blipFill>
-          <a:blip r:embed="rId3"/>
-          <a:stretch>
-            <a:fillRect/>
-          </a:stretch>
-        </p:blipFill>
-        <p:spPr>
-          <a:xfrm>
             <a:off x="10667999" y="256022"/>
             <a:ext cx="1260713" cy="872978"/>
           </a:xfrm>
@@ -21429,6 +21374,226 @@
           </a:prstGeom>
         </p:spPr>
       </p:pic>
+      <p:sp>
+        <p:nvSpPr>
+          <p:cNvPr id="3" name="Rectangle 2">
+            <a:extLst>
+              <a:ext uri="{FF2B5EF4-FFF2-40B4-BE49-F238E27FC236}">
+                <a16:creationId xmlns:a16="http://schemas.microsoft.com/office/drawing/2014/main" id="{FC138641-EC46-C401-842D-A80D9A09C277}"/>
+              </a:ext>
+            </a:extLst>
+          </p:cNvPr>
+          <p:cNvSpPr>
+            <a:spLocks noChangeArrowheads="1"/>
+          </p:cNvSpPr>
+          <p:nvPr/>
+        </p:nvSpPr>
+        <p:spPr bwMode="auto">
+          <a:xfrm>
+            <a:off x="0" y="0"/>
+            <a:ext cx="12192000" cy="457200"/>
+          </a:xfrm>
+          <a:prstGeom prst="rect">
+            <a:avLst/>
+          </a:prstGeom>
+          <a:noFill/>
+          <a:ln>
+            <a:noFill/>
+          </a:ln>
+          <a:effectLst/>
+          <a:extLst>
+            <a:ext uri="{909E8E84-426E-40DD-AFC4-6F175D3DCCD1}">
+              <a14:hiddenFill xmlns:a14="http://schemas.microsoft.com/office/drawing/2010/main">
+                <a:solidFill>
+                  <a:schemeClr val="accent1"/>
+                </a:solidFill>
+              </a14:hiddenFill>
+            </a:ext>
+            <a:ext uri="{91240B29-F687-4F45-9708-019B960494DF}">
+              <a14:hiddenLine xmlns:a14="http://schemas.microsoft.com/office/drawing/2010/main" w="9525">
+                <a:solidFill>
+                  <a:schemeClr val="tx1"/>
+                </a:solidFill>
+                <a:miter lim="800000"/>
+                <a:headEnd/>
+                <a:tailEnd/>
+              </a14:hiddenLine>
+            </a:ext>
+            <a:ext uri="{AF507438-7753-43E0-B8FC-AC1667EBCBE1}">
+              <a14:hiddenEffects xmlns:a14="http://schemas.microsoft.com/office/drawing/2010/main">
+                <a:effectLst>
+                  <a:outerShdw dist="35921" dir="2700000" algn="ctr" rotWithShape="0">
+                    <a:schemeClr val="bg2"/>
+                  </a:outerShdw>
+                </a:effectLst>
+              </a14:hiddenEffects>
+            </a:ext>
+          </a:extLst>
+        </p:spPr>
+        <p:txBody>
+          <a:bodyPr vert="horz" wrap="none" lIns="91440" tIns="45720" rIns="91440" bIns="45720" numCol="1" anchor="ctr" anchorCtr="0" compatLnSpc="1">
+            <a:prstTxWarp prst="textNoShape">
+              <a:avLst/>
+            </a:prstTxWarp>
+            <a:spAutoFit/>
+          </a:bodyPr>
+          <a:lstStyle/>
+          <a:p>
+            <a:endParaRPr lang="en-US"/>
+          </a:p>
+        </p:txBody>
+      </p:sp>
+      <p:pic>
+        <p:nvPicPr>
+          <p:cNvPr id="6145" name="Picture 8" descr="Chart, histogram&#10;&#10;Description automatically generated">
+            <a:extLst>
+              <a:ext uri="{FF2B5EF4-FFF2-40B4-BE49-F238E27FC236}">
+                <a16:creationId xmlns:a16="http://schemas.microsoft.com/office/drawing/2014/main" id="{2606B71F-65A0-6313-4559-F9B617A2EFD3}"/>
+              </a:ext>
+            </a:extLst>
+          </p:cNvPr>
+          <p:cNvPicPr>
+            <a:picLocks noChangeAspect="1" noChangeArrowheads="1"/>
+          </p:cNvPicPr>
+          <p:nvPr/>
+        </p:nvPicPr>
+        <p:blipFill>
+          <a:blip r:embed="rId3">
+            <a:extLst>
+              <a:ext uri="{28A0092B-C50C-407E-A947-70E740481C1C}">
+                <a14:useLocalDpi xmlns:a14="http://schemas.microsoft.com/office/drawing/2010/main" val="0"/>
+              </a:ext>
+            </a:extLst>
+          </a:blip>
+          <a:srcRect/>
+          <a:stretch>
+            <a:fillRect/>
+          </a:stretch>
+        </p:blipFill>
+        <p:spPr bwMode="auto">
+          <a:xfrm>
+            <a:off x="1262108" y="1249745"/>
+            <a:ext cx="9923755" cy="4863938"/>
+          </a:xfrm>
+          <a:prstGeom prst="rect">
+            <a:avLst/>
+          </a:prstGeom>
+          <a:noFill/>
+          <a:extLst>
+            <a:ext uri="{909E8E84-426E-40DD-AFC4-6F175D3DCCD1}">
+              <a14:hiddenFill xmlns:a14="http://schemas.microsoft.com/office/drawing/2010/main">
+                <a:solidFill>
+                  <a:srgbClr val="FFFFFF"/>
+                </a:solidFill>
+              </a14:hiddenFill>
+            </a:ext>
+          </a:extLst>
+        </p:spPr>
+      </p:pic>
+      <p:sp>
+        <p:nvSpPr>
+          <p:cNvPr id="4" name="Rectangle 3">
+            <a:extLst>
+              <a:ext uri="{FF2B5EF4-FFF2-40B4-BE49-F238E27FC236}">
+                <a16:creationId xmlns:a16="http://schemas.microsoft.com/office/drawing/2014/main" id="{EBC750CD-D7C0-8F5A-FC6C-07ADF2D8CB89}"/>
+              </a:ext>
+            </a:extLst>
+          </p:cNvPr>
+          <p:cNvSpPr>
+            <a:spLocks noChangeArrowheads="1"/>
+          </p:cNvSpPr>
+          <p:nvPr/>
+        </p:nvSpPr>
+        <p:spPr bwMode="auto">
+          <a:xfrm>
+            <a:off x="2171655" y="6172229"/>
+            <a:ext cx="7475829" cy="400110"/>
+          </a:xfrm>
+          <a:prstGeom prst="rect">
+            <a:avLst/>
+          </a:prstGeom>
+          <a:noFill/>
+          <a:ln>
+            <a:noFill/>
+          </a:ln>
+          <a:effectLst/>
+          <a:extLst>
+            <a:ext uri="{909E8E84-426E-40DD-AFC4-6F175D3DCCD1}">
+              <a14:hiddenFill xmlns:a14="http://schemas.microsoft.com/office/drawing/2010/main">
+                <a:solidFill>
+                  <a:schemeClr val="accent1"/>
+                </a:solidFill>
+              </a14:hiddenFill>
+            </a:ext>
+            <a:ext uri="{91240B29-F687-4F45-9708-019B960494DF}">
+              <a14:hiddenLine xmlns:a14="http://schemas.microsoft.com/office/drawing/2010/main" w="9525">
+                <a:solidFill>
+                  <a:schemeClr val="tx1"/>
+                </a:solidFill>
+                <a:miter lim="800000"/>
+                <a:headEnd/>
+                <a:tailEnd/>
+              </a14:hiddenLine>
+            </a:ext>
+            <a:ext uri="{AF507438-7753-43E0-B8FC-AC1667EBCBE1}">
+              <a14:hiddenEffects xmlns:a14="http://schemas.microsoft.com/office/drawing/2010/main">
+                <a:effectLst>
+                  <a:outerShdw dist="35921" dir="2700000" algn="ctr" rotWithShape="0">
+                    <a:schemeClr val="bg2"/>
+                  </a:outerShdw>
+                </a:effectLst>
+              </a14:hiddenEffects>
+            </a:ext>
+          </a:extLst>
+        </p:spPr>
+        <p:txBody>
+          <a:bodyPr vert="horz" wrap="none" lIns="91440" tIns="45720" rIns="91440" bIns="45720" numCol="1" anchor="ctr" anchorCtr="0" compatLnSpc="1">
+            <a:prstTxWarp prst="textNoShape">
+              <a:avLst/>
+            </a:prstTxWarp>
+            <a:spAutoFit/>
+          </a:bodyPr>
+          <a:lstStyle/>
+          <a:p>
+            <a:pPr marL="0" marR="0" lvl="0" indent="0" algn="ctr" defTabSz="914400" rtl="0" eaLnBrk="0" fontAlgn="base" latinLnBrk="0" hangingPunct="0">
+              <a:lnSpc>
+                <a:spcPct val="100000"/>
+              </a:lnSpc>
+              <a:spcBef>
+                <a:spcPct val="0"/>
+              </a:spcBef>
+              <a:spcAft>
+                <a:spcPct val="0"/>
+              </a:spcAft>
+              <a:buClrTx/>
+              <a:buSzTx/>
+              <a:buFontTx/>
+              <a:buNone/>
+              <a:tabLst/>
+            </a:pPr>
+            <a:r>
+              <a:rPr kumimoji="0" lang="en-US" altLang="en-US" sz="2000" b="0" i="1" u="none" strike="noStrike" cap="none" normalizeH="0" baseline="0" dirty="0">
+                <a:ln>
+                  <a:noFill/>
+                </a:ln>
+                <a:effectLst/>
+                <a:latin typeface="Times New Roman" panose="02020603050405020304" pitchFamily="18" charset="0"/>
+                <a:ea typeface="Aptos" panose="020B0004020202020204" pitchFamily="34" charset="0"/>
+                <a:cs typeface="Times New Roman" panose="02020603050405020304" pitchFamily="18" charset="0"/>
+              </a:rPr>
+              <a:t>Figure 6: Model’s Dice Coefficient Plot for 500 Images and 500 Masks</a:t>
+            </a:r>
+            <a:endParaRPr kumimoji="0" lang="en-US" altLang="en-US" sz="2000" b="0" i="0" u="none" strike="noStrike" cap="none" normalizeH="0" baseline="0" dirty="0">
+              <a:ln>
+                <a:noFill/>
+              </a:ln>
+              <a:effectLst/>
+              <a:latin typeface="Times New Roman" panose="02020603050405020304" pitchFamily="18" charset="0"/>
+              <a:cs typeface="Times New Roman" panose="02020603050405020304" pitchFamily="18" charset="0"/>
+            </a:endParaRPr>
+          </a:p>
+        </p:txBody>
+      </p:sp>
     </p:spTree>
     <p:extLst>
       <p:ext uri="{BB962C8B-B14F-4D97-AF65-F5344CB8AC3E}">
@@ -21496,62 +21661,12 @@
           </a:p>
         </p:txBody>
       </p:sp>
-      <p:sp>
-        <p:nvSpPr>
-          <p:cNvPr id="5" name="Content Placeholder 4">
+      <p:pic>
+        <p:nvPicPr>
+          <p:cNvPr id="8" name="Picture 7">
             <a:extLst>
               <a:ext uri="{FF2B5EF4-FFF2-40B4-BE49-F238E27FC236}">
-                <a16:creationId xmlns:a16="http://schemas.microsoft.com/office/drawing/2014/main" id="{09198237-3D97-4C8C-A848-18F7BEE3B21B}"/>
-              </a:ext>
-            </a:extLst>
-          </p:cNvPr>
-          <p:cNvSpPr>
-            <a:spLocks noGrp="1"/>
-          </p:cNvSpPr>
-          <p:nvPr>
-            <p:ph sz="half" idx="1"/>
-          </p:nvPr>
-        </p:nvSpPr>
-        <p:spPr/>
-        <p:txBody>
-          <a:bodyPr/>
-          <a:lstStyle/>
-          <a:p>
-            <a:endParaRPr lang="en-US"/>
-          </a:p>
-        </p:txBody>
-      </p:sp>
-      <p:sp>
-        <p:nvSpPr>
-          <p:cNvPr id="7" name="Content Placeholder 6">
-            <a:extLst>
-              <a:ext uri="{FF2B5EF4-FFF2-40B4-BE49-F238E27FC236}">
-                <a16:creationId xmlns:a16="http://schemas.microsoft.com/office/drawing/2014/main" id="{A33720BD-0F2B-43E2-A442-868FFF19794D}"/>
-              </a:ext>
-            </a:extLst>
-          </p:cNvPr>
-          <p:cNvSpPr>
-            <a:spLocks noGrp="1"/>
-          </p:cNvSpPr>
-          <p:nvPr>
-            <p:ph sz="half" idx="2"/>
-          </p:nvPr>
-        </p:nvSpPr>
-        <p:spPr/>
-        <p:txBody>
-          <a:bodyPr/>
-          <a:lstStyle/>
-          <a:p>
-            <a:endParaRPr lang="en-US" dirty="0"/>
-          </a:p>
-        </p:txBody>
-      </p:sp>
-      <p:pic>
-        <p:nvPicPr>
-          <p:cNvPr id="6" name="Content Placeholder 3">
-            <a:extLst>
-              <a:ext uri="{FF2B5EF4-FFF2-40B4-BE49-F238E27FC236}">
-                <a16:creationId xmlns:a16="http://schemas.microsoft.com/office/drawing/2014/main" id="{74123F4A-C327-492F-AE7B-1579FD8D3CCB}"/>
+                <a16:creationId xmlns:a16="http://schemas.microsoft.com/office/drawing/2014/main" id="{3A9F2B2E-4491-4483-A4D7-5E753D329AF4}"/>
               </a:ext>
             </a:extLst>
           </p:cNvPr>
@@ -21568,36 +21683,6 @@
         </p:blipFill>
         <p:spPr>
           <a:xfrm>
-            <a:off x="941033" y="1241365"/>
-            <a:ext cx="10106378" cy="5068763"/>
-          </a:xfrm>
-          <a:prstGeom prst="rect">
-            <a:avLst/>
-          </a:prstGeom>
-        </p:spPr>
-      </p:pic>
-      <p:pic>
-        <p:nvPicPr>
-          <p:cNvPr id="8" name="Picture 7">
-            <a:extLst>
-              <a:ext uri="{FF2B5EF4-FFF2-40B4-BE49-F238E27FC236}">
-                <a16:creationId xmlns:a16="http://schemas.microsoft.com/office/drawing/2014/main" id="{3A9F2B2E-4491-4483-A4D7-5E753D329AF4}"/>
-              </a:ext>
-            </a:extLst>
-          </p:cNvPr>
-          <p:cNvPicPr>
-            <a:picLocks noChangeAspect="1"/>
-          </p:cNvPicPr>
-          <p:nvPr/>
-        </p:nvPicPr>
-        <p:blipFill>
-          <a:blip r:embed="rId3"/>
-          <a:stretch>
-            <a:fillRect/>
-          </a:stretch>
-        </p:blipFill>
-        <p:spPr>
-          <a:xfrm>
             <a:off x="10667999" y="256022"/>
             <a:ext cx="1260713" cy="872978"/>
           </a:xfrm>
@@ -21606,6 +21691,226 @@
           </a:prstGeom>
         </p:spPr>
       </p:pic>
+      <p:sp>
+        <p:nvSpPr>
+          <p:cNvPr id="3" name="Rectangle 2">
+            <a:extLst>
+              <a:ext uri="{FF2B5EF4-FFF2-40B4-BE49-F238E27FC236}">
+                <a16:creationId xmlns:a16="http://schemas.microsoft.com/office/drawing/2014/main" id="{0A05F064-3B0F-31C7-C3E1-C1C4560507CC}"/>
+              </a:ext>
+            </a:extLst>
+          </p:cNvPr>
+          <p:cNvSpPr>
+            <a:spLocks noChangeArrowheads="1"/>
+          </p:cNvSpPr>
+          <p:nvPr/>
+        </p:nvSpPr>
+        <p:spPr bwMode="auto">
+          <a:xfrm>
+            <a:off x="0" y="0"/>
+            <a:ext cx="12192000" cy="457200"/>
+          </a:xfrm>
+          <a:prstGeom prst="rect">
+            <a:avLst/>
+          </a:prstGeom>
+          <a:noFill/>
+          <a:ln>
+            <a:noFill/>
+          </a:ln>
+          <a:effectLst/>
+          <a:extLst>
+            <a:ext uri="{909E8E84-426E-40DD-AFC4-6F175D3DCCD1}">
+              <a14:hiddenFill xmlns:a14="http://schemas.microsoft.com/office/drawing/2010/main">
+                <a:solidFill>
+                  <a:schemeClr val="accent1"/>
+                </a:solidFill>
+              </a14:hiddenFill>
+            </a:ext>
+            <a:ext uri="{91240B29-F687-4F45-9708-019B960494DF}">
+              <a14:hiddenLine xmlns:a14="http://schemas.microsoft.com/office/drawing/2010/main" w="9525">
+                <a:solidFill>
+                  <a:schemeClr val="tx1"/>
+                </a:solidFill>
+                <a:miter lim="800000"/>
+                <a:headEnd/>
+                <a:tailEnd/>
+              </a14:hiddenLine>
+            </a:ext>
+            <a:ext uri="{AF507438-7753-43E0-B8FC-AC1667EBCBE1}">
+              <a14:hiddenEffects xmlns:a14="http://schemas.microsoft.com/office/drawing/2010/main">
+                <a:effectLst>
+                  <a:outerShdw dist="35921" dir="2700000" algn="ctr" rotWithShape="0">
+                    <a:schemeClr val="bg2"/>
+                  </a:outerShdw>
+                </a:effectLst>
+              </a14:hiddenEffects>
+            </a:ext>
+          </a:extLst>
+        </p:spPr>
+        <p:txBody>
+          <a:bodyPr vert="horz" wrap="none" lIns="91440" tIns="45720" rIns="91440" bIns="45720" numCol="1" anchor="ctr" anchorCtr="0" compatLnSpc="1">
+            <a:prstTxWarp prst="textNoShape">
+              <a:avLst/>
+            </a:prstTxWarp>
+            <a:spAutoFit/>
+          </a:bodyPr>
+          <a:lstStyle/>
+          <a:p>
+            <a:endParaRPr lang="en-US"/>
+          </a:p>
+        </p:txBody>
+      </p:sp>
+      <p:pic>
+        <p:nvPicPr>
+          <p:cNvPr id="7169" name="Picture 11" descr="Chart&#10;&#10;Description automatically generated with medium confidence">
+            <a:extLst>
+              <a:ext uri="{FF2B5EF4-FFF2-40B4-BE49-F238E27FC236}">
+                <a16:creationId xmlns:a16="http://schemas.microsoft.com/office/drawing/2014/main" id="{260891D1-C21E-A327-D2EF-24606DB74F27}"/>
+              </a:ext>
+            </a:extLst>
+          </p:cNvPr>
+          <p:cNvPicPr>
+            <a:picLocks noChangeAspect="1" noChangeArrowheads="1"/>
+          </p:cNvPicPr>
+          <p:nvPr/>
+        </p:nvPicPr>
+        <p:blipFill>
+          <a:blip r:embed="rId3">
+            <a:extLst>
+              <a:ext uri="{28A0092B-C50C-407E-A947-70E740481C1C}">
+                <a14:useLocalDpi xmlns:a14="http://schemas.microsoft.com/office/drawing/2010/main" val="0"/>
+              </a:ext>
+            </a:extLst>
+          </a:blip>
+          <a:srcRect/>
+          <a:stretch>
+            <a:fillRect/>
+          </a:stretch>
+        </p:blipFill>
+        <p:spPr bwMode="auto">
+          <a:xfrm>
+            <a:off x="1040167" y="1249011"/>
+            <a:ext cx="10111666" cy="4859047"/>
+          </a:xfrm>
+          <a:prstGeom prst="rect">
+            <a:avLst/>
+          </a:prstGeom>
+          <a:noFill/>
+          <a:extLst>
+            <a:ext uri="{909E8E84-426E-40DD-AFC4-6F175D3DCCD1}">
+              <a14:hiddenFill xmlns:a14="http://schemas.microsoft.com/office/drawing/2010/main">
+                <a:solidFill>
+                  <a:srgbClr val="FFFFFF"/>
+                </a:solidFill>
+              </a14:hiddenFill>
+            </a:ext>
+          </a:extLst>
+        </p:spPr>
+      </p:pic>
+      <p:sp>
+        <p:nvSpPr>
+          <p:cNvPr id="4" name="Rectangle 3">
+            <a:extLst>
+              <a:ext uri="{FF2B5EF4-FFF2-40B4-BE49-F238E27FC236}">
+                <a16:creationId xmlns:a16="http://schemas.microsoft.com/office/drawing/2014/main" id="{5BAE35B2-5CF7-3F07-E5EA-5347768E52AB}"/>
+              </a:ext>
+            </a:extLst>
+          </p:cNvPr>
+          <p:cNvSpPr>
+            <a:spLocks noChangeArrowheads="1"/>
+          </p:cNvSpPr>
+          <p:nvPr/>
+        </p:nvSpPr>
+        <p:spPr bwMode="auto">
+          <a:xfrm>
+            <a:off x="2335659" y="6171506"/>
+            <a:ext cx="6277809" cy="400110"/>
+          </a:xfrm>
+          <a:prstGeom prst="rect">
+            <a:avLst/>
+          </a:prstGeom>
+          <a:noFill/>
+          <a:ln>
+            <a:noFill/>
+          </a:ln>
+          <a:effectLst/>
+          <a:extLst>
+            <a:ext uri="{909E8E84-426E-40DD-AFC4-6F175D3DCCD1}">
+              <a14:hiddenFill xmlns:a14="http://schemas.microsoft.com/office/drawing/2010/main">
+                <a:solidFill>
+                  <a:schemeClr val="accent1"/>
+                </a:solidFill>
+              </a14:hiddenFill>
+            </a:ext>
+            <a:ext uri="{91240B29-F687-4F45-9708-019B960494DF}">
+              <a14:hiddenLine xmlns:a14="http://schemas.microsoft.com/office/drawing/2010/main" w="9525">
+                <a:solidFill>
+                  <a:schemeClr val="tx1"/>
+                </a:solidFill>
+                <a:miter lim="800000"/>
+                <a:headEnd/>
+                <a:tailEnd/>
+              </a14:hiddenLine>
+            </a:ext>
+            <a:ext uri="{AF507438-7753-43E0-B8FC-AC1667EBCBE1}">
+              <a14:hiddenEffects xmlns:a14="http://schemas.microsoft.com/office/drawing/2010/main">
+                <a:effectLst>
+                  <a:outerShdw dist="35921" dir="2700000" algn="ctr" rotWithShape="0">
+                    <a:schemeClr val="bg2"/>
+                  </a:outerShdw>
+                </a:effectLst>
+              </a14:hiddenEffects>
+            </a:ext>
+          </a:extLst>
+        </p:spPr>
+        <p:txBody>
+          <a:bodyPr vert="horz" wrap="none" lIns="91440" tIns="45720" rIns="91440" bIns="45720" numCol="1" anchor="ctr" anchorCtr="0" compatLnSpc="1">
+            <a:prstTxWarp prst="textNoShape">
+              <a:avLst/>
+            </a:prstTxWarp>
+            <a:spAutoFit/>
+          </a:bodyPr>
+          <a:lstStyle/>
+          <a:p>
+            <a:pPr marL="0" marR="0" lvl="0" indent="0" algn="ctr" defTabSz="914400" rtl="0" eaLnBrk="0" fontAlgn="base" latinLnBrk="0" hangingPunct="0">
+              <a:lnSpc>
+                <a:spcPct val="100000"/>
+              </a:lnSpc>
+              <a:spcBef>
+                <a:spcPct val="0"/>
+              </a:spcBef>
+              <a:spcAft>
+                <a:spcPct val="0"/>
+              </a:spcAft>
+              <a:buClrTx/>
+              <a:buSzTx/>
+              <a:buFontTx/>
+              <a:buNone/>
+              <a:tabLst/>
+            </a:pPr>
+            <a:r>
+              <a:rPr kumimoji="0" lang="en-US" altLang="en-US" sz="2000" b="0" i="1" u="none" strike="noStrike" cap="none" normalizeH="0" baseline="0" dirty="0">
+                <a:ln>
+                  <a:noFill/>
+                </a:ln>
+                <a:effectLst/>
+                <a:latin typeface="Times New Roman" panose="02020603050405020304" pitchFamily="18" charset="0"/>
+                <a:ea typeface="Aptos" panose="020B0004020202020204" pitchFamily="34" charset="0"/>
+                <a:cs typeface="Times New Roman" panose="02020603050405020304" pitchFamily="18" charset="0"/>
+              </a:rPr>
+              <a:t>Figure 7: Model's Loss Plot for 500 Images and 500 Masks</a:t>
+            </a:r>
+            <a:endParaRPr kumimoji="0" lang="en-US" altLang="en-US" sz="2000" b="0" i="0" u="none" strike="noStrike" cap="none" normalizeH="0" baseline="0" dirty="0">
+              <a:ln>
+                <a:noFill/>
+              </a:ln>
+              <a:effectLst/>
+              <a:latin typeface="Times New Roman" panose="02020603050405020304" pitchFamily="18" charset="0"/>
+              <a:cs typeface="Times New Roman" panose="02020603050405020304" pitchFamily="18" charset="0"/>
+            </a:endParaRPr>
+          </a:p>
+        </p:txBody>
+      </p:sp>
     </p:spTree>
     <p:extLst>
       <p:ext uri="{BB962C8B-B14F-4D97-AF65-F5344CB8AC3E}">
@@ -21673,62 +21978,12 @@
           </a:p>
         </p:txBody>
       </p:sp>
-      <p:sp>
-        <p:nvSpPr>
-          <p:cNvPr id="5" name="Content Placeholder 4">
+      <p:pic>
+        <p:nvPicPr>
+          <p:cNvPr id="8" name="Picture 7">
             <a:extLst>
               <a:ext uri="{FF2B5EF4-FFF2-40B4-BE49-F238E27FC236}">
-                <a16:creationId xmlns:a16="http://schemas.microsoft.com/office/drawing/2014/main" id="{09198237-3D97-4C8C-A848-18F7BEE3B21B}"/>
-              </a:ext>
-            </a:extLst>
-          </p:cNvPr>
-          <p:cNvSpPr>
-            <a:spLocks noGrp="1"/>
-          </p:cNvSpPr>
-          <p:nvPr>
-            <p:ph sz="half" idx="1"/>
-          </p:nvPr>
-        </p:nvSpPr>
-        <p:spPr/>
-        <p:txBody>
-          <a:bodyPr/>
-          <a:lstStyle/>
-          <a:p>
-            <a:endParaRPr lang="en-US"/>
-          </a:p>
-        </p:txBody>
-      </p:sp>
-      <p:sp>
-        <p:nvSpPr>
-          <p:cNvPr id="7" name="Content Placeholder 6">
-            <a:extLst>
-              <a:ext uri="{FF2B5EF4-FFF2-40B4-BE49-F238E27FC236}">
-                <a16:creationId xmlns:a16="http://schemas.microsoft.com/office/drawing/2014/main" id="{A33720BD-0F2B-43E2-A442-868FFF19794D}"/>
-              </a:ext>
-            </a:extLst>
-          </p:cNvPr>
-          <p:cNvSpPr>
-            <a:spLocks noGrp="1"/>
-          </p:cNvSpPr>
-          <p:nvPr>
-            <p:ph sz="half" idx="2"/>
-          </p:nvPr>
-        </p:nvSpPr>
-        <p:spPr/>
-        <p:txBody>
-          <a:bodyPr/>
-          <a:lstStyle/>
-          <a:p>
-            <a:endParaRPr lang="en-US" dirty="0"/>
-          </a:p>
-        </p:txBody>
-      </p:sp>
-      <p:pic>
-        <p:nvPicPr>
-          <p:cNvPr id="6" name="Content Placeholder 3">
-            <a:extLst>
-              <a:ext uri="{FF2B5EF4-FFF2-40B4-BE49-F238E27FC236}">
-                <a16:creationId xmlns:a16="http://schemas.microsoft.com/office/drawing/2014/main" id="{40DE9DEE-6132-4993-A23F-B5C9E0C17C9E}"/>
+                <a16:creationId xmlns:a16="http://schemas.microsoft.com/office/drawing/2014/main" id="{5497B9E6-DA5D-4EC3-B722-A097D0767568}"/>
               </a:ext>
             </a:extLst>
           </p:cNvPr>
@@ -21745,36 +22000,6 @@
         </p:blipFill>
         <p:spPr>
           <a:xfrm>
-            <a:off x="875983" y="1230766"/>
-            <a:ext cx="10287631" cy="5123419"/>
-          </a:xfrm>
-          <a:prstGeom prst="rect">
-            <a:avLst/>
-          </a:prstGeom>
-        </p:spPr>
-      </p:pic>
-      <p:pic>
-        <p:nvPicPr>
-          <p:cNvPr id="8" name="Picture 7">
-            <a:extLst>
-              <a:ext uri="{FF2B5EF4-FFF2-40B4-BE49-F238E27FC236}">
-                <a16:creationId xmlns:a16="http://schemas.microsoft.com/office/drawing/2014/main" id="{5497B9E6-DA5D-4EC3-B722-A097D0767568}"/>
-              </a:ext>
-            </a:extLst>
-          </p:cNvPr>
-          <p:cNvPicPr>
-            <a:picLocks noChangeAspect="1"/>
-          </p:cNvPicPr>
-          <p:nvPr/>
-        </p:nvPicPr>
-        <p:blipFill>
-          <a:blip r:embed="rId3"/>
-          <a:stretch>
-            <a:fillRect/>
-          </a:stretch>
-        </p:blipFill>
-        <p:spPr>
-          <a:xfrm>
             <a:off x="10667999" y="256022"/>
             <a:ext cx="1260713" cy="872978"/>
           </a:xfrm>
@@ -21783,6 +22008,226 @@
           </a:prstGeom>
         </p:spPr>
       </p:pic>
+      <p:sp>
+        <p:nvSpPr>
+          <p:cNvPr id="3" name="Rectangle 2">
+            <a:extLst>
+              <a:ext uri="{FF2B5EF4-FFF2-40B4-BE49-F238E27FC236}">
+                <a16:creationId xmlns:a16="http://schemas.microsoft.com/office/drawing/2014/main" id="{FA07F29E-AF9D-2BB5-E768-17B90D164DE1}"/>
+              </a:ext>
+            </a:extLst>
+          </p:cNvPr>
+          <p:cNvSpPr>
+            <a:spLocks noChangeArrowheads="1"/>
+          </p:cNvSpPr>
+          <p:nvPr/>
+        </p:nvSpPr>
+        <p:spPr bwMode="auto">
+          <a:xfrm>
+            <a:off x="0" y="0"/>
+            <a:ext cx="12192000" cy="457200"/>
+          </a:xfrm>
+          <a:prstGeom prst="rect">
+            <a:avLst/>
+          </a:prstGeom>
+          <a:noFill/>
+          <a:ln>
+            <a:noFill/>
+          </a:ln>
+          <a:effectLst/>
+          <a:extLst>
+            <a:ext uri="{909E8E84-426E-40DD-AFC4-6F175D3DCCD1}">
+              <a14:hiddenFill xmlns:a14="http://schemas.microsoft.com/office/drawing/2010/main">
+                <a:solidFill>
+                  <a:schemeClr val="accent1"/>
+                </a:solidFill>
+              </a14:hiddenFill>
+            </a:ext>
+            <a:ext uri="{91240B29-F687-4F45-9708-019B960494DF}">
+              <a14:hiddenLine xmlns:a14="http://schemas.microsoft.com/office/drawing/2010/main" w="9525">
+                <a:solidFill>
+                  <a:schemeClr val="tx1"/>
+                </a:solidFill>
+                <a:miter lim="800000"/>
+                <a:headEnd/>
+                <a:tailEnd/>
+              </a14:hiddenLine>
+            </a:ext>
+            <a:ext uri="{AF507438-7753-43E0-B8FC-AC1667EBCBE1}">
+              <a14:hiddenEffects xmlns:a14="http://schemas.microsoft.com/office/drawing/2010/main">
+                <a:effectLst>
+                  <a:outerShdw dist="35921" dir="2700000" algn="ctr" rotWithShape="0">
+                    <a:schemeClr val="bg2"/>
+                  </a:outerShdw>
+                </a:effectLst>
+              </a14:hiddenEffects>
+            </a:ext>
+          </a:extLst>
+        </p:spPr>
+        <p:txBody>
+          <a:bodyPr vert="horz" wrap="none" lIns="91440" tIns="45720" rIns="91440" bIns="45720" numCol="1" anchor="ctr" anchorCtr="0" compatLnSpc="1">
+            <a:prstTxWarp prst="textNoShape">
+              <a:avLst/>
+            </a:prstTxWarp>
+            <a:spAutoFit/>
+          </a:bodyPr>
+          <a:lstStyle/>
+          <a:p>
+            <a:endParaRPr lang="en-US"/>
+          </a:p>
+        </p:txBody>
+      </p:sp>
+      <p:pic>
+        <p:nvPicPr>
+          <p:cNvPr id="8193" name="Picture 12" descr="Chart&#10;&#10;Description automatically generated">
+            <a:extLst>
+              <a:ext uri="{FF2B5EF4-FFF2-40B4-BE49-F238E27FC236}">
+                <a16:creationId xmlns:a16="http://schemas.microsoft.com/office/drawing/2014/main" id="{8F7F4329-15D5-49D9-0CED-908C715F22C4}"/>
+              </a:ext>
+            </a:extLst>
+          </p:cNvPr>
+          <p:cNvPicPr>
+            <a:picLocks noChangeAspect="1" noChangeArrowheads="1"/>
+          </p:cNvPicPr>
+          <p:nvPr/>
+        </p:nvPicPr>
+        <p:blipFill>
+          <a:blip r:embed="rId3">
+            <a:extLst>
+              <a:ext uri="{28A0092B-C50C-407E-A947-70E740481C1C}">
+                <a14:useLocalDpi xmlns:a14="http://schemas.microsoft.com/office/drawing/2010/main" val="0"/>
+              </a:ext>
+            </a:extLst>
+          </a:blip>
+          <a:srcRect/>
+          <a:stretch>
+            <a:fillRect/>
+          </a:stretch>
+        </p:blipFill>
+        <p:spPr bwMode="auto">
+          <a:xfrm>
+            <a:off x="1074197" y="1188985"/>
+            <a:ext cx="9898603" cy="4779390"/>
+          </a:xfrm>
+          <a:prstGeom prst="rect">
+            <a:avLst/>
+          </a:prstGeom>
+          <a:noFill/>
+          <a:extLst>
+            <a:ext uri="{909E8E84-426E-40DD-AFC4-6F175D3DCCD1}">
+              <a14:hiddenFill xmlns:a14="http://schemas.microsoft.com/office/drawing/2010/main">
+                <a:solidFill>
+                  <a:srgbClr val="FFFFFF"/>
+                </a:solidFill>
+              </a14:hiddenFill>
+            </a:ext>
+          </a:extLst>
+        </p:spPr>
+      </p:pic>
+      <p:sp>
+        <p:nvSpPr>
+          <p:cNvPr id="4" name="Rectangle 3">
+            <a:extLst>
+              <a:ext uri="{FF2B5EF4-FFF2-40B4-BE49-F238E27FC236}">
+                <a16:creationId xmlns:a16="http://schemas.microsoft.com/office/drawing/2014/main" id="{4DC0B1EC-1E25-5D78-EF6D-A4286A97E9B6}"/>
+              </a:ext>
+            </a:extLst>
+          </p:cNvPr>
+          <p:cNvSpPr>
+            <a:spLocks noChangeArrowheads="1"/>
+          </p:cNvSpPr>
+          <p:nvPr/>
+        </p:nvSpPr>
+        <p:spPr bwMode="auto">
+          <a:xfrm>
+            <a:off x="2575220" y="6173323"/>
+            <a:ext cx="6704208" cy="400110"/>
+          </a:xfrm>
+          <a:prstGeom prst="rect">
+            <a:avLst/>
+          </a:prstGeom>
+          <a:noFill/>
+          <a:ln>
+            <a:noFill/>
+          </a:ln>
+          <a:effectLst/>
+          <a:extLst>
+            <a:ext uri="{909E8E84-426E-40DD-AFC4-6F175D3DCCD1}">
+              <a14:hiddenFill xmlns:a14="http://schemas.microsoft.com/office/drawing/2010/main">
+                <a:solidFill>
+                  <a:schemeClr val="accent1"/>
+                </a:solidFill>
+              </a14:hiddenFill>
+            </a:ext>
+            <a:ext uri="{91240B29-F687-4F45-9708-019B960494DF}">
+              <a14:hiddenLine xmlns:a14="http://schemas.microsoft.com/office/drawing/2010/main" w="9525">
+                <a:solidFill>
+                  <a:schemeClr val="tx1"/>
+                </a:solidFill>
+                <a:miter lim="800000"/>
+                <a:headEnd/>
+                <a:tailEnd/>
+              </a14:hiddenLine>
+            </a:ext>
+            <a:ext uri="{AF507438-7753-43E0-B8FC-AC1667EBCBE1}">
+              <a14:hiddenEffects xmlns:a14="http://schemas.microsoft.com/office/drawing/2010/main">
+                <a:effectLst>
+                  <a:outerShdw dist="35921" dir="2700000" algn="ctr" rotWithShape="0">
+                    <a:schemeClr val="bg2"/>
+                  </a:outerShdw>
+                </a:effectLst>
+              </a14:hiddenEffects>
+            </a:ext>
+          </a:extLst>
+        </p:spPr>
+        <p:txBody>
+          <a:bodyPr vert="horz" wrap="none" lIns="91440" tIns="45720" rIns="91440" bIns="45720" numCol="1" anchor="ctr" anchorCtr="0" compatLnSpc="1">
+            <a:prstTxWarp prst="textNoShape">
+              <a:avLst/>
+            </a:prstTxWarp>
+            <a:spAutoFit/>
+          </a:bodyPr>
+          <a:lstStyle/>
+          <a:p>
+            <a:pPr marL="0" marR="0" lvl="0" indent="0" algn="ctr" defTabSz="914400" rtl="0" eaLnBrk="0" fontAlgn="base" latinLnBrk="0" hangingPunct="0">
+              <a:lnSpc>
+                <a:spcPct val="100000"/>
+              </a:lnSpc>
+              <a:spcBef>
+                <a:spcPct val="0"/>
+              </a:spcBef>
+              <a:spcAft>
+                <a:spcPct val="0"/>
+              </a:spcAft>
+              <a:buClrTx/>
+              <a:buSzTx/>
+              <a:buFontTx/>
+              <a:buNone/>
+              <a:tabLst/>
+            </a:pPr>
+            <a:r>
+              <a:rPr kumimoji="0" lang="en-US" altLang="en-US" sz="2000" b="0" i="1" u="none" strike="noStrike" cap="none" normalizeH="0" baseline="0" dirty="0">
+                <a:ln>
+                  <a:noFill/>
+                </a:ln>
+                <a:effectLst/>
+                <a:latin typeface="Times New Roman" panose="02020603050405020304" pitchFamily="18" charset="0"/>
+                <a:ea typeface="Aptos" panose="020B0004020202020204" pitchFamily="34" charset="0"/>
+                <a:cs typeface="Times New Roman" panose="02020603050405020304" pitchFamily="18" charset="0"/>
+              </a:rPr>
+              <a:t>Figure 8: Model Sensitivity Plot for 500 Images and 500 Masks</a:t>
+            </a:r>
+            <a:endParaRPr kumimoji="0" lang="en-US" altLang="en-US" sz="2000" b="0" i="0" u="none" strike="noStrike" cap="none" normalizeH="0" baseline="0" dirty="0">
+              <a:ln>
+                <a:noFill/>
+              </a:ln>
+              <a:effectLst/>
+              <a:latin typeface="Times New Roman" panose="02020603050405020304" pitchFamily="18" charset="0"/>
+              <a:cs typeface="Times New Roman" panose="02020603050405020304" pitchFamily="18" charset="0"/>
+            </a:endParaRPr>
+          </a:p>
+        </p:txBody>
+      </p:sp>
     </p:spTree>
     <p:extLst>
       <p:ext uri="{BB962C8B-B14F-4D97-AF65-F5344CB8AC3E}">
@@ -21797,183 +22242,6 @@
 </file>
 
 <file path=ppt/slides/slide13.xml><?xml version="1.0" encoding="utf-8"?>
-<p:sld xmlns:a="http://schemas.openxmlformats.org/drawingml/2006/main" xmlns:r="http://schemas.openxmlformats.org/officeDocument/2006/relationships" xmlns:p="http://schemas.openxmlformats.org/presentationml/2006/main">
-  <p:cSld>
-    <p:spTree>
-      <p:nvGrpSpPr>
-        <p:cNvPr id="1" name=""/>
-        <p:cNvGrpSpPr/>
-        <p:nvPr/>
-      </p:nvGrpSpPr>
-      <p:grpSpPr>
-        <a:xfrm>
-          <a:off x="0" y="0"/>
-          <a:ext cx="0" cy="0"/>
-          <a:chOff x="0" y="0"/>
-          <a:chExt cx="0" cy="0"/>
-        </a:xfrm>
-      </p:grpSpPr>
-      <p:sp>
-        <p:nvSpPr>
-          <p:cNvPr id="2" name="Title 1">
-            <a:extLst>
-              <a:ext uri="{FF2B5EF4-FFF2-40B4-BE49-F238E27FC236}">
-                <a16:creationId xmlns:a16="http://schemas.microsoft.com/office/drawing/2014/main" id="{34DB6CE4-2B13-4715-B5B2-615A55922CA1}"/>
-              </a:ext>
-            </a:extLst>
-          </p:cNvPr>
-          <p:cNvSpPr>
-            <a:spLocks noGrp="1"/>
-          </p:cNvSpPr>
-          <p:nvPr>
-            <p:ph type="title"/>
-          </p:nvPr>
-        </p:nvSpPr>
-        <p:spPr>
-          <a:xfrm>
-            <a:off x="3485118" y="256022"/>
-            <a:ext cx="6164909" cy="756560"/>
-          </a:xfrm>
-        </p:spPr>
-        <p:txBody>
-          <a:bodyPr>
-            <a:normAutofit/>
-          </a:bodyPr>
-          <a:lstStyle/>
-          <a:p>
-            <a:r>
-              <a:rPr lang="en-US" sz="4400" dirty="0">
-                <a:latin typeface="Rockwell" panose="02060603020205020403" pitchFamily="18" charset="0"/>
-              </a:rPr>
-              <a:t>U-Net Model Result</a:t>
-            </a:r>
-          </a:p>
-        </p:txBody>
-      </p:sp>
-      <p:sp>
-        <p:nvSpPr>
-          <p:cNvPr id="5" name="Content Placeholder 4">
-            <a:extLst>
-              <a:ext uri="{FF2B5EF4-FFF2-40B4-BE49-F238E27FC236}">
-                <a16:creationId xmlns:a16="http://schemas.microsoft.com/office/drawing/2014/main" id="{09198237-3D97-4C8C-A848-18F7BEE3B21B}"/>
-              </a:ext>
-            </a:extLst>
-          </p:cNvPr>
-          <p:cNvSpPr>
-            <a:spLocks noGrp="1"/>
-          </p:cNvSpPr>
-          <p:nvPr>
-            <p:ph sz="half" idx="1"/>
-          </p:nvPr>
-        </p:nvSpPr>
-        <p:spPr/>
-        <p:txBody>
-          <a:bodyPr/>
-          <a:lstStyle/>
-          <a:p>
-            <a:endParaRPr lang="en-US"/>
-          </a:p>
-        </p:txBody>
-      </p:sp>
-      <p:sp>
-        <p:nvSpPr>
-          <p:cNvPr id="7" name="Content Placeholder 6">
-            <a:extLst>
-              <a:ext uri="{FF2B5EF4-FFF2-40B4-BE49-F238E27FC236}">
-                <a16:creationId xmlns:a16="http://schemas.microsoft.com/office/drawing/2014/main" id="{A33720BD-0F2B-43E2-A442-868FFF19794D}"/>
-              </a:ext>
-            </a:extLst>
-          </p:cNvPr>
-          <p:cNvSpPr>
-            <a:spLocks noGrp="1"/>
-          </p:cNvSpPr>
-          <p:nvPr>
-            <p:ph sz="half" idx="2"/>
-          </p:nvPr>
-        </p:nvSpPr>
-        <p:spPr/>
-        <p:txBody>
-          <a:bodyPr/>
-          <a:lstStyle/>
-          <a:p>
-            <a:endParaRPr lang="en-US" dirty="0"/>
-          </a:p>
-        </p:txBody>
-      </p:sp>
-      <p:pic>
-        <p:nvPicPr>
-          <p:cNvPr id="6" name="Content Placeholder 6">
-            <a:extLst>
-              <a:ext uri="{FF2B5EF4-FFF2-40B4-BE49-F238E27FC236}">
-                <a16:creationId xmlns:a16="http://schemas.microsoft.com/office/drawing/2014/main" id="{8FACAC29-4E12-43F6-8A87-39AF825D040A}"/>
-              </a:ext>
-            </a:extLst>
-          </p:cNvPr>
-          <p:cNvPicPr>
-            <a:picLocks noChangeAspect="1"/>
-          </p:cNvPicPr>
-          <p:nvPr/>
-        </p:nvPicPr>
-        <p:blipFill>
-          <a:blip r:embed="rId2"/>
-          <a:stretch>
-            <a:fillRect/>
-          </a:stretch>
-        </p:blipFill>
-        <p:spPr>
-          <a:xfrm>
-            <a:off x="594804" y="1216240"/>
-            <a:ext cx="11008311" cy="5295469"/>
-          </a:xfrm>
-          <a:prstGeom prst="rect">
-            <a:avLst/>
-          </a:prstGeom>
-        </p:spPr>
-      </p:pic>
-      <p:pic>
-        <p:nvPicPr>
-          <p:cNvPr id="8" name="Picture 7">
-            <a:extLst>
-              <a:ext uri="{FF2B5EF4-FFF2-40B4-BE49-F238E27FC236}">
-                <a16:creationId xmlns:a16="http://schemas.microsoft.com/office/drawing/2014/main" id="{02DC82F4-9AFF-4838-8AEB-E4E0FE7361F3}"/>
-              </a:ext>
-            </a:extLst>
-          </p:cNvPr>
-          <p:cNvPicPr>
-            <a:picLocks noChangeAspect="1"/>
-          </p:cNvPicPr>
-          <p:nvPr/>
-        </p:nvPicPr>
-        <p:blipFill>
-          <a:blip r:embed="rId3"/>
-          <a:stretch>
-            <a:fillRect/>
-          </a:stretch>
-        </p:blipFill>
-        <p:spPr>
-          <a:xfrm>
-            <a:off x="10667999" y="256022"/>
-            <a:ext cx="1260713" cy="872978"/>
-          </a:xfrm>
-          <a:prstGeom prst="rect">
-            <a:avLst/>
-          </a:prstGeom>
-        </p:spPr>
-      </p:pic>
-    </p:spTree>
-    <p:extLst>
-      <p:ext uri="{BB962C8B-B14F-4D97-AF65-F5344CB8AC3E}">
-        <p14:creationId xmlns:p14="http://schemas.microsoft.com/office/powerpoint/2010/main" val="2255526437"/>
-      </p:ext>
-    </p:extLst>
-  </p:cSld>
-  <p:clrMapOvr>
-    <a:masterClrMapping/>
-  </p:clrMapOvr>
-</p:sld>
-</file>
-
-<file path=ppt/slides/slide14.xml><?xml version="1.0" encoding="utf-8"?>
 <p:sld xmlns:a="http://schemas.openxmlformats.org/drawingml/2006/main" xmlns:r="http://schemas.openxmlformats.org/officeDocument/2006/relationships" xmlns:p="http://schemas.openxmlformats.org/presentationml/2006/main">
   <p:cSld>
     <p:spTree>
@@ -22051,8 +22319,8 @@
         </p:blipFill>
         <p:spPr>
           <a:xfrm>
-            <a:off x="1731146" y="1429305"/>
-            <a:ext cx="9339308" cy="4382224"/>
+            <a:off x="933634" y="1291451"/>
+            <a:ext cx="10324731" cy="4603002"/>
           </a:xfrm>
         </p:spPr>
       </p:pic>
@@ -22086,6 +22354,130 @@
           </a:prstGeom>
         </p:spPr>
       </p:pic>
+      <p:sp>
+        <p:nvSpPr>
+          <p:cNvPr id="3" name="Rectangle 2">
+            <a:extLst>
+              <a:ext uri="{FF2B5EF4-FFF2-40B4-BE49-F238E27FC236}">
+                <a16:creationId xmlns:a16="http://schemas.microsoft.com/office/drawing/2014/main" id="{73EB0C38-1016-76C6-CB98-E21567E1E581}"/>
+              </a:ext>
+            </a:extLst>
+          </p:cNvPr>
+          <p:cNvSpPr>
+            <a:spLocks noChangeArrowheads="1"/>
+          </p:cNvSpPr>
+          <p:nvPr/>
+        </p:nvSpPr>
+        <p:spPr bwMode="auto">
+          <a:xfrm>
+            <a:off x="4102016" y="6173323"/>
+            <a:ext cx="3650615" cy="400110"/>
+          </a:xfrm>
+          <a:prstGeom prst="rect">
+            <a:avLst/>
+          </a:prstGeom>
+          <a:noFill/>
+          <a:ln>
+            <a:noFill/>
+          </a:ln>
+          <a:effectLst/>
+          <a:extLst>
+            <a:ext uri="{909E8E84-426E-40DD-AFC4-6F175D3DCCD1}">
+              <a14:hiddenFill xmlns:a14="http://schemas.microsoft.com/office/drawing/2010/main">
+                <a:solidFill>
+                  <a:schemeClr val="accent1"/>
+                </a:solidFill>
+              </a14:hiddenFill>
+            </a:ext>
+            <a:ext uri="{91240B29-F687-4F45-9708-019B960494DF}">
+              <a14:hiddenLine xmlns:a14="http://schemas.microsoft.com/office/drawing/2010/main" w="9525">
+                <a:solidFill>
+                  <a:schemeClr val="tx1"/>
+                </a:solidFill>
+                <a:miter lim="800000"/>
+                <a:headEnd/>
+                <a:tailEnd/>
+              </a14:hiddenLine>
+            </a:ext>
+            <a:ext uri="{AF507438-7753-43E0-B8FC-AC1667EBCBE1}">
+              <a14:hiddenEffects xmlns:a14="http://schemas.microsoft.com/office/drawing/2010/main">
+                <a:effectLst>
+                  <a:outerShdw dist="35921" dir="2700000" algn="ctr" rotWithShape="0">
+                    <a:schemeClr val="bg2"/>
+                  </a:outerShdw>
+                </a:effectLst>
+              </a14:hiddenEffects>
+            </a:ext>
+          </a:extLst>
+        </p:spPr>
+        <p:txBody>
+          <a:bodyPr vert="horz" wrap="none" lIns="91440" tIns="45720" rIns="91440" bIns="45720" numCol="1" anchor="ctr" anchorCtr="0" compatLnSpc="1">
+            <a:prstTxWarp prst="textNoShape">
+              <a:avLst/>
+            </a:prstTxWarp>
+            <a:spAutoFit/>
+          </a:bodyPr>
+          <a:lstStyle/>
+          <a:p>
+            <a:pPr marL="0" marR="0" lvl="0" indent="0" algn="ctr" defTabSz="914400" rtl="0" eaLnBrk="0" fontAlgn="base" latinLnBrk="0" hangingPunct="0">
+              <a:lnSpc>
+                <a:spcPct val="100000"/>
+              </a:lnSpc>
+              <a:spcBef>
+                <a:spcPct val="0"/>
+              </a:spcBef>
+              <a:spcAft>
+                <a:spcPct val="0"/>
+              </a:spcAft>
+              <a:buClrTx/>
+              <a:buSzTx/>
+              <a:buFontTx/>
+              <a:buNone/>
+              <a:tabLst/>
+            </a:pPr>
+            <a:r>
+              <a:rPr kumimoji="0" lang="en-US" altLang="en-US" sz="2000" b="0" i="1" u="none" strike="noStrike" cap="none" normalizeH="0" baseline="0" dirty="0">
+                <a:ln>
+                  <a:noFill/>
+                </a:ln>
+                <a:effectLst/>
+                <a:latin typeface="Times New Roman" panose="02020603050405020304" pitchFamily="18" charset="0"/>
+                <a:ea typeface="Aptos" panose="020B0004020202020204" pitchFamily="34" charset="0"/>
+                <a:cs typeface="Times New Roman" panose="02020603050405020304" pitchFamily="18" charset="0"/>
+              </a:rPr>
+              <a:t>Figure </a:t>
+            </a:r>
+            <a:r>
+              <a:rPr lang="en-US" altLang="en-US" sz="2000" i="1" dirty="0">
+                <a:latin typeface="Times New Roman" panose="02020603050405020304" pitchFamily="18" charset="0"/>
+                <a:ea typeface="Aptos" panose="020B0004020202020204" pitchFamily="34" charset="0"/>
+                <a:cs typeface="Times New Roman" panose="02020603050405020304" pitchFamily="18" charset="0"/>
+              </a:rPr>
+              <a:t>9</a:t>
+            </a:r>
+            <a:r>
+              <a:rPr kumimoji="0" lang="en-US" altLang="en-US" sz="2000" b="0" i="1" u="none" strike="noStrike" cap="none" normalizeH="0" baseline="0" dirty="0">
+                <a:ln>
+                  <a:noFill/>
+                </a:ln>
+                <a:effectLst/>
+                <a:latin typeface="Times New Roman" panose="02020603050405020304" pitchFamily="18" charset="0"/>
+                <a:ea typeface="Aptos" panose="020B0004020202020204" pitchFamily="34" charset="0"/>
+                <a:cs typeface="Times New Roman" panose="02020603050405020304" pitchFamily="18" charset="0"/>
+              </a:rPr>
+              <a:t>: Image-Mask-Prediction</a:t>
+            </a:r>
+            <a:endParaRPr kumimoji="0" lang="en-US" altLang="en-US" sz="2000" b="0" i="0" u="none" strike="noStrike" cap="none" normalizeH="0" baseline="0" dirty="0">
+              <a:ln>
+                <a:noFill/>
+              </a:ln>
+              <a:effectLst/>
+              <a:latin typeface="Times New Roman" panose="02020603050405020304" pitchFamily="18" charset="0"/>
+              <a:cs typeface="Times New Roman" panose="02020603050405020304" pitchFamily="18" charset="0"/>
+            </a:endParaRPr>
+          </a:p>
+        </p:txBody>
+      </p:sp>
     </p:spTree>
     <p:extLst>
       <p:ext uri="{BB962C8B-B14F-4D97-AF65-F5344CB8AC3E}">
@@ -22099,7 +22491,7 @@
 </p:sld>
 </file>
 
-<file path=ppt/slides/slide15.xml><?xml version="1.0" encoding="utf-8"?>
+<file path=ppt/slides/slide14.xml><?xml version="1.0" encoding="utf-8"?>
 <p:sld xmlns:a="http://schemas.openxmlformats.org/drawingml/2006/main" xmlns:r="http://schemas.openxmlformats.org/officeDocument/2006/relationships" xmlns:p="http://schemas.openxmlformats.org/presentationml/2006/main">
   <p:cSld>
     <p:spTree>
@@ -22274,7 +22666,7 @@
 </p:sld>
 </file>
 
-<file path=ppt/slides/slide16.xml><?xml version="1.0" encoding="utf-8"?>
+<file path=ppt/slides/slide15.xml><?xml version="1.0" encoding="utf-8"?>
 <p:sld xmlns:a="http://schemas.openxmlformats.org/drawingml/2006/main" xmlns:r="http://schemas.openxmlformats.org/officeDocument/2006/relationships" xmlns:p="http://schemas.openxmlformats.org/presentationml/2006/main">
   <p:cSld>
     <p:spTree>
@@ -22293,113 +22685,224 @@
       </p:grpSpPr>
       <p:sp>
         <p:nvSpPr>
-          <p:cNvPr id="2" name="Title 1">
+          <p:cNvPr id="3" name="Rectangle 2">
             <a:extLst>
               <a:ext uri="{FF2B5EF4-FFF2-40B4-BE49-F238E27FC236}">
-                <a16:creationId xmlns:a16="http://schemas.microsoft.com/office/drawing/2014/main" id="{34DB6CE4-2B13-4715-B5B2-615A55922CA1}"/>
+                <a16:creationId xmlns:a16="http://schemas.microsoft.com/office/drawing/2014/main" id="{F20CE6D6-A029-33C9-FC9E-6432DAD20A60}"/>
               </a:ext>
             </a:extLst>
           </p:cNvPr>
           <p:cNvSpPr>
-            <a:spLocks noGrp="1"/>
+            <a:spLocks noChangeArrowheads="1"/>
           </p:cNvSpPr>
-          <p:nvPr>
-            <p:ph type="title"/>
-          </p:nvPr>
+          <p:nvPr/>
         </p:nvSpPr>
-        <p:spPr/>
+        <p:spPr bwMode="auto">
+          <a:xfrm>
+            <a:off x="0" y="0"/>
+            <a:ext cx="12192000" cy="457200"/>
+          </a:xfrm>
+          <a:prstGeom prst="rect">
+            <a:avLst/>
+          </a:prstGeom>
+          <a:noFill/>
+          <a:ln>
+            <a:noFill/>
+          </a:ln>
+          <a:effectLst/>
+          <a:extLst>
+            <a:ext uri="{909E8E84-426E-40DD-AFC4-6F175D3DCCD1}">
+              <a14:hiddenFill xmlns:a14="http://schemas.microsoft.com/office/drawing/2010/main">
+                <a:solidFill>
+                  <a:schemeClr val="accent1"/>
+                </a:solidFill>
+              </a14:hiddenFill>
+            </a:ext>
+            <a:ext uri="{91240B29-F687-4F45-9708-019B960494DF}">
+              <a14:hiddenLine xmlns:a14="http://schemas.microsoft.com/office/drawing/2010/main" w="9525">
+                <a:solidFill>
+                  <a:schemeClr val="tx1"/>
+                </a:solidFill>
+                <a:miter lim="800000"/>
+                <a:headEnd/>
+                <a:tailEnd/>
+              </a14:hiddenLine>
+            </a:ext>
+            <a:ext uri="{AF507438-7753-43E0-B8FC-AC1667EBCBE1}">
+              <a14:hiddenEffects xmlns:a14="http://schemas.microsoft.com/office/drawing/2010/main">
+                <a:effectLst>
+                  <a:outerShdw dist="35921" dir="2700000" algn="ctr" rotWithShape="0">
+                    <a:schemeClr val="bg2"/>
+                  </a:outerShdw>
+                </a:effectLst>
+              </a14:hiddenEffects>
+            </a:ext>
+          </a:extLst>
+        </p:spPr>
         <p:txBody>
-          <a:bodyPr>
-            <a:normAutofit/>
+          <a:bodyPr vert="horz" wrap="none" lIns="91440" tIns="45720" rIns="91440" bIns="45720" numCol="1" anchor="ctr" anchorCtr="0" compatLnSpc="1">
+            <a:prstTxWarp prst="textNoShape">
+              <a:avLst/>
+            </a:prstTxWarp>
+            <a:spAutoFit/>
           </a:bodyPr>
-          <a:lstStyle/>
-          <a:p>
-            <a:endParaRPr lang="en-US" sz="4400" dirty="0">
-              <a:latin typeface="Rockwell" panose="02060603020205020403" pitchFamily="18" charset="0"/>
-            </a:endParaRPr>
-          </a:p>
-        </p:txBody>
-      </p:sp>
-      <p:sp>
-        <p:nvSpPr>
-          <p:cNvPr id="5" name="Content Placeholder 4">
-            <a:extLst>
-              <a:ext uri="{FF2B5EF4-FFF2-40B4-BE49-F238E27FC236}">
-                <a16:creationId xmlns:a16="http://schemas.microsoft.com/office/drawing/2014/main" id="{09198237-3D97-4C8C-A848-18F7BEE3B21B}"/>
-              </a:ext>
-            </a:extLst>
-          </p:cNvPr>
-          <p:cNvSpPr>
-            <a:spLocks noGrp="1"/>
-          </p:cNvSpPr>
-          <p:nvPr>
-            <p:ph sz="half" idx="1"/>
-          </p:nvPr>
-        </p:nvSpPr>
-        <p:spPr/>
-        <p:txBody>
-          <a:bodyPr/>
           <a:lstStyle/>
           <a:p>
             <a:endParaRPr lang="en-US"/>
           </a:p>
         </p:txBody>
       </p:sp>
+      <p:pic>
+        <p:nvPicPr>
+          <p:cNvPr id="1025" name="Picture 1" descr="Chart">
+            <a:extLst>
+              <a:ext uri="{FF2B5EF4-FFF2-40B4-BE49-F238E27FC236}">
+                <a16:creationId xmlns:a16="http://schemas.microsoft.com/office/drawing/2014/main" id="{370117DB-E1C7-1141-61D2-BAF074E7D21D}"/>
+              </a:ext>
+            </a:extLst>
+          </p:cNvPr>
+          <p:cNvPicPr>
+            <a:picLocks noChangeAspect="1" noChangeArrowheads="1"/>
+          </p:cNvPicPr>
+          <p:nvPr/>
+        </p:nvPicPr>
+        <p:blipFill>
+          <a:blip r:embed="rId2">
+            <a:extLst>
+              <a:ext uri="{28A0092B-C50C-407E-A947-70E740481C1C}">
+                <a14:useLocalDpi xmlns:a14="http://schemas.microsoft.com/office/drawing/2010/main" val="0"/>
+              </a:ext>
+            </a:extLst>
+          </a:blip>
+          <a:srcRect/>
+          <a:stretch>
+            <a:fillRect/>
+          </a:stretch>
+        </p:blipFill>
+        <p:spPr bwMode="auto">
+          <a:xfrm>
+            <a:off x="1040167" y="457200"/>
+            <a:ext cx="10111666" cy="5625952"/>
+          </a:xfrm>
+          <a:prstGeom prst="rect">
+            <a:avLst/>
+          </a:prstGeom>
+          <a:noFill/>
+          <a:extLst>
+            <a:ext uri="{909E8E84-426E-40DD-AFC4-6F175D3DCCD1}">
+              <a14:hiddenFill xmlns:a14="http://schemas.microsoft.com/office/drawing/2010/main">
+                <a:solidFill>
+                  <a:srgbClr val="FFFFFF"/>
+                </a:solidFill>
+              </a14:hiddenFill>
+            </a:ext>
+          </a:extLst>
+        </p:spPr>
+      </p:pic>
       <p:sp>
         <p:nvSpPr>
-          <p:cNvPr id="7" name="Content Placeholder 6">
+          <p:cNvPr id="4" name="Rectangle 3">
             <a:extLst>
               <a:ext uri="{FF2B5EF4-FFF2-40B4-BE49-F238E27FC236}">
-                <a16:creationId xmlns:a16="http://schemas.microsoft.com/office/drawing/2014/main" id="{A33720BD-0F2B-43E2-A442-868FFF19794D}"/>
+                <a16:creationId xmlns:a16="http://schemas.microsoft.com/office/drawing/2014/main" id="{D400471D-FF42-BF48-DA50-C0C995E112DB}"/>
               </a:ext>
             </a:extLst>
           </p:cNvPr>
           <p:cNvSpPr>
-            <a:spLocks noGrp="1"/>
+            <a:spLocks noChangeArrowheads="1"/>
           </p:cNvSpPr>
-          <p:nvPr>
-            <p:ph sz="half" idx="2"/>
-          </p:nvPr>
+          <p:nvPr/>
         </p:nvSpPr>
-        <p:spPr/>
-        <p:txBody>
-          <a:bodyPr/>
-          <a:lstStyle/>
-          <a:p>
-            <a:endParaRPr lang="en-US" dirty="0"/>
-          </a:p>
-        </p:txBody>
-      </p:sp>
-      <p:pic>
-        <p:nvPicPr>
-          <p:cNvPr id="8" name="Content Placeholder 3">
-            <a:extLst>
-              <a:ext uri="{FF2B5EF4-FFF2-40B4-BE49-F238E27FC236}">
-                <a16:creationId xmlns:a16="http://schemas.microsoft.com/office/drawing/2014/main" id="{8A0DBDC5-22C1-47F3-A976-CF1B9C5B6E48}"/>
-              </a:ext>
-            </a:extLst>
-          </p:cNvPr>
-          <p:cNvPicPr>
-            <a:picLocks noChangeAspect="1"/>
-          </p:cNvPicPr>
-          <p:nvPr/>
-        </p:nvPicPr>
-        <p:blipFill>
-          <a:blip r:embed="rId2"/>
-          <a:stretch>
-            <a:fillRect/>
-          </a:stretch>
-        </p:blipFill>
-        <p:spPr>
+        <p:spPr bwMode="auto">
           <a:xfrm>
-            <a:off x="1017790" y="521563"/>
-            <a:ext cx="10153244" cy="5814873"/>
+            <a:off x="2875342" y="6200745"/>
+            <a:ext cx="5109669" cy="400110"/>
           </a:xfrm>
           <a:prstGeom prst="rect">
             <a:avLst/>
           </a:prstGeom>
+          <a:noFill/>
+          <a:ln>
+            <a:noFill/>
+          </a:ln>
+          <a:effectLst/>
+          <a:extLst>
+            <a:ext uri="{909E8E84-426E-40DD-AFC4-6F175D3DCCD1}">
+              <a14:hiddenFill xmlns:a14="http://schemas.microsoft.com/office/drawing/2010/main">
+                <a:solidFill>
+                  <a:schemeClr val="accent1"/>
+                </a:solidFill>
+              </a14:hiddenFill>
+            </a:ext>
+            <a:ext uri="{91240B29-F687-4F45-9708-019B960494DF}">
+              <a14:hiddenLine xmlns:a14="http://schemas.microsoft.com/office/drawing/2010/main" w="9525">
+                <a:solidFill>
+                  <a:schemeClr val="tx1"/>
+                </a:solidFill>
+                <a:miter lim="800000"/>
+                <a:headEnd/>
+                <a:tailEnd/>
+              </a14:hiddenLine>
+            </a:ext>
+            <a:ext uri="{AF507438-7753-43E0-B8FC-AC1667EBCBE1}">
+              <a14:hiddenEffects xmlns:a14="http://schemas.microsoft.com/office/drawing/2010/main">
+                <a:effectLst>
+                  <a:outerShdw dist="35921" dir="2700000" algn="ctr" rotWithShape="0">
+                    <a:schemeClr val="bg2"/>
+                  </a:outerShdw>
+                </a:effectLst>
+              </a14:hiddenEffects>
+            </a:ext>
+          </a:extLst>
         </p:spPr>
-      </p:pic>
+        <p:txBody>
+          <a:bodyPr vert="horz" wrap="none" lIns="91440" tIns="45720" rIns="91440" bIns="45720" numCol="1" anchor="ctr" anchorCtr="0" compatLnSpc="1">
+            <a:prstTxWarp prst="textNoShape">
+              <a:avLst/>
+            </a:prstTxWarp>
+            <a:spAutoFit/>
+          </a:bodyPr>
+          <a:lstStyle/>
+          <a:p>
+            <a:pPr marL="0" marR="0" lvl="0" indent="0" algn="ctr" defTabSz="914400" rtl="0" eaLnBrk="0" fontAlgn="base" latinLnBrk="0" hangingPunct="0">
+              <a:lnSpc>
+                <a:spcPct val="100000"/>
+              </a:lnSpc>
+              <a:spcBef>
+                <a:spcPct val="0"/>
+              </a:spcBef>
+              <a:spcAft>
+                <a:spcPct val="0"/>
+              </a:spcAft>
+              <a:buClrTx/>
+              <a:buSzTx/>
+              <a:buFontTx/>
+              <a:buNone/>
+              <a:tabLst/>
+            </a:pPr>
+            <a:r>
+              <a:rPr kumimoji="0" lang="en-US" altLang="en-US" sz="2000" b="0" i="1" u="none" strike="noStrike" cap="none" normalizeH="0" baseline="0" dirty="0">
+                <a:ln>
+                  <a:noFill/>
+                </a:ln>
+                <a:effectLst/>
+                <a:latin typeface="Times New Roman" panose="02020603050405020304" pitchFamily="18" charset="0"/>
+                <a:ea typeface="Aptos" panose="020B0004020202020204" pitchFamily="34" charset="0"/>
+                <a:cs typeface="Times New Roman" panose="02020603050405020304" pitchFamily="18" charset="0"/>
+              </a:rPr>
+              <a:t>Figure 12: U-Net Model Architecture (U-shape)</a:t>
+            </a:r>
+            <a:endParaRPr kumimoji="0" lang="en-US" altLang="en-US" sz="2000" b="0" i="0" u="none" strike="noStrike" cap="none" normalizeH="0" baseline="0" dirty="0">
+              <a:ln>
+                <a:noFill/>
+              </a:ln>
+              <a:effectLst/>
+              <a:latin typeface="Times New Roman" panose="02020603050405020304" pitchFamily="18" charset="0"/>
+              <a:cs typeface="Times New Roman" panose="02020603050405020304" pitchFamily="18" charset="0"/>
+            </a:endParaRPr>
+          </a:p>
+        </p:txBody>
+      </p:sp>
     </p:spTree>
     <p:extLst>
       <p:ext uri="{BB962C8B-B14F-4D97-AF65-F5344CB8AC3E}">
@@ -22413,7 +22916,7 @@
 </p:sld>
 </file>
 
-<file path=ppt/slides/slide17.xml><?xml version="1.0" encoding="utf-8"?>
+<file path=ppt/slides/slide16.xml><?xml version="1.0" encoding="utf-8"?>
 <p:sld xmlns:a="http://schemas.openxmlformats.org/drawingml/2006/main" xmlns:r="http://schemas.openxmlformats.org/officeDocument/2006/relationships" xmlns:p="http://schemas.openxmlformats.org/presentationml/2006/main">
   <p:cSld>
     <p:spTree>
@@ -22568,7 +23071,7 @@
 </p:sld>
 </file>
 
-<file path=ppt/slides/slide18.xml><?xml version="1.0" encoding="utf-8"?>
+<file path=ppt/slides/slide17.xml><?xml version="1.0" encoding="utf-8"?>
 <p:sld xmlns:a="http://schemas.openxmlformats.org/drawingml/2006/main" xmlns:r="http://schemas.openxmlformats.org/officeDocument/2006/relationships" xmlns:p="http://schemas.openxmlformats.org/presentationml/2006/main">
   <p:cSld>
     <p:spTree>
@@ -22603,8 +23106,8 @@
         </p:nvSpPr>
         <p:spPr>
           <a:xfrm>
-            <a:off x="1682949" y="259950"/>
-            <a:ext cx="8588515" cy="869050"/>
+            <a:off x="3644916" y="324516"/>
+            <a:ext cx="3936616" cy="869050"/>
           </a:xfrm>
         </p:spPr>
         <p:txBody>
@@ -22615,7 +23118,7 @@
           <a:p>
             <a:r>
               <a:rPr lang="en-US" sz="4400" dirty="0"/>
-              <a:t>Suggestions For Future Work</a:t>
+              <a:t>Future Work</a:t>
             </a:r>
           </a:p>
         </p:txBody>
@@ -22971,7 +23474,7 @@
             <p:ph idx="1"/>
             <p:extLst>
               <p:ext uri="{D42A27DB-BD31-4B8C-83A1-F6EECF244321}">
-                <p14:modId xmlns:p14="http://schemas.microsoft.com/office/powerpoint/2010/main" val="555775108"/>
+                <p14:modId xmlns:p14="http://schemas.microsoft.com/office/powerpoint/2010/main" val="2914411040"/>
               </p:ext>
             </p:extLst>
           </p:nvPr>
@@ -23383,12 +23886,81 @@
           </a:p>
         </p:txBody>
       </p:sp>
+      <p:sp>
+        <p:nvSpPr>
+          <p:cNvPr id="3" name="Rectangle 2">
+            <a:extLst>
+              <a:ext uri="{FF2B5EF4-FFF2-40B4-BE49-F238E27FC236}">
+                <a16:creationId xmlns:a16="http://schemas.microsoft.com/office/drawing/2014/main" id="{29DCAF2B-45BC-33D8-D701-BE271B76971C}"/>
+              </a:ext>
+            </a:extLst>
+          </p:cNvPr>
+          <p:cNvSpPr>
+            <a:spLocks noChangeArrowheads="1"/>
+          </p:cNvSpPr>
+          <p:nvPr/>
+        </p:nvSpPr>
+        <p:spPr bwMode="auto">
+          <a:xfrm>
+            <a:off x="0" y="0"/>
+            <a:ext cx="12192000" cy="457200"/>
+          </a:xfrm>
+          <a:prstGeom prst="rect">
+            <a:avLst/>
+          </a:prstGeom>
+          <a:noFill/>
+          <a:ln>
+            <a:noFill/>
+          </a:ln>
+          <a:effectLst/>
+          <a:extLst>
+            <a:ext uri="{909E8E84-426E-40DD-AFC4-6F175D3DCCD1}">
+              <a14:hiddenFill xmlns:a14="http://schemas.microsoft.com/office/drawing/2010/main">
+                <a:solidFill>
+                  <a:schemeClr val="accent1"/>
+                </a:solidFill>
+              </a14:hiddenFill>
+            </a:ext>
+            <a:ext uri="{91240B29-F687-4F45-9708-019B960494DF}">
+              <a14:hiddenLine xmlns:a14="http://schemas.microsoft.com/office/drawing/2010/main" w="9525">
+                <a:solidFill>
+                  <a:schemeClr val="tx1"/>
+                </a:solidFill>
+                <a:miter lim="800000"/>
+                <a:headEnd/>
+                <a:tailEnd/>
+              </a14:hiddenLine>
+            </a:ext>
+            <a:ext uri="{AF507438-7753-43E0-B8FC-AC1667EBCBE1}">
+              <a14:hiddenEffects xmlns:a14="http://schemas.microsoft.com/office/drawing/2010/main">
+                <a:effectLst>
+                  <a:outerShdw dist="35921" dir="2700000" algn="ctr" rotWithShape="0">
+                    <a:schemeClr val="bg2"/>
+                  </a:outerShdw>
+                </a:effectLst>
+              </a14:hiddenEffects>
+            </a:ext>
+          </a:extLst>
+        </p:spPr>
+        <p:txBody>
+          <a:bodyPr vert="horz" wrap="none" lIns="91440" tIns="45720" rIns="91440" bIns="45720" numCol="1" anchor="ctr" anchorCtr="0" compatLnSpc="1">
+            <a:prstTxWarp prst="textNoShape">
+              <a:avLst/>
+            </a:prstTxWarp>
+            <a:spAutoFit/>
+          </a:bodyPr>
+          <a:lstStyle/>
+          <a:p>
+            <a:endParaRPr lang="en-US"/>
+          </a:p>
+        </p:txBody>
+      </p:sp>
       <p:pic>
         <p:nvPicPr>
-          <p:cNvPr id="1028" name="Picture 4" descr="Graphical user interface&#10;&#10;Description automatically generated">
+          <p:cNvPr id="2049" name="Picture 4" descr="Graphical user interface&#10;&#10;Description automatically generated">
             <a:extLst>
               <a:ext uri="{FF2B5EF4-FFF2-40B4-BE49-F238E27FC236}">
-                <a16:creationId xmlns:a16="http://schemas.microsoft.com/office/drawing/2014/main" id="{356F25F2-FE7A-AE1F-51EB-A96783B168A9}"/>
+                <a16:creationId xmlns:a16="http://schemas.microsoft.com/office/drawing/2014/main" id="{EE66AF51-A07A-5AEB-CA22-5AEEDD47A931}"/>
               </a:ext>
             </a:extLst>
           </p:cNvPr>
@@ -23412,8 +23984,8 @@
         </p:blipFill>
         <p:spPr bwMode="auto">
           <a:xfrm>
-            <a:off x="484909" y="1224422"/>
-            <a:ext cx="11222182" cy="5157594"/>
+            <a:off x="655781" y="1236487"/>
+            <a:ext cx="10741843" cy="4936836"/>
           </a:xfrm>
           <a:prstGeom prst="rect">
             <a:avLst/>
@@ -23432,10 +24004,10 @@
       </p:pic>
       <p:sp>
         <p:nvSpPr>
-          <p:cNvPr id="24" name="Rectangle 6">
+          <p:cNvPr id="4" name="Rectangle 3">
             <a:extLst>
               <a:ext uri="{FF2B5EF4-FFF2-40B4-BE49-F238E27FC236}">
-                <a16:creationId xmlns:a16="http://schemas.microsoft.com/office/drawing/2014/main" id="{2CC08ED7-5E89-1213-3008-077833F5A405}"/>
+                <a16:creationId xmlns:a16="http://schemas.microsoft.com/office/drawing/2014/main" id="{16752734-B715-9E72-2AE7-27FDEFEE66C2}"/>
               </a:ext>
             </a:extLst>
           </p:cNvPr>
@@ -23446,8 +24018,8 @@
         </p:nvSpPr>
         <p:spPr bwMode="auto">
           <a:xfrm>
-            <a:off x="2796310" y="6354972"/>
-            <a:ext cx="5611088" cy="369332"/>
+            <a:off x="2551938" y="6173323"/>
+            <a:ext cx="6029343" cy="400110"/>
           </a:xfrm>
           <a:prstGeom prst="rect">
             <a:avLst/>
@@ -23512,59 +24084,48 @@
               <a:tabLst/>
             </a:pPr>
             <a:r>
-              <a:rPr kumimoji="0" lang="en-US" altLang="en-US" b="0" i="1" u="none" strike="noStrike" cap="none" normalizeH="0" baseline="0" dirty="0">
+              <a:rPr kumimoji="0" lang="en-US" altLang="en-US" sz="2000" b="0" i="1" u="none" strike="noStrike" cap="none" normalizeH="0" baseline="0" dirty="0">
                 <a:ln>
                   <a:noFill/>
                 </a:ln>
-                <a:solidFill>
-                  <a:schemeClr val="tx2"/>
-                </a:solidFill>
                 <a:effectLst/>
-                <a:latin typeface="Aptos" panose="020B0004020202020204" pitchFamily="34" charset="0"/>
+                <a:latin typeface="Times New Roman" panose="02020603050405020304" pitchFamily="18" charset="0"/>
                 <a:ea typeface="Aptos" panose="020B0004020202020204" pitchFamily="34" charset="0"/>
                 <a:cs typeface="Times New Roman" panose="02020603050405020304" pitchFamily="18" charset="0"/>
               </a:rPr>
-              <a:t>Figure 3: </a:t>
+              <a:t>Figure 1: </a:t>
             </a:r>
             <a:r>
-              <a:rPr kumimoji="0" lang="en-US" altLang="en-US" b="0" i="1" u="none" strike="noStrike" cap="none" normalizeH="0" baseline="0" dirty="0" err="1">
+              <a:rPr kumimoji="0" lang="en-US" altLang="en-US" sz="2000" b="0" i="1" u="none" strike="noStrike" cap="none" normalizeH="0" baseline="0" dirty="0" err="1">
                 <a:ln>
                   <a:noFill/>
                 </a:ln>
-                <a:solidFill>
-                  <a:schemeClr val="tx2"/>
-                </a:solidFill>
                 <a:effectLst/>
-                <a:latin typeface="Aptos" panose="020B0004020202020204" pitchFamily="34" charset="0"/>
+                <a:latin typeface="Times New Roman" panose="02020603050405020304" pitchFamily="18" charset="0"/>
                 <a:ea typeface="Aptos" panose="020B0004020202020204" pitchFamily="34" charset="0"/>
                 <a:cs typeface="Times New Roman" panose="02020603050405020304" pitchFamily="18" charset="0"/>
               </a:rPr>
               <a:t>Softmax</a:t>
             </a:r>
             <a:r>
-              <a:rPr kumimoji="0" lang="en-US" altLang="en-US" b="0" i="1" u="none" strike="noStrike" cap="none" normalizeH="0" baseline="0" dirty="0">
+              <a:rPr kumimoji="0" lang="en-US" altLang="en-US" sz="2000" b="0" i="1" u="none" strike="noStrike" cap="none" normalizeH="0" baseline="0" dirty="0">
                 <a:ln>
                   <a:noFill/>
                 </a:ln>
-                <a:solidFill>
-                  <a:schemeClr val="tx2"/>
-                </a:solidFill>
                 <a:effectLst/>
-                <a:latin typeface="Aptos" panose="020B0004020202020204" pitchFamily="34" charset="0"/>
+                <a:latin typeface="Times New Roman" panose="02020603050405020304" pitchFamily="18" charset="0"/>
                 <a:ea typeface="Aptos" panose="020B0004020202020204" pitchFamily="34" charset="0"/>
                 <a:cs typeface="Times New Roman" panose="02020603050405020304" pitchFamily="18" charset="0"/>
               </a:rPr>
               <a:t> Metrics Plot for 10 Images and Masks</a:t>
             </a:r>
-            <a:endParaRPr kumimoji="0" lang="en-US" altLang="en-US" b="0" i="0" u="none" strike="noStrike" cap="none" normalizeH="0" baseline="0" dirty="0">
+            <a:endParaRPr kumimoji="0" lang="en-US" altLang="en-US" sz="2000" b="0" i="0" u="none" strike="noStrike" cap="none" normalizeH="0" baseline="0" dirty="0">
               <a:ln>
                 <a:noFill/>
               </a:ln>
-              <a:solidFill>
-                <a:schemeClr val="tx2"/>
-              </a:solidFill>
               <a:effectLst/>
-              <a:latin typeface="Arial" panose="020B0604020202020204" pitchFamily="34" charset="0"/>
+              <a:latin typeface="Times New Roman" panose="02020603050405020304" pitchFamily="18" charset="0"/>
+              <a:cs typeface="Times New Roman" panose="02020603050405020304" pitchFamily="18" charset="0"/>
             </a:endParaRPr>
           </a:p>
         </p:txBody>
@@ -23814,62 +24375,12 @@
           </a:p>
         </p:txBody>
       </p:sp>
-      <p:sp>
-        <p:nvSpPr>
-          <p:cNvPr id="5" name="Content Placeholder 4">
+      <p:pic>
+        <p:nvPicPr>
+          <p:cNvPr id="8" name="Picture 7">
             <a:extLst>
               <a:ext uri="{FF2B5EF4-FFF2-40B4-BE49-F238E27FC236}">
-                <a16:creationId xmlns:a16="http://schemas.microsoft.com/office/drawing/2014/main" id="{09198237-3D97-4C8C-A848-18F7BEE3B21B}"/>
-              </a:ext>
-            </a:extLst>
-          </p:cNvPr>
-          <p:cNvSpPr>
-            <a:spLocks noGrp="1"/>
-          </p:cNvSpPr>
-          <p:nvPr>
-            <p:ph sz="half" idx="1"/>
-          </p:nvPr>
-        </p:nvSpPr>
-        <p:spPr/>
-        <p:txBody>
-          <a:bodyPr/>
-          <a:lstStyle/>
-          <a:p>
-            <a:endParaRPr lang="en-US"/>
-          </a:p>
-        </p:txBody>
-      </p:sp>
-      <p:sp>
-        <p:nvSpPr>
-          <p:cNvPr id="7" name="Content Placeholder 6">
-            <a:extLst>
-              <a:ext uri="{FF2B5EF4-FFF2-40B4-BE49-F238E27FC236}">
-                <a16:creationId xmlns:a16="http://schemas.microsoft.com/office/drawing/2014/main" id="{A33720BD-0F2B-43E2-A442-868FFF19794D}"/>
-              </a:ext>
-            </a:extLst>
-          </p:cNvPr>
-          <p:cNvSpPr>
-            <a:spLocks noGrp="1"/>
-          </p:cNvSpPr>
-          <p:nvPr>
-            <p:ph sz="half" idx="2"/>
-          </p:nvPr>
-        </p:nvSpPr>
-        <p:spPr/>
-        <p:txBody>
-          <a:bodyPr/>
-          <a:lstStyle/>
-          <a:p>
-            <a:endParaRPr lang="en-US" dirty="0"/>
-          </a:p>
-        </p:txBody>
-      </p:sp>
-      <p:pic>
-        <p:nvPicPr>
-          <p:cNvPr id="6" name="Content Placeholder 3">
-            <a:extLst>
-              <a:ext uri="{FF2B5EF4-FFF2-40B4-BE49-F238E27FC236}">
-                <a16:creationId xmlns:a16="http://schemas.microsoft.com/office/drawing/2014/main" id="{38540C53-2DB5-4EA5-A140-722125C5DA3D}"/>
+                <a16:creationId xmlns:a16="http://schemas.microsoft.com/office/drawing/2014/main" id="{D5E9412A-185F-4873-A606-9CF8090183B3}"/>
               </a:ext>
             </a:extLst>
           </p:cNvPr>
@@ -23886,36 +24397,6 @@
         </p:blipFill>
         <p:spPr>
           <a:xfrm>
-            <a:off x="754603" y="1219701"/>
-            <a:ext cx="10292808" cy="5382277"/>
-          </a:xfrm>
-          <a:prstGeom prst="rect">
-            <a:avLst/>
-          </a:prstGeom>
-        </p:spPr>
-      </p:pic>
-      <p:pic>
-        <p:nvPicPr>
-          <p:cNvPr id="8" name="Picture 7">
-            <a:extLst>
-              <a:ext uri="{FF2B5EF4-FFF2-40B4-BE49-F238E27FC236}">
-                <a16:creationId xmlns:a16="http://schemas.microsoft.com/office/drawing/2014/main" id="{D5E9412A-185F-4873-A606-9CF8090183B3}"/>
-              </a:ext>
-            </a:extLst>
-          </p:cNvPr>
-          <p:cNvPicPr>
-            <a:picLocks noChangeAspect="1"/>
-          </p:cNvPicPr>
-          <p:nvPr/>
-        </p:nvPicPr>
-        <p:blipFill>
-          <a:blip r:embed="rId3"/>
-          <a:stretch>
-            <a:fillRect/>
-          </a:stretch>
-        </p:blipFill>
-        <p:spPr>
-          <a:xfrm>
             <a:off x="10667999" y="256022"/>
             <a:ext cx="1260713" cy="872978"/>
           </a:xfrm>
@@ -23924,6 +24405,226 @@
           </a:prstGeom>
         </p:spPr>
       </p:pic>
+      <p:sp>
+        <p:nvSpPr>
+          <p:cNvPr id="3" name="Rectangle 2">
+            <a:extLst>
+              <a:ext uri="{FF2B5EF4-FFF2-40B4-BE49-F238E27FC236}">
+                <a16:creationId xmlns:a16="http://schemas.microsoft.com/office/drawing/2014/main" id="{C44DD251-8D5D-FC86-262F-3EFBC2A1FFD7}"/>
+              </a:ext>
+            </a:extLst>
+          </p:cNvPr>
+          <p:cNvSpPr>
+            <a:spLocks noChangeArrowheads="1"/>
+          </p:cNvSpPr>
+          <p:nvPr/>
+        </p:nvSpPr>
+        <p:spPr bwMode="auto">
+          <a:xfrm>
+            <a:off x="-470517" y="506027"/>
+            <a:ext cx="12192000" cy="457200"/>
+          </a:xfrm>
+          <a:prstGeom prst="rect">
+            <a:avLst/>
+          </a:prstGeom>
+          <a:noFill/>
+          <a:ln>
+            <a:noFill/>
+          </a:ln>
+          <a:effectLst/>
+          <a:extLst>
+            <a:ext uri="{909E8E84-426E-40DD-AFC4-6F175D3DCCD1}">
+              <a14:hiddenFill xmlns:a14="http://schemas.microsoft.com/office/drawing/2010/main">
+                <a:solidFill>
+                  <a:schemeClr val="accent1"/>
+                </a:solidFill>
+              </a14:hiddenFill>
+            </a:ext>
+            <a:ext uri="{91240B29-F687-4F45-9708-019B960494DF}">
+              <a14:hiddenLine xmlns:a14="http://schemas.microsoft.com/office/drawing/2010/main" w="9525">
+                <a:solidFill>
+                  <a:schemeClr val="tx1"/>
+                </a:solidFill>
+                <a:miter lim="800000"/>
+                <a:headEnd/>
+                <a:tailEnd/>
+              </a14:hiddenLine>
+            </a:ext>
+            <a:ext uri="{AF507438-7753-43E0-B8FC-AC1667EBCBE1}">
+              <a14:hiddenEffects xmlns:a14="http://schemas.microsoft.com/office/drawing/2010/main">
+                <a:effectLst>
+                  <a:outerShdw dist="35921" dir="2700000" algn="ctr" rotWithShape="0">
+                    <a:schemeClr val="bg2"/>
+                  </a:outerShdw>
+                </a:effectLst>
+              </a14:hiddenEffects>
+            </a:ext>
+          </a:extLst>
+        </p:spPr>
+        <p:txBody>
+          <a:bodyPr vert="horz" wrap="none" lIns="91440" tIns="45720" rIns="91440" bIns="45720" numCol="1" anchor="ctr" anchorCtr="0" compatLnSpc="1">
+            <a:prstTxWarp prst="textNoShape">
+              <a:avLst/>
+            </a:prstTxWarp>
+            <a:spAutoFit/>
+          </a:bodyPr>
+          <a:lstStyle/>
+          <a:p>
+            <a:endParaRPr lang="en-US"/>
+          </a:p>
+        </p:txBody>
+      </p:sp>
+      <p:pic>
+        <p:nvPicPr>
+          <p:cNvPr id="3073" name="Picture 5" descr="Graphical user interface&#10;&#10;Description automatically generated">
+            <a:extLst>
+              <a:ext uri="{FF2B5EF4-FFF2-40B4-BE49-F238E27FC236}">
+                <a16:creationId xmlns:a16="http://schemas.microsoft.com/office/drawing/2014/main" id="{61FF02F5-76CC-4B1F-9A8A-A9B5D397FF03}"/>
+              </a:ext>
+            </a:extLst>
+          </p:cNvPr>
+          <p:cNvPicPr>
+            <a:picLocks noChangeAspect="1" noChangeArrowheads="1"/>
+          </p:cNvPicPr>
+          <p:nvPr/>
+        </p:nvPicPr>
+        <p:blipFill>
+          <a:blip r:embed="rId3">
+            <a:extLst>
+              <a:ext uri="{28A0092B-C50C-407E-A947-70E740481C1C}">
+                <a14:useLocalDpi xmlns:a14="http://schemas.microsoft.com/office/drawing/2010/main" val="0"/>
+              </a:ext>
+            </a:extLst>
+          </a:blip>
+          <a:srcRect/>
+          <a:stretch>
+            <a:fillRect/>
+          </a:stretch>
+        </p:blipFill>
+        <p:spPr bwMode="auto">
+          <a:xfrm>
+            <a:off x="1213281" y="1286047"/>
+            <a:ext cx="9765437" cy="4701684"/>
+          </a:xfrm>
+          <a:prstGeom prst="rect">
+            <a:avLst/>
+          </a:prstGeom>
+          <a:noFill/>
+          <a:extLst>
+            <a:ext uri="{909E8E84-426E-40DD-AFC4-6F175D3DCCD1}">
+              <a14:hiddenFill xmlns:a14="http://schemas.microsoft.com/office/drawing/2010/main">
+                <a:solidFill>
+                  <a:srgbClr val="FFFFFF"/>
+                </a:solidFill>
+              </a14:hiddenFill>
+            </a:ext>
+          </a:extLst>
+        </p:spPr>
+      </p:pic>
+      <p:sp>
+        <p:nvSpPr>
+          <p:cNvPr id="4" name="Rectangle 3">
+            <a:extLst>
+              <a:ext uri="{FF2B5EF4-FFF2-40B4-BE49-F238E27FC236}">
+                <a16:creationId xmlns:a16="http://schemas.microsoft.com/office/drawing/2014/main" id="{A6E0E3BE-E139-2BE8-04C4-3052F99F4DBA}"/>
+              </a:ext>
+            </a:extLst>
+          </p:cNvPr>
+          <p:cNvSpPr>
+            <a:spLocks noChangeArrowheads="1"/>
+          </p:cNvSpPr>
+          <p:nvPr/>
+        </p:nvSpPr>
+        <p:spPr bwMode="auto">
+          <a:xfrm>
+            <a:off x="1677880" y="6173323"/>
+            <a:ext cx="8513685" cy="400110"/>
+          </a:xfrm>
+          <a:prstGeom prst="rect">
+            <a:avLst/>
+          </a:prstGeom>
+          <a:noFill/>
+          <a:ln>
+            <a:noFill/>
+          </a:ln>
+          <a:effectLst/>
+          <a:extLst>
+            <a:ext uri="{909E8E84-426E-40DD-AFC4-6F175D3DCCD1}">
+              <a14:hiddenFill xmlns:a14="http://schemas.microsoft.com/office/drawing/2010/main">
+                <a:solidFill>
+                  <a:schemeClr val="accent1"/>
+                </a:solidFill>
+              </a14:hiddenFill>
+            </a:ext>
+            <a:ext uri="{91240B29-F687-4F45-9708-019B960494DF}">
+              <a14:hiddenLine xmlns:a14="http://schemas.microsoft.com/office/drawing/2010/main" w="9525">
+                <a:solidFill>
+                  <a:schemeClr val="tx1"/>
+                </a:solidFill>
+                <a:miter lim="800000"/>
+                <a:headEnd/>
+                <a:tailEnd/>
+              </a14:hiddenLine>
+            </a:ext>
+            <a:ext uri="{AF507438-7753-43E0-B8FC-AC1667EBCBE1}">
+              <a14:hiddenEffects xmlns:a14="http://schemas.microsoft.com/office/drawing/2010/main">
+                <a:effectLst>
+                  <a:outerShdw dist="35921" dir="2700000" algn="ctr" rotWithShape="0">
+                    <a:schemeClr val="bg2"/>
+                  </a:outerShdw>
+                </a:effectLst>
+              </a14:hiddenEffects>
+            </a:ext>
+          </a:extLst>
+        </p:spPr>
+        <p:txBody>
+          <a:bodyPr vert="horz" wrap="square" lIns="91440" tIns="45720" rIns="91440" bIns="45720" numCol="1" anchor="ctr" anchorCtr="0" compatLnSpc="1">
+            <a:prstTxWarp prst="textNoShape">
+              <a:avLst/>
+            </a:prstTxWarp>
+            <a:spAutoFit/>
+          </a:bodyPr>
+          <a:lstStyle/>
+          <a:p>
+            <a:pPr marL="0" marR="0" lvl="0" indent="0" algn="ctr" defTabSz="914400" rtl="0" eaLnBrk="0" fontAlgn="base" latinLnBrk="0" hangingPunct="0">
+              <a:lnSpc>
+                <a:spcPct val="100000"/>
+              </a:lnSpc>
+              <a:spcBef>
+                <a:spcPct val="0"/>
+              </a:spcBef>
+              <a:spcAft>
+                <a:spcPct val="0"/>
+              </a:spcAft>
+              <a:buClrTx/>
+              <a:buSzTx/>
+              <a:buFontTx/>
+              <a:buNone/>
+              <a:tabLst/>
+            </a:pPr>
+            <a:r>
+              <a:rPr kumimoji="0" lang="en-US" altLang="en-US" sz="2000" b="0" i="1" u="none" strike="noStrike" cap="none" normalizeH="0" baseline="0" dirty="0">
+                <a:ln>
+                  <a:noFill/>
+                </a:ln>
+                <a:effectLst/>
+                <a:latin typeface="Times New Roman" panose="02020603050405020304" pitchFamily="18" charset="0"/>
+                <a:ea typeface="Aptos" panose="020B0004020202020204" pitchFamily="34" charset="0"/>
+                <a:cs typeface="Times New Roman" panose="02020603050405020304" pitchFamily="18" charset="0"/>
+              </a:rPr>
+              <a:t>Figure 3: Sigmoid Metrics Plot for 100 Images and Masks</a:t>
+            </a:r>
+            <a:endParaRPr kumimoji="0" lang="en-US" altLang="en-US" sz="2000" b="0" i="0" u="none" strike="noStrike" cap="none" normalizeH="0" baseline="0" dirty="0">
+              <a:ln>
+                <a:noFill/>
+              </a:ln>
+              <a:effectLst/>
+              <a:latin typeface="Times New Roman" panose="02020603050405020304" pitchFamily="18" charset="0"/>
+              <a:cs typeface="Times New Roman" panose="02020603050405020304" pitchFamily="18" charset="0"/>
+            </a:endParaRPr>
+          </a:p>
+        </p:txBody>
+      </p:sp>
     </p:spTree>
     <p:extLst>
       <p:ext uri="{BB962C8B-B14F-4D97-AF65-F5344CB8AC3E}">
@@ -23991,62 +24692,12 @@
           </a:p>
         </p:txBody>
       </p:sp>
-      <p:sp>
-        <p:nvSpPr>
-          <p:cNvPr id="5" name="Content Placeholder 4">
+      <p:pic>
+        <p:nvPicPr>
+          <p:cNvPr id="8" name="Picture 7">
             <a:extLst>
               <a:ext uri="{FF2B5EF4-FFF2-40B4-BE49-F238E27FC236}">
-                <a16:creationId xmlns:a16="http://schemas.microsoft.com/office/drawing/2014/main" id="{09198237-3D97-4C8C-A848-18F7BEE3B21B}"/>
-              </a:ext>
-            </a:extLst>
-          </p:cNvPr>
-          <p:cNvSpPr>
-            <a:spLocks noGrp="1"/>
-          </p:cNvSpPr>
-          <p:nvPr>
-            <p:ph sz="half" idx="1"/>
-          </p:nvPr>
-        </p:nvSpPr>
-        <p:spPr/>
-        <p:txBody>
-          <a:bodyPr/>
-          <a:lstStyle/>
-          <a:p>
-            <a:endParaRPr lang="en-US"/>
-          </a:p>
-        </p:txBody>
-      </p:sp>
-      <p:sp>
-        <p:nvSpPr>
-          <p:cNvPr id="7" name="Content Placeholder 6">
-            <a:extLst>
-              <a:ext uri="{FF2B5EF4-FFF2-40B4-BE49-F238E27FC236}">
-                <a16:creationId xmlns:a16="http://schemas.microsoft.com/office/drawing/2014/main" id="{A33720BD-0F2B-43E2-A442-868FFF19794D}"/>
-              </a:ext>
-            </a:extLst>
-          </p:cNvPr>
-          <p:cNvSpPr>
-            <a:spLocks noGrp="1"/>
-          </p:cNvSpPr>
-          <p:nvPr>
-            <p:ph sz="half" idx="2"/>
-          </p:nvPr>
-        </p:nvSpPr>
-        <p:spPr/>
-        <p:txBody>
-          <a:bodyPr/>
-          <a:lstStyle/>
-          <a:p>
-            <a:endParaRPr lang="en-US" dirty="0"/>
-          </a:p>
-        </p:txBody>
-      </p:sp>
-      <p:pic>
-        <p:nvPicPr>
-          <p:cNvPr id="6" name="Content Placeholder 6">
-            <a:extLst>
-              <a:ext uri="{FF2B5EF4-FFF2-40B4-BE49-F238E27FC236}">
-                <a16:creationId xmlns:a16="http://schemas.microsoft.com/office/drawing/2014/main" id="{7DEC53D3-DB33-4AC3-AC91-39E32564A878}"/>
+                <a16:creationId xmlns:a16="http://schemas.microsoft.com/office/drawing/2014/main" id="{A0F59DDE-FEC5-4D65-80D8-14537F28EE4B}"/>
               </a:ext>
             </a:extLst>
           </p:cNvPr>
@@ -24063,36 +24714,6 @@
         </p:blipFill>
         <p:spPr>
           <a:xfrm>
-            <a:off x="1141409" y="1000109"/>
-            <a:ext cx="9905997" cy="5176853"/>
-          </a:xfrm>
-          <a:prstGeom prst="rect">
-            <a:avLst/>
-          </a:prstGeom>
-        </p:spPr>
-      </p:pic>
-      <p:pic>
-        <p:nvPicPr>
-          <p:cNvPr id="8" name="Picture 7">
-            <a:extLst>
-              <a:ext uri="{FF2B5EF4-FFF2-40B4-BE49-F238E27FC236}">
-                <a16:creationId xmlns:a16="http://schemas.microsoft.com/office/drawing/2014/main" id="{A0F59DDE-FEC5-4D65-80D8-14537F28EE4B}"/>
-              </a:ext>
-            </a:extLst>
-          </p:cNvPr>
-          <p:cNvPicPr>
-            <a:picLocks noChangeAspect="1"/>
-          </p:cNvPicPr>
-          <p:nvPr/>
-        </p:nvPicPr>
-        <p:blipFill>
-          <a:blip r:embed="rId3"/>
-          <a:stretch>
-            <a:fillRect/>
-          </a:stretch>
-        </p:blipFill>
-        <p:spPr>
-          <a:xfrm>
             <a:off x="10667999" y="256022"/>
             <a:ext cx="1260713" cy="872978"/>
           </a:xfrm>
@@ -24101,6 +24722,226 @@
           </a:prstGeom>
         </p:spPr>
       </p:pic>
+      <p:sp>
+        <p:nvSpPr>
+          <p:cNvPr id="3" name="Rectangle 2">
+            <a:extLst>
+              <a:ext uri="{FF2B5EF4-FFF2-40B4-BE49-F238E27FC236}">
+                <a16:creationId xmlns:a16="http://schemas.microsoft.com/office/drawing/2014/main" id="{29E2F0ED-3586-011A-A217-DD35D33C93CE}"/>
+              </a:ext>
+            </a:extLst>
+          </p:cNvPr>
+          <p:cNvSpPr>
+            <a:spLocks noChangeArrowheads="1"/>
+          </p:cNvSpPr>
+          <p:nvPr/>
+        </p:nvSpPr>
+        <p:spPr bwMode="auto">
+          <a:xfrm>
+            <a:off x="0" y="0"/>
+            <a:ext cx="12192000" cy="457200"/>
+          </a:xfrm>
+          <a:prstGeom prst="rect">
+            <a:avLst/>
+          </a:prstGeom>
+          <a:noFill/>
+          <a:ln>
+            <a:noFill/>
+          </a:ln>
+          <a:effectLst/>
+          <a:extLst>
+            <a:ext uri="{909E8E84-426E-40DD-AFC4-6F175D3DCCD1}">
+              <a14:hiddenFill xmlns:a14="http://schemas.microsoft.com/office/drawing/2010/main">
+                <a:solidFill>
+                  <a:schemeClr val="accent1"/>
+                </a:solidFill>
+              </a14:hiddenFill>
+            </a:ext>
+            <a:ext uri="{91240B29-F687-4F45-9708-019B960494DF}">
+              <a14:hiddenLine xmlns:a14="http://schemas.microsoft.com/office/drawing/2010/main" w="9525">
+                <a:solidFill>
+                  <a:schemeClr val="tx1"/>
+                </a:solidFill>
+                <a:miter lim="800000"/>
+                <a:headEnd/>
+                <a:tailEnd/>
+              </a14:hiddenLine>
+            </a:ext>
+            <a:ext uri="{AF507438-7753-43E0-B8FC-AC1667EBCBE1}">
+              <a14:hiddenEffects xmlns:a14="http://schemas.microsoft.com/office/drawing/2010/main">
+                <a:effectLst>
+                  <a:outerShdw dist="35921" dir="2700000" algn="ctr" rotWithShape="0">
+                    <a:schemeClr val="bg2"/>
+                  </a:outerShdw>
+                </a:effectLst>
+              </a14:hiddenEffects>
+            </a:ext>
+          </a:extLst>
+        </p:spPr>
+        <p:txBody>
+          <a:bodyPr vert="horz" wrap="none" lIns="91440" tIns="45720" rIns="91440" bIns="45720" numCol="1" anchor="ctr" anchorCtr="0" compatLnSpc="1">
+            <a:prstTxWarp prst="textNoShape">
+              <a:avLst/>
+            </a:prstTxWarp>
+            <a:spAutoFit/>
+          </a:bodyPr>
+          <a:lstStyle/>
+          <a:p>
+            <a:endParaRPr lang="en-US"/>
+          </a:p>
+        </p:txBody>
+      </p:sp>
+      <p:pic>
+        <p:nvPicPr>
+          <p:cNvPr id="4097" name="Picture 7" descr="Graphical user interface, chart&#10;&#10;Description automatically generated with medium confidence">
+            <a:extLst>
+              <a:ext uri="{FF2B5EF4-FFF2-40B4-BE49-F238E27FC236}">
+                <a16:creationId xmlns:a16="http://schemas.microsoft.com/office/drawing/2014/main" id="{9843A4A5-EFAC-D0B8-64A7-BDEB0E434D31}"/>
+              </a:ext>
+            </a:extLst>
+          </p:cNvPr>
+          <p:cNvPicPr>
+            <a:picLocks noChangeAspect="1" noChangeArrowheads="1"/>
+          </p:cNvPicPr>
+          <p:nvPr/>
+        </p:nvPicPr>
+        <p:blipFill>
+          <a:blip r:embed="rId3">
+            <a:extLst>
+              <a:ext uri="{28A0092B-C50C-407E-A947-70E740481C1C}">
+                <a14:useLocalDpi xmlns:a14="http://schemas.microsoft.com/office/drawing/2010/main" val="0"/>
+              </a:ext>
+            </a:extLst>
+          </a:blip>
+          <a:srcRect/>
+          <a:stretch>
+            <a:fillRect/>
+          </a:stretch>
+        </p:blipFill>
+        <p:spPr bwMode="auto">
+          <a:xfrm>
+            <a:off x="865466" y="1229288"/>
+            <a:ext cx="10178356" cy="4714312"/>
+          </a:xfrm>
+          <a:prstGeom prst="rect">
+            <a:avLst/>
+          </a:prstGeom>
+          <a:noFill/>
+          <a:extLst>
+            <a:ext uri="{909E8E84-426E-40DD-AFC4-6F175D3DCCD1}">
+              <a14:hiddenFill xmlns:a14="http://schemas.microsoft.com/office/drawing/2010/main">
+                <a:solidFill>
+                  <a:srgbClr val="FFFFFF"/>
+                </a:solidFill>
+              </a14:hiddenFill>
+            </a:ext>
+          </a:extLst>
+        </p:spPr>
+      </p:pic>
+      <p:sp>
+        <p:nvSpPr>
+          <p:cNvPr id="4" name="Rectangle 3">
+            <a:extLst>
+              <a:ext uri="{FF2B5EF4-FFF2-40B4-BE49-F238E27FC236}">
+                <a16:creationId xmlns:a16="http://schemas.microsoft.com/office/drawing/2014/main" id="{9B0CC967-45C3-6EC9-9AC4-D70AF2B67372}"/>
+              </a:ext>
+            </a:extLst>
+          </p:cNvPr>
+          <p:cNvSpPr>
+            <a:spLocks noChangeArrowheads="1"/>
+          </p:cNvSpPr>
+          <p:nvPr/>
+        </p:nvSpPr>
+        <p:spPr bwMode="auto">
+          <a:xfrm>
+            <a:off x="2448163" y="6067994"/>
+            <a:ext cx="6769097" cy="400110"/>
+          </a:xfrm>
+          <a:prstGeom prst="rect">
+            <a:avLst/>
+          </a:prstGeom>
+          <a:noFill/>
+          <a:ln>
+            <a:noFill/>
+          </a:ln>
+          <a:effectLst/>
+          <a:extLst>
+            <a:ext uri="{909E8E84-426E-40DD-AFC4-6F175D3DCCD1}">
+              <a14:hiddenFill xmlns:a14="http://schemas.microsoft.com/office/drawing/2010/main">
+                <a:solidFill>
+                  <a:schemeClr val="accent1"/>
+                </a:solidFill>
+              </a14:hiddenFill>
+            </a:ext>
+            <a:ext uri="{91240B29-F687-4F45-9708-019B960494DF}">
+              <a14:hiddenLine xmlns:a14="http://schemas.microsoft.com/office/drawing/2010/main" w="9525">
+                <a:solidFill>
+                  <a:schemeClr val="tx1"/>
+                </a:solidFill>
+                <a:miter lim="800000"/>
+                <a:headEnd/>
+                <a:tailEnd/>
+              </a14:hiddenLine>
+            </a:ext>
+            <a:ext uri="{AF507438-7753-43E0-B8FC-AC1667EBCBE1}">
+              <a14:hiddenEffects xmlns:a14="http://schemas.microsoft.com/office/drawing/2010/main">
+                <a:effectLst>
+                  <a:outerShdw dist="35921" dir="2700000" algn="ctr" rotWithShape="0">
+                    <a:schemeClr val="bg2"/>
+                  </a:outerShdw>
+                </a:effectLst>
+              </a14:hiddenEffects>
+            </a:ext>
+          </a:extLst>
+        </p:spPr>
+        <p:txBody>
+          <a:bodyPr vert="horz" wrap="none" lIns="91440" tIns="45720" rIns="91440" bIns="45720" numCol="1" anchor="ctr" anchorCtr="0" compatLnSpc="1">
+            <a:prstTxWarp prst="textNoShape">
+              <a:avLst/>
+            </a:prstTxWarp>
+            <a:spAutoFit/>
+          </a:bodyPr>
+          <a:lstStyle/>
+          <a:p>
+            <a:pPr marL="0" marR="0" lvl="0" indent="0" algn="ctr" defTabSz="914400" rtl="0" eaLnBrk="0" fontAlgn="base" latinLnBrk="0" hangingPunct="0">
+              <a:lnSpc>
+                <a:spcPct val="100000"/>
+              </a:lnSpc>
+              <a:spcBef>
+                <a:spcPct val="0"/>
+              </a:spcBef>
+              <a:spcAft>
+                <a:spcPct val="0"/>
+              </a:spcAft>
+              <a:buClrTx/>
+              <a:buSzTx/>
+              <a:buFontTx/>
+              <a:buNone/>
+              <a:tabLst/>
+            </a:pPr>
+            <a:r>
+              <a:rPr kumimoji="0" lang="en-US" altLang="en-US" sz="2000" b="0" i="1" u="none" strike="noStrike" cap="none" normalizeH="0" baseline="0" dirty="0">
+                <a:ln>
+                  <a:noFill/>
+                </a:ln>
+                <a:effectLst/>
+                <a:latin typeface="Times New Roman" panose="02020603050405020304" pitchFamily="18" charset="0"/>
+                <a:ea typeface="Aptos" panose="020B0004020202020204" pitchFamily="34" charset="0"/>
+                <a:cs typeface="Times New Roman" panose="02020603050405020304" pitchFamily="18" charset="0"/>
+              </a:rPr>
+              <a:t>Figure 4: Model’s Accuracy Plot for 500 Images and 500 Masks</a:t>
+            </a:r>
+            <a:endParaRPr kumimoji="0" lang="en-US" altLang="en-US" sz="2000" b="0" i="0" u="none" strike="noStrike" cap="none" normalizeH="0" baseline="0" dirty="0">
+              <a:ln>
+                <a:noFill/>
+              </a:ln>
+              <a:effectLst/>
+              <a:latin typeface="Times New Roman" panose="02020603050405020304" pitchFamily="18" charset="0"/>
+              <a:cs typeface="Times New Roman" panose="02020603050405020304" pitchFamily="18" charset="0"/>
+            </a:endParaRPr>
+          </a:p>
+        </p:txBody>
+      </p:sp>
     </p:spTree>
     <p:extLst>
       <p:ext uri="{BB962C8B-B14F-4D97-AF65-F5344CB8AC3E}">
@@ -24168,62 +25009,12 @@
           </a:p>
         </p:txBody>
       </p:sp>
-      <p:sp>
-        <p:nvSpPr>
-          <p:cNvPr id="5" name="Content Placeholder 4">
+      <p:pic>
+        <p:nvPicPr>
+          <p:cNvPr id="8" name="Picture 7">
             <a:extLst>
               <a:ext uri="{FF2B5EF4-FFF2-40B4-BE49-F238E27FC236}">
-                <a16:creationId xmlns:a16="http://schemas.microsoft.com/office/drawing/2014/main" id="{09198237-3D97-4C8C-A848-18F7BEE3B21B}"/>
-              </a:ext>
-            </a:extLst>
-          </p:cNvPr>
-          <p:cNvSpPr>
-            <a:spLocks noGrp="1"/>
-          </p:cNvSpPr>
-          <p:nvPr>
-            <p:ph sz="half" idx="1"/>
-          </p:nvPr>
-        </p:nvSpPr>
-        <p:spPr/>
-        <p:txBody>
-          <a:bodyPr/>
-          <a:lstStyle/>
-          <a:p>
-            <a:endParaRPr lang="en-US"/>
-          </a:p>
-        </p:txBody>
-      </p:sp>
-      <p:sp>
-        <p:nvSpPr>
-          <p:cNvPr id="7" name="Content Placeholder 6">
-            <a:extLst>
-              <a:ext uri="{FF2B5EF4-FFF2-40B4-BE49-F238E27FC236}">
-                <a16:creationId xmlns:a16="http://schemas.microsoft.com/office/drawing/2014/main" id="{A33720BD-0F2B-43E2-A442-868FFF19794D}"/>
-              </a:ext>
-            </a:extLst>
-          </p:cNvPr>
-          <p:cNvSpPr>
-            <a:spLocks noGrp="1"/>
-          </p:cNvSpPr>
-          <p:nvPr>
-            <p:ph sz="half" idx="2"/>
-          </p:nvPr>
-        </p:nvSpPr>
-        <p:spPr/>
-        <p:txBody>
-          <a:bodyPr/>
-          <a:lstStyle/>
-          <a:p>
-            <a:endParaRPr lang="en-US" dirty="0"/>
-          </a:p>
-        </p:txBody>
-      </p:sp>
-      <p:pic>
-        <p:nvPicPr>
-          <p:cNvPr id="6" name="Content Placeholder 6">
-            <a:extLst>
-              <a:ext uri="{FF2B5EF4-FFF2-40B4-BE49-F238E27FC236}">
-                <a16:creationId xmlns:a16="http://schemas.microsoft.com/office/drawing/2014/main" id="{949A3A02-CAE4-4ECE-AD34-CF391A623811}"/>
+                <a16:creationId xmlns:a16="http://schemas.microsoft.com/office/drawing/2014/main" id="{0CB56835-DCB5-43C6-AFBD-3C6D40CF4F18}"/>
               </a:ext>
             </a:extLst>
           </p:cNvPr>
@@ -24240,36 +25031,6 @@
         </p:blipFill>
         <p:spPr>
           <a:xfrm>
-            <a:off x="914400" y="1151558"/>
-            <a:ext cx="10262586" cy="5025405"/>
-          </a:xfrm>
-          <a:prstGeom prst="rect">
-            <a:avLst/>
-          </a:prstGeom>
-        </p:spPr>
-      </p:pic>
-      <p:pic>
-        <p:nvPicPr>
-          <p:cNvPr id="8" name="Picture 7">
-            <a:extLst>
-              <a:ext uri="{FF2B5EF4-FFF2-40B4-BE49-F238E27FC236}">
-                <a16:creationId xmlns:a16="http://schemas.microsoft.com/office/drawing/2014/main" id="{0CB56835-DCB5-43C6-AFBD-3C6D40CF4F18}"/>
-              </a:ext>
-            </a:extLst>
-          </p:cNvPr>
-          <p:cNvPicPr>
-            <a:picLocks noChangeAspect="1"/>
-          </p:cNvPicPr>
-          <p:nvPr/>
-        </p:nvPicPr>
-        <p:blipFill>
-          <a:blip r:embed="rId3"/>
-          <a:stretch>
-            <a:fillRect/>
-          </a:stretch>
-        </p:blipFill>
-        <p:spPr>
-          <a:xfrm>
             <a:off x="10667999" y="256022"/>
             <a:ext cx="1260713" cy="872978"/>
           </a:xfrm>
@@ -24278,6 +25039,226 @@
           </a:prstGeom>
         </p:spPr>
       </p:pic>
+      <p:sp>
+        <p:nvSpPr>
+          <p:cNvPr id="3" name="Rectangle 2">
+            <a:extLst>
+              <a:ext uri="{FF2B5EF4-FFF2-40B4-BE49-F238E27FC236}">
+                <a16:creationId xmlns:a16="http://schemas.microsoft.com/office/drawing/2014/main" id="{800BEDD7-9D42-6566-2271-92B6062FBAF9}"/>
+              </a:ext>
+            </a:extLst>
+          </p:cNvPr>
+          <p:cNvSpPr>
+            <a:spLocks noChangeArrowheads="1"/>
+          </p:cNvSpPr>
+          <p:nvPr/>
+        </p:nvSpPr>
+        <p:spPr bwMode="auto">
+          <a:xfrm>
+            <a:off x="0" y="0"/>
+            <a:ext cx="12192000" cy="457200"/>
+          </a:xfrm>
+          <a:prstGeom prst="rect">
+            <a:avLst/>
+          </a:prstGeom>
+          <a:noFill/>
+          <a:ln>
+            <a:noFill/>
+          </a:ln>
+          <a:effectLst/>
+          <a:extLst>
+            <a:ext uri="{909E8E84-426E-40DD-AFC4-6F175D3DCCD1}">
+              <a14:hiddenFill xmlns:a14="http://schemas.microsoft.com/office/drawing/2010/main">
+                <a:solidFill>
+                  <a:schemeClr val="accent1"/>
+                </a:solidFill>
+              </a14:hiddenFill>
+            </a:ext>
+            <a:ext uri="{91240B29-F687-4F45-9708-019B960494DF}">
+              <a14:hiddenLine xmlns:a14="http://schemas.microsoft.com/office/drawing/2010/main" w="9525">
+                <a:solidFill>
+                  <a:schemeClr val="tx1"/>
+                </a:solidFill>
+                <a:miter lim="800000"/>
+                <a:headEnd/>
+                <a:tailEnd/>
+              </a14:hiddenLine>
+            </a:ext>
+            <a:ext uri="{AF507438-7753-43E0-B8FC-AC1667EBCBE1}">
+              <a14:hiddenEffects xmlns:a14="http://schemas.microsoft.com/office/drawing/2010/main">
+                <a:effectLst>
+                  <a:outerShdw dist="35921" dir="2700000" algn="ctr" rotWithShape="0">
+                    <a:schemeClr val="bg2"/>
+                  </a:outerShdw>
+                </a:effectLst>
+              </a14:hiddenEffects>
+            </a:ext>
+          </a:extLst>
+        </p:spPr>
+        <p:txBody>
+          <a:bodyPr vert="horz" wrap="none" lIns="91440" tIns="45720" rIns="91440" bIns="45720" numCol="1" anchor="ctr" anchorCtr="0" compatLnSpc="1">
+            <a:prstTxWarp prst="textNoShape">
+              <a:avLst/>
+            </a:prstTxWarp>
+            <a:spAutoFit/>
+          </a:bodyPr>
+          <a:lstStyle/>
+          <a:p>
+            <a:endParaRPr lang="en-US"/>
+          </a:p>
+        </p:txBody>
+      </p:sp>
+      <p:pic>
+        <p:nvPicPr>
+          <p:cNvPr id="5121" name="Picture 8" descr="Chart, histogram&#10;&#10;Description automatically generated">
+            <a:extLst>
+              <a:ext uri="{FF2B5EF4-FFF2-40B4-BE49-F238E27FC236}">
+                <a16:creationId xmlns:a16="http://schemas.microsoft.com/office/drawing/2014/main" id="{2A05C837-2C2F-80CC-F296-23501B9133C4}"/>
+              </a:ext>
+            </a:extLst>
+          </p:cNvPr>
+          <p:cNvPicPr>
+            <a:picLocks noChangeAspect="1" noChangeArrowheads="1"/>
+          </p:cNvPicPr>
+          <p:nvPr/>
+        </p:nvPicPr>
+        <p:blipFill>
+          <a:blip r:embed="rId3">
+            <a:extLst>
+              <a:ext uri="{28A0092B-C50C-407E-A947-70E740481C1C}">
+                <a14:useLocalDpi xmlns:a14="http://schemas.microsoft.com/office/drawing/2010/main" val="0"/>
+              </a:ext>
+            </a:extLst>
+          </a:blip>
+          <a:srcRect/>
+          <a:stretch>
+            <a:fillRect/>
+          </a:stretch>
+        </p:blipFill>
+        <p:spPr bwMode="auto">
+          <a:xfrm>
+            <a:off x="1143001" y="1129000"/>
+            <a:ext cx="9905997" cy="5054012"/>
+          </a:xfrm>
+          <a:prstGeom prst="rect">
+            <a:avLst/>
+          </a:prstGeom>
+          <a:noFill/>
+          <a:extLst>
+            <a:ext uri="{909E8E84-426E-40DD-AFC4-6F175D3DCCD1}">
+              <a14:hiddenFill xmlns:a14="http://schemas.microsoft.com/office/drawing/2010/main">
+                <a:solidFill>
+                  <a:srgbClr val="FFFFFF"/>
+                </a:solidFill>
+              </a14:hiddenFill>
+            </a:ext>
+          </a:extLst>
+        </p:spPr>
+      </p:pic>
+      <p:sp>
+        <p:nvSpPr>
+          <p:cNvPr id="4" name="Rectangle 3">
+            <a:extLst>
+              <a:ext uri="{FF2B5EF4-FFF2-40B4-BE49-F238E27FC236}">
+                <a16:creationId xmlns:a16="http://schemas.microsoft.com/office/drawing/2014/main" id="{E4B87998-28A8-24A7-9000-45BEA77EA018}"/>
+              </a:ext>
+            </a:extLst>
+          </p:cNvPr>
+          <p:cNvSpPr>
+            <a:spLocks noChangeArrowheads="1"/>
+          </p:cNvSpPr>
+          <p:nvPr/>
+        </p:nvSpPr>
+        <p:spPr bwMode="auto">
+          <a:xfrm>
+            <a:off x="2094798" y="6211557"/>
+            <a:ext cx="7475829" cy="400110"/>
+          </a:xfrm>
+          <a:prstGeom prst="rect">
+            <a:avLst/>
+          </a:prstGeom>
+          <a:noFill/>
+          <a:ln>
+            <a:noFill/>
+          </a:ln>
+          <a:effectLst/>
+          <a:extLst>
+            <a:ext uri="{909E8E84-426E-40DD-AFC4-6F175D3DCCD1}">
+              <a14:hiddenFill xmlns:a14="http://schemas.microsoft.com/office/drawing/2010/main">
+                <a:solidFill>
+                  <a:schemeClr val="accent1"/>
+                </a:solidFill>
+              </a14:hiddenFill>
+            </a:ext>
+            <a:ext uri="{91240B29-F687-4F45-9708-019B960494DF}">
+              <a14:hiddenLine xmlns:a14="http://schemas.microsoft.com/office/drawing/2010/main" w="9525">
+                <a:solidFill>
+                  <a:schemeClr val="tx1"/>
+                </a:solidFill>
+                <a:miter lim="800000"/>
+                <a:headEnd/>
+                <a:tailEnd/>
+              </a14:hiddenLine>
+            </a:ext>
+            <a:ext uri="{AF507438-7753-43E0-B8FC-AC1667EBCBE1}">
+              <a14:hiddenEffects xmlns:a14="http://schemas.microsoft.com/office/drawing/2010/main">
+                <a:effectLst>
+                  <a:outerShdw dist="35921" dir="2700000" algn="ctr" rotWithShape="0">
+                    <a:schemeClr val="bg2"/>
+                  </a:outerShdw>
+                </a:effectLst>
+              </a14:hiddenEffects>
+            </a:ext>
+          </a:extLst>
+        </p:spPr>
+        <p:txBody>
+          <a:bodyPr vert="horz" wrap="none" lIns="91440" tIns="45720" rIns="91440" bIns="45720" numCol="1" anchor="ctr" anchorCtr="0" compatLnSpc="1">
+            <a:prstTxWarp prst="textNoShape">
+              <a:avLst/>
+            </a:prstTxWarp>
+            <a:spAutoFit/>
+          </a:bodyPr>
+          <a:lstStyle/>
+          <a:p>
+            <a:pPr marL="0" marR="0" lvl="0" indent="0" algn="ctr" defTabSz="914400" rtl="0" eaLnBrk="0" fontAlgn="base" latinLnBrk="0" hangingPunct="0">
+              <a:lnSpc>
+                <a:spcPct val="100000"/>
+              </a:lnSpc>
+              <a:spcBef>
+                <a:spcPct val="0"/>
+              </a:spcBef>
+              <a:spcAft>
+                <a:spcPct val="0"/>
+              </a:spcAft>
+              <a:buClrTx/>
+              <a:buSzTx/>
+              <a:buFontTx/>
+              <a:buNone/>
+              <a:tabLst/>
+            </a:pPr>
+            <a:r>
+              <a:rPr kumimoji="0" lang="en-US" altLang="en-US" sz="2000" b="0" i="1" u="none" strike="noStrike" cap="none" normalizeH="0" baseline="0" dirty="0">
+                <a:ln>
+                  <a:noFill/>
+                </a:ln>
+                <a:effectLst/>
+                <a:latin typeface="Times New Roman" panose="02020603050405020304" pitchFamily="18" charset="0"/>
+                <a:ea typeface="Aptos" panose="020B0004020202020204" pitchFamily="34" charset="0"/>
+                <a:cs typeface="Times New Roman" panose="02020603050405020304" pitchFamily="18" charset="0"/>
+              </a:rPr>
+              <a:t>Figure 5: Model’s Dice Coefficient Plot for 500 Images and 500 Masks</a:t>
+            </a:r>
+            <a:endParaRPr kumimoji="0" lang="en-US" altLang="en-US" sz="2000" b="0" i="0" u="none" strike="noStrike" cap="none" normalizeH="0" baseline="0" dirty="0">
+              <a:ln>
+                <a:noFill/>
+              </a:ln>
+              <a:effectLst/>
+              <a:latin typeface="Times New Roman" panose="02020603050405020304" pitchFamily="18" charset="0"/>
+              <a:cs typeface="Times New Roman" panose="02020603050405020304" pitchFamily="18" charset="0"/>
+            </a:endParaRPr>
+          </a:p>
+        </p:txBody>
+      </p:sp>
     </p:spTree>
     <p:extLst>
       <p:ext uri="{BB962C8B-B14F-4D97-AF65-F5344CB8AC3E}">
@@ -25133,23 +26114,6 @@
 </file>
 
 <file path=customXml/item1.xml><?xml version="1.0" encoding="utf-8"?>
-<p:properties xmlns:p="http://schemas.microsoft.com/office/2006/metadata/properties" xmlns:xsi="http://www.w3.org/2001/XMLSchema-instance" xmlns:pc="http://schemas.microsoft.com/office/infopath/2007/PartnerControls">
-  <documentManagement>
-    <MediaServiceKeyPoints xmlns="71af3243-3dd4-4a8d-8c0d-dd76da1f02a5" xsi:nil="true"/>
-  </documentManagement>
-</p:properties>
-</file>
-
-<file path=customXml/item2.xml><?xml version="1.0" encoding="utf-8"?>
-<?mso-contentType ?>
-<FormTemplates xmlns="http://schemas.microsoft.com/sharepoint/v3/contenttype/forms">
-  <Display>DocumentLibraryForm</Display>
-  <Edit>DocumentLibraryForm</Edit>
-  <New>DocumentLibraryForm</New>
-</FormTemplates>
-</file>
-
-<file path=customXml/item3.xml><?xml version="1.0" encoding="utf-8"?>
 <ct:contentTypeSchema xmlns:ct="http://schemas.microsoft.com/office/2006/metadata/contentType" xmlns:ma="http://schemas.microsoft.com/office/2006/metadata/properties/metaAttributes" ct:_="" ma:_="" ma:contentTypeName="Document" ma:contentTypeID="0x01010079F111ED35F8CC479449609E8A0923A6" ma:contentTypeVersion="11" ma:contentTypeDescription="Create a new document." ma:contentTypeScope="" ma:versionID="96291512c1ee715ab617f4c07df79fc1">
   <xsd:schema xmlns:xsd="http://www.w3.org/2001/XMLSchema" xmlns:xs="http://www.w3.org/2001/XMLSchema" xmlns:p="http://schemas.microsoft.com/office/2006/metadata/properties" xmlns:ns2="71af3243-3dd4-4a8d-8c0d-dd76da1f02a5" xmlns:ns3="16c05727-aa75-4e4a-9b5f-8a80a1165891" targetNamespace="http://schemas.microsoft.com/office/2006/metadata/properties" ma:root="true" ma:fieldsID="8256c27c40ca5c40ce1cf6c44f0205df" ns2:_="" ns3:_="">
     <xsd:import namespace="71af3243-3dd4-4a8d-8c0d-dd76da1f02a5"/>
@@ -25360,32 +26324,24 @@
 </ct:contentTypeSchema>
 </file>
 
-<file path=customXml/itemProps1.xml><?xml version="1.0" encoding="utf-8"?>
-<ds:datastoreItem xmlns:ds="http://schemas.openxmlformats.org/officeDocument/2006/customXml" ds:itemID="{E7866CFD-F94E-4AE5-ACEA-86FEC0F48A10}">
-  <ds:schemaRefs>
-    <ds:schemaRef ds:uri="http://purl.org/dc/elements/1.1/"/>
-    <ds:schemaRef ds:uri="http://schemas.microsoft.com/office/2006/documentManagement/types"/>
-    <ds:schemaRef ds:uri="16c05727-aa75-4e4a-9b5f-8a80a1165891"/>
-    <ds:schemaRef ds:uri="http://purl.org/dc/terms/"/>
-    <ds:schemaRef ds:uri="71af3243-3dd4-4a8d-8c0d-dd76da1f02a5"/>
-    <ds:schemaRef ds:uri="http://schemas.microsoft.com/office/infopath/2007/PartnerControls"/>
-    <ds:schemaRef ds:uri="http://www.w3.org/XML/1998/namespace"/>
-    <ds:schemaRef ds:uri="http://schemas.openxmlformats.org/package/2006/metadata/core-properties"/>
-    <ds:schemaRef ds:uri="http://schemas.microsoft.com/office/2006/metadata/properties"/>
-    <ds:schemaRef ds:uri="http://purl.org/dc/dcmitype/"/>
-  </ds:schemaRefs>
-</ds:datastoreItem>
+<file path=customXml/item2.xml><?xml version="1.0" encoding="utf-8"?>
+<?mso-contentType ?>
+<FormTemplates xmlns="http://schemas.microsoft.com/sharepoint/v3/contenttype/forms">
+  <Display>DocumentLibraryForm</Display>
+  <Edit>DocumentLibraryForm</Edit>
+  <New>DocumentLibraryForm</New>
+</FormTemplates>
 </file>
 
-<file path=customXml/itemProps2.xml><?xml version="1.0" encoding="utf-8"?>
-<ds:datastoreItem xmlns:ds="http://schemas.openxmlformats.org/officeDocument/2006/customXml" ds:itemID="{B579702B-25C7-40D7-9E29-7686B11A9660}">
-  <ds:schemaRefs>
-    <ds:schemaRef ds:uri="http://schemas.microsoft.com/sharepoint/v3/contenttype/forms"/>
-  </ds:schemaRefs>
-</ds:datastoreItem>
+<file path=customXml/item3.xml><?xml version="1.0" encoding="utf-8"?>
+<p:properties xmlns:p="http://schemas.microsoft.com/office/2006/metadata/properties" xmlns:xsi="http://www.w3.org/2001/XMLSchema-instance" xmlns:pc="http://schemas.microsoft.com/office/infopath/2007/PartnerControls">
+  <documentManagement>
+    <MediaServiceKeyPoints xmlns="71af3243-3dd4-4a8d-8c0d-dd76da1f02a5" xsi:nil="true"/>
+  </documentManagement>
+</p:properties>
 </file>
 
-<file path=customXml/itemProps3.xml><?xml version="1.0" encoding="utf-8"?>
+<file path=customXml/itemProps1.xml><?xml version="1.0" encoding="utf-8"?>
 <ds:datastoreItem xmlns:ds="http://schemas.openxmlformats.org/officeDocument/2006/customXml" ds:itemID="{A7C0B241-13E5-418D-8920-D23491E2D2C0}">
   <ds:schemaRefs>
     <ds:schemaRef ds:uri="http://schemas.microsoft.com/office/2006/metadata/contentType"/>
@@ -25402,4 +26358,29 @@
     <ds:schemaRef ds:uri="http://schemas.microsoft.com/internal/obd"/>
   </ds:schemaRefs>
 </ds:datastoreItem>
+</file>
+
+<file path=customXml/itemProps2.xml><?xml version="1.0" encoding="utf-8"?>
+<ds:datastoreItem xmlns:ds="http://schemas.openxmlformats.org/officeDocument/2006/customXml" ds:itemID="{B579702B-25C7-40D7-9E29-7686B11A9660}">
+  <ds:schemaRefs>
+    <ds:schemaRef ds:uri="http://schemas.microsoft.com/sharepoint/v3/contenttype/forms"/>
+  </ds:schemaRefs>
+</ds:datastoreItem>
+</file>
+
+<file path=customXml/itemProps3.xml><?xml version="1.0" encoding="utf-8"?>
+<ds:datastoreItem xmlns:ds="http://schemas.openxmlformats.org/officeDocument/2006/customXml" ds:itemID="{E7866CFD-F94E-4AE5-ACEA-86FEC0F48A10}">
+  <ds:schemaRefs>
+    <ds:schemaRef ds:uri="http://purl.org/dc/elements/1.1/"/>
+    <ds:schemaRef ds:uri="http://schemas.microsoft.com/office/2006/documentManagement/types"/>
+    <ds:schemaRef ds:uri="16c05727-aa75-4e4a-9b5f-8a80a1165891"/>
+    <ds:schemaRef ds:uri="http://purl.org/dc/terms/"/>
+    <ds:schemaRef ds:uri="71af3243-3dd4-4a8d-8c0d-dd76da1f02a5"/>
+    <ds:schemaRef ds:uri="http://schemas.microsoft.com/office/infopath/2007/PartnerControls"/>
+    <ds:schemaRef ds:uri="http://www.w3.org/XML/1998/namespace"/>
+    <ds:schemaRef ds:uri="http://schemas.openxmlformats.org/package/2006/metadata/core-properties"/>
+    <ds:schemaRef ds:uri="http://schemas.microsoft.com/office/2006/metadata/properties"/>
+    <ds:schemaRef ds:uri="http://purl.org/dc/dcmitype/"/>
+  </ds:schemaRefs>
+</ds:datastoreItem>
 </file>
</xml_diff>